<commit_message>
Added numerous GE slides
</commit_message>
<xml_diff>
--- a/03-initial-configuration-scans.pptx
+++ b/03-initial-configuration-scans.pptx
@@ -6,10 +6,10 @@
     <p:sldMasterId id="2147483847" r:id="rId6"/>
   </p:sldMasterIdLst>
   <p:notesMasterIdLst>
-    <p:notesMasterId r:id="rId30"/>
+    <p:notesMasterId r:id="rId36"/>
   </p:notesMasterIdLst>
   <p:handoutMasterIdLst>
-    <p:handoutMasterId r:id="rId31"/>
+    <p:handoutMasterId r:id="rId37"/>
   </p:handoutMasterIdLst>
   <p:sldIdLst>
     <p:sldId id="256" r:id="rId7"/>
@@ -22,19 +22,25 @@
     <p:sldId id="292" r:id="rId14"/>
     <p:sldId id="293" r:id="rId15"/>
     <p:sldId id="295" r:id="rId16"/>
-    <p:sldId id="298" r:id="rId17"/>
-    <p:sldId id="300" r:id="rId18"/>
-    <p:sldId id="297" r:id="rId19"/>
-    <p:sldId id="294" r:id="rId20"/>
-    <p:sldId id="301" r:id="rId21"/>
-    <p:sldId id="302" r:id="rId22"/>
-    <p:sldId id="303" r:id="rId23"/>
-    <p:sldId id="273" r:id="rId24"/>
-    <p:sldId id="274" r:id="rId25"/>
-    <p:sldId id="266" r:id="rId26"/>
-    <p:sldId id="275" r:id="rId27"/>
-    <p:sldId id="276" r:id="rId28"/>
-    <p:sldId id="267" r:id="rId29"/>
+    <p:sldId id="304" r:id="rId17"/>
+    <p:sldId id="305" r:id="rId18"/>
+    <p:sldId id="307" r:id="rId19"/>
+    <p:sldId id="308" r:id="rId20"/>
+    <p:sldId id="297" r:id="rId21"/>
+    <p:sldId id="294" r:id="rId22"/>
+    <p:sldId id="301" r:id="rId23"/>
+    <p:sldId id="302" r:id="rId24"/>
+    <p:sldId id="309" r:id="rId25"/>
+    <p:sldId id="312" r:id="rId26"/>
+    <p:sldId id="313" r:id="rId27"/>
+    <p:sldId id="306" r:id="rId28"/>
+    <p:sldId id="303" r:id="rId29"/>
+    <p:sldId id="273" r:id="rId30"/>
+    <p:sldId id="274" r:id="rId31"/>
+    <p:sldId id="266" r:id="rId32"/>
+    <p:sldId id="275" r:id="rId33"/>
+    <p:sldId id="276" r:id="rId34"/>
+    <p:sldId id="267" r:id="rId35"/>
   </p:sldIdLst>
   <p:sldSz cx="16256000" cy="9144000"/>
   <p:notesSz cx="6858000" cy="9144000"/>
@@ -296,7 +302,7 @@
               <a:pPr>
                 <a:defRPr/>
               </a:pPr>
-              <a:t>2015-12-02</a:t>
+              <a:t>2015-12-04</a:t>
             </a:fld>
             <a:endParaRPr lang="en-US" dirty="0"/>
           </a:p>
@@ -479,7 +485,7 @@
               <a:pPr>
                 <a:defRPr/>
               </a:pPr>
-              <a:t>2015-12-02</a:t>
+              <a:t>2015-12-04</a:t>
             </a:fld>
             <a:endParaRPr lang="en-US" dirty="0"/>
           </a:p>
@@ -1014,6 +1020,1073 @@
 </p:notes>
 </file>
 
+<file path=ppt/notesSlides/notesSlide10.xml><?xml version="1.0" encoding="utf-8"?>
+<p:notes xmlns:a="http://schemas.openxmlformats.org/drawingml/2006/main" xmlns:r="http://schemas.openxmlformats.org/officeDocument/2006/relationships" xmlns:p="http://schemas.openxmlformats.org/presentationml/2006/main">
+  <p:cSld>
+    <p:spTree>
+      <p:nvGrpSpPr>
+        <p:cNvPr id="1" name=""/>
+        <p:cNvGrpSpPr/>
+        <p:nvPr/>
+      </p:nvGrpSpPr>
+      <p:grpSpPr>
+        <a:xfrm>
+          <a:off x="0" y="0"/>
+          <a:ext cx="0" cy="0"/>
+          <a:chOff x="0" y="0"/>
+          <a:chExt cx="0" cy="0"/>
+        </a:xfrm>
+      </p:grpSpPr>
+      <p:sp>
+        <p:nvSpPr>
+          <p:cNvPr id="2" name="Slide Image Placeholder 1"/>
+          <p:cNvSpPr>
+            <a:spLocks noGrp="1" noRot="1" noChangeAspect="1"/>
+          </p:cNvSpPr>
+          <p:nvPr>
+            <p:ph type="sldImg"/>
+          </p:nvPr>
+        </p:nvSpPr>
+        <p:spPr/>
+      </p:sp>
+      <p:sp>
+        <p:nvSpPr>
+          <p:cNvPr id="3" name="Notes Placeholder 2"/>
+          <p:cNvSpPr>
+            <a:spLocks noGrp="1"/>
+          </p:cNvSpPr>
+          <p:nvPr>
+            <p:ph type="body" idx="1"/>
+          </p:nvPr>
+        </p:nvSpPr>
+        <p:spPr/>
+        <p:txBody>
+          <a:bodyPr/>
+          <a:lstStyle/>
+          <a:p>
+            <a:endParaRPr lang="en-US" dirty="0"/>
+          </a:p>
+        </p:txBody>
+      </p:sp>
+      <p:sp>
+        <p:nvSpPr>
+          <p:cNvPr id="4" name="Slide Number Placeholder 3"/>
+          <p:cNvSpPr>
+            <a:spLocks noGrp="1"/>
+          </p:cNvSpPr>
+          <p:nvPr>
+            <p:ph type="sldNum" sz="quarter" idx="10"/>
+          </p:nvPr>
+        </p:nvSpPr>
+        <p:spPr/>
+        <p:txBody>
+          <a:bodyPr/>
+          <a:lstStyle/>
+          <a:p>
+            <a:pPr>
+              <a:defRPr/>
+            </a:pPr>
+            <a:fld id="{DC3734AA-3150-D947-AC52-2F5DF48BFCD5}" type="slidenum">
+              <a:rPr lang="en-US" smtClean="0"/>
+              <a:pPr>
+                <a:defRPr/>
+              </a:pPr>
+              <a:t>15</a:t>
+            </a:fld>
+            <a:endParaRPr lang="en-US" dirty="0"/>
+          </a:p>
+        </p:txBody>
+      </p:sp>
+      <p:sp>
+        <p:nvSpPr>
+          <p:cNvPr id="5" name="Header Placeholder 4"/>
+          <p:cNvSpPr>
+            <a:spLocks noGrp="1"/>
+          </p:cNvSpPr>
+          <p:nvPr>
+            <p:ph type="hdr" sz="quarter" idx="11"/>
+          </p:nvPr>
+        </p:nvSpPr>
+        <p:spPr/>
+        <p:txBody>
+          <a:bodyPr/>
+          <a:lstStyle/>
+          <a:p>
+            <a:pPr>
+              <a:defRPr/>
+            </a:pPr>
+            <a:endParaRPr lang="en-US"/>
+          </a:p>
+        </p:txBody>
+      </p:sp>
+      <p:sp>
+        <p:nvSpPr>
+          <p:cNvPr id="6" name="Footer Placeholder 5"/>
+          <p:cNvSpPr>
+            <a:spLocks noGrp="1"/>
+          </p:cNvSpPr>
+          <p:nvPr>
+            <p:ph type="ftr" sz="quarter" idx="12"/>
+          </p:nvPr>
+        </p:nvSpPr>
+        <p:spPr/>
+        <p:txBody>
+          <a:bodyPr/>
+          <a:lstStyle/>
+          <a:p>
+            <a:pPr>
+              <a:defRPr/>
+            </a:pPr>
+            <a:endParaRPr lang="en-US"/>
+          </a:p>
+        </p:txBody>
+      </p:sp>
+    </p:spTree>
+    <p:extLst>
+      <p:ext uri="{BB962C8B-B14F-4D97-AF65-F5344CB8AC3E}">
+        <p14:creationId xmlns:p14="http://schemas.microsoft.com/office/powerpoint/2010/main" val="2879381677"/>
+      </p:ext>
+    </p:extLst>
+  </p:cSld>
+  <p:clrMapOvr>
+    <a:masterClrMapping/>
+  </p:clrMapOvr>
+</p:notes>
+</file>
+
+<file path=ppt/notesSlides/notesSlide11.xml><?xml version="1.0" encoding="utf-8"?>
+<p:notes xmlns:a="http://schemas.openxmlformats.org/drawingml/2006/main" xmlns:r="http://schemas.openxmlformats.org/officeDocument/2006/relationships" xmlns:p="http://schemas.openxmlformats.org/presentationml/2006/main">
+  <p:cSld>
+    <p:spTree>
+      <p:nvGrpSpPr>
+        <p:cNvPr id="1" name=""/>
+        <p:cNvGrpSpPr/>
+        <p:nvPr/>
+      </p:nvGrpSpPr>
+      <p:grpSpPr>
+        <a:xfrm>
+          <a:off x="0" y="0"/>
+          <a:ext cx="0" cy="0"/>
+          <a:chOff x="0" y="0"/>
+          <a:chExt cx="0" cy="0"/>
+        </a:xfrm>
+      </p:grpSpPr>
+      <p:sp>
+        <p:nvSpPr>
+          <p:cNvPr id="2" name="Slide Image Placeholder 1"/>
+          <p:cNvSpPr>
+            <a:spLocks noGrp="1" noRot="1" noChangeAspect="1"/>
+          </p:cNvSpPr>
+          <p:nvPr>
+            <p:ph type="sldImg"/>
+          </p:nvPr>
+        </p:nvSpPr>
+        <p:spPr/>
+      </p:sp>
+      <p:sp>
+        <p:nvSpPr>
+          <p:cNvPr id="3" name="Notes Placeholder 2"/>
+          <p:cNvSpPr>
+            <a:spLocks noGrp="1"/>
+          </p:cNvSpPr>
+          <p:nvPr>
+            <p:ph type="body" idx="1"/>
+          </p:nvPr>
+        </p:nvSpPr>
+        <p:spPr/>
+        <p:txBody>
+          <a:bodyPr/>
+          <a:lstStyle/>
+          <a:p>
+            <a:endParaRPr lang="en-US" dirty="0"/>
+          </a:p>
+        </p:txBody>
+      </p:sp>
+      <p:sp>
+        <p:nvSpPr>
+          <p:cNvPr id="4" name="Slide Number Placeholder 3"/>
+          <p:cNvSpPr>
+            <a:spLocks noGrp="1"/>
+          </p:cNvSpPr>
+          <p:nvPr>
+            <p:ph type="sldNum" sz="quarter" idx="10"/>
+          </p:nvPr>
+        </p:nvSpPr>
+        <p:spPr/>
+        <p:txBody>
+          <a:bodyPr/>
+          <a:lstStyle/>
+          <a:p>
+            <a:pPr>
+              <a:defRPr/>
+            </a:pPr>
+            <a:fld id="{DC3734AA-3150-D947-AC52-2F5DF48BFCD5}" type="slidenum">
+              <a:rPr lang="en-US" smtClean="0"/>
+              <a:pPr>
+                <a:defRPr/>
+              </a:pPr>
+              <a:t>17</a:t>
+            </a:fld>
+            <a:endParaRPr lang="en-US" dirty="0"/>
+          </a:p>
+        </p:txBody>
+      </p:sp>
+      <p:sp>
+        <p:nvSpPr>
+          <p:cNvPr id="5" name="Header Placeholder 4"/>
+          <p:cNvSpPr>
+            <a:spLocks noGrp="1"/>
+          </p:cNvSpPr>
+          <p:nvPr>
+            <p:ph type="hdr" sz="quarter" idx="11"/>
+          </p:nvPr>
+        </p:nvSpPr>
+        <p:spPr/>
+        <p:txBody>
+          <a:bodyPr/>
+          <a:lstStyle/>
+          <a:p>
+            <a:pPr>
+              <a:defRPr/>
+            </a:pPr>
+            <a:endParaRPr lang="en-US"/>
+          </a:p>
+        </p:txBody>
+      </p:sp>
+      <p:sp>
+        <p:nvSpPr>
+          <p:cNvPr id="6" name="Footer Placeholder 5"/>
+          <p:cNvSpPr>
+            <a:spLocks noGrp="1"/>
+          </p:cNvSpPr>
+          <p:nvPr>
+            <p:ph type="ftr" sz="quarter" idx="12"/>
+          </p:nvPr>
+        </p:nvSpPr>
+        <p:spPr/>
+        <p:txBody>
+          <a:bodyPr/>
+          <a:lstStyle/>
+          <a:p>
+            <a:pPr>
+              <a:defRPr/>
+            </a:pPr>
+            <a:endParaRPr lang="en-US"/>
+          </a:p>
+        </p:txBody>
+      </p:sp>
+    </p:spTree>
+    <p:extLst>
+      <p:ext uri="{BB962C8B-B14F-4D97-AF65-F5344CB8AC3E}">
+        <p14:creationId xmlns:p14="http://schemas.microsoft.com/office/powerpoint/2010/main" val="2151536436"/>
+      </p:ext>
+    </p:extLst>
+  </p:cSld>
+  <p:clrMapOvr>
+    <a:masterClrMapping/>
+  </p:clrMapOvr>
+</p:notes>
+</file>
+
+<file path=ppt/notesSlides/notesSlide12.xml><?xml version="1.0" encoding="utf-8"?>
+<p:notes xmlns:a="http://schemas.openxmlformats.org/drawingml/2006/main" xmlns:r="http://schemas.openxmlformats.org/officeDocument/2006/relationships" xmlns:p="http://schemas.openxmlformats.org/presentationml/2006/main">
+  <p:cSld>
+    <p:spTree>
+      <p:nvGrpSpPr>
+        <p:cNvPr id="1" name=""/>
+        <p:cNvGrpSpPr/>
+        <p:nvPr/>
+      </p:nvGrpSpPr>
+      <p:grpSpPr>
+        <a:xfrm>
+          <a:off x="0" y="0"/>
+          <a:ext cx="0" cy="0"/>
+          <a:chOff x="0" y="0"/>
+          <a:chExt cx="0" cy="0"/>
+        </a:xfrm>
+      </p:grpSpPr>
+      <p:sp>
+        <p:nvSpPr>
+          <p:cNvPr id="2" name="Slide Image Placeholder 1"/>
+          <p:cNvSpPr>
+            <a:spLocks noGrp="1" noRot="1" noChangeAspect="1"/>
+          </p:cNvSpPr>
+          <p:nvPr>
+            <p:ph type="sldImg"/>
+          </p:nvPr>
+        </p:nvSpPr>
+        <p:spPr/>
+      </p:sp>
+      <p:sp>
+        <p:nvSpPr>
+          <p:cNvPr id="3" name="Notes Placeholder 2"/>
+          <p:cNvSpPr>
+            <a:spLocks noGrp="1"/>
+          </p:cNvSpPr>
+          <p:nvPr>
+            <p:ph type="body" idx="1"/>
+          </p:nvPr>
+        </p:nvSpPr>
+        <p:spPr/>
+        <p:txBody>
+          <a:bodyPr/>
+          <a:lstStyle/>
+          <a:p>
+            <a:r>
+              <a:rPr lang="en-US" dirty="0" smtClean="0"/>
+              <a:t>There are also 6 critical issues related to ssh on the target node.</a:t>
+            </a:r>
+          </a:p>
+          <a:p>
+            <a:endParaRPr lang="en-US" dirty="0" smtClean="0"/>
+          </a:p>
+          <a:p>
+            <a:r>
+              <a:rPr lang="en-US" dirty="0" smtClean="0"/>
+              <a:t>Instructor Note: This</a:t>
+            </a:r>
+            <a:r>
+              <a:rPr lang="en-US" baseline="0" dirty="0" smtClean="0"/>
+              <a:t> and the following slide should be used for a discussion of the scan results. The group exercise continues after that.</a:t>
+            </a:r>
+            <a:endParaRPr lang="en-US" dirty="0"/>
+          </a:p>
+        </p:txBody>
+      </p:sp>
+      <p:sp>
+        <p:nvSpPr>
+          <p:cNvPr id="4" name="Slide Number Placeholder 3"/>
+          <p:cNvSpPr>
+            <a:spLocks noGrp="1"/>
+          </p:cNvSpPr>
+          <p:nvPr>
+            <p:ph type="sldNum" sz="quarter" idx="10"/>
+          </p:nvPr>
+        </p:nvSpPr>
+        <p:spPr/>
+        <p:txBody>
+          <a:bodyPr/>
+          <a:lstStyle/>
+          <a:p>
+            <a:pPr>
+              <a:defRPr/>
+            </a:pPr>
+            <a:fld id="{DC3734AA-3150-D947-AC52-2F5DF48BFCD5}" type="slidenum">
+              <a:rPr lang="en-US" smtClean="0"/>
+              <a:pPr>
+                <a:defRPr/>
+              </a:pPr>
+              <a:t>18</a:t>
+            </a:fld>
+            <a:endParaRPr lang="en-US" dirty="0"/>
+          </a:p>
+        </p:txBody>
+      </p:sp>
+      <p:sp>
+        <p:nvSpPr>
+          <p:cNvPr id="5" name="Header Placeholder 4"/>
+          <p:cNvSpPr>
+            <a:spLocks noGrp="1"/>
+          </p:cNvSpPr>
+          <p:nvPr>
+            <p:ph type="hdr" sz="quarter" idx="11"/>
+          </p:nvPr>
+        </p:nvSpPr>
+        <p:spPr/>
+        <p:txBody>
+          <a:bodyPr/>
+          <a:lstStyle/>
+          <a:p>
+            <a:pPr>
+              <a:defRPr/>
+            </a:pPr>
+            <a:endParaRPr lang="en-US"/>
+          </a:p>
+        </p:txBody>
+      </p:sp>
+      <p:sp>
+        <p:nvSpPr>
+          <p:cNvPr id="6" name="Footer Placeholder 5"/>
+          <p:cNvSpPr>
+            <a:spLocks noGrp="1"/>
+          </p:cNvSpPr>
+          <p:nvPr>
+            <p:ph type="ftr" sz="quarter" idx="12"/>
+          </p:nvPr>
+        </p:nvSpPr>
+        <p:spPr/>
+        <p:txBody>
+          <a:bodyPr/>
+          <a:lstStyle/>
+          <a:p>
+            <a:pPr>
+              <a:defRPr/>
+            </a:pPr>
+            <a:endParaRPr lang="en-US"/>
+          </a:p>
+        </p:txBody>
+      </p:sp>
+    </p:spTree>
+    <p:extLst>
+      <p:ext uri="{BB962C8B-B14F-4D97-AF65-F5344CB8AC3E}">
+        <p14:creationId xmlns:p14="http://schemas.microsoft.com/office/powerpoint/2010/main" val="1213312203"/>
+      </p:ext>
+    </p:extLst>
+  </p:cSld>
+  <p:clrMapOvr>
+    <a:masterClrMapping/>
+  </p:clrMapOvr>
+</p:notes>
+</file>
+
+<file path=ppt/notesSlides/notesSlide13.xml><?xml version="1.0" encoding="utf-8"?>
+<p:notes xmlns:a="http://schemas.openxmlformats.org/drawingml/2006/main" xmlns:r="http://schemas.openxmlformats.org/officeDocument/2006/relationships" xmlns:p="http://schemas.openxmlformats.org/presentationml/2006/main">
+  <p:cSld>
+    <p:spTree>
+      <p:nvGrpSpPr>
+        <p:cNvPr id="1" name=""/>
+        <p:cNvGrpSpPr/>
+        <p:nvPr/>
+      </p:nvGrpSpPr>
+      <p:grpSpPr>
+        <a:xfrm>
+          <a:off x="0" y="0"/>
+          <a:ext cx="0" cy="0"/>
+          <a:chOff x="0" y="0"/>
+          <a:chExt cx="0" cy="0"/>
+        </a:xfrm>
+      </p:grpSpPr>
+      <p:sp>
+        <p:nvSpPr>
+          <p:cNvPr id="2" name="Slide Image Placeholder 1"/>
+          <p:cNvSpPr>
+            <a:spLocks noGrp="1" noRot="1" noChangeAspect="1"/>
+          </p:cNvSpPr>
+          <p:nvPr>
+            <p:ph type="sldImg"/>
+          </p:nvPr>
+        </p:nvSpPr>
+        <p:spPr/>
+      </p:sp>
+      <p:sp>
+        <p:nvSpPr>
+          <p:cNvPr id="3" name="Notes Placeholder 2"/>
+          <p:cNvSpPr>
+            <a:spLocks noGrp="1"/>
+          </p:cNvSpPr>
+          <p:nvPr>
+            <p:ph type="body" idx="1"/>
+          </p:nvPr>
+        </p:nvSpPr>
+        <p:spPr/>
+        <p:txBody>
+          <a:bodyPr/>
+          <a:lstStyle/>
+          <a:p>
+            <a:r>
+              <a:rPr lang="en-US" dirty="0" smtClean="0"/>
+              <a:t>The bottom half of the Compliance Report has a table of details of test results.</a:t>
+            </a:r>
+          </a:p>
+          <a:p>
+            <a:endParaRPr lang="en-US" dirty="0" smtClean="0"/>
+          </a:p>
+          <a:p>
+            <a:r>
+              <a:rPr lang="en-US" dirty="0" smtClean="0"/>
+              <a:t>These are sorted by severity so the critical issues are listed at the top and the compliant items are at the bottom of the list.     </a:t>
+            </a:r>
+          </a:p>
+          <a:p>
+            <a:endParaRPr lang="en-US" dirty="0" smtClean="0"/>
+          </a:p>
+          <a:p>
+            <a:pPr marL="0" marR="0" indent="0" algn="l" defTabSz="1217613" rtl="0" eaLnBrk="1" fontAlgn="base" latinLnBrk="0" hangingPunct="1">
+              <a:lnSpc>
+                <a:spcPct val="90000"/>
+              </a:lnSpc>
+              <a:spcBef>
+                <a:spcPct val="30000"/>
+              </a:spcBef>
+              <a:spcAft>
+                <a:spcPts val="450"/>
+              </a:spcAft>
+              <a:buClrTx/>
+              <a:buSzTx/>
+              <a:buFontTx/>
+              <a:buNone/>
+              <a:tabLst/>
+              <a:defRPr/>
+            </a:pPr>
+            <a:r>
+              <a:rPr lang="en-US" dirty="0" smtClean="0"/>
+              <a:t>If you click an issue as shown here, a bit more information about the issue displays,</a:t>
+            </a:r>
+            <a:r>
+              <a:rPr lang="en-US" baseline="0" dirty="0" smtClean="0"/>
+              <a:t> but that's not really telling us much.</a:t>
+            </a:r>
+            <a:endParaRPr lang="en-US" dirty="0" smtClean="0"/>
+          </a:p>
+          <a:p>
+            <a:endParaRPr lang="en-US" dirty="0" smtClean="0"/>
+          </a:p>
+          <a:p>
+            <a:endParaRPr lang="en-US" dirty="0"/>
+          </a:p>
+        </p:txBody>
+      </p:sp>
+      <p:sp>
+        <p:nvSpPr>
+          <p:cNvPr id="4" name="Slide Number Placeholder 3"/>
+          <p:cNvSpPr>
+            <a:spLocks noGrp="1"/>
+          </p:cNvSpPr>
+          <p:nvPr>
+            <p:ph type="sldNum" sz="quarter" idx="10"/>
+          </p:nvPr>
+        </p:nvSpPr>
+        <p:spPr/>
+        <p:txBody>
+          <a:bodyPr/>
+          <a:lstStyle/>
+          <a:p>
+            <a:pPr>
+              <a:defRPr/>
+            </a:pPr>
+            <a:fld id="{DC3734AA-3150-D947-AC52-2F5DF48BFCD5}" type="slidenum">
+              <a:rPr lang="en-US" smtClean="0"/>
+              <a:pPr>
+                <a:defRPr/>
+              </a:pPr>
+              <a:t>19</a:t>
+            </a:fld>
+            <a:endParaRPr lang="en-US" dirty="0"/>
+          </a:p>
+        </p:txBody>
+      </p:sp>
+      <p:sp>
+        <p:nvSpPr>
+          <p:cNvPr id="5" name="Header Placeholder 4"/>
+          <p:cNvSpPr>
+            <a:spLocks noGrp="1"/>
+          </p:cNvSpPr>
+          <p:nvPr>
+            <p:ph type="hdr" sz="quarter" idx="11"/>
+          </p:nvPr>
+        </p:nvSpPr>
+        <p:spPr/>
+        <p:txBody>
+          <a:bodyPr/>
+          <a:lstStyle/>
+          <a:p>
+            <a:pPr>
+              <a:defRPr/>
+            </a:pPr>
+            <a:endParaRPr lang="en-US"/>
+          </a:p>
+        </p:txBody>
+      </p:sp>
+      <p:sp>
+        <p:nvSpPr>
+          <p:cNvPr id="6" name="Footer Placeholder 5"/>
+          <p:cNvSpPr>
+            <a:spLocks noGrp="1"/>
+          </p:cNvSpPr>
+          <p:nvPr>
+            <p:ph type="ftr" sz="quarter" idx="12"/>
+          </p:nvPr>
+        </p:nvSpPr>
+        <p:spPr/>
+        <p:txBody>
+          <a:bodyPr/>
+          <a:lstStyle/>
+          <a:p>
+            <a:pPr>
+              <a:defRPr/>
+            </a:pPr>
+            <a:endParaRPr lang="en-US"/>
+          </a:p>
+        </p:txBody>
+      </p:sp>
+    </p:spTree>
+    <p:extLst>
+      <p:ext uri="{BB962C8B-B14F-4D97-AF65-F5344CB8AC3E}">
+        <p14:creationId xmlns:p14="http://schemas.microsoft.com/office/powerpoint/2010/main" val="4045622586"/>
+      </p:ext>
+    </p:extLst>
+  </p:cSld>
+  <p:clrMapOvr>
+    <a:masterClrMapping/>
+  </p:clrMapOvr>
+</p:notes>
+</file>
+
+<file path=ppt/notesSlides/notesSlide14.xml><?xml version="1.0" encoding="utf-8"?>
+<p:notes xmlns:a="http://schemas.openxmlformats.org/drawingml/2006/main" xmlns:r="http://schemas.openxmlformats.org/officeDocument/2006/relationships" xmlns:p="http://schemas.openxmlformats.org/presentationml/2006/main">
+  <p:cSld>
+    <p:spTree>
+      <p:nvGrpSpPr>
+        <p:cNvPr id="1" name=""/>
+        <p:cNvGrpSpPr/>
+        <p:nvPr/>
+      </p:nvGrpSpPr>
+      <p:grpSpPr>
+        <a:xfrm>
+          <a:off x="0" y="0"/>
+          <a:ext cx="0" cy="0"/>
+          <a:chOff x="0" y="0"/>
+          <a:chExt cx="0" cy="0"/>
+        </a:xfrm>
+      </p:grpSpPr>
+      <p:sp>
+        <p:nvSpPr>
+          <p:cNvPr id="2" name="Slide Image Placeholder 1"/>
+          <p:cNvSpPr>
+            <a:spLocks noGrp="1" noRot="1" noChangeAspect="1"/>
+          </p:cNvSpPr>
+          <p:nvPr>
+            <p:ph type="sldImg"/>
+          </p:nvPr>
+        </p:nvSpPr>
+        <p:spPr/>
+      </p:sp>
+      <p:sp>
+        <p:nvSpPr>
+          <p:cNvPr id="3" name="Notes Placeholder 2"/>
+          <p:cNvSpPr>
+            <a:spLocks noGrp="1"/>
+          </p:cNvSpPr>
+          <p:nvPr>
+            <p:ph type="body" idx="1"/>
+          </p:nvPr>
+        </p:nvSpPr>
+        <p:spPr/>
+        <p:txBody>
+          <a:bodyPr/>
+          <a:lstStyle/>
+          <a:p>
+            <a:r>
+              <a:rPr lang="en-US" dirty="0" smtClean="0"/>
+              <a:t>Instructor Note: Now we continue the group exercise but you</a:t>
+            </a:r>
+            <a:r>
+              <a:rPr lang="en-US" baseline="0" dirty="0" smtClean="0"/>
+              <a:t> should stop as needed to explain what this code means.</a:t>
+            </a:r>
+            <a:endParaRPr lang="en-US" dirty="0" smtClean="0"/>
+          </a:p>
+          <a:p>
+            <a:endParaRPr lang="en-US" dirty="0" smtClean="0"/>
+          </a:p>
+          <a:p>
+            <a:endParaRPr lang="en-US" dirty="0"/>
+          </a:p>
+        </p:txBody>
+      </p:sp>
+      <p:sp>
+        <p:nvSpPr>
+          <p:cNvPr id="4" name="Slide Number Placeholder 3"/>
+          <p:cNvSpPr>
+            <a:spLocks noGrp="1"/>
+          </p:cNvSpPr>
+          <p:nvPr>
+            <p:ph type="sldNum" sz="quarter" idx="10"/>
+          </p:nvPr>
+        </p:nvSpPr>
+        <p:spPr/>
+        <p:txBody>
+          <a:bodyPr/>
+          <a:lstStyle/>
+          <a:p>
+            <a:pPr>
+              <a:defRPr/>
+            </a:pPr>
+            <a:fld id="{DC3734AA-3150-D947-AC52-2F5DF48BFCD5}" type="slidenum">
+              <a:rPr lang="en-US" smtClean="0"/>
+              <a:pPr>
+                <a:defRPr/>
+              </a:pPr>
+              <a:t>20</a:t>
+            </a:fld>
+            <a:endParaRPr lang="en-US" dirty="0"/>
+          </a:p>
+        </p:txBody>
+      </p:sp>
+      <p:sp>
+        <p:nvSpPr>
+          <p:cNvPr id="5" name="Header Placeholder 4"/>
+          <p:cNvSpPr>
+            <a:spLocks noGrp="1"/>
+          </p:cNvSpPr>
+          <p:nvPr>
+            <p:ph type="hdr" sz="quarter" idx="11"/>
+          </p:nvPr>
+        </p:nvSpPr>
+        <p:spPr/>
+        <p:txBody>
+          <a:bodyPr/>
+          <a:lstStyle/>
+          <a:p>
+            <a:pPr>
+              <a:defRPr/>
+            </a:pPr>
+            <a:endParaRPr lang="en-US"/>
+          </a:p>
+        </p:txBody>
+      </p:sp>
+      <p:sp>
+        <p:nvSpPr>
+          <p:cNvPr id="6" name="Footer Placeholder 5"/>
+          <p:cNvSpPr>
+            <a:spLocks noGrp="1"/>
+          </p:cNvSpPr>
+          <p:nvPr>
+            <p:ph type="ftr" sz="quarter" idx="12"/>
+          </p:nvPr>
+        </p:nvSpPr>
+        <p:spPr/>
+        <p:txBody>
+          <a:bodyPr/>
+          <a:lstStyle/>
+          <a:p>
+            <a:pPr>
+              <a:defRPr/>
+            </a:pPr>
+            <a:endParaRPr lang="en-US"/>
+          </a:p>
+        </p:txBody>
+      </p:sp>
+    </p:spTree>
+    <p:extLst>
+      <p:ext uri="{BB962C8B-B14F-4D97-AF65-F5344CB8AC3E}">
+        <p14:creationId xmlns:p14="http://schemas.microsoft.com/office/powerpoint/2010/main" val="4240485001"/>
+      </p:ext>
+    </p:extLst>
+  </p:cSld>
+  <p:clrMapOvr>
+    <a:masterClrMapping/>
+  </p:clrMapOvr>
+</p:notes>
+</file>
+
+<file path=ppt/notesSlides/notesSlide15.xml><?xml version="1.0" encoding="utf-8"?>
+<p:notes xmlns:a="http://schemas.openxmlformats.org/drawingml/2006/main" xmlns:r="http://schemas.openxmlformats.org/officeDocument/2006/relationships" xmlns:p="http://schemas.openxmlformats.org/presentationml/2006/main">
+  <p:cSld>
+    <p:spTree>
+      <p:nvGrpSpPr>
+        <p:cNvPr id="1" name=""/>
+        <p:cNvGrpSpPr/>
+        <p:nvPr/>
+      </p:nvGrpSpPr>
+      <p:grpSpPr>
+        <a:xfrm>
+          <a:off x="0" y="0"/>
+          <a:ext cx="0" cy="0"/>
+          <a:chOff x="0" y="0"/>
+          <a:chExt cx="0" cy="0"/>
+        </a:xfrm>
+      </p:grpSpPr>
+      <p:sp>
+        <p:nvSpPr>
+          <p:cNvPr id="2" name="Slide Image Placeholder 1"/>
+          <p:cNvSpPr>
+            <a:spLocks noGrp="1" noRot="1" noChangeAspect="1"/>
+          </p:cNvSpPr>
+          <p:nvPr>
+            <p:ph type="sldImg"/>
+          </p:nvPr>
+        </p:nvSpPr>
+        <p:spPr/>
+      </p:sp>
+      <p:sp>
+        <p:nvSpPr>
+          <p:cNvPr id="3" name="Notes Placeholder 2"/>
+          <p:cNvSpPr>
+            <a:spLocks noGrp="1"/>
+          </p:cNvSpPr>
+          <p:nvPr>
+            <p:ph type="body" idx="1"/>
+          </p:nvPr>
+        </p:nvSpPr>
+        <p:spPr/>
+        <p:txBody>
+          <a:bodyPr/>
+          <a:lstStyle/>
+          <a:p>
+            <a:r>
+              <a:rPr lang="en-US" dirty="0" smtClean="0"/>
+              <a:t>Let's discuss what this profile is doing.</a:t>
+            </a:r>
+          </a:p>
+          <a:p>
+            <a:endParaRPr lang="en-US" dirty="0" smtClean="0"/>
+          </a:p>
+          <a:p>
+            <a:r>
+              <a:rPr lang="en-US" sz="1200" dirty="0" smtClean="0"/>
+              <a:t>The impact of 1.0 indicates this is a Major issue.</a:t>
+            </a:r>
+          </a:p>
+          <a:p>
+            <a:endParaRPr lang="en-US" sz="1200" dirty="0" smtClean="0"/>
+          </a:p>
+          <a:p>
+            <a:r>
+              <a:rPr lang="en-US" sz="1200" dirty="0" smtClean="0"/>
+              <a:t>The title is what populates the Compliance Report issue title.</a:t>
+            </a:r>
+          </a:p>
+          <a:p>
+            <a:endParaRPr lang="en-US" sz="1200" dirty="0" smtClean="0"/>
+          </a:p>
+          <a:p>
+            <a:r>
+              <a:rPr lang="en-US" sz="1200" dirty="0" smtClean="0"/>
+              <a:t>The describe value is the actual test. In this case, this is saying the protocol for </a:t>
+            </a:r>
+            <a:r>
+              <a:rPr lang="en-US" sz="1200" dirty="0" err="1" smtClean="0"/>
+              <a:t>ssh_config</a:t>
+            </a:r>
+            <a:r>
+              <a:rPr lang="en-US" sz="1200" dirty="0" smtClean="0"/>
+              <a:t> should be 2. If the actual value from the node is not Protocol 2, the Major issue is reported </a:t>
+            </a:r>
+            <a:r>
+              <a:rPr lang="en-US" sz="1200" baseline="0" dirty="0" smtClean="0"/>
+              <a:t>as in this case.</a:t>
+            </a:r>
+            <a:endParaRPr lang="en-US" sz="1200" dirty="0" smtClean="0"/>
+          </a:p>
+          <a:p>
+            <a:endParaRPr lang="en-US" dirty="0" smtClean="0"/>
+          </a:p>
+          <a:p>
+            <a:endParaRPr lang="en-US" dirty="0"/>
+          </a:p>
+        </p:txBody>
+      </p:sp>
+      <p:sp>
+        <p:nvSpPr>
+          <p:cNvPr id="4" name="Slide Number Placeholder 3"/>
+          <p:cNvSpPr>
+            <a:spLocks noGrp="1"/>
+          </p:cNvSpPr>
+          <p:nvPr>
+            <p:ph type="sldNum" sz="quarter" idx="10"/>
+          </p:nvPr>
+        </p:nvSpPr>
+        <p:spPr/>
+        <p:txBody>
+          <a:bodyPr/>
+          <a:lstStyle/>
+          <a:p>
+            <a:pPr>
+              <a:defRPr/>
+            </a:pPr>
+            <a:fld id="{DC3734AA-3150-D947-AC52-2F5DF48BFCD5}" type="slidenum">
+              <a:rPr lang="en-US" smtClean="0"/>
+              <a:pPr>
+                <a:defRPr/>
+              </a:pPr>
+              <a:t>21</a:t>
+            </a:fld>
+            <a:endParaRPr lang="en-US" dirty="0"/>
+          </a:p>
+        </p:txBody>
+      </p:sp>
+      <p:sp>
+        <p:nvSpPr>
+          <p:cNvPr id="5" name="Header Placeholder 4"/>
+          <p:cNvSpPr>
+            <a:spLocks noGrp="1"/>
+          </p:cNvSpPr>
+          <p:nvPr>
+            <p:ph type="hdr" sz="quarter" idx="11"/>
+          </p:nvPr>
+        </p:nvSpPr>
+        <p:spPr/>
+        <p:txBody>
+          <a:bodyPr/>
+          <a:lstStyle/>
+          <a:p>
+            <a:pPr>
+              <a:defRPr/>
+            </a:pPr>
+            <a:endParaRPr lang="en-US"/>
+          </a:p>
+        </p:txBody>
+      </p:sp>
+      <p:sp>
+        <p:nvSpPr>
+          <p:cNvPr id="6" name="Footer Placeholder 5"/>
+          <p:cNvSpPr>
+            <a:spLocks noGrp="1"/>
+          </p:cNvSpPr>
+          <p:nvPr>
+            <p:ph type="ftr" sz="quarter" idx="12"/>
+          </p:nvPr>
+        </p:nvSpPr>
+        <p:spPr/>
+        <p:txBody>
+          <a:bodyPr/>
+          <a:lstStyle/>
+          <a:p>
+            <a:pPr>
+              <a:defRPr/>
+            </a:pPr>
+            <a:endParaRPr lang="en-US"/>
+          </a:p>
+        </p:txBody>
+      </p:sp>
+    </p:spTree>
+    <p:extLst>
+      <p:ext uri="{BB962C8B-B14F-4D97-AF65-F5344CB8AC3E}">
+        <p14:creationId xmlns:p14="http://schemas.microsoft.com/office/powerpoint/2010/main" val="445567721"/>
+      </p:ext>
+    </p:extLst>
+  </p:cSld>
+  <p:clrMapOvr>
+    <a:masterClrMapping/>
+  </p:clrMapOvr>
+</p:notes>
+</file>
+
+<file path=ppt/notesSlides/notesSlide16.xml><?xml version="1.0" encoding="utf-8"?>
+<p:notes xmlns:a="http://schemas.openxmlformats.org/drawingml/2006/main" xmlns:r="http://schemas.openxmlformats.org/officeDocument/2006/relationships" xmlns:p="http://schemas.openxmlformats.org/presentationml/2006/main">
+  <p:cSld>
+    <p:spTree>
+      <p:nvGrpSpPr>
+        <p:cNvPr id="1" name=""/>
+        <p:cNvGrpSpPr/>
+        <p:nvPr/>
+      </p:nvGrpSpPr>
+      <p:grpSpPr>
+        <a:xfrm>
+          <a:off x="0" y="0"/>
+          <a:ext cx="0" cy="0"/>
+          <a:chOff x="0" y="0"/>
+          <a:chExt cx="0" cy="0"/>
+        </a:xfrm>
+      </p:grpSpPr>
+      <p:sp>
+        <p:nvSpPr>
+          <p:cNvPr id="2" name="Slide Image Placeholder 1"/>
+          <p:cNvSpPr>
+            <a:spLocks noGrp="1" noRot="1" noChangeAspect="1"/>
+          </p:cNvSpPr>
+          <p:nvPr>
+            <p:ph type="sldImg"/>
+          </p:nvPr>
+        </p:nvSpPr>
+        <p:spPr/>
+      </p:sp>
+      <p:sp>
+        <p:nvSpPr>
+          <p:cNvPr id="3" name="Notes Placeholder 2"/>
+          <p:cNvSpPr>
+            <a:spLocks noGrp="1"/>
+          </p:cNvSpPr>
+          <p:nvPr>
+            <p:ph type="body" idx="1"/>
+          </p:nvPr>
+        </p:nvSpPr>
+        <p:spPr/>
+        <p:txBody>
+          <a:bodyPr/>
+          <a:lstStyle/>
+          <a:p>
+            <a:endParaRPr lang="en-US" dirty="0"/>
+          </a:p>
+        </p:txBody>
+      </p:sp>
+      <p:sp>
+        <p:nvSpPr>
+          <p:cNvPr id="4" name="Slide Number Placeholder 3"/>
+          <p:cNvSpPr>
+            <a:spLocks noGrp="1"/>
+          </p:cNvSpPr>
+          <p:nvPr>
+            <p:ph type="sldNum" sz="quarter" idx="10"/>
+          </p:nvPr>
+        </p:nvSpPr>
+        <p:spPr/>
+        <p:txBody>
+          <a:bodyPr/>
+          <a:lstStyle/>
+          <a:p>
+            <a:pPr>
+              <a:defRPr/>
+            </a:pPr>
+            <a:fld id="{DC3734AA-3150-D947-AC52-2F5DF48BFCD5}" type="slidenum">
+              <a:rPr lang="en-US" smtClean="0"/>
+              <a:pPr>
+                <a:defRPr/>
+              </a:pPr>
+              <a:t>22</a:t>
+            </a:fld>
+            <a:endParaRPr lang="en-US" dirty="0"/>
+          </a:p>
+        </p:txBody>
+      </p:sp>
+      <p:sp>
+        <p:nvSpPr>
+          <p:cNvPr id="5" name="Header Placeholder 4"/>
+          <p:cNvSpPr>
+            <a:spLocks noGrp="1"/>
+          </p:cNvSpPr>
+          <p:nvPr>
+            <p:ph type="hdr" sz="quarter" idx="11"/>
+          </p:nvPr>
+        </p:nvSpPr>
+        <p:spPr/>
+        <p:txBody>
+          <a:bodyPr/>
+          <a:lstStyle/>
+          <a:p>
+            <a:pPr>
+              <a:defRPr/>
+            </a:pPr>
+            <a:endParaRPr lang="en-US"/>
+          </a:p>
+        </p:txBody>
+      </p:sp>
+      <p:sp>
+        <p:nvSpPr>
+          <p:cNvPr id="6" name="Footer Placeholder 5"/>
+          <p:cNvSpPr>
+            <a:spLocks noGrp="1"/>
+          </p:cNvSpPr>
+          <p:nvPr>
+            <p:ph type="ftr" sz="quarter" idx="12"/>
+          </p:nvPr>
+        </p:nvSpPr>
+        <p:spPr/>
+        <p:txBody>
+          <a:bodyPr/>
+          <a:lstStyle/>
+          <a:p>
+            <a:pPr>
+              <a:defRPr/>
+            </a:pPr>
+            <a:endParaRPr lang="en-US"/>
+          </a:p>
+        </p:txBody>
+      </p:sp>
+    </p:spTree>
+    <p:extLst>
+      <p:ext uri="{BB962C8B-B14F-4D97-AF65-F5344CB8AC3E}">
+        <p14:creationId xmlns:p14="http://schemas.microsoft.com/office/powerpoint/2010/main" val="161960279"/>
+      </p:ext>
+    </p:extLst>
+  </p:cSld>
+  <p:clrMapOvr>
+    <a:masterClrMapping/>
+  </p:clrMapOvr>
+</p:notes>
+</file>
+
 <file path=ppt/notesSlides/notesSlide2.xml><?xml version="1.0" encoding="utf-8"?>
 <p:notes xmlns:a="http://schemas.openxmlformats.org/drawingml/2006/main" xmlns:r="http://schemas.openxmlformats.org/officeDocument/2006/relationships" xmlns:p="http://schemas.openxmlformats.org/presentationml/2006/main">
   <p:cSld>
@@ -1198,7 +2271,28 @@
             </a:r>
             <a:r>
               <a:rPr lang="en-US" baseline="0" dirty="0" smtClean="0"/>
-              <a:t> node's username and password will likely different than shown in this example.</a:t>
+              <a:t> node's username and password will likely </a:t>
+            </a:r>
+            <a:r>
+              <a:rPr lang="en-US" baseline="0" dirty="0" smtClean="0"/>
+              <a:t>be different </a:t>
+            </a:r>
+            <a:r>
+              <a:rPr lang="en-US" baseline="0" dirty="0" smtClean="0"/>
+              <a:t>than shown in this example</a:t>
+            </a:r>
+            <a:r>
+              <a:rPr lang="en-US" baseline="0" dirty="0" smtClean="0"/>
+              <a:t>.</a:t>
+            </a:r>
+          </a:p>
+          <a:p>
+            <a:endParaRPr lang="en-US" baseline="0" dirty="0" smtClean="0"/>
+          </a:p>
+          <a:p>
+            <a:r>
+              <a:rPr lang="en-US" baseline="0" dirty="0" smtClean="0"/>
+              <a:t>We'll discuss using key pair access later in the module.</a:t>
             </a:r>
             <a:endParaRPr lang="en-US" dirty="0"/>
           </a:p>
@@ -1490,7 +2584,15 @@
             </a:r>
             <a:r>
               <a:rPr lang="en-US" b="0" baseline="0" dirty="0" smtClean="0"/>
-              <a:t> please notify your instructor.</a:t>
+              <a:t> please notify </a:t>
+            </a:r>
+            <a:r>
+              <a:rPr lang="en-US" b="0" baseline="0" dirty="0" smtClean="0"/>
+              <a:t>the instructor</a:t>
+            </a:r>
+            <a:r>
+              <a:rPr lang="en-US" b="0" baseline="0" dirty="0" smtClean="0"/>
+              <a:t>.</a:t>
             </a:r>
             <a:endParaRPr lang="en-US" dirty="0"/>
           </a:p>
@@ -1628,30 +2730,16 @@
           <a:p>
             <a:r>
               <a:rPr lang="en-US" dirty="0" smtClean="0"/>
-              <a:t>This image shows the default Compliance Profiles that are included with the Chef Compliance server. You'll access the profiles in a moment. These profiles</a:t>
-            </a:r>
-            <a:r>
-              <a:rPr lang="en-US" baseline="0" dirty="0" smtClean="0"/>
-              <a:t> determine what will be scanned on your nodes.</a:t>
-            </a:r>
+              <a:t>As you may have noticed, you could add additional nodes by simply repeating the previous steps and entering the new nodes' IP addresses or FQDNs.</a:t>
+            </a:r>
+          </a:p>
+          <a:p>
             <a:endParaRPr lang="en-US" dirty="0" smtClean="0"/>
           </a:p>
           <a:p>
-            <a:endParaRPr lang="en-US" dirty="0" smtClean="0"/>
-          </a:p>
-          <a:p>
-            <a:r>
-              <a:rPr lang="en-US" dirty="0" smtClean="0"/>
-              <a:t>You should be thoughtful with which profiles choose since the more you choose to run, the longer it will take to execute the scan.</a:t>
-            </a:r>
-          </a:p>
-          <a:p>
-            <a:endParaRPr lang="en-US" dirty="0" smtClean="0"/>
-          </a:p>
-          <a:p>
-            <a:r>
-              <a:rPr lang="en-US" dirty="0" smtClean="0"/>
-              <a:t>Notice how you can also choose to run a scan on demand (Scan now) or schedule a scan to run at a later time.</a:t>
+            <a:r>
+              <a:rPr lang="en-US" dirty="0" smtClean="0"/>
+              <a:t>You could also add nodes in bulk by separating each hostname or IP address with a comma or a space as shown in this illustration.</a:t>
             </a:r>
           </a:p>
           <a:p>
@@ -1682,7 +2770,7 @@
               <a:pPr>
                 <a:defRPr/>
               </a:pPr>
-              <a:t>12</a:t>
+              <a:t>11</a:t>
             </a:fld>
             <a:endParaRPr lang="en-US" dirty="0"/>
           </a:p>
@@ -1735,7 +2823,7 @@
     </p:spTree>
     <p:extLst>
       <p:ext uri="{BB962C8B-B14F-4D97-AF65-F5344CB8AC3E}">
-        <p14:creationId xmlns:p14="http://schemas.microsoft.com/office/powerpoint/2010/main" val="70162713"/>
+        <p14:creationId xmlns:p14="http://schemas.microsoft.com/office/powerpoint/2010/main" val="2409257355"/>
       </p:ext>
     </p:extLst>
   </p:cSld>
@@ -1789,6 +2877,29 @@
           <a:bodyPr/>
           <a:lstStyle/>
           <a:p>
+            <a:r>
+              <a:rPr lang="en-US" dirty="0" smtClean="0"/>
+              <a:t>In the workplace, using security key pairs would be a more secure method for connecting to nodes than using the password method we are using in class. </a:t>
+            </a:r>
+          </a:p>
+          <a:p>
+            <a:endParaRPr lang="en-US" dirty="0" smtClean="0"/>
+          </a:p>
+          <a:p>
+            <a:r>
+              <a:rPr lang="en-US" dirty="0" smtClean="0"/>
+              <a:t>By clicking </a:t>
+            </a:r>
+            <a:r>
+              <a:rPr lang="en-US" b="1" dirty="0" smtClean="0"/>
+              <a:t>Settings &gt; Add New Key Pair  </a:t>
+            </a:r>
+            <a:r>
+              <a:rPr lang="en-US" dirty="0" smtClean="0"/>
+              <a:t>you will see where to past your private and public keys. </a:t>
+            </a:r>
+          </a:p>
+          <a:p>
             <a:endParaRPr lang="en-US" dirty="0"/>
           </a:p>
         </p:txBody>
@@ -1816,7 +2927,7 @@
               <a:pPr>
                 <a:defRPr/>
               </a:pPr>
-              <a:t>13</a:t>
+              <a:t>12</a:t>
             </a:fld>
             <a:endParaRPr lang="en-US" dirty="0"/>
           </a:p>
@@ -1869,7 +2980,7 @@
     </p:spTree>
     <p:extLst>
       <p:ext uri="{BB962C8B-B14F-4D97-AF65-F5344CB8AC3E}">
-        <p14:creationId xmlns:p14="http://schemas.microsoft.com/office/powerpoint/2010/main" val="2879381677"/>
+        <p14:creationId xmlns:p14="http://schemas.microsoft.com/office/powerpoint/2010/main" val="208647667"/>
       </p:ext>
     </p:extLst>
   </p:cSld>
@@ -1950,7 +3061,7 @@
               <a:pPr>
                 <a:defRPr/>
               </a:pPr>
-              <a:t>16</a:t>
+              <a:t>13</a:t>
             </a:fld>
             <a:endParaRPr lang="en-US" dirty="0"/>
           </a:p>
@@ -2003,7 +3114,188 @@
     </p:spTree>
     <p:extLst>
       <p:ext uri="{BB962C8B-B14F-4D97-AF65-F5344CB8AC3E}">
-        <p14:creationId xmlns:p14="http://schemas.microsoft.com/office/powerpoint/2010/main" val="1213312203"/>
+        <p14:creationId xmlns:p14="http://schemas.microsoft.com/office/powerpoint/2010/main" val="958851555"/>
+      </p:ext>
+    </p:extLst>
+  </p:cSld>
+  <p:clrMapOvr>
+    <a:masterClrMapping/>
+  </p:clrMapOvr>
+</p:notes>
+</file>
+
+<file path=ppt/notesSlides/notesSlide9.xml><?xml version="1.0" encoding="utf-8"?>
+<p:notes xmlns:a="http://schemas.openxmlformats.org/drawingml/2006/main" xmlns:r="http://schemas.openxmlformats.org/officeDocument/2006/relationships" xmlns:p="http://schemas.openxmlformats.org/presentationml/2006/main">
+  <p:cSld>
+    <p:spTree>
+      <p:nvGrpSpPr>
+        <p:cNvPr id="1" name=""/>
+        <p:cNvGrpSpPr/>
+        <p:nvPr/>
+      </p:nvGrpSpPr>
+      <p:grpSpPr>
+        <a:xfrm>
+          <a:off x="0" y="0"/>
+          <a:ext cx="0" cy="0"/>
+          <a:chOff x="0" y="0"/>
+          <a:chExt cx="0" cy="0"/>
+        </a:xfrm>
+      </p:grpSpPr>
+      <p:sp>
+        <p:nvSpPr>
+          <p:cNvPr id="2" name="Slide Image Placeholder 1"/>
+          <p:cNvSpPr>
+            <a:spLocks noGrp="1" noRot="1" noChangeAspect="1"/>
+          </p:cNvSpPr>
+          <p:nvPr>
+            <p:ph type="sldImg"/>
+          </p:nvPr>
+        </p:nvSpPr>
+        <p:spPr/>
+      </p:sp>
+      <p:sp>
+        <p:nvSpPr>
+          <p:cNvPr id="3" name="Notes Placeholder 2"/>
+          <p:cNvSpPr>
+            <a:spLocks noGrp="1"/>
+          </p:cNvSpPr>
+          <p:nvPr>
+            <p:ph type="body" idx="1"/>
+          </p:nvPr>
+        </p:nvSpPr>
+        <p:spPr/>
+        <p:txBody>
+          <a:bodyPr/>
+          <a:lstStyle/>
+          <a:p>
+            <a:r>
+              <a:rPr lang="en-US" dirty="0" smtClean="0"/>
+              <a:t>This image shows the default Compliance Profiles as accessed from the Scan Nodes page. This page displays when you select</a:t>
+            </a:r>
+            <a:r>
+              <a:rPr lang="en-US" baseline="0" dirty="0" smtClean="0"/>
+              <a:t> nodes to scan and then click the Scan button.</a:t>
+            </a:r>
+            <a:endParaRPr lang="en-US" dirty="0" smtClean="0"/>
+          </a:p>
+          <a:p>
+            <a:endParaRPr lang="en-US" dirty="0" smtClean="0"/>
+          </a:p>
+          <a:p>
+            <a:r>
+              <a:rPr lang="en-US" dirty="0" smtClean="0"/>
+              <a:t>You'll </a:t>
+            </a:r>
+            <a:r>
+              <a:rPr lang="en-US" dirty="0" smtClean="0"/>
+              <a:t>access the profiles in a moment. These profiles</a:t>
+            </a:r>
+            <a:r>
+              <a:rPr lang="en-US" baseline="0" dirty="0" smtClean="0"/>
+              <a:t> determine what will be scanned on your nodes.</a:t>
+            </a:r>
+            <a:endParaRPr lang="en-US" dirty="0" smtClean="0"/>
+          </a:p>
+          <a:p>
+            <a:endParaRPr lang="en-US" dirty="0" smtClean="0"/>
+          </a:p>
+          <a:p>
+            <a:r>
+              <a:rPr lang="en-US" dirty="0" smtClean="0"/>
+              <a:t>You should be thoughtful with which profiles choose since the more you choose to run, the longer it will take to execute the scan.</a:t>
+            </a:r>
+          </a:p>
+          <a:p>
+            <a:endParaRPr lang="en-US" dirty="0" smtClean="0"/>
+          </a:p>
+          <a:p>
+            <a:r>
+              <a:rPr lang="en-US" dirty="0" smtClean="0"/>
+              <a:t>Notice how you can also choose to run a scan on demand (Scan now) or schedule a scan to run at a later time.</a:t>
+            </a:r>
+          </a:p>
+          <a:p>
+            <a:endParaRPr lang="en-US" dirty="0"/>
+          </a:p>
+        </p:txBody>
+      </p:sp>
+      <p:sp>
+        <p:nvSpPr>
+          <p:cNvPr id="4" name="Slide Number Placeholder 3"/>
+          <p:cNvSpPr>
+            <a:spLocks noGrp="1"/>
+          </p:cNvSpPr>
+          <p:nvPr>
+            <p:ph type="sldNum" sz="quarter" idx="10"/>
+          </p:nvPr>
+        </p:nvSpPr>
+        <p:spPr/>
+        <p:txBody>
+          <a:bodyPr/>
+          <a:lstStyle/>
+          <a:p>
+            <a:pPr>
+              <a:defRPr/>
+            </a:pPr>
+            <a:fld id="{DC3734AA-3150-D947-AC52-2F5DF48BFCD5}" type="slidenum">
+              <a:rPr lang="en-US" smtClean="0"/>
+              <a:pPr>
+                <a:defRPr/>
+              </a:pPr>
+              <a:t>14</a:t>
+            </a:fld>
+            <a:endParaRPr lang="en-US" dirty="0"/>
+          </a:p>
+        </p:txBody>
+      </p:sp>
+      <p:sp>
+        <p:nvSpPr>
+          <p:cNvPr id="5" name="Header Placeholder 4"/>
+          <p:cNvSpPr>
+            <a:spLocks noGrp="1"/>
+          </p:cNvSpPr>
+          <p:nvPr>
+            <p:ph type="hdr" sz="quarter" idx="11"/>
+          </p:nvPr>
+        </p:nvSpPr>
+        <p:spPr/>
+        <p:txBody>
+          <a:bodyPr/>
+          <a:lstStyle/>
+          <a:p>
+            <a:pPr>
+              <a:defRPr/>
+            </a:pPr>
+            <a:endParaRPr lang="en-US"/>
+          </a:p>
+        </p:txBody>
+      </p:sp>
+      <p:sp>
+        <p:nvSpPr>
+          <p:cNvPr id="6" name="Footer Placeholder 5"/>
+          <p:cNvSpPr>
+            <a:spLocks noGrp="1"/>
+          </p:cNvSpPr>
+          <p:nvPr>
+            <p:ph type="ftr" sz="quarter" idx="12"/>
+          </p:nvPr>
+        </p:nvSpPr>
+        <p:spPr/>
+        <p:txBody>
+          <a:bodyPr/>
+          <a:lstStyle/>
+          <a:p>
+            <a:pPr>
+              <a:defRPr/>
+            </a:pPr>
+            <a:endParaRPr lang="en-US"/>
+          </a:p>
+        </p:txBody>
+      </p:sp>
+    </p:spTree>
+    <p:extLst>
+      <p:ext uri="{BB962C8B-B14F-4D97-AF65-F5344CB8AC3E}">
+        <p14:creationId xmlns:p14="http://schemas.microsoft.com/office/powerpoint/2010/main" val="29724005"/>
       </p:ext>
     </p:extLst>
   </p:cSld>
@@ -10384,11 +11676,7 @@
           <a:p>
             <a:r>
               <a:rPr lang="en-US" dirty="0" smtClean="0"/>
-              <a:t>Initial </a:t>
-            </a:r>
-            <a:r>
-              <a:rPr lang="en-US" dirty="0" smtClean="0"/>
-              <a:t>Configuration and Running Scans</a:t>
+              <a:t>Initial Configuration and Running Scans</a:t>
             </a:r>
             <a:endParaRPr lang="en-US" dirty="0"/>
           </a:p>
@@ -10626,6 +11914,13 @@
   <p:transition spd="med">
     <p:fade/>
   </p:transition>
+  <p:timing>
+    <p:tnLst>
+      <p:par>
+        <p:cTn id="1" dur="indefinite" restart="never" nodeType="tmRoot"/>
+      </p:par>
+    </p:tnLst>
+  </p:timing>
 </p:sld>
 </file>
 
@@ -10653,28 +11948,7 @@
             <a:spLocks noGrp="1"/>
           </p:cNvSpPr>
           <p:nvPr>
-            <p:ph type="ctrTitle"/>
-          </p:nvPr>
-        </p:nvSpPr>
-        <p:spPr/>
-        <p:txBody>
-          <a:bodyPr>
-            <a:normAutofit fontScale="90000"/>
-          </a:bodyPr>
-          <a:lstStyle/>
-          <a:p>
-            <a:endParaRPr lang="en-US"/>
-          </a:p>
-        </p:txBody>
-      </p:sp>
-      <p:sp>
-        <p:nvSpPr>
-          <p:cNvPr id="3" name="Subtitle 2"/>
-          <p:cNvSpPr>
-            <a:spLocks noGrp="1"/>
-          </p:cNvSpPr>
-          <p:nvPr>
-            <p:ph type="subTitle" idx="1"/>
+            <p:ph type="title"/>
           </p:nvPr>
         </p:nvSpPr>
         <p:spPr/>
@@ -10682,21 +11956,145 @@
           <a:bodyPr/>
           <a:lstStyle/>
           <a:p>
+            <a:r>
+              <a:rPr lang="en-US" dirty="0" smtClean="0"/>
+              <a:t>Adding Nodes in Bulk</a:t>
+            </a:r>
+            <a:endParaRPr lang="en-US" dirty="0"/>
+          </a:p>
+        </p:txBody>
+      </p:sp>
+      <p:sp>
+        <p:nvSpPr>
+          <p:cNvPr id="3" name="Text Placeholder 2"/>
+          <p:cNvSpPr>
+            <a:spLocks noGrp="1"/>
+          </p:cNvSpPr>
+          <p:nvPr>
+            <p:ph type="body" sz="quarter" idx="12"/>
+          </p:nvPr>
+        </p:nvSpPr>
+        <p:spPr>
+          <a:xfrm>
+            <a:off x="276530" y="1710724"/>
+            <a:ext cx="7992921" cy="5345953"/>
+          </a:xfrm>
+        </p:spPr>
+        <p:txBody>
+          <a:bodyPr/>
+          <a:lstStyle/>
+          <a:p>
+            <a:r>
+              <a:rPr lang="en-US" dirty="0"/>
+              <a:t>As you may have noticed, you could add additional nodes by simply repeating the previous </a:t>
+            </a:r>
+            <a:r>
+              <a:rPr lang="en-US" dirty="0" smtClean="0"/>
+              <a:t>steps.</a:t>
+            </a:r>
+          </a:p>
+          <a:p>
+            <a:endParaRPr lang="en-US" dirty="0"/>
+          </a:p>
+          <a:p>
+            <a:r>
+              <a:rPr lang="en-US" dirty="0" smtClean="0"/>
+              <a:t>You could also add nodes in bulk by separating each hostname or IP address with a comma or a space, as shown in this illustration.</a:t>
+            </a:r>
+            <a:endParaRPr lang="en-US" dirty="0"/>
+          </a:p>
+          <a:p>
+            <a:pPr marL="514350" indent="-514350">
+              <a:buFont typeface="+mj-lt"/>
+              <a:buAutoNum type="arabicPeriod"/>
+            </a:pPr>
             <a:endParaRPr lang="en-US" dirty="0" smtClean="0"/>
           </a:p>
           <a:p>
-            <a:r>
-              <a:rPr lang="en-US" dirty="0" smtClean="0"/>
-              <a:t>As you may have noticed, you could add additional nodes by simply repeating the previous steps and entering the new nodes' IP addresses or FQDNs.</a:t>
-            </a:r>
+            <a:pPr marL="514350" indent="-514350">
+              <a:buFont typeface="+mj-lt"/>
+              <a:buAutoNum type="arabicPeriod"/>
+            </a:pPr>
             <a:endParaRPr lang="en-US" dirty="0"/>
           </a:p>
-        </p:txBody>
-      </p:sp>
+          <a:p>
+            <a:pPr marL="514350" indent="-514350">
+              <a:buFont typeface="+mj-lt"/>
+              <a:buAutoNum type="arabicPeriod"/>
+            </a:pPr>
+            <a:endParaRPr lang="en-US" dirty="0" smtClean="0"/>
+          </a:p>
+        </p:txBody>
+      </p:sp>
+      <p:cxnSp>
+        <p:nvCxnSpPr>
+          <p:cNvPr id="7" name="Straight Arrow Connector 6"/>
+          <p:cNvCxnSpPr/>
+          <p:nvPr/>
+        </p:nvCxnSpPr>
+        <p:spPr>
+          <a:xfrm>
+            <a:off x="13777498" y="463815"/>
+            <a:ext cx="2015836" cy="2493818"/>
+          </a:xfrm>
+          <a:prstGeom prst="straightConnector1">
+            <a:avLst/>
+          </a:prstGeom>
+          <a:ln>
+            <a:solidFill>
+              <a:schemeClr val="accent4"/>
+            </a:solidFill>
+            <a:tailEnd type="triangle"/>
+          </a:ln>
+        </p:spPr>
+        <p:style>
+          <a:lnRef idx="3">
+            <a:schemeClr val="accent1"/>
+          </a:lnRef>
+          <a:fillRef idx="0">
+            <a:schemeClr val="accent1"/>
+          </a:fillRef>
+          <a:effectRef idx="2">
+            <a:schemeClr val="accent1"/>
+          </a:effectRef>
+          <a:fontRef idx="minor">
+            <a:schemeClr val="tx1"/>
+          </a:fontRef>
+        </p:style>
+      </p:cxnSp>
+      <p:pic>
+        <p:nvPicPr>
+          <p:cNvPr id="8" name="Picture 7"/>
+          <p:cNvPicPr>
+            <a:picLocks noChangeAspect="1"/>
+          </p:cNvPicPr>
+          <p:nvPr/>
+        </p:nvPicPr>
+        <p:blipFill>
+          <a:blip r:embed="rId3"/>
+          <a:stretch>
+            <a:fillRect/>
+          </a:stretch>
+        </p:blipFill>
+        <p:spPr>
+          <a:xfrm>
+            <a:off x="8565861" y="41564"/>
+            <a:ext cx="7648575" cy="8029575"/>
+          </a:xfrm>
+          <a:prstGeom prst="rect">
+            <a:avLst/>
+          </a:prstGeom>
+          <a:ln>
+            <a:solidFill>
+              <a:schemeClr val="accent1"/>
+            </a:solidFill>
+          </a:ln>
+        </p:spPr>
+      </p:pic>
     </p:spTree>
     <p:extLst>
       <p:ext uri="{BB962C8B-B14F-4D97-AF65-F5344CB8AC3E}">
-        <p14:creationId xmlns:p14="http://schemas.microsoft.com/office/powerpoint/2010/main" val="240096012"/>
+        <p14:creationId xmlns:p14="http://schemas.microsoft.com/office/powerpoint/2010/main" val="1432411639"/>
       </p:ext>
     </p:extLst>
   </p:cSld>
@@ -10750,7 +12148,7 @@
           <a:p>
             <a:r>
               <a:rPr lang="en-US" dirty="0" smtClean="0"/>
-              <a:t>Compliance Profiles Used in Scans</a:t>
+              <a:t>Key Pairs</a:t>
             </a:r>
             <a:endParaRPr lang="en-US" dirty="0"/>
           </a:p>
@@ -10768,8 +12166,8 @@
         </p:nvSpPr>
         <p:spPr>
           <a:xfrm>
-            <a:off x="151838" y="1710724"/>
-            <a:ext cx="7745253" cy="5345953"/>
+            <a:off x="234966" y="1710724"/>
+            <a:ext cx="7992921" cy="5345953"/>
           </a:xfrm>
         </p:spPr>
         <p:txBody>
@@ -10778,38 +12176,23 @@
           <a:p>
             <a:r>
               <a:rPr lang="en-US" dirty="0" smtClean="0"/>
-              <a:t>This image shows the default Compliance Profiles.</a:t>
-            </a:r>
-          </a:p>
-          <a:p>
-            <a:endParaRPr lang="en-US" dirty="0" smtClean="0"/>
-          </a:p>
-          <a:p>
-            <a:r>
-              <a:rPr lang="en-US" dirty="0" smtClean="0"/>
-              <a:t>You should be thoughtful with which profiles choose.</a:t>
-            </a:r>
-          </a:p>
-          <a:p>
-            <a:endParaRPr lang="en-US" dirty="0" smtClean="0"/>
-          </a:p>
-          <a:p>
-            <a:r>
-              <a:rPr lang="en-US" dirty="0" smtClean="0"/>
-              <a:t>Notice how you can also choose to run a scan on demand or schedule a scan.</a:t>
-            </a:r>
-          </a:p>
-          <a:p>
+              <a:t>In the workplace, using security key pairs would be a more secure method for connecting to nodes than using the password method. </a:t>
+            </a:r>
             <a:endParaRPr lang="en-US" dirty="0"/>
           </a:p>
           <a:p>
-            <a:endParaRPr lang="en-US" dirty="0" smtClean="0"/>
-          </a:p>
-          <a:p>
-            <a:pPr marL="514350" indent="-514350">
-              <a:buFont typeface="+mj-lt"/>
-              <a:buAutoNum type="arabicPeriod"/>
-            </a:pPr>
+            <a:r>
+              <a:rPr lang="en-US" dirty="0" smtClean="0"/>
+              <a:t>By clicking </a:t>
+            </a:r>
+            <a:r>
+              <a:rPr lang="en-US" b="1" dirty="0" smtClean="0"/>
+              <a:t>Settings &gt; Add New Key Pair  </a:t>
+            </a:r>
+            <a:r>
+              <a:rPr lang="en-US" dirty="0" smtClean="0"/>
+              <a:t>you will see where to paste your private and public keys.</a:t>
+            </a:r>
             <a:endParaRPr lang="en-US" dirty="0"/>
           </a:p>
           <a:p>
@@ -10851,158 +12234,23 @@
         </p:blipFill>
         <p:spPr>
           <a:xfrm>
-            <a:off x="8077200" y="1200148"/>
-            <a:ext cx="7810500" cy="6743700"/>
+            <a:off x="8378795" y="154011"/>
+            <a:ext cx="7564467" cy="7535261"/>
           </a:xfrm>
           <a:prstGeom prst="rect">
             <a:avLst/>
           </a:prstGeom>
           <a:ln>
             <a:solidFill>
-              <a:schemeClr val="accent4"/>
+              <a:schemeClr val="accent1"/>
             </a:solidFill>
           </a:ln>
         </p:spPr>
       </p:pic>
-      <p:sp>
-        <p:nvSpPr>
-          <p:cNvPr id="5" name="Rectangle 4"/>
-          <p:cNvSpPr/>
-          <p:nvPr/>
-        </p:nvSpPr>
-        <p:spPr bwMode="auto">
-          <a:xfrm>
-            <a:off x="12115800" y="3314700"/>
-            <a:ext cx="3771900" cy="3741977"/>
-          </a:xfrm>
-          <a:prstGeom prst="rect">
-            <a:avLst/>
-          </a:prstGeom>
-          <a:noFill/>
-          <a:ln>
-            <a:solidFill>
-              <a:schemeClr val="accent1"/>
-            </a:solidFill>
-            <a:headEnd type="none" w="med" len="med"/>
-            <a:tailEnd type="none" w="med" len="med"/>
-          </a:ln>
-          <a:effectLst/>
-        </p:spPr>
-        <p:style>
-          <a:lnRef idx="1">
-            <a:schemeClr val="accent4"/>
-          </a:lnRef>
-          <a:fillRef idx="3">
-            <a:schemeClr val="accent4"/>
-          </a:fillRef>
-          <a:effectRef idx="2">
-            <a:schemeClr val="accent4"/>
-          </a:effectRef>
-          <a:fontRef idx="minor">
-            <a:schemeClr val="lt1"/>
-          </a:fontRef>
-        </p:style>
-        <p:txBody>
-          <a:bodyPr vert="horz" wrap="square" lIns="91436" tIns="45718" rIns="91436" bIns="45718" numCol="1" rtlCol="0" anchor="ctr" anchorCtr="0" compatLnSpc="1">
-            <a:prstTxWarp prst="textNoShape">
-              <a:avLst/>
-            </a:prstTxWarp>
-          </a:bodyPr>
-          <a:lstStyle/>
-          <a:p>
-            <a:pPr algn="ctr" defTabSz="914099"/>
-            <a:endParaRPr lang="en-US" sz="2400" dirty="0" err="1" smtClean="0">
-              <a:gradFill>
-                <a:gsLst>
-                  <a:gs pos="0">
-                    <a:srgbClr val="FFFFFF"/>
-                  </a:gs>
-                  <a:gs pos="100000">
-                    <a:srgbClr val="FFFFFF"/>
-                  </a:gs>
-                </a:gsLst>
-                <a:lin ang="5400000" scaled="0"/>
-              </a:gradFill>
-            </a:endParaRPr>
-          </a:p>
-        </p:txBody>
-      </p:sp>
-      <p:cxnSp>
-        <p:nvCxnSpPr>
-          <p:cNvPr id="9" name="Straight Arrow Connector 8"/>
-          <p:cNvCxnSpPr/>
-          <p:nvPr/>
-        </p:nvCxnSpPr>
-        <p:spPr>
-          <a:xfrm>
-            <a:off x="1771650" y="2571750"/>
-            <a:ext cx="10267950" cy="1905000"/>
-          </a:xfrm>
-          <a:prstGeom prst="straightConnector1">
-            <a:avLst/>
-          </a:prstGeom>
-          <a:ln w="12700">
-            <a:solidFill>
-              <a:schemeClr val="accent4"/>
-            </a:solidFill>
-            <a:tailEnd type="triangle"/>
-          </a:ln>
-        </p:spPr>
-        <p:style>
-          <a:lnRef idx="3">
-            <a:schemeClr val="accent1"/>
-          </a:lnRef>
-          <a:fillRef idx="0">
-            <a:schemeClr val="accent1"/>
-          </a:fillRef>
-          <a:effectRef idx="2">
-            <a:schemeClr val="accent1"/>
-          </a:effectRef>
-          <a:fontRef idx="minor">
-            <a:schemeClr val="tx1"/>
-          </a:fontRef>
-        </p:style>
-      </p:cxnSp>
-      <p:cxnSp>
-        <p:nvCxnSpPr>
-          <p:cNvPr id="10" name="Straight Arrow Connector 9"/>
-          <p:cNvCxnSpPr/>
-          <p:nvPr/>
-        </p:nvCxnSpPr>
-        <p:spPr>
-          <a:xfrm>
-            <a:off x="6943725" y="6248400"/>
-            <a:ext cx="6267450" cy="914399"/>
-          </a:xfrm>
-          <a:prstGeom prst="straightConnector1">
-            <a:avLst/>
-          </a:prstGeom>
-          <a:ln w="12700">
-            <a:solidFill>
-              <a:schemeClr val="accent4"/>
-            </a:solidFill>
-            <a:tailEnd type="triangle"/>
-          </a:ln>
-        </p:spPr>
-        <p:style>
-          <a:lnRef idx="3">
-            <a:schemeClr val="accent1"/>
-          </a:lnRef>
-          <a:fillRef idx="0">
-            <a:schemeClr val="accent1"/>
-          </a:fillRef>
-          <a:effectRef idx="2">
-            <a:schemeClr val="accent1"/>
-          </a:effectRef>
-          <a:fontRef idx="minor">
-            <a:schemeClr val="tx1"/>
-          </a:fontRef>
-        </p:style>
-      </p:cxnSp>
     </p:spTree>
     <p:extLst>
       <p:ext uri="{BB962C8B-B14F-4D97-AF65-F5344CB8AC3E}">
-        <p14:creationId xmlns:p14="http://schemas.microsoft.com/office/powerpoint/2010/main" val="1034997069"/>
+        <p14:creationId xmlns:p14="http://schemas.microsoft.com/office/powerpoint/2010/main" val="871112849"/>
       </p:ext>
     </p:extLst>
   </p:cSld>
@@ -11049,23 +12297,467 @@
             <p:ph type="ctrTitle"/>
           </p:nvPr>
         </p:nvSpPr>
+        <p:spPr/>
+        <p:txBody>
+          <a:bodyPr>
+            <a:normAutofit fontScale="90000"/>
+          </a:bodyPr>
+          <a:lstStyle/>
+          <a:p>
+            <a:r>
+              <a:rPr lang="en-US" dirty="0" smtClean="0"/>
+              <a:t>Running Compliance Scans</a:t>
+            </a:r>
+            <a:endParaRPr lang="en-US" dirty="0"/>
+          </a:p>
+        </p:txBody>
+      </p:sp>
+      <p:sp>
+        <p:nvSpPr>
+          <p:cNvPr id="3" name="Subtitle 2"/>
+          <p:cNvSpPr>
+            <a:spLocks noGrp="1"/>
+          </p:cNvSpPr>
+          <p:nvPr>
+            <p:ph type="subTitle" idx="1"/>
+          </p:nvPr>
+        </p:nvSpPr>
         <p:spPr>
           <a:xfrm>
-            <a:off x="1200150" y="2292126"/>
-            <a:ext cx="14211299" cy="1822674"/>
+            <a:off x="1671638" y="3271838"/>
+            <a:ext cx="12319000" cy="4317682"/>
           </a:xfrm>
         </p:spPr>
         <p:txBody>
-          <a:bodyPr>
-            <a:normAutofit/>
+          <a:bodyPr/>
+          <a:lstStyle/>
+          <a:p>
+            <a:r>
+              <a:rPr lang="en-US" dirty="0"/>
+              <a:t>You can run Compliance scans on demand or schedule them to run at a later time</a:t>
+            </a:r>
+            <a:r>
+              <a:rPr lang="en-US" dirty="0" smtClean="0"/>
+              <a:t>.</a:t>
+            </a:r>
+          </a:p>
+          <a:p>
+            <a:endParaRPr lang="en-US" dirty="0"/>
+          </a:p>
+          <a:p>
+            <a:r>
+              <a:rPr lang="en-US" dirty="0" smtClean="0"/>
+              <a:t>Chef </a:t>
+            </a:r>
+            <a:r>
+              <a:rPr lang="en-US" dirty="0"/>
+              <a:t>Compliance maintains profiles as a collection of individual controls that comprise a complete audit.</a:t>
+            </a:r>
+            <a:endParaRPr lang="en-US" dirty="0" smtClean="0"/>
+          </a:p>
+          <a:p>
+            <a:endParaRPr lang="en-US" dirty="0" smtClean="0"/>
+          </a:p>
+          <a:p>
+            <a:r>
+              <a:rPr lang="en-US" dirty="0" smtClean="0"/>
+              <a:t>As mentioned previously, Compliance </a:t>
+            </a:r>
+            <a:r>
+              <a:rPr lang="en-US" dirty="0"/>
+              <a:t>profiles exist for many scenarios, such as those created by the Center for Internet Security (</a:t>
+            </a:r>
+            <a:r>
+              <a:rPr lang="en-US" dirty="0" smtClean="0"/>
+              <a:t>CIS).</a:t>
+            </a:r>
+          </a:p>
+        </p:txBody>
+      </p:sp>
+    </p:spTree>
+    <p:extLst>
+      <p:ext uri="{BB962C8B-B14F-4D97-AF65-F5344CB8AC3E}">
+        <p14:creationId xmlns:p14="http://schemas.microsoft.com/office/powerpoint/2010/main" val="1842217701"/>
+      </p:ext>
+    </p:extLst>
+  </p:cSld>
+  <p:clrMapOvr>
+    <a:masterClrMapping/>
+  </p:clrMapOvr>
+  <p:transition spd="med">
+    <p:fade/>
+  </p:transition>
+</p:sld>
+</file>
+
+<file path=ppt/slides/slide14.xml><?xml version="1.0" encoding="utf-8"?>
+<p:sld xmlns:a="http://schemas.openxmlformats.org/drawingml/2006/main" xmlns:r="http://schemas.openxmlformats.org/officeDocument/2006/relationships" xmlns:p="http://schemas.openxmlformats.org/presentationml/2006/main">
+  <p:cSld>
+    <p:spTree>
+      <p:nvGrpSpPr>
+        <p:cNvPr id="1" name=""/>
+        <p:cNvGrpSpPr/>
+        <p:nvPr/>
+      </p:nvGrpSpPr>
+      <p:grpSpPr>
+        <a:xfrm>
+          <a:off x="0" y="0"/>
+          <a:ext cx="0" cy="0"/>
+          <a:chOff x="0" y="0"/>
+          <a:chExt cx="0" cy="0"/>
+        </a:xfrm>
+      </p:grpSpPr>
+      <p:sp>
+        <p:nvSpPr>
+          <p:cNvPr id="2" name="Title 1"/>
+          <p:cNvSpPr>
+            <a:spLocks noGrp="1"/>
+          </p:cNvSpPr>
+          <p:nvPr>
+            <p:ph type="title"/>
+          </p:nvPr>
+        </p:nvSpPr>
+        <p:spPr/>
+        <p:txBody>
+          <a:bodyPr/>
+          <a:lstStyle/>
+          <a:p>
+            <a:r>
+              <a:rPr lang="en-US" dirty="0" smtClean="0"/>
+              <a:t>Compliance Profiles Used in Scans</a:t>
+            </a:r>
+            <a:endParaRPr lang="en-US" dirty="0"/>
+          </a:p>
+        </p:txBody>
+      </p:sp>
+      <p:sp>
+        <p:nvSpPr>
+          <p:cNvPr id="3" name="Text Placeholder 2"/>
+          <p:cNvSpPr>
+            <a:spLocks noGrp="1"/>
+          </p:cNvSpPr>
+          <p:nvPr>
+            <p:ph type="body" sz="quarter" idx="12"/>
+          </p:nvPr>
+        </p:nvSpPr>
+        <p:spPr>
+          <a:xfrm>
+            <a:off x="151838" y="1710724"/>
+            <a:ext cx="7745253" cy="5345953"/>
+          </a:xfrm>
+        </p:spPr>
+        <p:txBody>
+          <a:bodyPr/>
+          <a:lstStyle/>
+          <a:p>
+            <a:r>
+              <a:rPr lang="en-US" dirty="0" smtClean="0"/>
+              <a:t>This image shows the default Compliance </a:t>
+            </a:r>
+            <a:r>
+              <a:rPr lang="en-US" dirty="0" smtClean="0"/>
+              <a:t>Profiles as accessed from the Scan Nodes page.</a:t>
+            </a:r>
+          </a:p>
+          <a:p>
+            <a:endParaRPr lang="en-US" dirty="0" smtClean="0"/>
+          </a:p>
+          <a:p>
+            <a:r>
+              <a:rPr lang="en-US" dirty="0" smtClean="0"/>
+              <a:t>You should be thoughtful with which profiles choose.</a:t>
+            </a:r>
+          </a:p>
+          <a:p>
+            <a:endParaRPr lang="en-US" dirty="0" smtClean="0"/>
+          </a:p>
+          <a:p>
+            <a:r>
+              <a:rPr lang="en-US" dirty="0" smtClean="0"/>
+              <a:t>Notice how you can also choose to run a scan on demand or schedule a scan.</a:t>
+            </a:r>
+          </a:p>
+          <a:p>
+            <a:endParaRPr lang="en-US" dirty="0"/>
+          </a:p>
+          <a:p>
+            <a:endParaRPr lang="en-US" dirty="0" smtClean="0"/>
+          </a:p>
+          <a:p>
+            <a:pPr marL="514350" indent="-514350">
+              <a:buFont typeface="+mj-lt"/>
+              <a:buAutoNum type="arabicPeriod"/>
+            </a:pPr>
+            <a:endParaRPr lang="en-US" dirty="0"/>
+          </a:p>
+          <a:p>
+            <a:pPr marL="514350" indent="-514350">
+              <a:buFont typeface="+mj-lt"/>
+              <a:buAutoNum type="arabicPeriod"/>
+            </a:pPr>
+            <a:endParaRPr lang="en-US" dirty="0" smtClean="0"/>
+          </a:p>
+          <a:p>
+            <a:pPr marL="514350" indent="-514350">
+              <a:buFont typeface="+mj-lt"/>
+              <a:buAutoNum type="arabicPeriod"/>
+            </a:pPr>
+            <a:endParaRPr lang="en-US" dirty="0"/>
+          </a:p>
+          <a:p>
+            <a:pPr marL="514350" indent="-514350">
+              <a:buFont typeface="+mj-lt"/>
+              <a:buAutoNum type="arabicPeriod"/>
+            </a:pPr>
+            <a:endParaRPr lang="en-US" dirty="0" smtClean="0"/>
+          </a:p>
+        </p:txBody>
+      </p:sp>
+      <p:pic>
+        <p:nvPicPr>
+          <p:cNvPr id="4" name="Picture 3"/>
+          <p:cNvPicPr>
+            <a:picLocks noChangeAspect="1"/>
+          </p:cNvPicPr>
+          <p:nvPr/>
+        </p:nvPicPr>
+        <p:blipFill>
+          <a:blip r:embed="rId3"/>
+          <a:stretch>
+            <a:fillRect/>
+          </a:stretch>
+        </p:blipFill>
+        <p:spPr>
+          <a:xfrm>
+            <a:off x="8077200" y="1200148"/>
+            <a:ext cx="7810500" cy="6743700"/>
+          </a:xfrm>
+          <a:prstGeom prst="rect">
+            <a:avLst/>
+          </a:prstGeom>
+          <a:ln>
+            <a:solidFill>
+              <a:schemeClr val="accent4"/>
+            </a:solidFill>
+          </a:ln>
+        </p:spPr>
+      </p:pic>
+      <p:sp>
+        <p:nvSpPr>
+          <p:cNvPr id="5" name="Rectangle 4"/>
+          <p:cNvSpPr/>
+          <p:nvPr/>
+        </p:nvSpPr>
+        <p:spPr bwMode="auto">
+          <a:xfrm>
+            <a:off x="12115800" y="3314700"/>
+            <a:ext cx="3771900" cy="3741977"/>
+          </a:xfrm>
+          <a:prstGeom prst="rect">
+            <a:avLst/>
+          </a:prstGeom>
+          <a:noFill/>
+          <a:ln>
+            <a:solidFill>
+              <a:schemeClr val="accent1"/>
+            </a:solidFill>
+            <a:headEnd type="none" w="med" len="med"/>
+            <a:tailEnd type="none" w="med" len="med"/>
+          </a:ln>
+          <a:effectLst/>
+        </p:spPr>
+        <p:style>
+          <a:lnRef idx="1">
+            <a:schemeClr val="accent4"/>
+          </a:lnRef>
+          <a:fillRef idx="3">
+            <a:schemeClr val="accent4"/>
+          </a:fillRef>
+          <a:effectRef idx="2">
+            <a:schemeClr val="accent4"/>
+          </a:effectRef>
+          <a:fontRef idx="minor">
+            <a:schemeClr val="lt1"/>
+          </a:fontRef>
+        </p:style>
+        <p:txBody>
+          <a:bodyPr vert="horz" wrap="square" lIns="91436" tIns="45718" rIns="91436" bIns="45718" numCol="1" rtlCol="0" anchor="ctr" anchorCtr="0" compatLnSpc="1">
+            <a:prstTxWarp prst="textNoShape">
+              <a:avLst/>
+            </a:prstTxWarp>
           </a:bodyPr>
           <a:lstStyle/>
           <a:p>
+            <a:pPr algn="ctr" defTabSz="914099"/>
+            <a:endParaRPr lang="en-US" sz="2400" dirty="0" err="1" smtClean="0">
+              <a:gradFill>
+                <a:gsLst>
+                  <a:gs pos="0">
+                    <a:srgbClr val="FFFFFF"/>
+                  </a:gs>
+                  <a:gs pos="100000">
+                    <a:srgbClr val="FFFFFF"/>
+                  </a:gs>
+                </a:gsLst>
+                <a:lin ang="5400000" scaled="0"/>
+              </a:gradFill>
+            </a:endParaRPr>
+          </a:p>
+        </p:txBody>
+      </p:sp>
+      <p:cxnSp>
+        <p:nvCxnSpPr>
+          <p:cNvPr id="9" name="Straight Arrow Connector 8"/>
+          <p:cNvCxnSpPr/>
+          <p:nvPr/>
+        </p:nvCxnSpPr>
+        <p:spPr>
+          <a:xfrm>
+            <a:off x="6276109" y="2930236"/>
+            <a:ext cx="5659582" cy="748146"/>
+          </a:xfrm>
+          <a:prstGeom prst="straightConnector1">
+            <a:avLst/>
+          </a:prstGeom>
+          <a:ln w="12700">
+            <a:solidFill>
+              <a:schemeClr val="accent4"/>
+            </a:solidFill>
+            <a:tailEnd type="triangle"/>
+          </a:ln>
+        </p:spPr>
+        <p:style>
+          <a:lnRef idx="3">
+            <a:schemeClr val="accent1"/>
+          </a:lnRef>
+          <a:fillRef idx="0">
+            <a:schemeClr val="accent1"/>
+          </a:fillRef>
+          <a:effectRef idx="2">
+            <a:schemeClr val="accent1"/>
+          </a:effectRef>
+          <a:fontRef idx="minor">
+            <a:schemeClr val="tx1"/>
+          </a:fontRef>
+        </p:style>
+      </p:cxnSp>
+      <p:cxnSp>
+        <p:nvCxnSpPr>
+          <p:cNvPr id="10" name="Straight Arrow Connector 9"/>
+          <p:cNvCxnSpPr/>
+          <p:nvPr/>
+        </p:nvCxnSpPr>
+        <p:spPr>
+          <a:xfrm>
+            <a:off x="7232073" y="6546273"/>
+            <a:ext cx="5979102" cy="616526"/>
+          </a:xfrm>
+          <a:prstGeom prst="straightConnector1">
+            <a:avLst/>
+          </a:prstGeom>
+          <a:ln w="12700">
+            <a:solidFill>
+              <a:schemeClr val="accent4"/>
+            </a:solidFill>
+            <a:tailEnd type="triangle"/>
+          </a:ln>
+        </p:spPr>
+        <p:style>
+          <a:lnRef idx="3">
+            <a:schemeClr val="accent1"/>
+          </a:lnRef>
+          <a:fillRef idx="0">
+            <a:schemeClr val="accent1"/>
+          </a:fillRef>
+          <a:effectRef idx="2">
+            <a:schemeClr val="accent1"/>
+          </a:effectRef>
+          <a:fontRef idx="minor">
+            <a:schemeClr val="tx1"/>
+          </a:fontRef>
+        </p:style>
+      </p:cxnSp>
+    </p:spTree>
+    <p:extLst>
+      <p:ext uri="{BB962C8B-B14F-4D97-AF65-F5344CB8AC3E}">
+        <p14:creationId xmlns:p14="http://schemas.microsoft.com/office/powerpoint/2010/main" val="2737170273"/>
+      </p:ext>
+    </p:extLst>
+  </p:cSld>
+  <p:clrMapOvr>
+    <a:masterClrMapping/>
+  </p:clrMapOvr>
+  <p:transition spd="med">
+    <p:fade/>
+  </p:transition>
+  <p:timing>
+    <p:tnLst>
+      <p:par>
+        <p:cTn id="1" dur="indefinite" restart="never" nodeType="tmRoot"/>
+      </p:par>
+    </p:tnLst>
+  </p:timing>
+</p:sld>
+</file>
+
+<file path=ppt/slides/slide15.xml><?xml version="1.0" encoding="utf-8"?>
+<p:sld xmlns:a="http://schemas.openxmlformats.org/drawingml/2006/main" xmlns:r="http://schemas.openxmlformats.org/officeDocument/2006/relationships" xmlns:p="http://schemas.openxmlformats.org/presentationml/2006/main">
+  <p:cSld>
+    <p:spTree>
+      <p:nvGrpSpPr>
+        <p:cNvPr id="1" name=""/>
+        <p:cNvGrpSpPr/>
+        <p:nvPr/>
+      </p:nvGrpSpPr>
+      <p:grpSpPr>
+        <a:xfrm>
+          <a:off x="0" y="0"/>
+          <a:ext cx="0" cy="0"/>
+          <a:chOff x="0" y="0"/>
+          <a:chExt cx="0" cy="0"/>
+        </a:xfrm>
+      </p:grpSpPr>
+      <p:sp>
+        <p:nvSpPr>
+          <p:cNvPr id="2" name="Title 1"/>
+          <p:cNvSpPr>
+            <a:spLocks noGrp="1"/>
+          </p:cNvSpPr>
+          <p:nvPr>
+            <p:ph type="ctrTitle"/>
+          </p:nvPr>
+        </p:nvSpPr>
+        <p:spPr/>
+        <p:txBody>
+          <a:bodyPr>
+            <a:normAutofit fontScale="90000"/>
+          </a:bodyPr>
+          <a:lstStyle/>
+          <a:p>
             <a:r>
               <a:rPr lang="en-US" dirty="0" smtClean="0"/>
               <a:t>Group Exercise: Running a Scan</a:t>
             </a:r>
             <a:endParaRPr lang="en-US" dirty="0"/>
+          </a:p>
+        </p:txBody>
+      </p:sp>
+      <p:sp>
+        <p:nvSpPr>
+          <p:cNvPr id="3" name="Content Placeholder 2"/>
+          <p:cNvSpPr>
+            <a:spLocks noGrp="1"/>
+          </p:cNvSpPr>
+          <p:nvPr>
+            <p:ph sz="quarter" idx="11"/>
+          </p:nvPr>
+        </p:nvSpPr>
+        <p:spPr/>
+        <p:txBody>
+          <a:bodyPr/>
+          <a:lstStyle/>
+          <a:p>
+            <a:endParaRPr lang="en-US"/>
           </a:p>
         </p:txBody>
       </p:sp>
@@ -11132,10 +12824,17 @@
   <p:transition spd="med">
     <p:fade/>
   </p:transition>
+  <p:timing>
+    <p:tnLst>
+      <p:par>
+        <p:cTn id="1" dur="indefinite" restart="never" nodeType="tmRoot"/>
+      </p:par>
+    </p:tnLst>
+  </p:timing>
 </p:sld>
 </file>
 
-<file path=ppt/slides/slide14.xml><?xml version="1.0" encoding="utf-8"?>
+<file path=ppt/slides/slide16.xml><?xml version="1.0" encoding="utf-8"?>
 <p:sld xmlns:a="http://schemas.openxmlformats.org/drawingml/2006/main" xmlns:r="http://schemas.openxmlformats.org/officeDocument/2006/relationships" xmlns:p="http://schemas.openxmlformats.org/presentationml/2006/main">
   <p:cSld>
     <p:spTree>
@@ -11296,10 +12995,17 @@
   <p:transition spd="med">
     <p:fade/>
   </p:transition>
+  <p:timing>
+    <p:tnLst>
+      <p:par>
+        <p:cTn id="1" dur="indefinite" restart="never" nodeType="tmRoot"/>
+      </p:par>
+    </p:tnLst>
+  </p:timing>
 </p:sld>
 </file>
 
-<file path=ppt/slides/slide15.xml><?xml version="1.0" encoding="utf-8"?>
+<file path=ppt/slides/slide17.xml><?xml version="1.0" encoding="utf-8"?>
 <p:sld xmlns:a="http://schemas.openxmlformats.org/drawingml/2006/main" xmlns:r="http://schemas.openxmlformats.org/officeDocument/2006/relationships" xmlns:p="http://schemas.openxmlformats.org/presentationml/2006/main">
   <p:cSld>
     <p:spTree>
@@ -11433,7 +13139,7 @@
           <p:nvPr/>
         </p:nvPicPr>
         <p:blipFill>
-          <a:blip r:embed="rId2"/>
+          <a:blip r:embed="rId3"/>
           <a:stretch>
             <a:fillRect/>
           </a:stretch>
@@ -11502,10 +13208,17 @@
   <p:transition spd="med">
     <p:fade/>
   </p:transition>
+  <p:timing>
+    <p:tnLst>
+      <p:par>
+        <p:cTn id="1" dur="indefinite" restart="never" nodeType="tmRoot"/>
+      </p:par>
+    </p:tnLst>
+  </p:timing>
 </p:sld>
 </file>
 
-<file path=ppt/slides/slide16.xml><?xml version="1.0" encoding="utf-8"?>
+<file path=ppt/slides/slide18.xml><?xml version="1.0" encoding="utf-8"?>
 <p:sld xmlns:a="http://schemas.openxmlformats.org/drawingml/2006/main" xmlns:r="http://schemas.openxmlformats.org/officeDocument/2006/relationships" xmlns:p="http://schemas.openxmlformats.org/presentationml/2006/main">
   <p:cSld>
     <p:spTree>
@@ -11564,7 +13277,7 @@
         </p:nvSpPr>
         <p:spPr>
           <a:xfrm>
-            <a:off x="342900" y="2400300"/>
+            <a:off x="342900" y="1548247"/>
             <a:ext cx="5105400" cy="4439901"/>
           </a:xfrm>
         </p:spPr>
@@ -11583,8 +13296,9 @@
           <a:p>
             <a:r>
               <a:rPr lang="en-US" dirty="0" smtClean="0"/>
-              <a:t>TBD- Show how to view this Compliance Report at a later time. </a:t>
-            </a:r>
+              <a:t>Notice how in the upper Summary section in this example, 10 tests were compliant and 6 tests show critical issues with ssh.</a:t>
+            </a:r>
+            <a:endParaRPr lang="en-US" dirty="0" smtClean="0"/>
           </a:p>
           <a:p>
             <a:endParaRPr lang="en-US" dirty="0"/>
@@ -11644,90 +13358,46 @@
           </a:ln>
         </p:spPr>
       </p:pic>
+      <p:cxnSp>
+        <p:nvCxnSpPr>
+          <p:cNvPr id="7" name="Straight Arrow Connector 6"/>
+          <p:cNvCxnSpPr/>
+          <p:nvPr/>
+        </p:nvCxnSpPr>
+        <p:spPr>
+          <a:xfrm flipV="1">
+            <a:off x="4883727" y="2763983"/>
+            <a:ext cx="5133109" cy="2743199"/>
+          </a:xfrm>
+          <a:prstGeom prst="straightConnector1">
+            <a:avLst/>
+          </a:prstGeom>
+          <a:ln w="12700">
+            <a:solidFill>
+              <a:schemeClr val="accent4"/>
+            </a:solidFill>
+            <a:tailEnd type="triangle"/>
+          </a:ln>
+        </p:spPr>
+        <p:style>
+          <a:lnRef idx="3">
+            <a:schemeClr val="accent1"/>
+          </a:lnRef>
+          <a:fillRef idx="0">
+            <a:schemeClr val="accent1"/>
+          </a:fillRef>
+          <a:effectRef idx="2">
+            <a:schemeClr val="accent1"/>
+          </a:effectRef>
+          <a:fontRef idx="minor">
+            <a:schemeClr val="tx1"/>
+          </a:fontRef>
+        </p:style>
+      </p:cxnSp>
     </p:spTree>
     <p:extLst>
       <p:ext uri="{BB962C8B-B14F-4D97-AF65-F5344CB8AC3E}">
         <p14:creationId xmlns:p14="http://schemas.microsoft.com/office/powerpoint/2010/main" val="2224900576"/>
-      </p:ext>
-    </p:extLst>
-  </p:cSld>
-  <p:clrMapOvr>
-    <a:masterClrMapping/>
-  </p:clrMapOvr>
-  <p:transition spd="med">
-    <p:fade/>
-  </p:transition>
-</p:sld>
-</file>
-
-<file path=ppt/slides/slide17.xml><?xml version="1.0" encoding="utf-8"?>
-<p:sld xmlns:a="http://schemas.openxmlformats.org/drawingml/2006/main" xmlns:r="http://schemas.openxmlformats.org/officeDocument/2006/relationships" xmlns:p="http://schemas.openxmlformats.org/presentationml/2006/main">
-  <p:cSld>
-    <p:spTree>
-      <p:nvGrpSpPr>
-        <p:cNvPr id="1" name=""/>
-        <p:cNvGrpSpPr/>
-        <p:nvPr/>
-      </p:nvGrpSpPr>
-      <p:grpSpPr>
-        <a:xfrm>
-          <a:off x="0" y="0"/>
-          <a:ext cx="0" cy="0"/>
-          <a:chOff x="0" y="0"/>
-          <a:chExt cx="0" cy="0"/>
-        </a:xfrm>
-      </p:grpSpPr>
-      <p:sp>
-        <p:nvSpPr>
-          <p:cNvPr id="2" name="Title 1"/>
-          <p:cNvSpPr>
-            <a:spLocks noGrp="1"/>
-          </p:cNvSpPr>
-          <p:nvPr>
-            <p:ph type="ctrTitle"/>
-          </p:nvPr>
-        </p:nvSpPr>
-        <p:spPr/>
-        <p:txBody>
-          <a:bodyPr>
-            <a:normAutofit fontScale="90000"/>
-          </a:bodyPr>
-          <a:lstStyle/>
-          <a:p>
-            <a:endParaRPr lang="en-US"/>
-          </a:p>
-        </p:txBody>
-      </p:sp>
-      <p:sp>
-        <p:nvSpPr>
-          <p:cNvPr id="3" name="Subtitle 2"/>
-          <p:cNvSpPr>
-            <a:spLocks noGrp="1"/>
-          </p:cNvSpPr>
-          <p:nvPr>
-            <p:ph type="subTitle" idx="1"/>
-          </p:nvPr>
-        </p:nvSpPr>
-        <p:spPr/>
-        <p:txBody>
-          <a:bodyPr/>
-          <a:lstStyle/>
-          <a:p>
-            <a:endParaRPr lang="en-US" dirty="0" smtClean="0"/>
-          </a:p>
-          <a:p>
-            <a:r>
-              <a:rPr lang="en-US" dirty="0" smtClean="0"/>
-              <a:t>Need explanation of scan results here.</a:t>
-            </a:r>
-            <a:endParaRPr lang="en-US" dirty="0"/>
-          </a:p>
-        </p:txBody>
-      </p:sp>
-    </p:spTree>
-    <p:extLst>
-      <p:ext uri="{BB962C8B-B14F-4D97-AF65-F5344CB8AC3E}">
-        <p14:creationId xmlns:p14="http://schemas.microsoft.com/office/powerpoint/2010/main" val="389738391"/>
       </p:ext>
     </p:extLst>
   </p:cSld>
@@ -11744,79 +13414,6 @@
       </p:par>
     </p:tnLst>
   </p:timing>
-</p:sld>
-</file>
-
-<file path=ppt/slides/slide18.xml><?xml version="1.0" encoding="utf-8"?>
-<p:sld xmlns:a="http://schemas.openxmlformats.org/drawingml/2006/main" xmlns:r="http://schemas.openxmlformats.org/officeDocument/2006/relationships" xmlns:p="http://schemas.openxmlformats.org/presentationml/2006/main">
-  <p:cSld>
-    <p:spTree>
-      <p:nvGrpSpPr>
-        <p:cNvPr id="1" name=""/>
-        <p:cNvGrpSpPr/>
-        <p:nvPr/>
-      </p:nvGrpSpPr>
-      <p:grpSpPr>
-        <a:xfrm>
-          <a:off x="0" y="0"/>
-          <a:ext cx="0" cy="0"/>
-          <a:chOff x="0" y="0"/>
-          <a:chExt cx="0" cy="0"/>
-        </a:xfrm>
-      </p:grpSpPr>
-      <p:sp>
-        <p:nvSpPr>
-          <p:cNvPr id="2" name="Title 1"/>
-          <p:cNvSpPr>
-            <a:spLocks noGrp="1"/>
-          </p:cNvSpPr>
-          <p:nvPr>
-            <p:ph type="ctrTitle"/>
-          </p:nvPr>
-        </p:nvSpPr>
-        <p:spPr/>
-        <p:txBody>
-          <a:bodyPr>
-            <a:normAutofit fontScale="90000"/>
-          </a:bodyPr>
-          <a:lstStyle/>
-          <a:p>
-            <a:endParaRPr lang="en-US"/>
-          </a:p>
-        </p:txBody>
-      </p:sp>
-      <p:sp>
-        <p:nvSpPr>
-          <p:cNvPr id="3" name="Subtitle 2"/>
-          <p:cNvSpPr>
-            <a:spLocks noGrp="1"/>
-          </p:cNvSpPr>
-          <p:nvPr>
-            <p:ph type="subTitle" idx="1"/>
-          </p:nvPr>
-        </p:nvSpPr>
-        <p:spPr/>
-        <p:txBody>
-          <a:bodyPr/>
-          <a:lstStyle/>
-          <a:p>
-            <a:endParaRPr lang="en-US"/>
-          </a:p>
-        </p:txBody>
-      </p:sp>
-    </p:spTree>
-    <p:extLst>
-      <p:ext uri="{BB962C8B-B14F-4D97-AF65-F5344CB8AC3E}">
-        <p14:creationId xmlns:p14="http://schemas.microsoft.com/office/powerpoint/2010/main" val="3842220861"/>
-      </p:ext>
-    </p:extLst>
-  </p:cSld>
-  <p:clrMapOvr>
-    <a:masterClrMapping/>
-  </p:clrMapOvr>
-  <p:transition spd="med">
-    <p:fade/>
-  </p:transition>
 </p:sld>
 </file>
 
@@ -11844,43 +13441,139 @@
             <a:spLocks noGrp="1"/>
           </p:cNvSpPr>
           <p:nvPr>
-            <p:ph type="ctrTitle"/>
-          </p:nvPr>
-        </p:nvSpPr>
-        <p:spPr/>
+            <p:ph type="title"/>
+          </p:nvPr>
+        </p:nvSpPr>
+        <p:spPr>
+          <a:xfrm>
+            <a:off x="457200" y="304800"/>
+            <a:ext cx="4838700" cy="828675"/>
+          </a:xfrm>
+        </p:spPr>
         <p:txBody>
           <a:bodyPr>
-            <a:normAutofit fontScale="90000"/>
+            <a:normAutofit/>
           </a:bodyPr>
           <a:lstStyle/>
           <a:p>
-            <a:endParaRPr lang="en-US"/>
-          </a:p>
-        </p:txBody>
-      </p:sp>
-      <p:sp>
-        <p:nvSpPr>
-          <p:cNvPr id="3" name="Subtitle 2"/>
-          <p:cNvSpPr>
-            <a:spLocks noGrp="1"/>
-          </p:cNvSpPr>
-          <p:nvPr>
-            <p:ph type="subTitle" idx="1"/>
-          </p:nvPr>
-        </p:nvSpPr>
-        <p:spPr/>
+            <a:r>
+              <a:rPr lang="en-US" dirty="0" smtClean="0"/>
+              <a:t>Scan Results</a:t>
+            </a:r>
+            <a:endParaRPr lang="en-US" dirty="0"/>
+          </a:p>
+        </p:txBody>
+      </p:sp>
+      <p:sp>
+        <p:nvSpPr>
+          <p:cNvPr id="3" name="Text Placeholder 2"/>
+          <p:cNvSpPr>
+            <a:spLocks noGrp="1"/>
+          </p:cNvSpPr>
+          <p:nvPr>
+            <p:ph type="body" sz="quarter" idx="12"/>
+          </p:nvPr>
+        </p:nvSpPr>
+        <p:spPr>
+          <a:xfrm>
+            <a:off x="342900" y="1652155"/>
+            <a:ext cx="4707082" cy="4439901"/>
+          </a:xfrm>
+        </p:spPr>
         <p:txBody>
           <a:bodyPr/>
           <a:lstStyle/>
           <a:p>
-            <a:endParaRPr lang="en-US"/>
-          </a:p>
-        </p:txBody>
-      </p:sp>
+            <a:r>
+              <a:rPr lang="en-US" dirty="0" smtClean="0"/>
+              <a:t>The bottom half of the Compliance Report shown here has a table of details of test results.</a:t>
+            </a:r>
+            <a:endParaRPr lang="en-US" dirty="0"/>
+          </a:p>
+          <a:p>
+            <a:r>
+              <a:rPr lang="en-US" dirty="0" smtClean="0"/>
+              <a:t>These are sorted by severity.</a:t>
+            </a:r>
+          </a:p>
+          <a:p>
+            <a:r>
+              <a:rPr lang="en-US" dirty="0" smtClean="0"/>
+              <a:t>If you click an issue as shown here, a bit more information about the issue displays.</a:t>
+            </a:r>
+            <a:endParaRPr lang="en-US" dirty="0"/>
+          </a:p>
+        </p:txBody>
+      </p:sp>
+      <p:pic>
+        <p:nvPicPr>
+          <p:cNvPr id="5" name="Picture 4"/>
+          <p:cNvPicPr>
+            <a:picLocks noChangeAspect="1"/>
+          </p:cNvPicPr>
+          <p:nvPr/>
+        </p:nvPicPr>
+        <p:blipFill>
+          <a:blip r:embed="rId3"/>
+          <a:stretch>
+            <a:fillRect/>
+          </a:stretch>
+        </p:blipFill>
+        <p:spPr>
+          <a:xfrm>
+            <a:off x="5623471" y="2236210"/>
+            <a:ext cx="10539779" cy="3790518"/>
+          </a:xfrm>
+          <a:prstGeom prst="rect">
+            <a:avLst/>
+          </a:prstGeom>
+          <a:ln>
+            <a:solidFill>
+              <a:schemeClr val="accent1"/>
+            </a:solidFill>
+          </a:ln>
+        </p:spPr>
+      </p:pic>
+      <p:cxnSp>
+        <p:nvCxnSpPr>
+          <p:cNvPr id="9" name="Straight Arrow Connector 8"/>
+          <p:cNvCxnSpPr/>
+          <p:nvPr/>
+        </p:nvCxnSpPr>
+        <p:spPr>
+          <a:xfrm>
+            <a:off x="4094018" y="2327564"/>
+            <a:ext cx="1201882" cy="249381"/>
+          </a:xfrm>
+          <a:prstGeom prst="straightConnector1">
+            <a:avLst/>
+          </a:prstGeom>
+          <a:ln w="12700">
+            <a:solidFill>
+              <a:schemeClr val="accent4"/>
+            </a:solidFill>
+            <a:tailEnd type="triangle"/>
+          </a:ln>
+        </p:spPr>
+        <p:style>
+          <a:lnRef idx="3">
+            <a:schemeClr val="accent1"/>
+          </a:lnRef>
+          <a:fillRef idx="0">
+            <a:schemeClr val="accent1"/>
+          </a:fillRef>
+          <a:effectRef idx="2">
+            <a:schemeClr val="accent1"/>
+          </a:effectRef>
+          <a:fontRef idx="minor">
+            <a:schemeClr val="tx1"/>
+          </a:fontRef>
+        </p:style>
+      </p:cxnSp>
     </p:spTree>
     <p:extLst>
       <p:ext uri="{BB962C8B-B14F-4D97-AF65-F5344CB8AC3E}">
-        <p14:creationId xmlns:p14="http://schemas.microsoft.com/office/powerpoint/2010/main" val="3953335903"/>
+        <p14:creationId xmlns:p14="http://schemas.microsoft.com/office/powerpoint/2010/main" val="2780391815"/>
       </p:ext>
     </p:extLst>
   </p:cSld>
@@ -11890,6 +13583,13 @@
   <p:transition spd="med">
     <p:fade/>
   </p:transition>
+  <p:timing>
+    <p:tnLst>
+      <p:par>
+        <p:cTn id="1" dur="indefinite" restart="never" nodeType="tmRoot"/>
+      </p:par>
+    </p:tnLst>
+  </p:timing>
 </p:sld>
 </file>
 
@@ -12009,7 +13709,11 @@
             </a:pPr>
             <a:r>
               <a:rPr lang="en-US" dirty="0" smtClean="0"/>
-              <a:t>Run a Compliance scan.</a:t>
+              <a:t>Run a Compliance scan</a:t>
+            </a:r>
+            <a:r>
+              <a:rPr lang="en-US" dirty="0" smtClean="0"/>
+              <a:t>.</a:t>
             </a:r>
           </a:p>
           <a:p>
@@ -12019,7 +13723,22 @@
             </a:pPr>
             <a:r>
               <a:rPr lang="en-US" dirty="0" smtClean="0"/>
-              <a:t>Set up Compliance key pairs.</a:t>
+              <a:t>Interpret scan results.</a:t>
+            </a:r>
+            <a:endParaRPr lang="en-US" dirty="0" smtClean="0"/>
+          </a:p>
+          <a:p>
+            <a:pPr marL="457200" indent="-457200">
+              <a:buFont typeface="Wingdings" charset="2"/>
+              <a:buChar char="Ø"/>
+            </a:pPr>
+            <a:r>
+              <a:rPr lang="en-US" dirty="0" smtClean="0"/>
+              <a:t>Explain where to set up security key </a:t>
+            </a:r>
+            <a:r>
+              <a:rPr lang="en-US" dirty="0" smtClean="0"/>
+              <a:t>pairs.</a:t>
             </a:r>
             <a:endParaRPr lang="en-US" dirty="0"/>
           </a:p>
@@ -12065,6 +13784,986 @@
           <a:chExt cx="0" cy="0"/>
         </a:xfrm>
       </p:grpSpPr>
+      <p:pic>
+        <p:nvPicPr>
+          <p:cNvPr id="18" name="Picture 17"/>
+          <p:cNvPicPr>
+            <a:picLocks noChangeAspect="1"/>
+          </p:cNvPicPr>
+          <p:nvPr/>
+        </p:nvPicPr>
+        <p:blipFill>
+          <a:blip r:embed="rId3"/>
+          <a:stretch>
+            <a:fillRect/>
+          </a:stretch>
+        </p:blipFill>
+        <p:spPr>
+          <a:xfrm>
+            <a:off x="7309713" y="318576"/>
+            <a:ext cx="5934075" cy="3505200"/>
+          </a:xfrm>
+          <a:prstGeom prst="rect">
+            <a:avLst/>
+          </a:prstGeom>
+          <a:ln>
+            <a:solidFill>
+              <a:schemeClr val="accent1"/>
+            </a:solidFill>
+          </a:ln>
+        </p:spPr>
+      </p:pic>
+      <p:sp>
+        <p:nvSpPr>
+          <p:cNvPr id="2" name="Title 1"/>
+          <p:cNvSpPr>
+            <a:spLocks noGrp="1"/>
+          </p:cNvSpPr>
+          <p:nvPr>
+            <p:ph type="title"/>
+          </p:nvPr>
+        </p:nvSpPr>
+        <p:spPr>
+          <a:xfrm>
+            <a:off x="457199" y="304800"/>
+            <a:ext cx="6089073" cy="911752"/>
+          </a:xfrm>
+        </p:spPr>
+        <p:txBody>
+          <a:bodyPr>
+            <a:normAutofit fontScale="90000"/>
+          </a:bodyPr>
+          <a:lstStyle/>
+          <a:p>
+            <a:r>
+              <a:rPr lang="en-US" dirty="0" smtClean="0"/>
+              <a:t>GE: Scan </a:t>
+            </a:r>
+            <a:r>
+              <a:rPr lang="en-US" dirty="0" smtClean="0"/>
+              <a:t>Results</a:t>
+            </a:r>
+            <a:endParaRPr lang="en-US" dirty="0"/>
+          </a:p>
+        </p:txBody>
+      </p:sp>
+      <p:sp>
+        <p:nvSpPr>
+          <p:cNvPr id="3" name="Text Placeholder 2"/>
+          <p:cNvSpPr>
+            <a:spLocks noGrp="1"/>
+          </p:cNvSpPr>
+          <p:nvPr>
+            <p:ph type="body" sz="quarter" idx="12"/>
+          </p:nvPr>
+        </p:nvSpPr>
+        <p:spPr>
+          <a:xfrm>
+            <a:off x="342900" y="1428751"/>
+            <a:ext cx="4707082" cy="6156614"/>
+          </a:xfrm>
+        </p:spPr>
+        <p:txBody>
+          <a:bodyPr/>
+          <a:lstStyle/>
+          <a:p>
+            <a:r>
+              <a:rPr lang="en-US" dirty="0" smtClean="0"/>
+              <a:t>To view the </a:t>
+            </a:r>
+            <a:r>
+              <a:rPr lang="en-US" dirty="0" err="1" smtClean="0"/>
+              <a:t>InfoSpec</a:t>
+            </a:r>
+            <a:r>
+              <a:rPr lang="en-US" dirty="0" smtClean="0"/>
+              <a:t> code that comprises this profile, do the following:</a:t>
+            </a:r>
+          </a:p>
+          <a:p>
+            <a:endParaRPr lang="en-US" dirty="0"/>
+          </a:p>
+          <a:p>
+            <a:pPr marL="514350" indent="-514350">
+              <a:buFont typeface="+mj-lt"/>
+              <a:buAutoNum type="arabicPeriod"/>
+            </a:pPr>
+            <a:r>
+              <a:rPr lang="en-US" dirty="0" smtClean="0"/>
+              <a:t>Click the </a:t>
+            </a:r>
+            <a:r>
+              <a:rPr lang="en-US" b="1" dirty="0" smtClean="0"/>
+              <a:t>Compliance</a:t>
+            </a:r>
+            <a:r>
+              <a:rPr lang="en-US" dirty="0" smtClean="0"/>
+              <a:t> button.</a:t>
+            </a:r>
+          </a:p>
+          <a:p>
+            <a:pPr marL="514350" indent="-514350">
+              <a:buFont typeface="+mj-lt"/>
+              <a:buAutoNum type="arabicPeriod"/>
+            </a:pPr>
+            <a:r>
+              <a:rPr lang="en-US" dirty="0" smtClean="0"/>
+              <a:t>Click the relevant profile (</a:t>
+            </a:r>
+            <a:r>
+              <a:rPr lang="en-US" b="1" dirty="0" smtClean="0"/>
+              <a:t>Basic SSH</a:t>
+            </a:r>
+            <a:r>
+              <a:rPr lang="en-US" dirty="0" smtClean="0"/>
+              <a:t>).</a:t>
+            </a:r>
+          </a:p>
+          <a:p>
+            <a:pPr marL="514350" indent="-514350">
+              <a:buFont typeface="+mj-lt"/>
+              <a:buAutoNum type="arabicPeriod"/>
+            </a:pPr>
+            <a:r>
+              <a:rPr lang="en-US" dirty="0" smtClean="0"/>
+              <a:t>Scroll down and click the `</a:t>
+            </a:r>
+            <a:r>
+              <a:rPr lang="en-US" b="1" dirty="0"/>
+              <a:t>Set SSH protocol version to </a:t>
+            </a:r>
+            <a:r>
+              <a:rPr lang="en-US" b="1" dirty="0" smtClean="0"/>
+              <a:t>2</a:t>
+            </a:r>
+            <a:r>
+              <a:rPr lang="en-US" dirty="0" smtClean="0"/>
+              <a:t>` profile.</a:t>
+            </a:r>
+            <a:endParaRPr lang="en-US" dirty="0"/>
+          </a:p>
+        </p:txBody>
+      </p:sp>
+      <p:pic>
+        <p:nvPicPr>
+          <p:cNvPr id="7" name="Picture 6"/>
+          <p:cNvPicPr>
+            <a:picLocks noChangeAspect="1"/>
+          </p:cNvPicPr>
+          <p:nvPr/>
+        </p:nvPicPr>
+        <p:blipFill>
+          <a:blip r:embed="rId4"/>
+          <a:stretch>
+            <a:fillRect/>
+          </a:stretch>
+        </p:blipFill>
+        <p:spPr>
+          <a:xfrm>
+            <a:off x="11226220" y="1216552"/>
+            <a:ext cx="4921251" cy="3645765"/>
+          </a:xfrm>
+          <a:prstGeom prst="rect">
+            <a:avLst/>
+          </a:prstGeom>
+          <a:ln>
+            <a:solidFill>
+              <a:schemeClr val="accent1"/>
+            </a:solidFill>
+          </a:ln>
+        </p:spPr>
+      </p:pic>
+      <p:pic>
+        <p:nvPicPr>
+          <p:cNvPr id="8" name="Picture 7"/>
+          <p:cNvPicPr>
+            <a:picLocks noChangeAspect="1"/>
+          </p:cNvPicPr>
+          <p:nvPr/>
+        </p:nvPicPr>
+        <p:blipFill>
+          <a:blip r:embed="rId5"/>
+          <a:stretch>
+            <a:fillRect/>
+          </a:stretch>
+        </p:blipFill>
+        <p:spPr>
+          <a:xfrm>
+            <a:off x="7535282" y="4814930"/>
+            <a:ext cx="7381875" cy="3228975"/>
+          </a:xfrm>
+          <a:prstGeom prst="rect">
+            <a:avLst/>
+          </a:prstGeom>
+          <a:ln>
+            <a:solidFill>
+              <a:schemeClr val="accent1"/>
+            </a:solidFill>
+          </a:ln>
+        </p:spPr>
+      </p:pic>
+      <p:cxnSp>
+        <p:nvCxnSpPr>
+          <p:cNvPr id="9" name="Straight Arrow Connector 8"/>
+          <p:cNvCxnSpPr/>
+          <p:nvPr/>
+        </p:nvCxnSpPr>
+        <p:spPr>
+          <a:xfrm flipV="1">
+            <a:off x="4967142" y="2876550"/>
+            <a:ext cx="2900508" cy="1104431"/>
+          </a:xfrm>
+          <a:prstGeom prst="straightConnector1">
+            <a:avLst/>
+          </a:prstGeom>
+          <a:ln w="28575">
+            <a:solidFill>
+              <a:schemeClr val="accent1"/>
+            </a:solidFill>
+            <a:tailEnd type="triangle"/>
+          </a:ln>
+        </p:spPr>
+        <p:style>
+          <a:lnRef idx="3">
+            <a:schemeClr val="accent1"/>
+          </a:lnRef>
+          <a:fillRef idx="0">
+            <a:schemeClr val="accent1"/>
+          </a:fillRef>
+          <a:effectRef idx="2">
+            <a:schemeClr val="accent1"/>
+          </a:effectRef>
+          <a:fontRef idx="minor">
+            <a:schemeClr val="tx1"/>
+          </a:fontRef>
+        </p:style>
+      </p:cxnSp>
+      <p:cxnSp>
+        <p:nvCxnSpPr>
+          <p:cNvPr id="13" name="Straight Arrow Connector 12"/>
+          <p:cNvCxnSpPr/>
+          <p:nvPr/>
+        </p:nvCxnSpPr>
+        <p:spPr>
+          <a:xfrm flipV="1">
+            <a:off x="4490892" y="4438650"/>
+            <a:ext cx="9129858" cy="1180631"/>
+          </a:xfrm>
+          <a:prstGeom prst="straightConnector1">
+            <a:avLst/>
+          </a:prstGeom>
+          <a:ln w="28575">
+            <a:solidFill>
+              <a:schemeClr val="accent1"/>
+            </a:solidFill>
+            <a:tailEnd type="triangle"/>
+          </a:ln>
+        </p:spPr>
+        <p:style>
+          <a:lnRef idx="3">
+            <a:schemeClr val="accent1"/>
+          </a:lnRef>
+          <a:fillRef idx="0">
+            <a:schemeClr val="accent1"/>
+          </a:fillRef>
+          <a:effectRef idx="2">
+            <a:schemeClr val="accent1"/>
+          </a:effectRef>
+          <a:fontRef idx="minor">
+            <a:schemeClr val="tx1"/>
+          </a:fontRef>
+        </p:style>
+      </p:cxnSp>
+      <p:cxnSp>
+        <p:nvCxnSpPr>
+          <p:cNvPr id="15" name="Straight Arrow Connector 14"/>
+          <p:cNvCxnSpPr/>
+          <p:nvPr/>
+        </p:nvCxnSpPr>
+        <p:spPr>
+          <a:xfrm flipV="1">
+            <a:off x="5295900" y="5831480"/>
+            <a:ext cx="3543300" cy="1026520"/>
+          </a:xfrm>
+          <a:prstGeom prst="straightConnector1">
+            <a:avLst/>
+          </a:prstGeom>
+          <a:ln w="28575">
+            <a:solidFill>
+              <a:schemeClr val="accent1"/>
+            </a:solidFill>
+            <a:tailEnd type="triangle"/>
+          </a:ln>
+        </p:spPr>
+        <p:style>
+          <a:lnRef idx="3">
+            <a:schemeClr val="accent1"/>
+          </a:lnRef>
+          <a:fillRef idx="0">
+            <a:schemeClr val="accent1"/>
+          </a:fillRef>
+          <a:effectRef idx="2">
+            <a:schemeClr val="accent1"/>
+          </a:effectRef>
+          <a:fontRef idx="minor">
+            <a:schemeClr val="tx1"/>
+          </a:fontRef>
+        </p:style>
+      </p:cxnSp>
+    </p:spTree>
+    <p:extLst>
+      <p:ext uri="{BB962C8B-B14F-4D97-AF65-F5344CB8AC3E}">
+        <p14:creationId xmlns:p14="http://schemas.microsoft.com/office/powerpoint/2010/main" val="3577483553"/>
+      </p:ext>
+    </p:extLst>
+  </p:cSld>
+  <p:clrMapOvr>
+    <a:masterClrMapping/>
+  </p:clrMapOvr>
+  <p:transition spd="med">
+    <p:fade/>
+  </p:transition>
+  <p:timing>
+    <p:tnLst>
+      <p:par>
+        <p:cTn id="1" dur="indefinite" restart="never" nodeType="tmRoot"/>
+      </p:par>
+    </p:tnLst>
+  </p:timing>
+</p:sld>
+</file>
+
+<file path=ppt/slides/slide21.xml><?xml version="1.0" encoding="utf-8"?>
+<p:sld xmlns:a="http://schemas.openxmlformats.org/drawingml/2006/main" xmlns:r="http://schemas.openxmlformats.org/officeDocument/2006/relationships" xmlns:p="http://schemas.openxmlformats.org/presentationml/2006/main">
+  <p:cSld>
+    <p:spTree>
+      <p:nvGrpSpPr>
+        <p:cNvPr id="1" name=""/>
+        <p:cNvGrpSpPr/>
+        <p:nvPr/>
+      </p:nvGrpSpPr>
+      <p:grpSpPr>
+        <a:xfrm>
+          <a:off x="0" y="0"/>
+          <a:ext cx="0" cy="0"/>
+          <a:chOff x="0" y="0"/>
+          <a:chExt cx="0" cy="0"/>
+        </a:xfrm>
+      </p:grpSpPr>
+      <p:sp>
+        <p:nvSpPr>
+          <p:cNvPr id="2" name="Title 1"/>
+          <p:cNvSpPr>
+            <a:spLocks noGrp="1"/>
+          </p:cNvSpPr>
+          <p:nvPr>
+            <p:ph type="title"/>
+          </p:nvPr>
+        </p:nvSpPr>
+        <p:spPr>
+          <a:xfrm>
+            <a:off x="457199" y="304800"/>
+            <a:ext cx="6089073" cy="911752"/>
+          </a:xfrm>
+        </p:spPr>
+        <p:txBody>
+          <a:bodyPr>
+            <a:normAutofit fontScale="90000"/>
+          </a:bodyPr>
+          <a:lstStyle/>
+          <a:p>
+            <a:r>
+              <a:rPr lang="en-US" dirty="0" smtClean="0"/>
+              <a:t>GE: Scan </a:t>
+            </a:r>
+            <a:r>
+              <a:rPr lang="en-US" dirty="0" smtClean="0"/>
+              <a:t>Results</a:t>
+            </a:r>
+            <a:endParaRPr lang="en-US" dirty="0"/>
+          </a:p>
+        </p:txBody>
+      </p:sp>
+      <p:sp>
+        <p:nvSpPr>
+          <p:cNvPr id="3" name="Text Placeholder 2"/>
+          <p:cNvSpPr>
+            <a:spLocks noGrp="1"/>
+          </p:cNvSpPr>
+          <p:nvPr>
+            <p:ph type="body" sz="quarter" idx="12"/>
+          </p:nvPr>
+        </p:nvSpPr>
+        <p:spPr>
+          <a:xfrm>
+            <a:off x="342900" y="1314451"/>
+            <a:ext cx="4707082" cy="6156614"/>
+          </a:xfrm>
+        </p:spPr>
+        <p:txBody>
+          <a:bodyPr/>
+          <a:lstStyle/>
+          <a:p>
+            <a:r>
+              <a:rPr lang="en-US" dirty="0" smtClean="0"/>
+              <a:t>Let's discuss what this profile is doing.</a:t>
+            </a:r>
+          </a:p>
+          <a:p>
+            <a:endParaRPr lang="en-US" dirty="0"/>
+          </a:p>
+          <a:p>
+            <a:r>
+              <a:rPr lang="en-US" sz="2800" dirty="0" smtClean="0"/>
+              <a:t>The impact of 1.0 indicates this is a </a:t>
+            </a:r>
+            <a:r>
+              <a:rPr lang="en-US" sz="2800" dirty="0" smtClean="0"/>
+              <a:t>Major </a:t>
+            </a:r>
+            <a:r>
+              <a:rPr lang="en-US" sz="2800" dirty="0" smtClean="0"/>
+              <a:t>issue.</a:t>
+            </a:r>
+          </a:p>
+          <a:p>
+            <a:endParaRPr lang="en-US" sz="2800" dirty="0" smtClean="0"/>
+          </a:p>
+          <a:p>
+            <a:r>
+              <a:rPr lang="en-US" sz="2800" dirty="0" smtClean="0"/>
+              <a:t>The title is what populates the Compliance Report issue title.</a:t>
+            </a:r>
+          </a:p>
+          <a:p>
+            <a:endParaRPr lang="en-US" sz="2800" dirty="0" smtClean="0"/>
+          </a:p>
+          <a:p>
+            <a:r>
+              <a:rPr lang="en-US" sz="2800" dirty="0" smtClean="0"/>
+              <a:t>The describe section is the actual test.</a:t>
+            </a:r>
+          </a:p>
+          <a:p>
+            <a:endParaRPr lang="en-US" dirty="0" smtClean="0"/>
+          </a:p>
+          <a:p>
+            <a:endParaRPr lang="en-US" dirty="0" smtClean="0"/>
+          </a:p>
+          <a:p>
+            <a:endParaRPr lang="en-US" dirty="0" smtClean="0"/>
+          </a:p>
+          <a:p>
+            <a:endParaRPr lang="en-US" dirty="0"/>
+          </a:p>
+          <a:p>
+            <a:endParaRPr lang="en-US" dirty="0"/>
+          </a:p>
+        </p:txBody>
+      </p:sp>
+      <p:pic>
+        <p:nvPicPr>
+          <p:cNvPr id="8" name="Picture 7"/>
+          <p:cNvPicPr>
+            <a:picLocks noChangeAspect="1"/>
+          </p:cNvPicPr>
+          <p:nvPr/>
+        </p:nvPicPr>
+        <p:blipFill>
+          <a:blip r:embed="rId3"/>
+          <a:stretch>
+            <a:fillRect/>
+          </a:stretch>
+        </p:blipFill>
+        <p:spPr>
+          <a:xfrm>
+            <a:off x="5281258" y="1428751"/>
+            <a:ext cx="10887719" cy="4762499"/>
+          </a:xfrm>
+          <a:prstGeom prst="rect">
+            <a:avLst/>
+          </a:prstGeom>
+          <a:ln>
+            <a:solidFill>
+              <a:schemeClr val="accent1"/>
+            </a:solidFill>
+          </a:ln>
+        </p:spPr>
+      </p:pic>
+      <p:cxnSp>
+        <p:nvCxnSpPr>
+          <p:cNvPr id="10" name="Straight Arrow Connector 9"/>
+          <p:cNvCxnSpPr/>
+          <p:nvPr/>
+        </p:nvCxnSpPr>
+        <p:spPr>
+          <a:xfrm>
+            <a:off x="4133850" y="3752851"/>
+            <a:ext cx="3409950" cy="292222"/>
+          </a:xfrm>
+          <a:prstGeom prst="straightConnector1">
+            <a:avLst/>
+          </a:prstGeom>
+          <a:ln w="28575">
+            <a:solidFill>
+              <a:schemeClr val="accent1"/>
+            </a:solidFill>
+            <a:tailEnd type="triangle"/>
+          </a:ln>
+        </p:spPr>
+        <p:style>
+          <a:lnRef idx="3">
+            <a:schemeClr val="accent1"/>
+          </a:lnRef>
+          <a:fillRef idx="0">
+            <a:schemeClr val="accent1"/>
+          </a:fillRef>
+          <a:effectRef idx="2">
+            <a:schemeClr val="accent1"/>
+          </a:effectRef>
+          <a:fontRef idx="minor">
+            <a:schemeClr val="tx1"/>
+          </a:fontRef>
+        </p:style>
+      </p:cxnSp>
+      <p:cxnSp>
+        <p:nvCxnSpPr>
+          <p:cNvPr id="11" name="Straight Arrow Connector 10"/>
+          <p:cNvCxnSpPr/>
+          <p:nvPr/>
+        </p:nvCxnSpPr>
+        <p:spPr>
+          <a:xfrm flipV="1">
+            <a:off x="4572000" y="4392758"/>
+            <a:ext cx="3733800" cy="712644"/>
+          </a:xfrm>
+          <a:prstGeom prst="straightConnector1">
+            <a:avLst/>
+          </a:prstGeom>
+          <a:ln w="28575">
+            <a:solidFill>
+              <a:schemeClr val="accent1"/>
+            </a:solidFill>
+            <a:tailEnd type="triangle"/>
+          </a:ln>
+        </p:spPr>
+        <p:style>
+          <a:lnRef idx="3">
+            <a:schemeClr val="accent1"/>
+          </a:lnRef>
+          <a:fillRef idx="0">
+            <a:schemeClr val="accent1"/>
+          </a:fillRef>
+          <a:effectRef idx="2">
+            <a:schemeClr val="accent1"/>
+          </a:effectRef>
+          <a:fontRef idx="minor">
+            <a:schemeClr val="tx1"/>
+          </a:fontRef>
+        </p:style>
+      </p:cxnSp>
+      <p:cxnSp>
+        <p:nvCxnSpPr>
+          <p:cNvPr id="15" name="Straight Arrow Connector 14"/>
+          <p:cNvCxnSpPr/>
+          <p:nvPr/>
+        </p:nvCxnSpPr>
+        <p:spPr>
+          <a:xfrm flipV="1">
+            <a:off x="4400550" y="5581650"/>
+            <a:ext cx="3276600" cy="1541730"/>
+          </a:xfrm>
+          <a:prstGeom prst="straightConnector1">
+            <a:avLst/>
+          </a:prstGeom>
+          <a:ln w="28575">
+            <a:solidFill>
+              <a:schemeClr val="accent1"/>
+            </a:solidFill>
+            <a:tailEnd type="triangle"/>
+          </a:ln>
+        </p:spPr>
+        <p:style>
+          <a:lnRef idx="3">
+            <a:schemeClr val="accent1"/>
+          </a:lnRef>
+          <a:fillRef idx="0">
+            <a:schemeClr val="accent1"/>
+          </a:fillRef>
+          <a:effectRef idx="2">
+            <a:schemeClr val="accent1"/>
+          </a:effectRef>
+          <a:fontRef idx="minor">
+            <a:schemeClr val="tx1"/>
+          </a:fontRef>
+        </p:style>
+      </p:cxnSp>
+    </p:spTree>
+    <p:extLst>
+      <p:ext uri="{BB962C8B-B14F-4D97-AF65-F5344CB8AC3E}">
+        <p14:creationId xmlns:p14="http://schemas.microsoft.com/office/powerpoint/2010/main" val="1080805466"/>
+      </p:ext>
+    </p:extLst>
+  </p:cSld>
+  <p:clrMapOvr>
+    <a:masterClrMapping/>
+  </p:clrMapOvr>
+  <p:transition spd="med">
+    <p:fade/>
+  </p:transition>
+  <p:timing>
+    <p:tnLst>
+      <p:par>
+        <p:cTn id="1" dur="indefinite" restart="never" nodeType="tmRoot"/>
+      </p:par>
+    </p:tnLst>
+  </p:timing>
+</p:sld>
+</file>
+
+<file path=ppt/slides/slide22.xml><?xml version="1.0" encoding="utf-8"?>
+<p:sld xmlns:a="http://schemas.openxmlformats.org/drawingml/2006/main" xmlns:r="http://schemas.openxmlformats.org/officeDocument/2006/relationships" xmlns:p="http://schemas.openxmlformats.org/presentationml/2006/main">
+  <p:cSld>
+    <p:spTree>
+      <p:nvGrpSpPr>
+        <p:cNvPr id="1" name=""/>
+        <p:cNvGrpSpPr/>
+        <p:nvPr/>
+      </p:nvGrpSpPr>
+      <p:grpSpPr>
+        <a:xfrm>
+          <a:off x="0" y="0"/>
+          <a:ext cx="0" cy="0"/>
+          <a:chOff x="0" y="0"/>
+          <a:chExt cx="0" cy="0"/>
+        </a:xfrm>
+      </p:grpSpPr>
+      <p:sp>
+        <p:nvSpPr>
+          <p:cNvPr id="2" name="Title 1"/>
+          <p:cNvSpPr>
+            <a:spLocks noGrp="1"/>
+          </p:cNvSpPr>
+          <p:nvPr>
+            <p:ph type="ctrTitle"/>
+          </p:nvPr>
+        </p:nvSpPr>
+        <p:spPr/>
+        <p:txBody>
+          <a:bodyPr>
+            <a:normAutofit fontScale="90000"/>
+          </a:bodyPr>
+          <a:lstStyle/>
+          <a:p>
+            <a:endParaRPr lang="en-US" dirty="0"/>
+          </a:p>
+        </p:txBody>
+      </p:sp>
+      <p:sp>
+        <p:nvSpPr>
+          <p:cNvPr id="3" name="Subtitle 2"/>
+          <p:cNvSpPr>
+            <a:spLocks noGrp="1"/>
+          </p:cNvSpPr>
+          <p:nvPr>
+            <p:ph type="subTitle" idx="1"/>
+          </p:nvPr>
+        </p:nvSpPr>
+        <p:spPr>
+          <a:xfrm>
+            <a:off x="1671638" y="3271838"/>
+            <a:ext cx="12319000" cy="4317682"/>
+          </a:xfrm>
+        </p:spPr>
+        <p:txBody>
+          <a:bodyPr/>
+          <a:lstStyle/>
+          <a:p>
+            <a:r>
+              <a:rPr lang="en-US" dirty="0" smtClean="0"/>
+              <a:t>Adding </a:t>
+            </a:r>
+            <a:r>
+              <a:rPr lang="en-US" dirty="0" smtClean="0"/>
+              <a:t>a</a:t>
+            </a:r>
+            <a:endParaRPr lang="en-US" dirty="0" smtClean="0"/>
+          </a:p>
+        </p:txBody>
+      </p:sp>
+    </p:spTree>
+    <p:extLst>
+      <p:ext uri="{BB962C8B-B14F-4D97-AF65-F5344CB8AC3E}">
+        <p14:creationId xmlns:p14="http://schemas.microsoft.com/office/powerpoint/2010/main" val="847587243"/>
+      </p:ext>
+    </p:extLst>
+  </p:cSld>
+  <p:clrMapOvr>
+    <a:masterClrMapping/>
+  </p:clrMapOvr>
+  <p:transition spd="med">
+    <p:fade/>
+  </p:transition>
+  <p:timing>
+    <p:tnLst>
+      <p:par>
+        <p:cTn id="1" dur="indefinite" restart="never" nodeType="tmRoot"/>
+      </p:par>
+    </p:tnLst>
+  </p:timing>
+</p:sld>
+</file>
+
+<file path=ppt/slides/slide23.xml><?xml version="1.0" encoding="utf-8"?>
+<p:sld xmlns:a="http://schemas.openxmlformats.org/drawingml/2006/main" xmlns:r="http://schemas.openxmlformats.org/officeDocument/2006/relationships" xmlns:p="http://schemas.openxmlformats.org/presentationml/2006/main">
+  <p:cSld>
+    <p:spTree>
+      <p:nvGrpSpPr>
+        <p:cNvPr id="1" name=""/>
+        <p:cNvGrpSpPr/>
+        <p:nvPr/>
+      </p:nvGrpSpPr>
+      <p:grpSpPr>
+        <a:xfrm>
+          <a:off x="0" y="0"/>
+          <a:ext cx="0" cy="0"/>
+          <a:chOff x="0" y="0"/>
+          <a:chExt cx="0" cy="0"/>
+        </a:xfrm>
+      </p:grpSpPr>
+      <p:sp>
+        <p:nvSpPr>
+          <p:cNvPr id="2" name="Title 1"/>
+          <p:cNvSpPr>
+            <a:spLocks noGrp="1"/>
+          </p:cNvSpPr>
+          <p:nvPr>
+            <p:ph type="ctrTitle"/>
+          </p:nvPr>
+        </p:nvSpPr>
+        <p:spPr/>
+        <p:txBody>
+          <a:bodyPr>
+            <a:normAutofit fontScale="90000"/>
+          </a:bodyPr>
+          <a:lstStyle/>
+          <a:p>
+            <a:endParaRPr lang="en-US"/>
+          </a:p>
+        </p:txBody>
+      </p:sp>
+      <p:sp>
+        <p:nvSpPr>
+          <p:cNvPr id="3" name="Subtitle 2"/>
+          <p:cNvSpPr>
+            <a:spLocks noGrp="1"/>
+          </p:cNvSpPr>
+          <p:nvPr>
+            <p:ph type="subTitle" idx="1"/>
+          </p:nvPr>
+        </p:nvSpPr>
+        <p:spPr/>
+        <p:txBody>
+          <a:bodyPr/>
+          <a:lstStyle/>
+          <a:p>
+            <a:endParaRPr lang="en-US" dirty="0" smtClean="0"/>
+          </a:p>
+          <a:p>
+            <a:r>
+              <a:rPr lang="en-US" dirty="0" smtClean="0"/>
+              <a:t>Need explanation of scan results here.</a:t>
+            </a:r>
+            <a:endParaRPr lang="en-US" dirty="0"/>
+          </a:p>
+        </p:txBody>
+      </p:sp>
+    </p:spTree>
+    <p:extLst>
+      <p:ext uri="{BB962C8B-B14F-4D97-AF65-F5344CB8AC3E}">
+        <p14:creationId xmlns:p14="http://schemas.microsoft.com/office/powerpoint/2010/main" val="389738391"/>
+      </p:ext>
+    </p:extLst>
+  </p:cSld>
+  <p:clrMapOvr>
+    <a:masterClrMapping/>
+  </p:clrMapOvr>
+  <p:transition spd="med">
+    <p:fade/>
+  </p:transition>
+  <p:timing>
+    <p:tnLst>
+      <p:par>
+        <p:cTn id="1" dur="indefinite" restart="never" nodeType="tmRoot"/>
+      </p:par>
+    </p:tnLst>
+  </p:timing>
+</p:sld>
+</file>
+
+<file path=ppt/slides/slide24.xml><?xml version="1.0" encoding="utf-8"?>
+<p:sld xmlns:a="http://schemas.openxmlformats.org/drawingml/2006/main" xmlns:r="http://schemas.openxmlformats.org/officeDocument/2006/relationships" xmlns:p="http://schemas.openxmlformats.org/presentationml/2006/main">
+  <p:cSld>
+    <p:spTree>
+      <p:nvGrpSpPr>
+        <p:cNvPr id="1" name=""/>
+        <p:cNvGrpSpPr/>
+        <p:nvPr/>
+      </p:nvGrpSpPr>
+      <p:grpSpPr>
+        <a:xfrm>
+          <a:off x="0" y="0"/>
+          <a:ext cx="0" cy="0"/>
+          <a:chOff x="0" y="0"/>
+          <a:chExt cx="0" cy="0"/>
+        </a:xfrm>
+      </p:grpSpPr>
+      <p:sp>
+        <p:nvSpPr>
+          <p:cNvPr id="2" name="Title 1"/>
+          <p:cNvSpPr>
+            <a:spLocks noGrp="1"/>
+          </p:cNvSpPr>
+          <p:nvPr>
+            <p:ph type="ctrTitle"/>
+          </p:nvPr>
+        </p:nvSpPr>
+        <p:spPr/>
+        <p:txBody>
+          <a:bodyPr>
+            <a:normAutofit fontScale="90000"/>
+          </a:bodyPr>
+          <a:lstStyle/>
+          <a:p>
+            <a:endParaRPr lang="en-US"/>
+          </a:p>
+        </p:txBody>
+      </p:sp>
+      <p:sp>
+        <p:nvSpPr>
+          <p:cNvPr id="3" name="Subtitle 2"/>
+          <p:cNvSpPr>
+            <a:spLocks noGrp="1"/>
+          </p:cNvSpPr>
+          <p:nvPr>
+            <p:ph type="subTitle" idx="1"/>
+          </p:nvPr>
+        </p:nvSpPr>
+        <p:spPr/>
+        <p:txBody>
+          <a:bodyPr/>
+          <a:lstStyle/>
+          <a:p>
+            <a:endParaRPr lang="en-US"/>
+          </a:p>
+        </p:txBody>
+      </p:sp>
+    </p:spTree>
+    <p:extLst>
+      <p:ext uri="{BB962C8B-B14F-4D97-AF65-F5344CB8AC3E}">
+        <p14:creationId xmlns:p14="http://schemas.microsoft.com/office/powerpoint/2010/main" val="3842220861"/>
+      </p:ext>
+    </p:extLst>
+  </p:cSld>
+  <p:clrMapOvr>
+    <a:masterClrMapping/>
+  </p:clrMapOvr>
+  <p:transition spd="med">
+    <p:fade/>
+  </p:transition>
+</p:sld>
+</file>
+
+<file path=ppt/slides/slide25.xml><?xml version="1.0" encoding="utf-8"?>
+<p:sld xmlns:a="http://schemas.openxmlformats.org/drawingml/2006/main" xmlns:r="http://schemas.openxmlformats.org/officeDocument/2006/relationships" xmlns:p="http://schemas.openxmlformats.org/presentationml/2006/main">
+  <p:cSld>
+    <p:spTree>
+      <p:nvGrpSpPr>
+        <p:cNvPr id="1" name=""/>
+        <p:cNvGrpSpPr/>
+        <p:nvPr/>
+      </p:nvGrpSpPr>
+      <p:grpSpPr>
+        <a:xfrm>
+          <a:off x="0" y="0"/>
+          <a:ext cx="0" cy="0"/>
+          <a:chOff x="0" y="0"/>
+          <a:chExt cx="0" cy="0"/>
+        </a:xfrm>
+      </p:grpSpPr>
+      <p:sp>
+        <p:nvSpPr>
+          <p:cNvPr id="2" name="Title 1"/>
+          <p:cNvSpPr>
+            <a:spLocks noGrp="1"/>
+          </p:cNvSpPr>
+          <p:nvPr>
+            <p:ph type="ctrTitle"/>
+          </p:nvPr>
+        </p:nvSpPr>
+        <p:spPr/>
+        <p:txBody>
+          <a:bodyPr>
+            <a:normAutofit fontScale="90000"/>
+          </a:bodyPr>
+          <a:lstStyle/>
+          <a:p>
+            <a:endParaRPr lang="en-US"/>
+          </a:p>
+        </p:txBody>
+      </p:sp>
+      <p:sp>
+        <p:nvSpPr>
+          <p:cNvPr id="3" name="Subtitle 2"/>
+          <p:cNvSpPr>
+            <a:spLocks noGrp="1"/>
+          </p:cNvSpPr>
+          <p:nvPr>
+            <p:ph type="subTitle" idx="1"/>
+          </p:nvPr>
+        </p:nvSpPr>
+        <p:spPr/>
+        <p:txBody>
+          <a:bodyPr/>
+          <a:lstStyle/>
+          <a:p>
+            <a:endParaRPr lang="en-US"/>
+          </a:p>
+        </p:txBody>
+      </p:sp>
+    </p:spTree>
+    <p:extLst>
+      <p:ext uri="{BB962C8B-B14F-4D97-AF65-F5344CB8AC3E}">
+        <p14:creationId xmlns:p14="http://schemas.microsoft.com/office/powerpoint/2010/main" val="3953335903"/>
+      </p:ext>
+    </p:extLst>
+  </p:cSld>
+  <p:clrMapOvr>
+    <a:masterClrMapping/>
+  </p:clrMapOvr>
+  <p:transition spd="med">
+    <p:fade/>
+  </p:transition>
+</p:sld>
+</file>
+
+<file path=ppt/slides/slide26.xml><?xml version="1.0" encoding="utf-8"?>
+<p:sld xmlns:a="http://schemas.openxmlformats.org/drawingml/2006/main" xmlns:r="http://schemas.openxmlformats.org/officeDocument/2006/relationships" xmlns:p="http://schemas.openxmlformats.org/presentationml/2006/main">
+  <p:cSld>
+    <p:spTree>
+      <p:nvGrpSpPr>
+        <p:cNvPr id="1" name=""/>
+        <p:cNvGrpSpPr/>
+        <p:nvPr/>
+      </p:nvGrpSpPr>
+      <p:grpSpPr>
+        <a:xfrm>
+          <a:off x="0" y="0"/>
+          <a:ext cx="0" cy="0"/>
+          <a:chOff x="0" y="0"/>
+          <a:chExt cx="0" cy="0"/>
+        </a:xfrm>
+      </p:grpSpPr>
       <p:sp>
         <p:nvSpPr>
           <p:cNvPr id="2" name="Content Placeholder 1"/>
@@ -12157,7 +14856,7 @@
 </p:sld>
 </file>
 
-<file path=ppt/slides/slide21.xml><?xml version="1.0" encoding="utf-8"?>
+<file path=ppt/slides/slide27.xml><?xml version="1.0" encoding="utf-8"?>
 <p:sld xmlns:a="http://schemas.openxmlformats.org/drawingml/2006/main" xmlns:r="http://schemas.openxmlformats.org/officeDocument/2006/relationships" xmlns:p="http://schemas.openxmlformats.org/presentationml/2006/main">
   <p:cSld>
     <p:spTree>
@@ -12325,7 +15024,7 @@
 </p:sld>
 </file>
 
-<file path=ppt/slides/slide22.xml><?xml version="1.0" encoding="utf-8"?>
+<file path=ppt/slides/slide28.xml><?xml version="1.0" encoding="utf-8"?>
 <p:sld xmlns:a="http://schemas.openxmlformats.org/drawingml/2006/main" xmlns:r="http://schemas.openxmlformats.org/officeDocument/2006/relationships" xmlns:p="http://schemas.openxmlformats.org/presentationml/2006/main">
   <p:cSld>
     <p:bg>
@@ -12505,7 +15204,7 @@
 </p:sld>
 </file>
 
-<file path=ppt/slides/slide23.xml><?xml version="1.0" encoding="utf-8"?>
+<file path=ppt/slides/slide29.xml><?xml version="1.0" encoding="utf-8"?>
 <p:sld xmlns:a="http://schemas.openxmlformats.org/drawingml/2006/main" xmlns:r="http://schemas.openxmlformats.org/officeDocument/2006/relationships" xmlns:p="http://schemas.openxmlformats.org/presentationml/2006/main">
   <p:cSld>
     <p:spTree>
@@ -13930,6 +16629,13 @@
   <p:transition spd="med">
     <p:fade/>
   </p:transition>
+  <p:timing>
+    <p:tnLst>
+      <p:par>
+        <p:cTn id="1" dur="indefinite" restart="never" nodeType="tmRoot"/>
+      </p:par>
+    </p:tnLst>
+  </p:timing>
 </p:sld>
 </file>
 

</xml_diff>

<commit_message>
committing first incomplete draft
</commit_message>
<xml_diff>
--- a/03-initial-configuration-scans.pptx
+++ b/03-initial-configuration-scans.pptx
@@ -333,7 +333,7 @@
               <a:pPr>
                 <a:defRPr/>
               </a:pPr>
-              <a:t>2015-12-10</a:t>
+              <a:t>2015-12-11</a:t>
             </a:fld>
             <a:endParaRPr lang="en-US" dirty="0"/>
           </a:p>
@@ -516,7 +516,7 @@
               <a:pPr>
                 <a:defRPr/>
               </a:pPr>
-              <a:t>2015-12-10</a:t>
+              <a:t>2015-12-11</a:t>
             </a:fld>
             <a:endParaRPr lang="en-US" dirty="0"/>
           </a:p>
@@ -6964,11 +6964,7 @@
             </a:r>
             <a:r>
               <a:rPr lang="en-US" baseline="0" dirty="0" smtClean="0"/>
-              <a:t> command using the container ID you just copied, replacing CONTAINER_ID in the example</a:t>
-            </a:r>
-            <a:r>
-              <a:rPr lang="en-US" baseline="0" dirty="0" smtClean="0"/>
-              <a:t>.</a:t>
+              <a:t> command using the container ID you just copied, replacing CONTAINER_ID in the example.</a:t>
             </a:r>
           </a:p>
           <a:p>
@@ -7003,7 +6999,6 @@
               <a:rPr lang="en-US" dirty="0" smtClean="0"/>
               <a:t> -t docker://CONTAINER_ID`</a:t>
             </a:r>
-            <a:endParaRPr lang="en-US" dirty="0" smtClean="0"/>
           </a:p>
           <a:p>
             <a:endParaRPr lang="en-US" dirty="0" smtClean="0"/>
@@ -7081,13 +7076,7 @@
               <a:rPr lang="en-US" dirty="0" err="1" smtClean="0">
                 <a:effectLst/>
               </a:rPr>
-              <a:t>Nathen</a:t>
-            </a:r>
-            <a:r>
-              <a:rPr lang="en-US" dirty="0" err="1" smtClean="0">
-                <a:effectLst/>
-              </a:rPr>
-              <a:t>:"I</a:t>
+              <a:t>Nathen:"I</a:t>
             </a:r>
             <a:r>
               <a:rPr lang="en-US" dirty="0" smtClean="0">
@@ -9433,7 +9422,15 @@
             </a:pPr>
             <a:r>
               <a:rPr lang="en-US" dirty="0" smtClean="0"/>
-              <a:t>In this module we scanned a node for compliance issues. We identified an issues and then wrote a remediation recipe directly on the node that we ran scans on. We also tested out recipe with test kitchen.</a:t>
+              <a:t>In this module we scanned a node for compliance issues. We identified </a:t>
+            </a:r>
+            <a:r>
+              <a:rPr lang="en-US" smtClean="0"/>
+              <a:t>an issue </a:t>
+            </a:r>
+            <a:r>
+              <a:rPr lang="en-US" dirty="0" smtClean="0"/>
+              <a:t>and then wrote a remediation recipe directly on the node scanned. We also tested our recipe with test kitchen.</a:t>
             </a:r>
           </a:p>
           <a:p>
@@ -9521,7 +9518,7 @@
               <a:tabLst/>
               <a:defRPr/>
             </a:pPr>
-            <a:endParaRPr lang="en-US" smtClean="0"/>
+            <a:endParaRPr lang="en-US" dirty="0" smtClean="0"/>
           </a:p>
           <a:p>
             <a:pPr marL="0" marR="0" indent="0" algn="l" defTabSz="1217613" rtl="0" eaLnBrk="1" fontAlgn="base" latinLnBrk="0" hangingPunct="1">
@@ -21875,7 +21872,15 @@
           <a:p>
             <a:r>
               <a:rPr lang="en-US" dirty="0"/>
-              <a:t> more /etc/ssh/</a:t>
+              <a:t> </a:t>
+            </a:r>
+            <a:r>
+              <a:rPr lang="en-US" dirty="0" smtClean="0"/>
+              <a:t>$ more </a:t>
+            </a:r>
+            <a:r>
+              <a:rPr lang="en-US" dirty="0"/>
+              <a:t>/etc/ssh/</a:t>
             </a:r>
             <a:r>
               <a:rPr lang="en-US" dirty="0" err="1"/>
@@ -22047,11 +22052,7 @@
             </a:r>
             <a:r>
               <a:rPr lang="en-US" dirty="0" smtClean="0"/>
-              <a:t>: In this course we will write a recipe directly on the node that we're running scans on. Of </a:t>
-            </a:r>
-            <a:r>
-              <a:rPr lang="en-US" dirty="0" smtClean="0"/>
-              <a:t>course </a:t>
+              <a:t>: In this course we will write a recipe directly on the node that we're running scans on. Of course </a:t>
             </a:r>
             <a:r>
               <a:rPr lang="en-US" dirty="0"/>
@@ -23435,11 +23436,7 @@
           <a:p>
             <a:r>
               <a:rPr lang="en-US" dirty="0" smtClean="0"/>
-              <a:t>Adding a Node </a:t>
-            </a:r>
-            <a:r>
-              <a:rPr lang="en-US" dirty="0" smtClean="0"/>
-              <a:t>to Scan</a:t>
+              <a:t>Adding a Node to Scan</a:t>
             </a:r>
             <a:endParaRPr lang="en-US" dirty="0"/>
           </a:p>

</xml_diff>

<commit_message>
replaced all file slides with proper File slide template
</commit_message>
<xml_diff>
--- a/03-initial-configuration-scans.pptx
+++ b/03-initial-configuration-scans.pptx
@@ -55,7 +55,7 @@
     <p:sldId id="333" r:id="rId47"/>
     <p:sldId id="353" r:id="rId48"/>
     <p:sldId id="334" r:id="rId49"/>
-    <p:sldId id="335" r:id="rId50"/>
+    <p:sldId id="356" r:id="rId50"/>
     <p:sldId id="336" r:id="rId51"/>
     <p:sldId id="346" r:id="rId52"/>
     <p:sldId id="349" r:id="rId53"/>
@@ -335,7 +335,7 @@
               <a:pPr>
                 <a:defRPr/>
               </a:pPr>
-              <a:t>2015-12-17</a:t>
+              <a:t>2015-12-18</a:t>
             </a:fld>
             <a:endParaRPr lang="en-US" dirty="0"/>
           </a:p>
@@ -518,7 +518,7 @@
               <a:pPr>
                 <a:defRPr/>
               </a:pPr>
-              <a:t>2015-12-17</a:t>
+              <a:t>2015-12-18</a:t>
             </a:fld>
             <a:endParaRPr lang="en-US" dirty="0"/>
           </a:p>
@@ -6240,10 +6240,29 @@
           <a:bodyPr/>
           <a:lstStyle/>
           <a:p>
+            <a:pPr marL="0" marR="0" indent="0" algn="l" defTabSz="1217613" rtl="0" eaLnBrk="1" fontAlgn="base" latinLnBrk="0" hangingPunct="1">
+              <a:lnSpc>
+                <a:spcPct val="90000"/>
+              </a:lnSpc>
+              <a:spcBef>
+                <a:spcPct val="30000"/>
+              </a:spcBef>
+              <a:spcAft>
+                <a:spcPts val="450"/>
+              </a:spcAft>
+              <a:buClrTx/>
+              <a:buSzTx/>
+              <a:buFontTx/>
+              <a:buNone/>
+              <a:tabLst/>
+              <a:defRPr/>
+            </a:pPr>
             <a:r>
               <a:rPr lang="en-US" dirty="0" smtClean="0"/>
               <a:t>See the following slide for an example of a handy way to populate this file.</a:t>
             </a:r>
+          </a:p>
+          <a:p>
             <a:endParaRPr lang="en-US" dirty="0"/>
           </a:p>
         </p:txBody>
@@ -6324,7 +6343,7 @@
     </p:spTree>
     <p:extLst>
       <p:ext uri="{BB962C8B-B14F-4D97-AF65-F5344CB8AC3E}">
-        <p14:creationId xmlns:p14="http://schemas.microsoft.com/office/powerpoint/2010/main" val="1699919457"/>
+        <p14:creationId xmlns:p14="http://schemas.microsoft.com/office/powerpoint/2010/main" val="2659342432"/>
       </p:ext>
     </p:extLst>
   </p:cSld>
@@ -11648,14 +11667,14 @@
           </a:ln>
           <a:extLst>
             <a:ext uri="{909E8E84-426E-40dd-AFC4-6F175D3DCCD1}">
-              <a14:hiddenFill xmlns="" xmlns:a14="http://schemas.microsoft.com/office/drawing/2010/main">
+              <a14:hiddenFill xmlns:a14="http://schemas.microsoft.com/office/drawing/2010/main" xmlns="">
                 <a:solidFill>
                   <a:srgbClr val="FFFFFF"/>
                 </a:solidFill>
               </a14:hiddenFill>
             </a:ext>
             <a:ext uri="{91240B29-F687-4f45-9708-019B960494DF}">
-              <a14:hiddenLine xmlns="" xmlns:a14="http://schemas.microsoft.com/office/drawing/2010/main" w="9525">
+              <a14:hiddenLine xmlns:a14="http://schemas.microsoft.com/office/drawing/2010/main" xmlns="" w="9525">
                 <a:solidFill>
                   <a:srgbClr val="000000"/>
                 </a:solidFill>
@@ -11803,14 +11822,14 @@
           </a:ln>
           <a:extLst>
             <a:ext uri="{909E8E84-426E-40dd-AFC4-6F175D3DCCD1}">
-              <a14:hiddenFill xmlns="" xmlns:a14="http://schemas.microsoft.com/office/drawing/2010/main">
+              <a14:hiddenFill xmlns:a14="http://schemas.microsoft.com/office/drawing/2010/main" xmlns="">
                 <a:solidFill>
                   <a:srgbClr val="FFFFFF"/>
                 </a:solidFill>
               </a14:hiddenFill>
             </a:ext>
             <a:ext uri="{91240B29-F687-4f45-9708-019B960494DF}">
-              <a14:hiddenLine xmlns="" xmlns:a14="http://schemas.microsoft.com/office/drawing/2010/main" w="9525">
+              <a14:hiddenLine xmlns:a14="http://schemas.microsoft.com/office/drawing/2010/main" xmlns="" w="9525">
                 <a:solidFill>
                   <a:srgbClr val="000000"/>
                 </a:solidFill>
@@ -12301,14 +12320,14 @@
           </a:ln>
           <a:extLst>
             <a:ext uri="{909E8E84-426E-40dd-AFC4-6F175D3DCCD1}">
-              <a14:hiddenFill xmlns="" xmlns:a14="http://schemas.microsoft.com/office/drawing/2010/main">
+              <a14:hiddenFill xmlns:a14="http://schemas.microsoft.com/office/drawing/2010/main" xmlns="">
                 <a:solidFill>
                   <a:srgbClr val="FFFFFF"/>
                 </a:solidFill>
               </a14:hiddenFill>
             </a:ext>
             <a:ext uri="{91240B29-F687-4f45-9708-019B960494DF}">
-              <a14:hiddenLine xmlns="" xmlns:a14="http://schemas.microsoft.com/office/drawing/2010/main" w="9525">
+              <a14:hiddenLine xmlns:a14="http://schemas.microsoft.com/office/drawing/2010/main" xmlns="" w="9525">
                 <a:solidFill>
                   <a:srgbClr val="000000"/>
                 </a:solidFill>
@@ -12547,14 +12566,14 @@
           </a:ln>
           <a:extLst>
             <a:ext uri="{909E8E84-426E-40dd-AFC4-6F175D3DCCD1}">
-              <a14:hiddenFill xmlns="" xmlns:a14="http://schemas.microsoft.com/office/drawing/2010/main">
+              <a14:hiddenFill xmlns:a14="http://schemas.microsoft.com/office/drawing/2010/main" xmlns="">
                 <a:solidFill>
                   <a:srgbClr val="FFFFFF"/>
                 </a:solidFill>
               </a14:hiddenFill>
             </a:ext>
             <a:ext uri="{91240B29-F687-4f45-9708-019B960494DF}">
-              <a14:hiddenLine xmlns="" xmlns:a14="http://schemas.microsoft.com/office/drawing/2010/main" w="9525">
+              <a14:hiddenLine xmlns:a14="http://schemas.microsoft.com/office/drawing/2010/main" xmlns="" w="9525">
                 <a:solidFill>
                   <a:srgbClr val="000000"/>
                 </a:solidFill>
@@ -14482,14 +14501,14 @@
           </a:ln>
           <a:extLst>
             <a:ext uri="{909E8E84-426E-40dd-AFC4-6F175D3DCCD1}">
-              <a14:hiddenFill xmlns="" xmlns:a14="http://schemas.microsoft.com/office/drawing/2010/main">
+              <a14:hiddenFill xmlns:a14="http://schemas.microsoft.com/office/drawing/2010/main" xmlns="">
                 <a:solidFill>
                   <a:srgbClr val="FFFFFF"/>
                 </a:solidFill>
               </a14:hiddenFill>
             </a:ext>
             <a:ext uri="{91240B29-F687-4f45-9708-019B960494DF}">
-              <a14:hiddenLine xmlns="" xmlns:a14="http://schemas.microsoft.com/office/drawing/2010/main" w="9525">
+              <a14:hiddenLine xmlns:a14="http://schemas.microsoft.com/office/drawing/2010/main" xmlns="" w="9525">
                 <a:solidFill>
                   <a:srgbClr val="000000"/>
                 </a:solidFill>
@@ -16023,14 +16042,14 @@
           </a:ln>
           <a:extLst>
             <a:ext uri="{909E8E84-426E-40dd-AFC4-6F175D3DCCD1}">
-              <a14:hiddenFill xmlns="" xmlns:a14="http://schemas.microsoft.com/office/drawing/2010/main">
+              <a14:hiddenFill xmlns:a14="http://schemas.microsoft.com/office/drawing/2010/main" xmlns="">
                 <a:solidFill>
                   <a:srgbClr val="FFFFFF"/>
                 </a:solidFill>
               </a14:hiddenFill>
             </a:ext>
             <a:ext uri="{91240B29-F687-4f45-9708-019B960494DF}">
-              <a14:hiddenLine xmlns="" xmlns:a14="http://schemas.microsoft.com/office/drawing/2010/main" w="9525">
+              <a14:hiddenLine xmlns:a14="http://schemas.microsoft.com/office/drawing/2010/main" xmlns="" w="9525">
                 <a:solidFill>
                   <a:srgbClr val="000000"/>
                 </a:solidFill>
@@ -16588,14 +16607,14 @@
           </a:ln>
           <a:extLst>
             <a:ext uri="{909E8E84-426E-40dd-AFC4-6F175D3DCCD1}">
-              <a14:hiddenFill xmlns="" xmlns:a14="http://schemas.microsoft.com/office/drawing/2010/main">
+              <a14:hiddenFill xmlns:a14="http://schemas.microsoft.com/office/drawing/2010/main" xmlns="">
                 <a:solidFill>
                   <a:srgbClr val="FFFFFF"/>
                 </a:solidFill>
               </a14:hiddenFill>
             </a:ext>
             <a:ext uri="{91240B29-F687-4f45-9708-019B960494DF}">
-              <a14:hiddenLine xmlns="" xmlns:a14="http://schemas.microsoft.com/office/drawing/2010/main" w="9525">
+              <a14:hiddenLine xmlns:a14="http://schemas.microsoft.com/office/drawing/2010/main" xmlns="" w="9525">
                 <a:solidFill>
                   <a:srgbClr val="000000"/>
                 </a:solidFill>
@@ -17162,14 +17181,14 @@
           </a:ln>
           <a:extLst>
             <a:ext uri="{909E8E84-426E-40dd-AFC4-6F175D3DCCD1}">
-              <a14:hiddenFill xmlns="" xmlns:a14="http://schemas.microsoft.com/office/drawing/2010/main">
+              <a14:hiddenFill xmlns:a14="http://schemas.microsoft.com/office/drawing/2010/main" xmlns="">
                 <a:solidFill>
                   <a:srgbClr val="FFFFFF"/>
                 </a:solidFill>
               </a14:hiddenFill>
             </a:ext>
             <a:ext uri="{91240B29-F687-4f45-9708-019B960494DF}">
-              <a14:hiddenLine xmlns="" xmlns:a14="http://schemas.microsoft.com/office/drawing/2010/main" w="9525">
+              <a14:hiddenLine xmlns:a14="http://schemas.microsoft.com/office/drawing/2010/main" xmlns="" w="9525">
                 <a:solidFill>
                   <a:srgbClr val="000000"/>
                 </a:solidFill>
@@ -18109,14 +18128,14 @@
           </a:ln>
           <a:extLst>
             <a:ext uri="{909E8E84-426E-40dd-AFC4-6F175D3DCCD1}">
-              <a14:hiddenFill xmlns="" xmlns:a14="http://schemas.microsoft.com/office/drawing/2010/main">
+              <a14:hiddenFill xmlns:a14="http://schemas.microsoft.com/office/drawing/2010/main" xmlns="">
                 <a:solidFill>
                   <a:srgbClr val="FFFFFF"/>
                 </a:solidFill>
               </a14:hiddenFill>
             </a:ext>
             <a:ext uri="{91240B29-F687-4f45-9708-019B960494DF}">
-              <a14:hiddenLine xmlns="" xmlns:a14="http://schemas.microsoft.com/office/drawing/2010/main" w="9525">
+              <a14:hiddenLine xmlns:a14="http://schemas.microsoft.com/office/drawing/2010/main" xmlns="" w="9525">
                 <a:solidFill>
                   <a:srgbClr val="000000"/>
                 </a:solidFill>
@@ -18869,14 +18888,14 @@
           </a:ln>
           <a:extLst>
             <a:ext uri="{909E8E84-426E-40dd-AFC4-6F175D3DCCD1}">
-              <a14:hiddenFill xmlns="" xmlns:a14="http://schemas.microsoft.com/office/drawing/2010/main">
+              <a14:hiddenFill xmlns:a14="http://schemas.microsoft.com/office/drawing/2010/main" xmlns="">
                 <a:solidFill>
                   <a:srgbClr val="FFFFFF"/>
                 </a:solidFill>
               </a14:hiddenFill>
             </a:ext>
             <a:ext uri="{91240B29-F687-4f45-9708-019B960494DF}">
-              <a14:hiddenLine xmlns="" xmlns:a14="http://schemas.microsoft.com/office/drawing/2010/main" w="9525">
+              <a14:hiddenLine xmlns:a14="http://schemas.microsoft.com/office/drawing/2010/main" xmlns="" w="9525">
                 <a:solidFill>
                   <a:srgbClr val="000000"/>
                 </a:solidFill>
@@ -22974,11 +22993,7 @@
           <a:p>
             <a:r>
               <a:rPr lang="en-US" dirty="0"/>
-              <a:t># </a:t>
-            </a:r>
-            <a:r>
-              <a:rPr lang="en-US" dirty="0"/>
-              <a:t>  Protocol 2,1</a:t>
+              <a:t>#   Protocol 2,1</a:t>
             </a:r>
             <a:endParaRPr lang="en-US" dirty="0" smtClean="0"/>
           </a:p>
@@ -27219,7 +27234,37 @@
       </p:grpSpPr>
       <p:sp>
         <p:nvSpPr>
-          <p:cNvPr id="2" name="Content Placeholder 1"/>
+          <p:cNvPr id="2" name="Title 1"/>
+          <p:cNvSpPr>
+            <a:spLocks noGrp="1"/>
+          </p:cNvSpPr>
+          <p:nvPr>
+            <p:ph type="title"/>
+          </p:nvPr>
+        </p:nvSpPr>
+        <p:spPr/>
+        <p:txBody>
+          <a:bodyPr/>
+          <a:lstStyle/>
+          <a:p>
+            <a:r>
+              <a:rPr lang="en-US" dirty="0"/>
+              <a:t>GE: Create the `</a:t>
+            </a:r>
+            <a:r>
+              <a:rPr lang="en-US" dirty="0" err="1"/>
+              <a:t>client_spec.rb</a:t>
+            </a:r>
+            <a:r>
+              <a:rPr lang="en-US" dirty="0"/>
+              <a:t>' file</a:t>
+            </a:r>
+          </a:p>
+        </p:txBody>
+      </p:sp>
+      <p:sp>
+        <p:nvSpPr>
+          <p:cNvPr id="3" name="Content Placeholder 2"/>
           <p:cNvSpPr>
             <a:spLocks noGrp="1"/>
           </p:cNvSpPr>
@@ -27227,111 +27272,108 @@
             <p:ph sz="quarter" idx="10"/>
           </p:nvPr>
         </p:nvSpPr>
-        <p:spPr>
-          <a:xfrm>
-            <a:off x="1121104" y="2315962"/>
-            <a:ext cx="14423693" cy="5822197"/>
-          </a:xfrm>
-        </p:spPr>
+        <p:spPr/>
         <p:txBody>
           <a:bodyPr/>
           <a:lstStyle/>
           <a:p>
             <a:r>
-              <a:rPr lang="en-US" dirty="0" smtClean="0"/>
+              <a:rPr lang="en-US" b="1" dirty="0"/>
               <a:t>control 'ssh-4' do</a:t>
             </a:r>
           </a:p>
           <a:p>
             <a:r>
-              <a:rPr lang="en-US" dirty="0" smtClean="0"/>
+              <a:rPr lang="en-US" b="1" dirty="0"/>
               <a:t>  impact 3.0</a:t>
             </a:r>
           </a:p>
           <a:p>
             <a:r>
-              <a:rPr lang="en-US" dirty="0" smtClean="0"/>
+              <a:rPr lang="en-US" b="1" dirty="0"/>
               <a:t>  title 'Client: Set SSH protocol version to 2'</a:t>
             </a:r>
           </a:p>
           <a:p>
             <a:r>
-              <a:rPr lang="en-US" dirty="0" smtClean="0"/>
+              <a:rPr lang="en-US" b="1" dirty="0"/>
               <a:t>  </a:t>
             </a:r>
             <a:r>
-              <a:rPr lang="en-US" dirty="0" err="1" smtClean="0"/>
+              <a:rPr lang="en-US" b="1" dirty="0" err="1"/>
               <a:t>desc</a:t>
             </a:r>
             <a:r>
-              <a:rPr lang="en-US" dirty="0" smtClean="0"/>
+              <a:rPr lang="en-US" b="1" dirty="0"/>
               <a:t> "</a:t>
             </a:r>
           </a:p>
           <a:p>
             <a:r>
-              <a:rPr lang="en-US" dirty="0" smtClean="0"/>
+              <a:rPr lang="en-US" b="1" dirty="0"/>
               <a:t>    Set the SSH protocol version to 2. Don't use legacy</a:t>
             </a:r>
           </a:p>
           <a:p>
             <a:r>
-              <a:rPr lang="en-US" dirty="0" smtClean="0"/>
+              <a:rPr lang="en-US" b="1" dirty="0"/>
               <a:t>    insecure SSHv3 connections anymore.</a:t>
             </a:r>
           </a:p>
           <a:p>
             <a:r>
-              <a:rPr lang="en-US" dirty="0" smtClean="0"/>
+              <a:rPr lang="en-US" b="1" dirty="0"/>
               <a:t>  "</a:t>
             </a:r>
           </a:p>
           <a:p>
             <a:r>
-              <a:rPr lang="en-US" dirty="0" smtClean="0"/>
+              <a:rPr lang="en-US" b="1" dirty="0"/>
               <a:t>  describe </a:t>
             </a:r>
             <a:r>
-              <a:rPr lang="en-US" dirty="0" err="1" smtClean="0"/>
+              <a:rPr lang="en-US" b="1" dirty="0" err="1"/>
               <a:t>ssh_config</a:t>
             </a:r>
             <a:r>
-              <a:rPr lang="en-US" dirty="0" smtClean="0"/>
+              <a:rPr lang="en-US" b="1" dirty="0"/>
               <a:t> do</a:t>
             </a:r>
           </a:p>
           <a:p>
             <a:r>
-              <a:rPr lang="en-US" dirty="0" smtClean="0"/>
+              <a:rPr lang="en-US" b="1" dirty="0"/>
               <a:t>    its('Protocol') { should </a:t>
             </a:r>
             <a:r>
-              <a:rPr lang="en-US" dirty="0" err="1" smtClean="0"/>
+              <a:rPr lang="en-US" b="1" dirty="0" err="1"/>
               <a:t>eq</a:t>
             </a:r>
             <a:r>
-              <a:rPr lang="en-US" dirty="0" smtClean="0"/>
+              <a:rPr lang="en-US" b="1" dirty="0"/>
               <a:t>('2') }</a:t>
             </a:r>
           </a:p>
           <a:p>
             <a:r>
-              <a:rPr lang="en-US" dirty="0" smtClean="0"/>
+              <a:rPr lang="en-US" b="1" dirty="0"/>
               <a:t>  end</a:t>
             </a:r>
           </a:p>
           <a:p>
             <a:r>
-              <a:rPr lang="en-US" dirty="0" smtClean="0"/>
+              <a:rPr lang="en-US" b="1" dirty="0"/>
               <a:t>end</a:t>
             </a:r>
+          </a:p>
+          <a:p>
             <a:endParaRPr lang="en-US" dirty="0"/>
           </a:p>
         </p:txBody>
       </p:sp>
       <p:sp>
         <p:nvSpPr>
-          <p:cNvPr id="3" name="Text Placeholder 2"/>
+          <p:cNvPr id="4" name="Text Placeholder 3"/>
           <p:cNvSpPr>
             <a:spLocks noGrp="1"/>
           </p:cNvSpPr>
@@ -27344,53 +27386,32 @@
           <a:bodyPr/>
           <a:lstStyle/>
           <a:p>
-            <a:r>
-              <a:rPr lang="en-US" dirty="0" smtClean="0"/>
-              <a:t>$ ~/cookbooks/ssh/test/integration/client/</a:t>
-            </a:r>
-            <a:r>
-              <a:rPr lang="en-US" dirty="0" err="1" smtClean="0"/>
+            <a:endParaRPr lang="en-US" dirty="0" smtClean="0"/>
+          </a:p>
+          <a:p>
+            <a:r>
+              <a:rPr lang="en-US" dirty="0" smtClean="0"/>
+              <a:t>~/</a:t>
+            </a:r>
+            <a:r>
+              <a:rPr lang="en-US" dirty="0"/>
+              <a:t>cookbooks/ssh/test/integration/client/</a:t>
+            </a:r>
+            <a:r>
+              <a:rPr lang="en-US" dirty="0" err="1"/>
               <a:t>inspec</a:t>
             </a:r>
             <a:r>
-              <a:rPr lang="en-US" dirty="0" smtClean="0"/>
+              <a:rPr lang="en-US" dirty="0"/>
               <a:t>/</a:t>
             </a:r>
             <a:r>
-              <a:rPr lang="en-US" dirty="0" err="1" smtClean="0"/>
+              <a:rPr lang="en-US" dirty="0" err="1"/>
               <a:t>client_spec.rb</a:t>
             </a:r>
             <a:endParaRPr lang="en-US" dirty="0"/>
           </a:p>
-        </p:txBody>
-      </p:sp>
-      <p:sp>
-        <p:nvSpPr>
-          <p:cNvPr id="5" name="Title 4"/>
-          <p:cNvSpPr>
-            <a:spLocks noGrp="1"/>
-          </p:cNvSpPr>
-          <p:nvPr>
-            <p:ph type="title"/>
-          </p:nvPr>
-        </p:nvSpPr>
-        <p:spPr/>
-        <p:txBody>
-          <a:bodyPr/>
-          <a:lstStyle/>
-          <a:p>
-            <a:r>
-              <a:rPr lang="en-US" dirty="0" smtClean="0"/>
-              <a:t>GE: Create the `</a:t>
-            </a:r>
-            <a:r>
-              <a:rPr lang="en-US" dirty="0" err="1" smtClean="0"/>
-              <a:t>client_spec.rb</a:t>
-            </a:r>
-            <a:r>
-              <a:rPr lang="en-US" dirty="0" smtClean="0"/>
-              <a:t>' file</a:t>
-            </a:r>
+          <a:p>
             <a:endParaRPr lang="en-US" dirty="0"/>
           </a:p>
         </p:txBody>
@@ -27398,7 +27419,7 @@
     </p:spTree>
     <p:extLst>
       <p:ext uri="{BB962C8B-B14F-4D97-AF65-F5344CB8AC3E}">
-        <p14:creationId xmlns:p14="http://schemas.microsoft.com/office/powerpoint/2010/main" val="2216193123"/>
+        <p14:creationId xmlns:p14="http://schemas.microsoft.com/office/powerpoint/2010/main" val="2645572185"/>
       </p:ext>
     </p:extLst>
   </p:cSld>
@@ -29643,53 +29664,66 @@
       </p:sp>
       <p:sp>
         <p:nvSpPr>
-          <p:cNvPr id="9" name="Content Placeholder 5"/>
-          <p:cNvSpPr>
-            <a:spLocks noGrp="1"/>
-          </p:cNvSpPr>
-          <p:nvPr>
-            <p:ph sz="quarter" idx="12" hasCustomPrompt="1"/>
-          </p:nvPr>
-        </p:nvSpPr>
-        <p:spPr>
+          <p:cNvPr id="8" name="Rectangle 7"/>
+          <p:cNvSpPr/>
+          <p:nvPr/>
+        </p:nvSpPr>
+        <p:spPr bwMode="auto">
           <a:xfrm>
-            <a:off x="1122782" y="6086015"/>
-            <a:ext cx="14420850" cy="1114885"/>
+            <a:off x="1122159" y="5534527"/>
+            <a:ext cx="14431939" cy="1128344"/>
           </a:xfrm>
+          <a:prstGeom prst="rect">
+            <a:avLst/>
+          </a:prstGeom>
           <a:solidFill>
             <a:schemeClr val="accent1">
-              <a:alpha val="60000"/>
+              <a:alpha val="40000"/>
             </a:schemeClr>
           </a:solidFill>
           <a:ln>
-            <a:solidFill>
-              <a:schemeClr val="accent1">
-                <a:lumMod val="75000"/>
-              </a:schemeClr>
-            </a:solidFill>
+            <a:noFill/>
+            <a:headEnd type="none" w="med" len="med"/>
+            <a:tailEnd type="none" w="med" len="med"/>
           </a:ln>
+          <a:effectLst/>
         </p:spPr>
-        <p:txBody>
-          <a:bodyPr anchor="ctr">
-            <a:noAutofit/>
+        <p:style>
+          <a:lnRef idx="1">
+            <a:schemeClr val="accent4"/>
+          </a:lnRef>
+          <a:fillRef idx="3">
+            <a:schemeClr val="accent4"/>
+          </a:fillRef>
+          <a:effectRef idx="2">
+            <a:schemeClr val="accent4"/>
+          </a:effectRef>
+          <a:fontRef idx="minor">
+            <a:schemeClr val="lt1"/>
+          </a:fontRef>
+        </p:style>
+        <p:txBody>
+          <a:bodyPr vert="horz" wrap="square" lIns="121915" tIns="60957" rIns="121915" bIns="60957" numCol="1" rtlCol="0" anchor="ctr" anchorCtr="0" compatLnSpc="1">
+            <a:prstTxWarp prst="textNoShape">
+              <a:avLst/>
+            </a:prstTxWarp>
           </a:bodyPr>
-          <a:lstStyle>
-            <a:lvl1pPr algn="l">
-              <a:defRPr sz="4200" baseline="0">
-                <a:solidFill>
-                  <a:schemeClr val="bg2"/>
-                </a:solidFill>
-                <a:latin typeface="Courier New"/>
-                <a:cs typeface="Courier New"/>
-              </a:defRPr>
-            </a:lvl1pPr>
-          </a:lstStyle>
-          <a:p>
-            <a:pPr lvl="0"/>
-            <a:r>
-              <a:rPr lang="en-US" dirty="0" smtClean="0"/>
-              <a:t> </a:t>
-            </a:r>
+          <a:lstStyle/>
+          <a:p>
+            <a:pPr algn="ctr" defTabSz="1218768"/>
+            <a:endParaRPr lang="en-US" sz="3200" dirty="0">
+              <a:gradFill>
+                <a:gsLst>
+                  <a:gs pos="0">
+                    <a:srgbClr val="FFFFFF"/>
+                  </a:gs>
+                  <a:gs pos="100000">
+                    <a:srgbClr val="FFFFFF"/>
+                  </a:gs>
+                </a:gsLst>
+                <a:lin ang="5400000" scaled="0"/>
+              </a:gradFill>
+            </a:endParaRPr>
           </a:p>
         </p:txBody>
       </p:sp>
@@ -30010,53 +30044,66 @@
       </p:sp>
       <p:sp>
         <p:nvSpPr>
-          <p:cNvPr id="9" name="Content Placeholder 5"/>
-          <p:cNvSpPr>
-            <a:spLocks noGrp="1"/>
-          </p:cNvSpPr>
-          <p:nvPr>
-            <p:ph sz="quarter" idx="12" hasCustomPrompt="1"/>
-          </p:nvPr>
-        </p:nvSpPr>
-        <p:spPr>
+          <p:cNvPr id="6" name="Rectangle 5"/>
+          <p:cNvSpPr/>
+          <p:nvPr/>
+        </p:nvSpPr>
+        <p:spPr bwMode="auto">
           <a:xfrm>
-            <a:off x="1122782" y="6108875"/>
-            <a:ext cx="14420850" cy="1069165"/>
+            <a:off x="1122159" y="6160166"/>
+            <a:ext cx="14431939" cy="1034718"/>
           </a:xfrm>
+          <a:prstGeom prst="rect">
+            <a:avLst/>
+          </a:prstGeom>
           <a:solidFill>
             <a:schemeClr val="accent1">
-              <a:alpha val="60000"/>
+              <a:alpha val="40000"/>
             </a:schemeClr>
           </a:solidFill>
           <a:ln>
-            <a:solidFill>
-              <a:schemeClr val="accent1">
-                <a:lumMod val="75000"/>
-              </a:schemeClr>
-            </a:solidFill>
+            <a:noFill/>
+            <a:headEnd type="none" w="med" len="med"/>
+            <a:tailEnd type="none" w="med" len="med"/>
           </a:ln>
+          <a:effectLst/>
         </p:spPr>
-        <p:txBody>
-          <a:bodyPr anchor="ctr">
-            <a:noAutofit/>
+        <p:style>
+          <a:lnRef idx="1">
+            <a:schemeClr val="accent4"/>
+          </a:lnRef>
+          <a:fillRef idx="3">
+            <a:schemeClr val="accent4"/>
+          </a:fillRef>
+          <a:effectRef idx="2">
+            <a:schemeClr val="accent4"/>
+          </a:effectRef>
+          <a:fontRef idx="minor">
+            <a:schemeClr val="lt1"/>
+          </a:fontRef>
+        </p:style>
+        <p:txBody>
+          <a:bodyPr vert="horz" wrap="square" lIns="121915" tIns="60957" rIns="121915" bIns="60957" numCol="1" rtlCol="0" anchor="ctr" anchorCtr="0" compatLnSpc="1">
+            <a:prstTxWarp prst="textNoShape">
+              <a:avLst/>
+            </a:prstTxWarp>
           </a:bodyPr>
-          <a:lstStyle>
-            <a:lvl1pPr algn="l">
-              <a:defRPr sz="4200" baseline="0">
-                <a:solidFill>
-                  <a:schemeClr val="bg2"/>
-                </a:solidFill>
-                <a:latin typeface="Courier New"/>
-                <a:cs typeface="Courier New"/>
-              </a:defRPr>
-            </a:lvl1pPr>
-          </a:lstStyle>
-          <a:p>
-            <a:pPr lvl="0"/>
-            <a:r>
-              <a:rPr lang="en-US" dirty="0" smtClean="0"/>
-              <a:t> </a:t>
-            </a:r>
+          <a:lstStyle/>
+          <a:p>
+            <a:pPr algn="ctr" defTabSz="1218768"/>
+            <a:endParaRPr lang="en-US" sz="3200" dirty="0">
+              <a:gradFill>
+                <a:gsLst>
+                  <a:gs pos="0">
+                    <a:srgbClr val="FFFFFF"/>
+                  </a:gs>
+                  <a:gs pos="100000">
+                    <a:srgbClr val="FFFFFF"/>
+                  </a:gs>
+                </a:gsLst>
+                <a:lin ang="5400000" scaled="0"/>
+              </a:gradFill>
+            </a:endParaRPr>
           </a:p>
         </p:txBody>
       </p:sp>
@@ -33351,6 +33398,73 @@
 </file>
 
 <file path=customXml/item1.xml><?xml version="1.0" encoding="utf-8"?>
+<?mso-contentType ?>
+<FormTemplates xmlns="http://schemas.microsoft.com/sharepoint/v3/contenttype/forms">
+  <Display>DocumentLibraryForm</Display>
+  <Edit>DocumentLibraryForm</Edit>
+  <New>DocumentLibraryForm</New>
+</FormTemplates>
+</file>
+
+<file path=customXml/item2.xml><?xml version="1.0" encoding="utf-8"?>
+<?mso-contentType ?>
+<spe:Receivers xmlns:spe="http://schemas.microsoft.com/sharepoint/events">
+  <Receiver>
+    <Name>Document ID Generator</Name>
+    <Synchronization>Synchronous</Synchronization>
+    <Type>10001</Type>
+    <SequenceNumber>1000</SequenceNumber>
+    <Assembly>Microsoft.Office.DocumentManagement, Version=14.0.0.0, Culture=neutral, PublicKeyToken=71e9bce111e9429c</Assembly>
+    <Class>Microsoft.Office.DocumentManagement.Internal.DocIdHandler</Class>
+    <Data/>
+    <Filter/>
+  </Receiver>
+  <Receiver>
+    <Name>Document ID Generator</Name>
+    <Synchronization>Synchronous</Synchronization>
+    <Type>10002</Type>
+    <SequenceNumber>1001</SequenceNumber>
+    <Assembly>Microsoft.Office.DocumentManagement, Version=14.0.0.0, Culture=neutral, PublicKeyToken=71e9bce111e9429c</Assembly>
+    <Class>Microsoft.Office.DocumentManagement.Internal.DocIdHandler</Class>
+    <Data/>
+    <Filter/>
+  </Receiver>
+  <Receiver>
+    <Name>Document ID Generator</Name>
+    <Synchronization>Synchronous</Synchronization>
+    <Type>10004</Type>
+    <SequenceNumber>1002</SequenceNumber>
+    <Assembly>Microsoft.Office.DocumentManagement, Version=14.0.0.0, Culture=neutral, PublicKeyToken=71e9bce111e9429c</Assembly>
+    <Class>Microsoft.Office.DocumentManagement.Internal.DocIdHandler</Class>
+    <Data/>
+    <Filter/>
+  </Receiver>
+  <Receiver>
+    <Name>Document ID Generator</Name>
+    <Synchronization>Synchronous</Synchronization>
+    <Type>10006</Type>
+    <SequenceNumber>1003</SequenceNumber>
+    <Assembly>Microsoft.Office.DocumentManagement, Version=14.0.0.0, Culture=neutral, PublicKeyToken=71e9bce111e9429c</Assembly>
+    <Class>Microsoft.Office.DocumentManagement.Internal.DocIdHandler</Class>
+    <Data/>
+    <Filter/>
+  </Receiver>
+</spe:Receivers>
+</file>
+
+<file path=customXml/item3.xml><?xml version="1.0" encoding="utf-8"?>
+<p:properties xmlns:p="http://schemas.microsoft.com/office/2006/metadata/properties" xmlns:xsi="http://www.w3.org/2001/XMLSchema-instance" xmlns:pc="http://schemas.microsoft.com/office/infopath/2007/PartnerControls">
+  <documentManagement>
+    <_dlc_DocId xmlns="7bb5d761-a2ea-4873-95f7-7a6658fb3ef0">M4CWTKMW727E-592-73</_dlc_DocId>
+    <_dlc_DocIdUrl xmlns="7bb5d761-a2ea-4873-95f7-7a6658fb3ef0">
+      <Url>https://kms.vci.local/marketing/team/_layouts/DocIdRedir.aspx?ID=M4CWTKMW727E-592-73</Url>
+      <Description>M4CWTKMW727E-592-73</Description>
+    </_dlc_DocIdUrl>
+  </documentManagement>
+</p:properties>
+</file>
+
+<file path=customXml/item4.xml><?xml version="1.0" encoding="utf-8"?>
 <ct:contentTypeSchema xmlns:ct="http://schemas.microsoft.com/office/2006/metadata/contentType" xmlns:ma="http://schemas.microsoft.com/office/2006/metadata/properties/metaAttributes" ct:_="" ma:_="" ma:contentTypeName="Document" ma:contentTypeID="0x0101000812F700BE7F874999720E88173FE491" ma:contentTypeVersion="0" ma:contentTypeDescription="Create a new document." ma:contentTypeScope="" ma:versionID="3f79f408e2ca720b7aba6e0e32464d0c">
   <xsd:schema xmlns:xsd="http://www.w3.org/2001/XMLSchema" xmlns:xs="http://www.w3.org/2001/XMLSchema" xmlns:p="http://schemas.microsoft.com/office/2006/metadata/properties" xmlns:ns2="7bb5d761-a2ea-4873-95f7-7a6658fb3ef0" targetNamespace="http://schemas.microsoft.com/office/2006/metadata/properties" ma:root="true" ma:fieldsID="1e062cd38ba31e406bfc4340fbc7f87a" ns2:_="">
     <xsd:import namespace="7bb5d761-a2ea-4873-95f7-7a6658fb3ef0"/>
@@ -33495,95 +33609,18 @@
 </ct:contentTypeSchema>
 </file>
 
-<file path=customXml/item2.xml><?xml version="1.0" encoding="utf-8"?>
-<?mso-contentType ?>
-<FormTemplates xmlns="http://schemas.microsoft.com/sharepoint/v3/contenttype/forms">
-  <Display>DocumentLibraryForm</Display>
-  <Edit>DocumentLibraryForm</Edit>
-  <New>DocumentLibraryForm</New>
-</FormTemplates>
-</file>
-
-<file path=customXml/item3.xml><?xml version="1.0" encoding="utf-8"?>
-<p:properties xmlns:p="http://schemas.microsoft.com/office/2006/metadata/properties" xmlns:xsi="http://www.w3.org/2001/XMLSchema-instance" xmlns:pc="http://schemas.microsoft.com/office/infopath/2007/PartnerControls">
-  <documentManagement>
-    <_dlc_DocId xmlns="7bb5d761-a2ea-4873-95f7-7a6658fb3ef0">M4CWTKMW727E-592-73</_dlc_DocId>
-    <_dlc_DocIdUrl xmlns="7bb5d761-a2ea-4873-95f7-7a6658fb3ef0">
-      <Url>https://kms.vci.local/marketing/team/_layouts/DocIdRedir.aspx?ID=M4CWTKMW727E-592-73</Url>
-      <Description>M4CWTKMW727E-592-73</Description>
-    </_dlc_DocIdUrl>
-  </documentManagement>
-</p:properties>
-</file>
-
-<file path=customXml/item4.xml><?xml version="1.0" encoding="utf-8"?>
-<?mso-contentType ?>
-<spe:Receivers xmlns:spe="http://schemas.microsoft.com/sharepoint/events">
-  <Receiver>
-    <Name>Document ID Generator</Name>
-    <Synchronization>Synchronous</Synchronization>
-    <Type>10001</Type>
-    <SequenceNumber>1000</SequenceNumber>
-    <Assembly>Microsoft.Office.DocumentManagement, Version=14.0.0.0, Culture=neutral, PublicKeyToken=71e9bce111e9429c</Assembly>
-    <Class>Microsoft.Office.DocumentManagement.Internal.DocIdHandler</Class>
-    <Data/>
-    <Filter/>
-  </Receiver>
-  <Receiver>
-    <Name>Document ID Generator</Name>
-    <Synchronization>Synchronous</Synchronization>
-    <Type>10002</Type>
-    <SequenceNumber>1001</SequenceNumber>
-    <Assembly>Microsoft.Office.DocumentManagement, Version=14.0.0.0, Culture=neutral, PublicKeyToken=71e9bce111e9429c</Assembly>
-    <Class>Microsoft.Office.DocumentManagement.Internal.DocIdHandler</Class>
-    <Data/>
-    <Filter/>
-  </Receiver>
-  <Receiver>
-    <Name>Document ID Generator</Name>
-    <Synchronization>Synchronous</Synchronization>
-    <Type>10004</Type>
-    <SequenceNumber>1002</SequenceNumber>
-    <Assembly>Microsoft.Office.DocumentManagement, Version=14.0.0.0, Culture=neutral, PublicKeyToken=71e9bce111e9429c</Assembly>
-    <Class>Microsoft.Office.DocumentManagement.Internal.DocIdHandler</Class>
-    <Data/>
-    <Filter/>
-  </Receiver>
-  <Receiver>
-    <Name>Document ID Generator</Name>
-    <Synchronization>Synchronous</Synchronization>
-    <Type>10006</Type>
-    <SequenceNumber>1003</SequenceNumber>
-    <Assembly>Microsoft.Office.DocumentManagement, Version=14.0.0.0, Culture=neutral, PublicKeyToken=71e9bce111e9429c</Assembly>
-    <Class>Microsoft.Office.DocumentManagement.Internal.DocIdHandler</Class>
-    <Data/>
-    <Filter/>
-  </Receiver>
-</spe:Receivers>
-</file>
-
 <file path=customXml/itemProps1.xml><?xml version="1.0" encoding="utf-8"?>
-<ds:datastoreItem xmlns:ds="http://schemas.openxmlformats.org/officeDocument/2006/customXml" ds:itemID="{164479E5-0B02-49AC-B79E-EC1D6164DDD3}">
+<ds:datastoreItem xmlns:ds="http://schemas.openxmlformats.org/officeDocument/2006/customXml" ds:itemID="{5CDEB364-43EC-4510-9881-539C2A3FCE9E}">
   <ds:schemaRefs>
-    <ds:schemaRef ds:uri="http://schemas.microsoft.com/office/2006/metadata/contentType"/>
-    <ds:schemaRef ds:uri="http://schemas.microsoft.com/office/2006/metadata/properties/metaAttributes"/>
-    <ds:schemaRef ds:uri="http://www.w3.org/2001/XMLSchema"/>
-    <ds:schemaRef ds:uri="http://schemas.microsoft.com/office/2006/metadata/properties"/>
-    <ds:schemaRef ds:uri="7bb5d761-a2ea-4873-95f7-7a6658fb3ef0"/>
-    <ds:schemaRef ds:uri="http://schemas.microsoft.com/office/2006/documentManagement/types"/>
-    <ds:schemaRef ds:uri="http://schemas.microsoft.com/office/infopath/2007/PartnerControls"/>
-    <ds:schemaRef ds:uri="http://schemas.openxmlformats.org/package/2006/metadata/core-properties"/>
-    <ds:schemaRef ds:uri="http://purl.org/dc/elements/1.1/"/>
-    <ds:schemaRef ds:uri="http://purl.org/dc/terms/"/>
-    <ds:schemaRef ds:uri="http://schemas.microsoft.com/internal/obd"/>
+    <ds:schemaRef ds:uri="http://schemas.microsoft.com/sharepoint/v3/contenttype/forms"/>
   </ds:schemaRefs>
 </ds:datastoreItem>
 </file>
 
 <file path=customXml/itemProps2.xml><?xml version="1.0" encoding="utf-8"?>
-<ds:datastoreItem xmlns:ds="http://schemas.openxmlformats.org/officeDocument/2006/customXml" ds:itemID="{5CDEB364-43EC-4510-9881-539C2A3FCE9E}">
+<ds:datastoreItem xmlns:ds="http://schemas.openxmlformats.org/officeDocument/2006/customXml" ds:itemID="{B13EBC30-FE27-4C6A-B723-23FC2188F7DC}">
   <ds:schemaRefs>
-    <ds:schemaRef ds:uri="http://schemas.microsoft.com/sharepoint/v3/contenttype/forms"/>
+    <ds:schemaRef ds:uri="http://schemas.microsoft.com/sharepoint/events"/>
   </ds:schemaRefs>
 </ds:datastoreItem>
 </file>
@@ -33605,9 +33642,19 @@
 </file>
 
 <file path=customXml/itemProps4.xml><?xml version="1.0" encoding="utf-8"?>
-<ds:datastoreItem xmlns:ds="http://schemas.openxmlformats.org/officeDocument/2006/customXml" ds:itemID="{B13EBC30-FE27-4C6A-B723-23FC2188F7DC}">
+<ds:datastoreItem xmlns:ds="http://schemas.openxmlformats.org/officeDocument/2006/customXml" ds:itemID="{164479E5-0B02-49AC-B79E-EC1D6164DDD3}">
   <ds:schemaRefs>
-    <ds:schemaRef ds:uri="http://schemas.microsoft.com/sharepoint/events"/>
+    <ds:schemaRef ds:uri="http://schemas.microsoft.com/office/2006/metadata/contentType"/>
+    <ds:schemaRef ds:uri="http://schemas.microsoft.com/office/2006/metadata/properties/metaAttributes"/>
+    <ds:schemaRef ds:uri="http://www.w3.org/2001/XMLSchema"/>
+    <ds:schemaRef ds:uri="http://schemas.microsoft.com/office/2006/metadata/properties"/>
+    <ds:schemaRef ds:uri="7bb5d761-a2ea-4873-95f7-7a6658fb3ef0"/>
+    <ds:schemaRef ds:uri="http://schemas.microsoft.com/office/2006/documentManagement/types"/>
+    <ds:schemaRef ds:uri="http://schemas.microsoft.com/office/infopath/2007/PartnerControls"/>
+    <ds:schemaRef ds:uri="http://schemas.openxmlformats.org/package/2006/metadata/core-properties"/>
+    <ds:schemaRef ds:uri="http://purl.org/dc/elements/1.1/"/>
+    <ds:schemaRef ds:uri="http://purl.org/dc/terms/"/>
+    <ds:schemaRef ds:uri="http://schemas.microsoft.com/internal/obd"/>
   </ds:schemaRefs>
 </ds:datastoreItem>
 </file>
</xml_diff>

<commit_message>
Updates to section 03
* An updated screen shot of adding a node
* Leave the 'environment' field blank, a 'default' environment will be automati
cally created.
* Adjust the arrow pointing at the base/ssh compliance profile
* Update screen shot in Scan Results
* Change the header of the slide for creating the cookbooks directory
* Specify that the template command is creating an 'SSH Config Template'
* Update the impact of the 'ssh-4' rule, 1.0, not 3.0
* Update the screen shot of the ssh compliance rule
* Hide the InSpec verifier slides.  It doesn't work with Docker, why show it?
* Re-run `inspec exec` after re-converging the kitchen.  This way we verify the
 remdiation before applying it

Finished in 0.00025 seconds (files took 0.38379 seconds to load)
0 examples, 0 failures after re-converging the kitchen.  This way we verify the
 remdiation before applying it
</commit_message>
<xml_diff>
--- a/03-initial-configuration-scans.pptx
+++ b/03-initial-configuration-scans.pptx
@@ -6,10 +6,10 @@
     <p:sldMasterId id="2147483847" r:id="rId6"/>
   </p:sldMasterIdLst>
   <p:notesMasterIdLst>
-    <p:notesMasterId r:id="rId68"/>
+    <p:notesMasterId r:id="rId69"/>
   </p:notesMasterIdLst>
   <p:handoutMasterIdLst>
-    <p:handoutMasterId r:id="rId69"/>
+    <p:handoutMasterId r:id="rId70"/>
   </p:handoutMasterIdLst>
   <p:sldIdLst>
     <p:sldId id="256" r:id="rId7"/>
@@ -18,7 +18,7 @@
     <p:sldId id="272" r:id="rId10"/>
     <p:sldId id="283" r:id="rId11"/>
     <p:sldId id="290" r:id="rId12"/>
-    <p:sldId id="291" r:id="rId13"/>
+    <p:sldId id="359" r:id="rId13"/>
     <p:sldId id="292" r:id="rId14"/>
     <p:sldId id="293" r:id="rId15"/>
     <p:sldId id="295" r:id="rId16"/>
@@ -65,14 +65,15 @@
     <p:sldId id="347" r:id="rId57"/>
     <p:sldId id="339" r:id="rId58"/>
     <p:sldId id="340" r:id="rId59"/>
-    <p:sldId id="341" r:id="rId60"/>
-    <p:sldId id="342" r:id="rId61"/>
-    <p:sldId id="343" r:id="rId62"/>
-    <p:sldId id="344" r:id="rId63"/>
-    <p:sldId id="345" r:id="rId64"/>
-    <p:sldId id="275" r:id="rId65"/>
-    <p:sldId id="276" r:id="rId66"/>
-    <p:sldId id="267" r:id="rId67"/>
+    <p:sldId id="360" r:id="rId60"/>
+    <p:sldId id="341" r:id="rId61"/>
+    <p:sldId id="342" r:id="rId62"/>
+    <p:sldId id="343" r:id="rId63"/>
+    <p:sldId id="344" r:id="rId64"/>
+    <p:sldId id="345" r:id="rId65"/>
+    <p:sldId id="275" r:id="rId66"/>
+    <p:sldId id="276" r:id="rId67"/>
+    <p:sldId id="267" r:id="rId68"/>
   </p:sldIdLst>
   <p:sldSz cx="16256000" cy="9144000"/>
   <p:notesSz cx="6858000" cy="9144000"/>
@@ -203,7 +204,7 @@
   </p:defaultTextStyle>
   <p:extLst>
     <p:ext uri="{EFAFB233-063F-42B5-8137-9DF3F51BA10A}">
-      <p15:sldGuideLst xmlns:p15="http://schemas.microsoft.com/office/powerpoint/2012/main">
+      <p15:sldGuideLst xmlns="" xmlns:p15="http://schemas.microsoft.com/office/powerpoint/2012/main">
         <p15:guide id="1" orient="horz" pos="894">
           <p15:clr>
             <a:srgbClr val="A4A3A4"/>
@@ -217,7 +218,7 @@
       </p15:sldGuideLst>
     </p:ext>
     <p:ext uri="{2D200454-40CA-4A62-9FC3-DE9A4176ACB9}">
-      <p15:notesGuideLst xmlns:p15="http://schemas.microsoft.com/office/powerpoint/2012/main"/>
+      <p15:notesGuideLst xmlns="" xmlns:p15="http://schemas.microsoft.com/office/powerpoint/2012/main"/>
     </p:ext>
   </p:extLst>
 </p:presentation>
@@ -334,7 +335,7 @@
               <a:pPr>
                 <a:defRPr/>
               </a:pPr>
-              <a:t>2016-01-11</a:t>
+              <a:t>1/19/16</a:t>
             </a:fld>
             <a:endParaRPr lang="en-US" dirty="0"/>
           </a:p>
@@ -517,7 +518,7 @@
               <a:pPr>
                 <a:defRPr/>
               </a:pPr>
-              <a:t>2016-01-11</a:t>
+              <a:t>1/19/16</a:t>
             </a:fld>
             <a:endParaRPr lang="en-US" dirty="0"/>
           </a:p>
@@ -9037,131 +9038,23 @@
         <p:spPr/>
         <p:txBody>
           <a:bodyPr>
-            <a:normAutofit/>
+            <a:normAutofit fontScale="25000" lnSpcReduction="20000"/>
           </a:bodyPr>
           <a:lstStyle/>
           <a:p>
-            <a:pPr marL="0" marR="0" indent="0" algn="l" defTabSz="1217613" rtl="0" eaLnBrk="1" fontAlgn="base" latinLnBrk="0" hangingPunct="1">
-              <a:lnSpc>
-                <a:spcPct val="90000"/>
-              </a:lnSpc>
-              <a:spcBef>
-                <a:spcPct val="30000"/>
-              </a:spcBef>
-              <a:spcAft>
-                <a:spcPts val="450"/>
-              </a:spcAft>
-              <a:buClrTx/>
-              <a:buSzTx/>
-              <a:buFontTx/>
-              <a:buNone/>
-              <a:tabLst/>
-              <a:defRPr/>
-            </a:pPr>
-            <a:r>
-              <a:rPr lang="en-US" dirty="0" smtClean="0"/>
-              <a:t>Now we</a:t>
+            <a:r>
+              <a:rPr lang="en-US" dirty="0" smtClean="0"/>
+              <a:t>We</a:t>
             </a:r>
             <a:r>
               <a:rPr lang="en-US" baseline="0" dirty="0" smtClean="0"/>
-              <a:t> need to actually apply the change to the node. We'll do this using </a:t>
-            </a:r>
-            <a:r>
-              <a:rPr lang="en-US" dirty="0" smtClean="0"/>
-              <a:t>chef-client in local mode. You should then see that only Protocol version 2 is currently set</a:t>
-            </a:r>
-            <a:r>
-              <a:rPr lang="en-US" baseline="0" dirty="0" smtClean="0"/>
-              <a:t> on the node. </a:t>
-            </a:r>
-            <a:endParaRPr lang="en-US" dirty="0" smtClean="0"/>
-          </a:p>
-          <a:p>
-            <a:pPr marL="0" marR="0" indent="0" algn="l" defTabSz="1217613" rtl="0" eaLnBrk="1" fontAlgn="base" latinLnBrk="0" hangingPunct="1">
-              <a:lnSpc>
-                <a:spcPct val="90000"/>
-              </a:lnSpc>
-              <a:spcBef>
-                <a:spcPct val="30000"/>
-              </a:spcBef>
-              <a:spcAft>
-                <a:spcPts val="450"/>
-              </a:spcAft>
-              <a:buClrTx/>
-              <a:buSzTx/>
-              <a:buFontTx/>
-              <a:buNone/>
-              <a:tabLst/>
-              <a:defRPr/>
-            </a:pPr>
-            <a:endParaRPr lang="en-US" dirty="0" smtClean="0"/>
-          </a:p>
-          <a:p>
-            <a:pPr marL="0" marR="0" indent="0" algn="l" defTabSz="1217613" rtl="0" eaLnBrk="1" fontAlgn="base" latinLnBrk="0" hangingPunct="1">
-              <a:lnSpc>
-                <a:spcPct val="90000"/>
-              </a:lnSpc>
-              <a:spcBef>
-                <a:spcPct val="30000"/>
-              </a:spcBef>
-              <a:spcAft>
-                <a:spcPts val="450"/>
-              </a:spcAft>
-              <a:buClrTx/>
-              <a:buSzTx/>
-              <a:buFontTx/>
-              <a:buNone/>
-              <a:tabLst/>
-              <a:defRPr/>
-            </a:pPr>
-            <a:r>
-              <a:rPr lang="en-US" dirty="0" smtClean="0"/>
-              <a:t>Of course</a:t>
-            </a:r>
-            <a:r>
-              <a:rPr lang="en-US" baseline="0" dirty="0" smtClean="0"/>
-              <a:t> in a production environment chef-client would most likely be set to run automatically to download and converge these changes from Chef Server.</a:t>
-            </a:r>
-          </a:p>
-          <a:p>
-            <a:pPr marL="0" marR="0" indent="0" algn="l" defTabSz="1217613" rtl="0" eaLnBrk="1" fontAlgn="base" latinLnBrk="0" hangingPunct="1">
-              <a:lnSpc>
-                <a:spcPct val="90000"/>
-              </a:lnSpc>
-              <a:spcBef>
-                <a:spcPct val="30000"/>
-              </a:spcBef>
-              <a:spcAft>
-                <a:spcPts val="450"/>
-              </a:spcAft>
-              <a:buClrTx/>
-              <a:buSzTx/>
-              <a:buFontTx/>
-              <a:buNone/>
-              <a:tabLst/>
-              <a:defRPr/>
-            </a:pPr>
-            <a:endParaRPr lang="en-US" baseline="0" dirty="0" smtClean="0"/>
-          </a:p>
-          <a:p>
-            <a:pPr marL="0" marR="0" indent="0" algn="l" defTabSz="1217613" rtl="0" eaLnBrk="1" fontAlgn="base" latinLnBrk="0" hangingPunct="1">
-              <a:lnSpc>
-                <a:spcPct val="90000"/>
-              </a:lnSpc>
-              <a:spcBef>
-                <a:spcPct val="30000"/>
-              </a:spcBef>
-              <a:spcAft>
-                <a:spcPts val="450"/>
-              </a:spcAft>
-              <a:buClrTx/>
-              <a:buSzTx/>
-              <a:buFontTx/>
-              <a:buNone/>
-              <a:tabLst/>
-              <a:defRPr/>
-            </a:pPr>
-            <a:endParaRPr lang="en-US" baseline="0" dirty="0" smtClean="0"/>
+              <a:t> have now verified the change in our </a:t>
+            </a:r>
+            <a:r>
+              <a:rPr lang="en-US" baseline="0" smtClean="0"/>
+              <a:t>test kitchen</a:t>
+            </a:r>
+            <a:endParaRPr lang="en-US" dirty="0"/>
           </a:p>
         </p:txBody>
       </p:sp>
@@ -9241,7 +9134,7 @@
     </p:spTree>
     <p:extLst>
       <p:ext uri="{BB962C8B-B14F-4D97-AF65-F5344CB8AC3E}">
-        <p14:creationId xmlns:p14="http://schemas.microsoft.com/office/powerpoint/2010/main" val="67414775"/>
+        <p14:creationId xmlns:p14="http://schemas.microsoft.com/office/powerpoint/2010/main" val="2321952843"/>
       </p:ext>
     </p:extLst>
   </p:cSld>
@@ -9292,7 +9185,9 @@
         </p:nvSpPr>
         <p:spPr/>
         <p:txBody>
-          <a:bodyPr/>
+          <a:bodyPr>
+            <a:normAutofit/>
+          </a:bodyPr>
           <a:lstStyle/>
           <a:p>
             <a:pPr marL="0" marR="0" indent="0" algn="l" defTabSz="1217613" rtl="0" eaLnBrk="1" fontAlgn="base" latinLnBrk="0" hangingPunct="1">
@@ -9312,7 +9207,110 @@
               <a:tabLst/>
               <a:defRPr/>
             </a:pPr>
-            <a:endParaRPr lang="en-US" dirty="0"/>
+            <a:r>
+              <a:rPr lang="en-US" dirty="0" smtClean="0"/>
+              <a:t>Now we</a:t>
+            </a:r>
+            <a:r>
+              <a:rPr lang="en-US" baseline="0" dirty="0" smtClean="0"/>
+              <a:t> need to actually apply the change to the node. We'll do this using </a:t>
+            </a:r>
+            <a:r>
+              <a:rPr lang="en-US" dirty="0" smtClean="0"/>
+              <a:t>chef-client in local mode. You should then see that only Protocol version 2 is currently set</a:t>
+            </a:r>
+            <a:r>
+              <a:rPr lang="en-US" baseline="0" dirty="0" smtClean="0"/>
+              <a:t> on the node. </a:t>
+            </a:r>
+            <a:endParaRPr lang="en-US" dirty="0" smtClean="0"/>
+          </a:p>
+          <a:p>
+            <a:pPr marL="0" marR="0" indent="0" algn="l" defTabSz="1217613" rtl="0" eaLnBrk="1" fontAlgn="base" latinLnBrk="0" hangingPunct="1">
+              <a:lnSpc>
+                <a:spcPct val="90000"/>
+              </a:lnSpc>
+              <a:spcBef>
+                <a:spcPct val="30000"/>
+              </a:spcBef>
+              <a:spcAft>
+                <a:spcPts val="450"/>
+              </a:spcAft>
+              <a:buClrTx/>
+              <a:buSzTx/>
+              <a:buFontTx/>
+              <a:buNone/>
+              <a:tabLst/>
+              <a:defRPr/>
+            </a:pPr>
+            <a:endParaRPr lang="en-US" dirty="0" smtClean="0"/>
+          </a:p>
+          <a:p>
+            <a:pPr marL="0" marR="0" indent="0" algn="l" defTabSz="1217613" rtl="0" eaLnBrk="1" fontAlgn="base" latinLnBrk="0" hangingPunct="1">
+              <a:lnSpc>
+                <a:spcPct val="90000"/>
+              </a:lnSpc>
+              <a:spcBef>
+                <a:spcPct val="30000"/>
+              </a:spcBef>
+              <a:spcAft>
+                <a:spcPts val="450"/>
+              </a:spcAft>
+              <a:buClrTx/>
+              <a:buSzTx/>
+              <a:buFontTx/>
+              <a:buNone/>
+              <a:tabLst/>
+              <a:defRPr/>
+            </a:pPr>
+            <a:r>
+              <a:rPr lang="en-US" dirty="0" smtClean="0"/>
+              <a:t>Of course</a:t>
+            </a:r>
+            <a:r>
+              <a:rPr lang="en-US" baseline="0" dirty="0" smtClean="0"/>
+              <a:t> in a production environment chef-client would most likely be set to run automatically to download and converge these changes from Chef Server.</a:t>
+            </a:r>
+          </a:p>
+          <a:p>
+            <a:pPr marL="0" marR="0" indent="0" algn="l" defTabSz="1217613" rtl="0" eaLnBrk="1" fontAlgn="base" latinLnBrk="0" hangingPunct="1">
+              <a:lnSpc>
+                <a:spcPct val="90000"/>
+              </a:lnSpc>
+              <a:spcBef>
+                <a:spcPct val="30000"/>
+              </a:spcBef>
+              <a:spcAft>
+                <a:spcPts val="450"/>
+              </a:spcAft>
+              <a:buClrTx/>
+              <a:buSzTx/>
+              <a:buFontTx/>
+              <a:buNone/>
+              <a:tabLst/>
+              <a:defRPr/>
+            </a:pPr>
+            <a:endParaRPr lang="en-US" baseline="0" dirty="0" smtClean="0"/>
+          </a:p>
+          <a:p>
+            <a:pPr marL="0" marR="0" indent="0" algn="l" defTabSz="1217613" rtl="0" eaLnBrk="1" fontAlgn="base" latinLnBrk="0" hangingPunct="1">
+              <a:lnSpc>
+                <a:spcPct val="90000"/>
+              </a:lnSpc>
+              <a:spcBef>
+                <a:spcPct val="30000"/>
+              </a:spcBef>
+              <a:spcAft>
+                <a:spcPts val="450"/>
+              </a:spcAft>
+              <a:buClrTx/>
+              <a:buSzTx/>
+              <a:buFontTx/>
+              <a:buNone/>
+              <a:tabLst/>
+              <a:defRPr/>
+            </a:pPr>
+            <a:endParaRPr lang="en-US" baseline="0" dirty="0" smtClean="0"/>
           </a:p>
         </p:txBody>
       </p:sp>
@@ -9392,7 +9390,7 @@
     </p:spTree>
     <p:extLst>
       <p:ext uri="{BB962C8B-B14F-4D97-AF65-F5344CB8AC3E}">
-        <p14:creationId xmlns:p14="http://schemas.microsoft.com/office/powerpoint/2010/main" val="903931591"/>
+        <p14:creationId xmlns:p14="http://schemas.microsoft.com/office/powerpoint/2010/main" val="67414775"/>
       </p:ext>
     </p:extLst>
   </p:cSld>
@@ -9543,7 +9541,7 @@
     </p:spTree>
     <p:extLst>
       <p:ext uri="{BB962C8B-B14F-4D97-AF65-F5344CB8AC3E}">
-        <p14:creationId xmlns:p14="http://schemas.microsoft.com/office/powerpoint/2010/main" val="2126077804"/>
+        <p14:creationId xmlns:p14="http://schemas.microsoft.com/office/powerpoint/2010/main" val="903931591"/>
       </p:ext>
     </p:extLst>
   </p:cSld>
@@ -9828,7 +9826,7 @@
     </p:spTree>
     <p:extLst>
       <p:ext uri="{BB962C8B-B14F-4D97-AF65-F5344CB8AC3E}">
-        <p14:creationId xmlns:p14="http://schemas.microsoft.com/office/powerpoint/2010/main" val="2355399236"/>
+        <p14:creationId xmlns:p14="http://schemas.microsoft.com/office/powerpoint/2010/main" val="2126077804"/>
       </p:ext>
     </p:extLst>
   </p:cSld>
@@ -9899,19 +9897,139 @@
               <a:tabLst/>
               <a:defRPr/>
             </a:pPr>
-            <a:r>
-              <a:rPr lang="en-US" dirty="0" smtClean="0"/>
-              <a:t>In this module we scanned a node for compliance issues. We identified </a:t>
-            </a:r>
-            <a:r>
+            <a:endParaRPr lang="en-US" dirty="0"/>
+          </a:p>
+        </p:txBody>
+      </p:sp>
+      <p:sp>
+        <p:nvSpPr>
+          <p:cNvPr id="4" name="Slide Number Placeholder 3"/>
+          <p:cNvSpPr>
+            <a:spLocks noGrp="1"/>
+          </p:cNvSpPr>
+          <p:nvPr>
+            <p:ph type="sldNum" sz="quarter" idx="10"/>
+          </p:nvPr>
+        </p:nvSpPr>
+        <p:spPr/>
+        <p:txBody>
+          <a:bodyPr/>
+          <a:lstStyle/>
+          <a:p>
+            <a:pPr>
+              <a:defRPr/>
+            </a:pPr>
+            <a:fld id="{DC3734AA-3150-D947-AC52-2F5DF48BFCD5}" type="slidenum">
               <a:rPr lang="en-US" smtClean="0"/>
-              <a:t>an issue </a:t>
-            </a:r>
-            <a:r>
-              <a:rPr lang="en-US" dirty="0" smtClean="0"/>
-              <a:t>and then wrote a remediation recipe directly on the node scanned. We also tested our recipe with test kitchen.</a:t>
-            </a:r>
-          </a:p>
+              <a:pPr>
+                <a:defRPr/>
+              </a:pPr>
+              <a:t>58</a:t>
+            </a:fld>
+            <a:endParaRPr lang="en-US" dirty="0"/>
+          </a:p>
+        </p:txBody>
+      </p:sp>
+      <p:sp>
+        <p:nvSpPr>
+          <p:cNvPr id="5" name="Header Placeholder 4"/>
+          <p:cNvSpPr>
+            <a:spLocks noGrp="1"/>
+          </p:cNvSpPr>
+          <p:nvPr>
+            <p:ph type="hdr" sz="quarter" idx="11"/>
+          </p:nvPr>
+        </p:nvSpPr>
+        <p:spPr/>
+        <p:txBody>
+          <a:bodyPr/>
+          <a:lstStyle/>
+          <a:p>
+            <a:pPr>
+              <a:defRPr/>
+            </a:pPr>
+            <a:endParaRPr lang="en-US"/>
+          </a:p>
+        </p:txBody>
+      </p:sp>
+      <p:sp>
+        <p:nvSpPr>
+          <p:cNvPr id="6" name="Footer Placeholder 5"/>
+          <p:cNvSpPr>
+            <a:spLocks noGrp="1"/>
+          </p:cNvSpPr>
+          <p:nvPr>
+            <p:ph type="ftr" sz="quarter" idx="12"/>
+          </p:nvPr>
+        </p:nvSpPr>
+        <p:spPr/>
+        <p:txBody>
+          <a:bodyPr/>
+          <a:lstStyle/>
+          <a:p>
+            <a:pPr>
+              <a:defRPr/>
+            </a:pPr>
+            <a:endParaRPr lang="en-US"/>
+          </a:p>
+        </p:txBody>
+      </p:sp>
+    </p:spTree>
+    <p:extLst>
+      <p:ext uri="{BB962C8B-B14F-4D97-AF65-F5344CB8AC3E}">
+        <p14:creationId xmlns:p14="http://schemas.microsoft.com/office/powerpoint/2010/main" val="2355399236"/>
+      </p:ext>
+    </p:extLst>
+  </p:cSld>
+  <p:clrMapOvr>
+    <a:masterClrMapping/>
+  </p:clrMapOvr>
+</p:notes>
+</file>
+
+<file path=ppt/notesSlides/notesSlide52.xml><?xml version="1.0" encoding="utf-8"?>
+<p:notes xmlns:a="http://schemas.openxmlformats.org/drawingml/2006/main" xmlns:r="http://schemas.openxmlformats.org/officeDocument/2006/relationships" xmlns:p="http://schemas.openxmlformats.org/presentationml/2006/main">
+  <p:cSld>
+    <p:spTree>
+      <p:nvGrpSpPr>
+        <p:cNvPr id="1" name=""/>
+        <p:cNvGrpSpPr/>
+        <p:nvPr/>
+      </p:nvGrpSpPr>
+      <p:grpSpPr>
+        <a:xfrm>
+          <a:off x="0" y="0"/>
+          <a:ext cx="0" cy="0"/>
+          <a:chOff x="0" y="0"/>
+          <a:chExt cx="0" cy="0"/>
+        </a:xfrm>
+      </p:grpSpPr>
+      <p:sp>
+        <p:nvSpPr>
+          <p:cNvPr id="2" name="Slide Image Placeholder 1"/>
+          <p:cNvSpPr>
+            <a:spLocks noGrp="1" noRot="1" noChangeAspect="1"/>
+          </p:cNvSpPr>
+          <p:nvPr>
+            <p:ph type="sldImg"/>
+          </p:nvPr>
+        </p:nvSpPr>
+        <p:spPr/>
+      </p:sp>
+      <p:sp>
+        <p:nvSpPr>
+          <p:cNvPr id="3" name="Notes Placeholder 2"/>
+          <p:cNvSpPr>
+            <a:spLocks noGrp="1"/>
+          </p:cNvSpPr>
+          <p:nvPr>
+            <p:ph type="body" idx="1"/>
+          </p:nvPr>
+        </p:nvSpPr>
+        <p:spPr/>
+        <p:txBody>
+          <a:bodyPr/>
+          <a:lstStyle/>
           <a:p>
             <a:pPr marL="0" marR="0" indent="0" algn="l" defTabSz="1217613" rtl="0" eaLnBrk="1" fontAlgn="base" latinLnBrk="0" hangingPunct="1">
               <a:lnSpc>
@@ -9930,7 +10048,18 @@
               <a:tabLst/>
               <a:defRPr/>
             </a:pPr>
-            <a:endParaRPr lang="en-US" dirty="0" smtClean="0"/>
+            <a:r>
+              <a:rPr lang="en-US" dirty="0" smtClean="0"/>
+              <a:t>In this module we scanned a node for compliance issues. We identified </a:t>
+            </a:r>
+            <a:r>
+              <a:rPr lang="en-US" smtClean="0"/>
+              <a:t>an issue </a:t>
+            </a:r>
+            <a:r>
+              <a:rPr lang="en-US" dirty="0" smtClean="0"/>
+              <a:t>and then wrote a remediation recipe directly on the node scanned. We also tested our recipe with test kitchen.</a:t>
+            </a:r>
           </a:p>
           <a:p>
             <a:pPr marL="0" marR="0" indent="0" algn="l" defTabSz="1217613" rtl="0" eaLnBrk="1" fontAlgn="base" latinLnBrk="0" hangingPunct="1">
@@ -9950,34 +10079,7 @@
               <a:tabLst/>
               <a:defRPr/>
             </a:pPr>
-            <a:r>
-              <a:rPr lang="en-US" dirty="0" smtClean="0"/>
-              <a:t>As mentioned</a:t>
-            </a:r>
-            <a:r>
-              <a:rPr lang="en-US" baseline="0" dirty="0" smtClean="0"/>
-              <a:t> previously</a:t>
-            </a:r>
-            <a:r>
-              <a:rPr lang="en-US" dirty="0" smtClean="0"/>
-              <a:t>, in a</a:t>
-            </a:r>
-            <a:r>
-              <a:rPr lang="en-US" baseline="0" dirty="0" smtClean="0"/>
-              <a:t> production environment, </a:t>
-            </a:r>
-            <a:r>
-              <a:rPr lang="en-US" dirty="0" smtClean="0"/>
-              <a:t>you will likely write such recipes locally, add them to the node's</a:t>
-            </a:r>
-            <a:r>
-              <a:rPr lang="en-US" baseline="0" dirty="0" smtClean="0"/>
-              <a:t> run list, </a:t>
-            </a:r>
-            <a:r>
-              <a:rPr lang="en-US" dirty="0" smtClean="0"/>
-              <a:t>and then upload them to Chef Server. </a:t>
-            </a:r>
+            <a:endParaRPr lang="en-US" dirty="0" smtClean="0"/>
           </a:p>
           <a:p>
             <a:pPr marL="0" marR="0" indent="0" algn="l" defTabSz="1217613" rtl="0" eaLnBrk="1" fontAlgn="base" latinLnBrk="0" hangingPunct="1">
@@ -9997,7 +10099,34 @@
               <a:tabLst/>
               <a:defRPr/>
             </a:pPr>
-            <a:endParaRPr lang="en-US" dirty="0" smtClean="0"/>
+            <a:r>
+              <a:rPr lang="en-US" dirty="0" smtClean="0"/>
+              <a:t>As mentioned</a:t>
+            </a:r>
+            <a:r>
+              <a:rPr lang="en-US" baseline="0" dirty="0" smtClean="0"/>
+              <a:t> previously</a:t>
+            </a:r>
+            <a:r>
+              <a:rPr lang="en-US" dirty="0" smtClean="0"/>
+              <a:t>, in a</a:t>
+            </a:r>
+            <a:r>
+              <a:rPr lang="en-US" baseline="0" dirty="0" smtClean="0"/>
+              <a:t> production environment, </a:t>
+            </a:r>
+            <a:r>
+              <a:rPr lang="en-US" dirty="0" smtClean="0"/>
+              <a:t>you will likely write such recipes locally, add them to the node's</a:t>
+            </a:r>
+            <a:r>
+              <a:rPr lang="en-US" baseline="0" dirty="0" smtClean="0"/>
+              <a:t> run list, </a:t>
+            </a:r>
+            <a:r>
+              <a:rPr lang="en-US" dirty="0" smtClean="0"/>
+              <a:t>and then upload them to Chef Server. </a:t>
+            </a:r>
           </a:p>
           <a:p>
             <a:pPr marL="0" marR="0" indent="0" algn="l" defTabSz="1217613" rtl="0" eaLnBrk="1" fontAlgn="base" latinLnBrk="0" hangingPunct="1">
@@ -10017,6 +10146,26 @@
               <a:tabLst/>
               <a:defRPr/>
             </a:pPr>
+            <a:endParaRPr lang="en-US" dirty="0" smtClean="0"/>
+          </a:p>
+          <a:p>
+            <a:pPr marL="0" marR="0" indent="0" algn="l" defTabSz="1217613" rtl="0" eaLnBrk="1" fontAlgn="base" latinLnBrk="0" hangingPunct="1">
+              <a:lnSpc>
+                <a:spcPct val="90000"/>
+              </a:lnSpc>
+              <a:spcBef>
+                <a:spcPct val="30000"/>
+              </a:spcBef>
+              <a:spcAft>
+                <a:spcPts val="450"/>
+              </a:spcAft>
+              <a:buClrTx/>
+              <a:buSzTx/>
+              <a:buFontTx/>
+              <a:buNone/>
+              <a:tabLst/>
+              <a:defRPr/>
+            </a:pPr>
             <a:r>
               <a:rPr lang="en-US" dirty="0" smtClean="0"/>
               <a:t>Then the nodes would download the recipes from Chef Server on their next chef-client</a:t>
@@ -10058,7 +10207,7 @@
               <a:pPr>
                 <a:defRPr/>
               </a:pPr>
-              <a:t>58</a:t>
+              <a:t>59</a:t>
             </a:fld>
             <a:endParaRPr lang="en-US" dirty="0"/>
           </a:p>
@@ -10873,7 +11022,7 @@
   <p:clrMapOvr>
     <a:masterClrMapping/>
   </p:clrMapOvr>
-  <p:transition spd="med">
+  <p:transition xmlns:p14="http://schemas.microsoft.com/office/powerpoint/2010/main" spd="med">
     <p:fade/>
   </p:transition>
 </p:sldLayout>
@@ -11168,7 +11317,7 @@
   <p:clrMapOvr>
     <a:overrideClrMapping bg1="lt1" tx1="dk1" bg2="lt2" tx2="dk2" accent1="accent1" accent2="accent2" accent3="accent3" accent4="accent4" accent5="accent5" accent6="accent6" hlink="hlink" folHlink="folHlink"/>
   </p:clrMapOvr>
-  <p:transition spd="med">
+  <p:transition xmlns:p14="http://schemas.microsoft.com/office/powerpoint/2010/main" spd="med">
     <p:fade/>
   </p:transition>
 </p:sldLayout>
@@ -11301,14 +11450,14 @@
           </a:ln>
           <a:extLst>
             <a:ext uri="{909E8E84-426E-40dd-AFC4-6F175D3DCCD1}">
-              <a14:hiddenFill xmlns:a14="http://schemas.microsoft.com/office/drawing/2010/main" xmlns="">
+              <a14:hiddenFill xmlns:a14="http://schemas.microsoft.com/office/drawing/2010/main">
                 <a:solidFill>
                   <a:srgbClr val="FFFFFF"/>
                 </a:solidFill>
               </a14:hiddenFill>
             </a:ext>
             <a:ext uri="{91240B29-F687-4f45-9708-019B960494DF}">
-              <a14:hiddenLine xmlns:a14="http://schemas.microsoft.com/office/drawing/2010/main" xmlns="" w="9525">
+              <a14:hiddenLine xmlns:a14="http://schemas.microsoft.com/office/drawing/2010/main" w="9525">
                 <a:solidFill>
                   <a:srgbClr val="000000"/>
                 </a:solidFill>
@@ -11456,14 +11605,14 @@
           </a:ln>
           <a:extLst>
             <a:ext uri="{909E8E84-426E-40dd-AFC4-6F175D3DCCD1}">
-              <a14:hiddenFill xmlns:a14="http://schemas.microsoft.com/office/drawing/2010/main" xmlns="">
+              <a14:hiddenFill xmlns:a14="http://schemas.microsoft.com/office/drawing/2010/main">
                 <a:solidFill>
                   <a:srgbClr val="FFFFFF"/>
                 </a:solidFill>
               </a14:hiddenFill>
             </a:ext>
             <a:ext uri="{91240B29-F687-4f45-9708-019B960494DF}">
-              <a14:hiddenLine xmlns:a14="http://schemas.microsoft.com/office/drawing/2010/main" xmlns="" w="9525">
+              <a14:hiddenLine xmlns:a14="http://schemas.microsoft.com/office/drawing/2010/main" w="9525">
                 <a:solidFill>
                   <a:srgbClr val="000000"/>
                 </a:solidFill>
@@ -11861,7 +12010,7 @@
   <p:clrMapOvr>
     <a:overrideClrMapping bg1="lt1" tx1="dk1" bg2="lt2" tx2="dk2" accent1="accent1" accent2="accent2" accent3="accent3" accent4="accent4" accent5="accent5" accent6="accent6" hlink="hlink" folHlink="folHlink"/>
   </p:clrMapOvr>
-  <p:transition spd="med">
+  <p:transition xmlns:p14="http://schemas.microsoft.com/office/powerpoint/2010/main" spd="med">
     <p:fade/>
   </p:transition>
 </p:sldLayout>
@@ -11954,14 +12103,14 @@
           </a:ln>
           <a:extLst>
             <a:ext uri="{909E8E84-426E-40dd-AFC4-6F175D3DCCD1}">
-              <a14:hiddenFill xmlns:a14="http://schemas.microsoft.com/office/drawing/2010/main" xmlns="">
+              <a14:hiddenFill xmlns:a14="http://schemas.microsoft.com/office/drawing/2010/main">
                 <a:solidFill>
                   <a:srgbClr val="FFFFFF"/>
                 </a:solidFill>
               </a14:hiddenFill>
             </a:ext>
             <a:ext uri="{91240B29-F687-4f45-9708-019B960494DF}">
-              <a14:hiddenLine xmlns:a14="http://schemas.microsoft.com/office/drawing/2010/main" xmlns="" w="9525">
+              <a14:hiddenLine xmlns:a14="http://schemas.microsoft.com/office/drawing/2010/main" w="9525">
                 <a:solidFill>
                   <a:srgbClr val="000000"/>
                 </a:solidFill>
@@ -11983,7 +12132,7 @@
   <p:clrMapOvr>
     <a:masterClrMapping/>
   </p:clrMapOvr>
-  <p:transition spd="med">
+  <p:transition xmlns:p14="http://schemas.microsoft.com/office/powerpoint/2010/main" spd="med">
     <p:fade/>
   </p:transition>
 </p:sldLayout>
@@ -12200,14 +12349,14 @@
           </a:ln>
           <a:extLst>
             <a:ext uri="{909E8E84-426E-40dd-AFC4-6F175D3DCCD1}">
-              <a14:hiddenFill xmlns:a14="http://schemas.microsoft.com/office/drawing/2010/main" xmlns="">
+              <a14:hiddenFill xmlns:a14="http://schemas.microsoft.com/office/drawing/2010/main">
                 <a:solidFill>
                   <a:srgbClr val="FFFFFF"/>
                 </a:solidFill>
               </a14:hiddenFill>
             </a:ext>
             <a:ext uri="{91240B29-F687-4f45-9708-019B960494DF}">
-              <a14:hiddenLine xmlns:a14="http://schemas.microsoft.com/office/drawing/2010/main" xmlns="" w="9525">
+              <a14:hiddenLine xmlns:a14="http://schemas.microsoft.com/office/drawing/2010/main" w="9525">
                 <a:solidFill>
                   <a:srgbClr val="000000"/>
                 </a:solidFill>
@@ -12404,7 +12553,7 @@
   <p:clrMapOvr>
     <a:masterClrMapping/>
   </p:clrMapOvr>
-  <p:transition spd="med">
+  <p:transition xmlns:p14="http://schemas.microsoft.com/office/powerpoint/2010/main" spd="med">
     <p:fade/>
   </p:transition>
 </p:sldLayout>
@@ -12708,7 +12857,7 @@
   <p:clrMapOvr>
     <a:masterClrMapping/>
   </p:clrMapOvr>
-  <p:transition spd="med">
+  <p:transition xmlns:p14="http://schemas.microsoft.com/office/powerpoint/2010/main" spd="med">
     <p:fade/>
   </p:transition>
 </p:sldLayout>
@@ -12995,7 +13144,7 @@
   <p:clrMapOvr>
     <a:masterClrMapping/>
   </p:clrMapOvr>
-  <p:transition spd="med">
+  <p:transition xmlns:p14="http://schemas.microsoft.com/office/powerpoint/2010/main" spd="med">
     <p:fade/>
   </p:transition>
 </p:sldLayout>
@@ -13282,7 +13431,7 @@
   <p:clrMapOvr>
     <a:masterClrMapping/>
   </p:clrMapOvr>
-  <p:transition spd="med">
+  <p:transition xmlns:p14="http://schemas.microsoft.com/office/powerpoint/2010/main" spd="med">
     <p:fade/>
   </p:transition>
 </p:sldLayout>
@@ -13631,7 +13780,7 @@
   <p:clrMapOvr>
     <a:masterClrMapping/>
   </p:clrMapOvr>
-  <p:transition spd="med">
+  <p:transition xmlns:p14="http://schemas.microsoft.com/office/powerpoint/2010/main" spd="med">
     <p:fade/>
   </p:transition>
 </p:sldLayout>
@@ -13918,7 +14067,7 @@
   <p:clrMapOvr>
     <a:masterClrMapping/>
   </p:clrMapOvr>
-  <p:transition spd="med">
+  <p:transition xmlns:p14="http://schemas.microsoft.com/office/powerpoint/2010/main" spd="med">
     <p:fade/>
   </p:transition>
 </p:sldLayout>
@@ -14135,14 +14284,14 @@
           </a:ln>
           <a:extLst>
             <a:ext uri="{909E8E84-426E-40dd-AFC4-6F175D3DCCD1}">
-              <a14:hiddenFill xmlns:a14="http://schemas.microsoft.com/office/drawing/2010/main" xmlns="">
+              <a14:hiddenFill xmlns:a14="http://schemas.microsoft.com/office/drawing/2010/main">
                 <a:solidFill>
                   <a:srgbClr val="FFFFFF"/>
                 </a:solidFill>
               </a14:hiddenFill>
             </a:ext>
             <a:ext uri="{91240B29-F687-4f45-9708-019B960494DF}">
-              <a14:hiddenLine xmlns:a14="http://schemas.microsoft.com/office/drawing/2010/main" xmlns="" w="9525">
+              <a14:hiddenLine xmlns:a14="http://schemas.microsoft.com/office/drawing/2010/main" w="9525">
                 <a:solidFill>
                   <a:srgbClr val="000000"/>
                 </a:solidFill>
@@ -14339,7 +14488,7 @@
   <p:clrMapOvr>
     <a:masterClrMapping/>
   </p:clrMapOvr>
-  <p:transition spd="med">
+  <p:transition xmlns:p14="http://schemas.microsoft.com/office/powerpoint/2010/main" spd="med">
     <p:fade/>
   </p:transition>
 </p:sldLayout>
@@ -14516,7 +14665,7 @@
   <p:clrMapOvr>
     <a:masterClrMapping/>
   </p:clrMapOvr>
-  <p:transition spd="med">
+  <p:transition xmlns:p14="http://schemas.microsoft.com/office/powerpoint/2010/main" spd="med">
     <p:fade/>
   </p:transition>
 </p:sldLayout>
@@ -14804,7 +14953,7 @@
   <p:clrMapOvr>
     <a:masterClrMapping/>
   </p:clrMapOvr>
-  <p:transition spd="med">
+  <p:transition xmlns:p14="http://schemas.microsoft.com/office/powerpoint/2010/main" spd="med">
     <p:fade/>
   </p:transition>
 </p:sldLayout>
@@ -15116,7 +15265,7 @@
   <p:clrMapOvr>
     <a:masterClrMapping/>
   </p:clrMapOvr>
-  <p:transition spd="med">
+  <p:transition xmlns:p14="http://schemas.microsoft.com/office/powerpoint/2010/main" spd="med">
     <p:fade/>
   </p:transition>
 </p:sldLayout>
@@ -15420,7 +15569,7 @@
   <p:clrMapOvr>
     <a:masterClrMapping/>
   </p:clrMapOvr>
-  <p:transition spd="med">
+  <p:transition xmlns:p14="http://schemas.microsoft.com/office/powerpoint/2010/main" spd="med">
     <p:fade/>
   </p:transition>
 </p:sldLayout>
@@ -15600,7 +15749,7 @@
   <p:clrMapOvr>
     <a:masterClrMapping/>
   </p:clrMapOvr>
-  <p:transition spd="med">
+  <p:transition xmlns:p14="http://schemas.microsoft.com/office/powerpoint/2010/main" spd="med">
     <p:fade/>
   </p:transition>
 </p:sldLayout>
@@ -15676,14 +15825,14 @@
           </a:ln>
           <a:extLst>
             <a:ext uri="{909E8E84-426E-40dd-AFC4-6F175D3DCCD1}">
-              <a14:hiddenFill xmlns:a14="http://schemas.microsoft.com/office/drawing/2010/main" xmlns="">
+              <a14:hiddenFill xmlns:a14="http://schemas.microsoft.com/office/drawing/2010/main">
                 <a:solidFill>
                   <a:srgbClr val="FFFFFF"/>
                 </a:solidFill>
               </a14:hiddenFill>
             </a:ext>
             <a:ext uri="{91240B29-F687-4f45-9708-019B960494DF}">
-              <a14:hiddenLine xmlns:a14="http://schemas.microsoft.com/office/drawing/2010/main" xmlns="" w="9525">
+              <a14:hiddenLine xmlns:a14="http://schemas.microsoft.com/office/drawing/2010/main" w="9525">
                 <a:solidFill>
                   <a:srgbClr val="000000"/>
                 </a:solidFill>
@@ -15959,7 +16108,7 @@
   <p:clrMapOvr>
     <a:overrideClrMapping bg1="lt1" tx1="dk1" bg2="lt2" tx2="dk2" accent1="accent1" accent2="accent2" accent3="accent3" accent4="accent4" accent5="accent5" accent6="accent6" hlink="hlink" folHlink="folHlink"/>
   </p:clrMapOvr>
-  <p:transition spd="med">
+  <p:transition xmlns:p14="http://schemas.microsoft.com/office/powerpoint/2010/main" spd="med">
     <p:fade/>
   </p:transition>
 </p:sldLayout>
@@ -16165,7 +16314,7 @@
   <p:clrMapOvr>
     <a:overrideClrMapping bg1="lt1" tx1="dk1" bg2="lt2" tx2="dk2" accent1="accent1" accent2="accent2" accent3="accent3" accent4="accent4" accent5="accent5" accent6="accent6" hlink="hlink" folHlink="folHlink"/>
   </p:clrMapOvr>
-  <p:transition spd="med">
+  <p:transition xmlns:p14="http://schemas.microsoft.com/office/powerpoint/2010/main" spd="med">
     <p:fade/>
   </p:transition>
 </p:sldLayout>
@@ -16241,14 +16390,14 @@
           </a:ln>
           <a:extLst>
             <a:ext uri="{909E8E84-426E-40dd-AFC4-6F175D3DCCD1}">
-              <a14:hiddenFill xmlns:a14="http://schemas.microsoft.com/office/drawing/2010/main" xmlns="">
+              <a14:hiddenFill xmlns:a14="http://schemas.microsoft.com/office/drawing/2010/main">
                 <a:solidFill>
                   <a:srgbClr val="FFFFFF"/>
                 </a:solidFill>
               </a14:hiddenFill>
             </a:ext>
             <a:ext uri="{91240B29-F687-4f45-9708-019B960494DF}">
-              <a14:hiddenLine xmlns:a14="http://schemas.microsoft.com/office/drawing/2010/main" xmlns="" w="9525">
+              <a14:hiddenLine xmlns:a14="http://schemas.microsoft.com/office/drawing/2010/main" w="9525">
                 <a:solidFill>
                   <a:srgbClr val="000000"/>
                 </a:solidFill>
@@ -16531,7 +16680,7 @@
   <p:clrMapOvr>
     <a:overrideClrMapping bg1="lt1" tx1="dk1" bg2="lt2" tx2="dk2" accent1="accent1" accent2="accent2" accent3="accent3" accent4="accent4" accent5="accent5" accent6="accent6" hlink="hlink" folHlink="folHlink"/>
   </p:clrMapOvr>
-  <p:transition spd="med">
+  <p:transition xmlns:p14="http://schemas.microsoft.com/office/powerpoint/2010/main" spd="med">
     <p:fade/>
   </p:transition>
 </p:sldLayout>
@@ -16739,7 +16888,7 @@
   <p:clrMapOvr>
     <a:overrideClrMapping bg1="lt1" tx1="dk1" bg2="lt2" tx2="dk2" accent1="accent1" accent2="accent2" accent3="accent3" accent4="accent4" accent5="accent5" accent6="accent6" hlink="hlink" folHlink="folHlink"/>
   </p:clrMapOvr>
-  <p:transition spd="med">
+  <p:transition xmlns:p14="http://schemas.microsoft.com/office/powerpoint/2010/main" spd="med">
     <p:fade/>
   </p:transition>
 </p:sldLayout>
@@ -16815,14 +16964,14 @@
           </a:ln>
           <a:extLst>
             <a:ext uri="{909E8E84-426E-40dd-AFC4-6F175D3DCCD1}">
-              <a14:hiddenFill xmlns:a14="http://schemas.microsoft.com/office/drawing/2010/main" xmlns="">
+              <a14:hiddenFill xmlns:a14="http://schemas.microsoft.com/office/drawing/2010/main">
                 <a:solidFill>
                   <a:srgbClr val="FFFFFF"/>
                 </a:solidFill>
               </a14:hiddenFill>
             </a:ext>
             <a:ext uri="{91240B29-F687-4f45-9708-019B960494DF}">
-              <a14:hiddenLine xmlns:a14="http://schemas.microsoft.com/office/drawing/2010/main" xmlns="" w="9525">
+              <a14:hiddenLine xmlns:a14="http://schemas.microsoft.com/office/drawing/2010/main" w="9525">
                 <a:solidFill>
                   <a:srgbClr val="000000"/>
                 </a:solidFill>
@@ -17090,7 +17239,7 @@
   <p:clrMapOvr>
     <a:overrideClrMapping bg1="lt1" tx1="dk1" bg2="lt2" tx2="dk2" accent1="accent1" accent2="accent2" accent3="accent3" accent4="accent4" accent5="accent5" accent6="accent6" hlink="hlink" folHlink="folHlink"/>
   </p:clrMapOvr>
-  <p:transition spd="med">
+  <p:transition xmlns:p14="http://schemas.microsoft.com/office/powerpoint/2010/main" spd="med">
     <p:fade/>
   </p:transition>
 </p:sldLayout>
@@ -17318,7 +17467,7 @@
   <p:clrMapOvr>
     <a:overrideClrMapping bg1="lt1" tx1="dk1" bg2="lt2" tx2="dk2" accent1="accent1" accent2="accent2" accent3="accent3" accent4="accent4" accent5="accent5" accent6="accent6" hlink="hlink" folHlink="folHlink"/>
   </p:clrMapOvr>
-  <p:transition spd="med">
+  <p:transition xmlns:p14="http://schemas.microsoft.com/office/powerpoint/2010/main" spd="med">
     <p:fade/>
   </p:transition>
 </p:sldLayout>
@@ -17606,7 +17755,7 @@
   <p:clrMapOvr>
     <a:overrideClrMapping bg1="lt1" tx1="dk1" bg2="lt2" tx2="dk2" accent1="accent1" accent2="accent2" accent3="accent3" accent4="accent4" accent5="accent5" accent6="accent6" hlink="hlink" folHlink="folHlink"/>
   </p:clrMapOvr>
-  <p:transition spd="med">
+  <p:transition xmlns:p14="http://schemas.microsoft.com/office/powerpoint/2010/main" spd="med">
     <p:fade/>
   </p:transition>
 </p:sldLayout>
@@ -17762,14 +17911,14 @@
           </a:ln>
           <a:extLst>
             <a:ext uri="{909E8E84-426E-40dd-AFC4-6F175D3DCCD1}">
-              <a14:hiddenFill xmlns:a14="http://schemas.microsoft.com/office/drawing/2010/main" xmlns="">
+              <a14:hiddenFill xmlns:a14="http://schemas.microsoft.com/office/drawing/2010/main">
                 <a:solidFill>
                   <a:srgbClr val="FFFFFF"/>
                 </a:solidFill>
               </a14:hiddenFill>
             </a:ext>
             <a:ext uri="{91240B29-F687-4f45-9708-019B960494DF}">
-              <a14:hiddenLine xmlns:a14="http://schemas.microsoft.com/office/drawing/2010/main" xmlns="" w="9525">
+              <a14:hiddenLine xmlns:a14="http://schemas.microsoft.com/office/drawing/2010/main" w="9525">
                 <a:solidFill>
                   <a:srgbClr val="000000"/>
                 </a:solidFill>
@@ -17988,13 +18137,13 @@
     <p:sldLayoutId id="2147483868" r:id="rId13"/>
     <p:sldLayoutId id="2147483869" r:id="rId14"/>
   </p:sldLayoutIdLst>
-  <p:transition spd="med">
+  <p:transition xmlns:p14="http://schemas.microsoft.com/office/powerpoint/2010/main" spd="med">
     <p:fade/>
   </p:transition>
   <p:timing>
     <p:tnLst>
       <p:par>
-        <p:cTn id="1" dur="indefinite" restart="never" nodeType="tmRoot"/>
+        <p:cTn xmlns:p14="http://schemas.microsoft.com/office/powerpoint/2010/main" id="1" dur="indefinite" restart="never" nodeType="tmRoot"/>
       </p:par>
     </p:tnLst>
   </p:timing>
@@ -18522,14 +18671,14 @@
           </a:ln>
           <a:extLst>
             <a:ext uri="{909E8E84-426E-40dd-AFC4-6F175D3DCCD1}">
-              <a14:hiddenFill xmlns:a14="http://schemas.microsoft.com/office/drawing/2010/main" xmlns="">
+              <a14:hiddenFill xmlns:a14="http://schemas.microsoft.com/office/drawing/2010/main">
                 <a:solidFill>
                   <a:srgbClr val="FFFFFF"/>
                 </a:solidFill>
               </a14:hiddenFill>
             </a:ext>
             <a:ext uri="{91240B29-F687-4f45-9708-019B960494DF}">
-              <a14:hiddenLine xmlns:a14="http://schemas.microsoft.com/office/drawing/2010/main" xmlns="" w="9525">
+              <a14:hiddenLine xmlns:a14="http://schemas.microsoft.com/office/drawing/2010/main" w="9525">
                 <a:solidFill>
                   <a:srgbClr val="000000"/>
                 </a:solidFill>
@@ -18818,13 +18967,13 @@
     <p:sldLayoutId id="2147483866" r:id="rId8"/>
     <p:sldLayoutId id="2147483870" r:id="rId9"/>
   </p:sldLayoutIdLst>
-  <p:transition spd="med">
+  <p:transition xmlns:p14="http://schemas.microsoft.com/office/powerpoint/2010/main" spd="med">
     <p:fade/>
   </p:transition>
   <p:timing>
     <p:tnLst>
       <p:par>
-        <p:cTn id="1" dur="indefinite" restart="never" nodeType="tmRoot"/>
+        <p:cTn xmlns:p14="http://schemas.microsoft.com/office/powerpoint/2010/main" id="1" dur="indefinite" restart="never" nodeType="tmRoot"/>
       </p:par>
     </p:tnLst>
   </p:timing>
@@ -19332,13 +19481,13 @@
   <p:clrMapOvr>
     <a:masterClrMapping/>
   </p:clrMapOvr>
-  <p:transition spd="med">
+  <p:transition xmlns:p14="http://schemas.microsoft.com/office/powerpoint/2010/main" spd="med">
     <p:fade/>
   </p:transition>
   <p:timing>
     <p:tnLst>
       <p:par>
-        <p:cTn id="1" dur="indefinite" restart="never" nodeType="tmRoot"/>
+        <p:cTn xmlns:p14="http://schemas.microsoft.com/office/powerpoint/2010/main" id="1" dur="indefinite" restart="never" nodeType="tmRoot"/>
       </p:par>
     </p:tnLst>
   </p:timing>
@@ -19523,13 +19672,13 @@
   <p:clrMapOvr>
     <a:masterClrMapping/>
   </p:clrMapOvr>
-  <p:transition spd="med">
+  <p:transition xmlns:p14="http://schemas.microsoft.com/office/powerpoint/2010/main" spd="med">
     <p:fade/>
   </p:transition>
   <p:timing>
     <p:tnLst>
       <p:par>
-        <p:cTn id="1" dur="indefinite" restart="never" nodeType="tmRoot"/>
+        <p:cTn xmlns:p14="http://schemas.microsoft.com/office/powerpoint/2010/main" id="1" dur="indefinite" restart="never" nodeType="tmRoot"/>
       </p:par>
     </p:tnLst>
   </p:timing>
@@ -19726,13 +19875,13 @@
   <p:clrMapOvr>
     <a:masterClrMapping/>
   </p:clrMapOvr>
-  <p:transition spd="med">
+  <p:transition xmlns:p14="http://schemas.microsoft.com/office/powerpoint/2010/main" spd="med">
     <p:fade/>
   </p:transition>
   <p:timing>
     <p:tnLst>
       <p:par>
-        <p:cTn id="1" dur="indefinite" restart="never" nodeType="tmRoot"/>
+        <p:cTn xmlns:p14="http://schemas.microsoft.com/office/powerpoint/2010/main" id="1" dur="indefinite" restart="never" nodeType="tmRoot"/>
       </p:par>
     </p:tnLst>
   </p:timing>
@@ -19882,13 +20031,13 @@
   <p:clrMapOvr>
     <a:masterClrMapping/>
   </p:clrMapOvr>
-  <p:transition spd="med">
+  <p:transition xmlns:p14="http://schemas.microsoft.com/office/powerpoint/2010/main" spd="med">
     <p:fade/>
   </p:transition>
   <p:timing>
     <p:tnLst>
       <p:par>
-        <p:cTn id="1" dur="indefinite" restart="never" nodeType="tmRoot"/>
+        <p:cTn xmlns:p14="http://schemas.microsoft.com/office/powerpoint/2010/main" id="1" dur="indefinite" restart="never" nodeType="tmRoot"/>
       </p:par>
     </p:tnLst>
   </p:timing>
@@ -20001,13 +20150,13 @@
   <p:clrMapOvr>
     <a:masterClrMapping/>
   </p:clrMapOvr>
-  <p:transition spd="med">
+  <p:transition xmlns:p14="http://schemas.microsoft.com/office/powerpoint/2010/main" spd="med">
     <p:fade/>
   </p:transition>
   <p:timing>
     <p:tnLst>
       <p:par>
-        <p:cTn id="1" dur="indefinite" restart="never" nodeType="tmRoot"/>
+        <p:cTn xmlns:p14="http://schemas.microsoft.com/office/powerpoint/2010/main" id="1" dur="indefinite" restart="never" nodeType="tmRoot"/>
       </p:par>
     </p:tnLst>
   </p:timing>
@@ -20307,13 +20456,13 @@
   <p:clrMapOvr>
     <a:masterClrMapping/>
   </p:clrMapOvr>
-  <p:transition spd="med">
+  <p:transition xmlns:p14="http://schemas.microsoft.com/office/powerpoint/2010/main" spd="med">
     <p:fade/>
   </p:transition>
   <p:timing>
     <p:tnLst>
       <p:par>
-        <p:cTn id="1" dur="indefinite" restart="never" nodeType="tmRoot"/>
+        <p:cTn xmlns:p14="http://schemas.microsoft.com/office/powerpoint/2010/main" id="1" dur="indefinite" restart="never" nodeType="tmRoot"/>
       </p:par>
     </p:tnLst>
   </p:timing>
@@ -20441,13 +20590,13 @@
   <p:clrMapOvr>
     <a:masterClrMapping/>
   </p:clrMapOvr>
-  <p:transition spd="med">
+  <p:transition xmlns:p14="http://schemas.microsoft.com/office/powerpoint/2010/main" spd="med">
     <p:fade/>
   </p:transition>
   <p:timing>
     <p:tnLst>
       <p:par>
-        <p:cTn id="1" dur="indefinite" restart="never" nodeType="tmRoot"/>
+        <p:cTn xmlns:p14="http://schemas.microsoft.com/office/powerpoint/2010/main" id="1" dur="indefinite" restart="never" nodeType="tmRoot"/>
       </p:par>
     </p:tnLst>
   </p:timing>
@@ -20612,13 +20761,13 @@
   <p:clrMapOvr>
     <a:masterClrMapping/>
   </p:clrMapOvr>
-  <p:transition spd="med">
+  <p:transition xmlns:p14="http://schemas.microsoft.com/office/powerpoint/2010/main" spd="med">
     <p:fade/>
   </p:transition>
   <p:timing>
     <p:tnLst>
       <p:par>
-        <p:cTn id="1" dur="indefinite" restart="never" nodeType="tmRoot"/>
+        <p:cTn xmlns:p14="http://schemas.microsoft.com/office/powerpoint/2010/main" id="1" dur="indefinite" restart="never" nodeType="tmRoot"/>
       </p:par>
     </p:tnLst>
   </p:timing>
@@ -20787,8 +20936,8 @@
         </p:nvCxnSpPr>
         <p:spPr>
           <a:xfrm>
-            <a:off x="4914900" y="3467100"/>
-            <a:ext cx="6534150" cy="1600200"/>
+            <a:off x="5600850" y="3101778"/>
+            <a:ext cx="5848200" cy="1965522"/>
           </a:xfrm>
           <a:prstGeom prst="straightConnector1">
             <a:avLst/>
@@ -20825,13 +20974,13 @@
   <p:clrMapOvr>
     <a:masterClrMapping/>
   </p:clrMapOvr>
-  <p:transition spd="med">
+  <p:transition xmlns:p14="http://schemas.microsoft.com/office/powerpoint/2010/main" spd="med">
     <p:fade/>
   </p:transition>
   <p:timing>
     <p:tnLst>
       <p:par>
-        <p:cTn id="1" dur="indefinite" restart="never" nodeType="tmRoot"/>
+        <p:cTn xmlns:p14="http://schemas.microsoft.com/office/powerpoint/2010/main" id="1" dur="indefinite" restart="never" nodeType="tmRoot"/>
       </p:par>
     </p:tnLst>
   </p:timing>
@@ -20946,35 +21095,6 @@
           <a:prstGeom prst="rect">
             <a:avLst/>
           </a:prstGeom>
-        </p:spPr>
-      </p:pic>
-      <p:pic>
-        <p:nvPicPr>
-          <p:cNvPr id="8" name="Picture 7"/>
-          <p:cNvPicPr>
-            <a:picLocks noChangeAspect="1"/>
-          </p:cNvPicPr>
-          <p:nvPr/>
-        </p:nvPicPr>
-        <p:blipFill>
-          <a:blip r:embed="rId4"/>
-          <a:stretch>
-            <a:fillRect/>
-          </a:stretch>
-        </p:blipFill>
-        <p:spPr>
-          <a:xfrm>
-            <a:off x="5711825" y="4667250"/>
-            <a:ext cx="10487025" cy="3181350"/>
-          </a:xfrm>
-          <a:prstGeom prst="rect">
-            <a:avLst/>
-          </a:prstGeom>
-          <a:ln>
-            <a:solidFill>
-              <a:schemeClr val="accent1"/>
-            </a:solidFill>
-          </a:ln>
         </p:spPr>
       </p:pic>
       <p:cxnSp>
@@ -21013,6 +21133,34 @@
           </a:fontRef>
         </p:style>
       </p:cxnSp>
+      <p:pic>
+        <p:nvPicPr>
+          <p:cNvPr id="9" name="Picture 8"/>
+          <p:cNvPicPr>
+            <a:picLocks noChangeAspect="1"/>
+          </p:cNvPicPr>
+          <p:nvPr/>
+        </p:nvPicPr>
+        <p:blipFill rotWithShape="1">
+          <a:blip r:embed="rId4"/>
+          <a:srcRect l="21821" r="-293"/>
+          <a:stretch/>
+        </p:blipFill>
+        <p:spPr>
+          <a:xfrm>
+            <a:off x="7984289" y="4795482"/>
+            <a:ext cx="7724990" cy="2986281"/>
+          </a:xfrm>
+          <a:prstGeom prst="rect">
+            <a:avLst/>
+          </a:prstGeom>
+          <a:ln>
+            <a:solidFill>
+              <a:schemeClr val="accent1"/>
+            </a:solidFill>
+          </a:ln>
+        </p:spPr>
+      </p:pic>
     </p:spTree>
     <p:extLst>
       <p:ext uri="{BB962C8B-B14F-4D97-AF65-F5344CB8AC3E}">
@@ -21023,13 +21171,13 @@
   <p:clrMapOvr>
     <a:masterClrMapping/>
   </p:clrMapOvr>
-  <p:transition spd="med">
+  <p:transition xmlns:p14="http://schemas.microsoft.com/office/powerpoint/2010/main" spd="med">
     <p:fade/>
   </p:transition>
   <p:timing>
     <p:tnLst>
       <p:par>
-        <p:cTn id="1" dur="indefinite" restart="never" nodeType="tmRoot"/>
+        <p:cTn xmlns:p14="http://schemas.microsoft.com/office/powerpoint/2010/main" id="1" dur="indefinite" restart="never" nodeType="tmRoot"/>
       </p:par>
     </p:tnLst>
   </p:timing>
@@ -21199,13 +21347,13 @@
   <p:clrMapOvr>
     <a:masterClrMapping/>
   </p:clrMapOvr>
-  <p:transition spd="med">
+  <p:transition xmlns:p14="http://schemas.microsoft.com/office/powerpoint/2010/main" spd="med">
     <p:fade/>
   </p:transition>
   <p:timing>
     <p:tnLst>
       <p:par>
-        <p:cTn id="1" dur="indefinite" restart="never" nodeType="tmRoot"/>
+        <p:cTn xmlns:p14="http://schemas.microsoft.com/office/powerpoint/2010/main" id="1" dur="indefinite" restart="never" nodeType="tmRoot"/>
       </p:par>
     </p:tnLst>
   </p:timing>
@@ -21408,13 +21556,13 @@
   <p:clrMapOvr>
     <a:masterClrMapping/>
   </p:clrMapOvr>
-  <p:transition spd="med">
+  <p:transition xmlns:p14="http://schemas.microsoft.com/office/powerpoint/2010/main" spd="med">
     <p:fade/>
   </p:transition>
   <p:timing>
     <p:tnLst>
       <p:par>
-        <p:cTn id="1" dur="indefinite" restart="never" nodeType="tmRoot"/>
+        <p:cTn xmlns:p14="http://schemas.microsoft.com/office/powerpoint/2010/main" id="1" dur="indefinite" restart="never" nodeType="tmRoot"/>
       </p:par>
     </p:tnLst>
   </p:timing>
@@ -21770,13 +21918,13 @@
   <p:clrMapOvr>
     <a:masterClrMapping/>
   </p:clrMapOvr>
-  <p:transition spd="med">
+  <p:transition xmlns:p14="http://schemas.microsoft.com/office/powerpoint/2010/main" spd="med">
     <p:fade/>
   </p:transition>
   <p:timing>
     <p:tnLst>
       <p:par>
-        <p:cTn id="1" dur="indefinite" restart="never" nodeType="tmRoot"/>
+        <p:cTn xmlns:p14="http://schemas.microsoft.com/office/powerpoint/2010/main" id="1" dur="indefinite" restart="never" nodeType="tmRoot"/>
       </p:par>
     </p:tnLst>
   </p:timing>
@@ -21994,13 +22142,13 @@
   <p:clrMapOvr>
     <a:masterClrMapping/>
   </p:clrMapOvr>
-  <p:transition spd="med">
+  <p:transition xmlns:p14="http://schemas.microsoft.com/office/powerpoint/2010/main" spd="med">
     <p:fade/>
   </p:transition>
   <p:timing>
     <p:tnLst>
       <p:par>
-        <p:cTn id="1" dur="indefinite" restart="never" nodeType="tmRoot"/>
+        <p:cTn xmlns:p14="http://schemas.microsoft.com/office/powerpoint/2010/main" id="1" dur="indefinite" restart="never" nodeType="tmRoot"/>
       </p:par>
     </p:tnLst>
   </p:timing>
@@ -22240,13 +22388,13 @@
   <p:clrMapOvr>
     <a:masterClrMapping/>
   </p:clrMapOvr>
-  <p:transition spd="med">
+  <p:transition xmlns:p14="http://schemas.microsoft.com/office/powerpoint/2010/main" spd="med">
     <p:fade/>
   </p:transition>
   <p:timing>
     <p:tnLst>
       <p:par>
-        <p:cTn id="1" dur="indefinite" restart="never" nodeType="tmRoot"/>
+        <p:cTn xmlns:p14="http://schemas.microsoft.com/office/powerpoint/2010/main" id="1" dur="indefinite" restart="never" nodeType="tmRoot"/>
       </p:par>
     </p:tnLst>
   </p:timing>
@@ -22491,7 +22639,7 @@
   <p:clrMapOvr>
     <a:masterClrMapping/>
   </p:clrMapOvr>
-  <p:transition spd="med">
+  <p:transition xmlns:p14="http://schemas.microsoft.com/office/powerpoint/2010/main" spd="med">
     <p:fade/>
   </p:transition>
 </p:sld>
@@ -22615,13 +22763,13 @@
   <p:clrMapOvr>
     <a:masterClrMapping/>
   </p:clrMapOvr>
-  <p:transition spd="med">
+  <p:transition xmlns:p14="http://schemas.microsoft.com/office/powerpoint/2010/main" spd="med">
     <p:fade/>
   </p:transition>
   <p:timing>
     <p:tnLst>
       <p:par>
-        <p:cTn id="1" dur="indefinite" restart="never" nodeType="tmRoot"/>
+        <p:cTn xmlns:p14="http://schemas.microsoft.com/office/powerpoint/2010/main" id="1" dur="indefinite" restart="never" nodeType="tmRoot"/>
       </p:par>
     </p:tnLst>
   </p:timing>
@@ -22741,7 +22889,7 @@
   <p:clrMapOvr>
     <a:masterClrMapping/>
   </p:clrMapOvr>
-  <p:transition spd="med">
+  <p:transition xmlns:p14="http://schemas.microsoft.com/office/powerpoint/2010/main" spd="med">
     <p:fade/>
   </p:transition>
 </p:sld>
@@ -22822,15 +22970,7 @@
             </a:r>
             <a:r>
               <a:rPr lang="en-US" sz="2800" dirty="0" smtClean="0"/>
-              <a:t> node (not your compliance server node) </a:t>
-            </a:r>
-            <a:r>
-              <a:rPr lang="en-US" sz="2800" dirty="0" smtClean="0"/>
-              <a:t>using ssh and </a:t>
-            </a:r>
-            <a:r>
-              <a:rPr lang="en-US" sz="2800" dirty="0" smtClean="0"/>
-              <a:t>ensure you are in the home directory.</a:t>
+              <a:t> node (not your compliance server node) using ssh and ensure you are in the home directory.</a:t>
             </a:r>
           </a:p>
           <a:p>
@@ -23094,13 +23234,13 @@
   <p:clrMapOvr>
     <a:masterClrMapping/>
   </p:clrMapOvr>
-  <p:transition spd="med">
+  <p:transition xmlns:p14="http://schemas.microsoft.com/office/powerpoint/2010/main" spd="med">
     <p:fade/>
   </p:transition>
   <p:timing>
     <p:tnLst>
       <p:par>
-        <p:cTn id="1" dur="indefinite" restart="never" nodeType="tmRoot"/>
+        <p:cTn xmlns:p14="http://schemas.microsoft.com/office/powerpoint/2010/main" id="1" dur="indefinite" restart="never" nodeType="tmRoot"/>
       </p:par>
     </p:tnLst>
   </p:timing>
@@ -23175,15 +23315,19 @@
         <p:spPr/>
         <p:txBody>
           <a:bodyPr>
-            <a:normAutofit/>
+            <a:noAutofit/>
           </a:bodyPr>
           <a:lstStyle/>
           <a:p>
             <a:r>
-              <a:rPr lang="en-US" dirty="0" smtClean="0"/>
-              <a:t>GE: Create an SSH Cookbook and CD to it</a:t>
-            </a:r>
-            <a:endParaRPr lang="en-US" dirty="0"/>
+              <a:rPr lang="en-US" sz="4900" dirty="0" smtClean="0"/>
+              <a:t>GE: </a:t>
+            </a:r>
+            <a:r>
+              <a:rPr lang="en-US" sz="4900" dirty="0"/>
+              <a:t>Create and change to a ‘cookbooks’ directory</a:t>
+            </a:r>
+            <a:endParaRPr lang="en-US" sz="4900" dirty="0"/>
           </a:p>
         </p:txBody>
       </p:sp>
@@ -23384,7 +23528,7 @@
   <p:clrMapOvr>
     <a:masterClrMapping/>
   </p:clrMapOvr>
-  <p:transition spd="med">
+  <p:transition xmlns:p14="http://schemas.microsoft.com/office/powerpoint/2010/main" spd="med">
     <p:fade/>
   </p:transition>
 </p:sld>
@@ -23544,7 +23688,7 @@
   <p:clrMapOvr>
     <a:masterClrMapping/>
   </p:clrMapOvr>
-  <p:transition spd="med">
+  <p:transition xmlns:p14="http://schemas.microsoft.com/office/powerpoint/2010/main" spd="med">
     <p:fade/>
   </p:transition>
 </p:sld>
@@ -23748,7 +23892,7 @@
   <p:clrMapOvr>
     <a:masterClrMapping/>
   </p:clrMapOvr>
-  <p:transition spd="med">
+  <p:transition xmlns:p14="http://schemas.microsoft.com/office/powerpoint/2010/main" spd="med">
     <p:fade/>
   </p:transition>
 </p:sld>
@@ -23884,7 +24028,7 @@
   <p:clrMapOvr>
     <a:masterClrMapping/>
   </p:clrMapOvr>
-  <p:transition spd="med">
+  <p:transition xmlns:p14="http://schemas.microsoft.com/office/powerpoint/2010/main" spd="med">
     <p:fade/>
   </p:transition>
 </p:sld>
@@ -24065,8 +24209,12 @@
               <a:t>GE: Create an SSH </a:t>
             </a:r>
             <a:r>
-              <a:rPr lang="en-US" dirty="0" smtClean="0"/>
-              <a:t>Template</a:t>
+              <a:rPr lang="en-US" dirty="0" err="1" smtClean="0"/>
+              <a:t>Config</a:t>
+            </a:r>
+            <a:r>
+              <a:rPr lang="en-US" dirty="0" smtClean="0"/>
+              <a:t> Template</a:t>
             </a:r>
             <a:endParaRPr lang="en-US" dirty="0"/>
           </a:p>
@@ -24082,7 +24230,7 @@
   <p:clrMapOvr>
     <a:masterClrMapping/>
   </p:clrMapOvr>
-  <p:transition spd="med">
+  <p:transition xmlns:p14="http://schemas.microsoft.com/office/powerpoint/2010/main" spd="med">
     <p:fade/>
   </p:transition>
 </p:sld>
@@ -24276,7 +24424,7 @@
   <p:clrMapOvr>
     <a:masterClrMapping/>
   </p:clrMapOvr>
-  <p:transition spd="med">
+  <p:transition xmlns:p14="http://schemas.microsoft.com/office/powerpoint/2010/main" spd="med">
     <p:fade/>
   </p:transition>
 </p:sld>
@@ -24413,7 +24561,7 @@
   <p:clrMapOvr>
     <a:masterClrMapping/>
   </p:clrMapOvr>
-  <p:transition spd="med">
+  <p:transition xmlns:p14="http://schemas.microsoft.com/office/powerpoint/2010/main" spd="med">
     <p:fade/>
   </p:transition>
 </p:sld>
@@ -24502,13 +24650,13 @@
   <p:clrMapOvr>
     <a:masterClrMapping/>
   </p:clrMapOvr>
-  <p:transition spd="med">
+  <p:transition xmlns:p14="http://schemas.microsoft.com/office/powerpoint/2010/main" spd="med">
     <p:fade/>
   </p:transition>
   <p:timing>
     <p:tnLst>
       <p:par>
-        <p:cTn id="1" dur="indefinite" restart="never" nodeType="tmRoot"/>
+        <p:cTn xmlns:p14="http://schemas.microsoft.com/office/powerpoint/2010/main" id="1" dur="indefinite" restart="never" nodeType="tmRoot"/>
       </p:par>
     </p:tnLst>
   </p:timing>
@@ -24674,7 +24822,7 @@
             <a:spLocks noGrp="1"/>
           </p:cNvSpPr>
           <p:nvPr>
-            <p:ph sz="quarter" idx="12" hasCustomPrompt="1"/>
+            <p:ph sz="quarter" idx="12"/>
           </p:nvPr>
         </p:nvSpPr>
         <p:spPr>
@@ -24729,13 +24877,13 @@
   <p:clrMapOvr>
     <a:masterClrMapping/>
   </p:clrMapOvr>
-  <p:transition spd="med">
+  <p:transition xmlns:p14="http://schemas.microsoft.com/office/powerpoint/2010/main" spd="med">
     <p:fade/>
   </p:transition>
   <p:timing>
     <p:tnLst>
       <p:par>
-        <p:cTn id="1" dur="indefinite" restart="never" nodeType="tmRoot"/>
+        <p:cTn xmlns:p14="http://schemas.microsoft.com/office/powerpoint/2010/main" id="1" dur="indefinite" restart="never" nodeType="tmRoot"/>
       </p:par>
     </p:tnLst>
   </p:timing>
@@ -24930,7 +25078,7 @@
             <a:spLocks noGrp="1"/>
           </p:cNvSpPr>
           <p:nvPr>
-            <p:ph sz="quarter" idx="12" hasCustomPrompt="1"/>
+            <p:ph sz="quarter" idx="12"/>
           </p:nvPr>
         </p:nvSpPr>
         <p:spPr>
@@ -24985,13 +25133,13 @@
   <p:clrMapOvr>
     <a:masterClrMapping/>
   </p:clrMapOvr>
-  <p:transition spd="med">
+  <p:transition xmlns:p14="http://schemas.microsoft.com/office/powerpoint/2010/main" spd="med">
     <p:fade/>
   </p:transition>
   <p:timing>
     <p:tnLst>
       <p:par>
-        <p:cTn id="1" dur="indefinite" restart="never" nodeType="tmRoot"/>
+        <p:cTn xmlns:p14="http://schemas.microsoft.com/office/powerpoint/2010/main" id="1" dur="indefinite" restart="never" nodeType="tmRoot"/>
       </p:par>
     </p:tnLst>
   </p:timing>
@@ -25567,13 +25715,13 @@
   <p:clrMapOvr>
     <a:masterClrMapping/>
   </p:clrMapOvr>
-  <p:transition spd="med">
+  <p:transition xmlns:p14="http://schemas.microsoft.com/office/powerpoint/2010/main" spd="med">
     <p:fade/>
   </p:transition>
   <p:timing>
     <p:tnLst>
       <p:par>
-        <p:cTn id="1" dur="indefinite" restart="never" nodeType="tmRoot"/>
+        <p:cTn xmlns:p14="http://schemas.microsoft.com/office/powerpoint/2010/main" id="1" dur="indefinite" restart="never" nodeType="tmRoot"/>
       </p:par>
     </p:tnLst>
   </p:timing>
@@ -25736,13 +25884,13 @@
   <p:clrMapOvr>
     <a:masterClrMapping/>
   </p:clrMapOvr>
-  <p:transition spd="med">
+  <p:transition xmlns:p14="http://schemas.microsoft.com/office/powerpoint/2010/main" spd="med">
     <p:fade/>
   </p:transition>
   <p:timing>
     <p:tnLst>
       <p:par>
-        <p:cTn id="1" dur="indefinite" restart="never" nodeType="tmRoot"/>
+        <p:cTn xmlns:p14="http://schemas.microsoft.com/office/powerpoint/2010/main" id="1" dur="indefinite" restart="never" nodeType="tmRoot"/>
       </p:par>
     </p:tnLst>
   </p:timing>
@@ -25953,13 +26101,13 @@
   <p:clrMapOvr>
     <a:masterClrMapping/>
   </p:clrMapOvr>
-  <p:transition spd="med">
+  <p:transition xmlns:p14="http://schemas.microsoft.com/office/powerpoint/2010/main" spd="med">
     <p:fade/>
   </p:transition>
   <p:timing>
     <p:tnLst>
       <p:par>
-        <p:cTn id="1" dur="indefinite" restart="never" nodeType="tmRoot"/>
+        <p:cTn xmlns:p14="http://schemas.microsoft.com/office/powerpoint/2010/main" id="1" dur="indefinite" restart="never" nodeType="tmRoot"/>
       </p:par>
     </p:tnLst>
   </p:timing>
@@ -26085,7 +26233,7 @@
   <p:clrMapOvr>
     <a:masterClrMapping/>
   </p:clrMapOvr>
-  <p:transition spd="med">
+  <p:transition xmlns:p14="http://schemas.microsoft.com/office/powerpoint/2010/main" spd="med">
     <p:fade/>
   </p:transition>
 </p:sld>
@@ -26159,15 +26307,7 @@
             </a:pPr>
             <a:r>
               <a:rPr lang="en-US" dirty="0" smtClean="0"/>
-              <a:t>Add a </a:t>
-            </a:r>
-            <a:r>
-              <a:rPr lang="en-US" dirty="0" smtClean="0"/>
-              <a:t>Linux Node </a:t>
-            </a:r>
-            <a:r>
-              <a:rPr lang="en-US" dirty="0" smtClean="0"/>
-              <a:t>to Scan</a:t>
+              <a:t>Add a Linux Node to Scan</a:t>
             </a:r>
           </a:p>
           <a:p>
@@ -26177,11 +26317,7 @@
             </a:pPr>
             <a:r>
               <a:rPr lang="en-US" dirty="0" smtClean="0"/>
-              <a:t>Test </a:t>
-            </a:r>
-            <a:r>
-              <a:rPr lang="en-US" dirty="0" smtClean="0"/>
-              <a:t>connectivity</a:t>
+              <a:t>Test connectivity</a:t>
             </a:r>
           </a:p>
           <a:p>
@@ -26200,7 +26336,6 @@
               <a:rPr lang="en-US" dirty="0" smtClean="0"/>
               <a:t>: In the next module you will perform the same exercises as in this module but using a Windows node as your target node.</a:t>
             </a:r>
-            <a:endParaRPr lang="en-US" dirty="0" smtClean="0"/>
           </a:p>
           <a:p>
             <a:endParaRPr lang="en-US" dirty="0" smtClean="0"/>
@@ -26224,7 +26359,7 @@
   <p:clrMapOvr>
     <a:masterClrMapping/>
   </p:clrMapOvr>
-  <p:transition spd="med">
+  <p:transition xmlns:p14="http://schemas.microsoft.com/office/powerpoint/2010/main" spd="med">
     <p:fade/>
   </p:transition>
 </p:sld>
@@ -26388,7 +26523,7 @@
   <p:clrMapOvr>
     <a:masterClrMapping/>
   </p:clrMapOvr>
-  <p:transition spd="med">
+  <p:transition xmlns:p14="http://schemas.microsoft.com/office/powerpoint/2010/main" spd="med">
     <p:fade/>
   </p:transition>
 </p:sld>
@@ -26532,7 +26667,7 @@
   <p:clrMapOvr>
     <a:masterClrMapping/>
   </p:clrMapOvr>
-  <p:transition spd="med">
+  <p:transition xmlns:p14="http://schemas.microsoft.com/office/powerpoint/2010/main" spd="med">
     <p:fade/>
   </p:transition>
 </p:sld>
@@ -26615,7 +26750,7 @@
   <p:clrMapOvr>
     <a:masterClrMapping/>
   </p:clrMapOvr>
-  <p:transition spd="med">
+  <p:transition xmlns:p14="http://schemas.microsoft.com/office/powerpoint/2010/main" spd="med">
     <p:fade/>
   </p:transition>
 </p:sld>
@@ -26691,8 +26826,13 @@
           <a:p>
             <a:r>
               <a:rPr lang="en-US" b="1" dirty="0"/>
-              <a:t>  impact 3.0</a:t>
-            </a:r>
+              <a:t>  impact </a:t>
+            </a:r>
+            <a:r>
+              <a:rPr lang="en-US" b="1" dirty="0" smtClean="0"/>
+              <a:t>1.0</a:t>
+            </a:r>
+            <a:endParaRPr lang="en-US" b="1" dirty="0"/>
           </a:p>
           <a:p>
             <a:r>
@@ -26832,7 +26972,7 @@
   <p:clrMapOvr>
     <a:masterClrMapping/>
   </p:clrMapOvr>
-  <p:transition spd="med">
+  <p:transition xmlns:p14="http://schemas.microsoft.com/office/powerpoint/2010/main" spd="med">
     <p:fade/>
   </p:transition>
 </p:sld>
@@ -26962,7 +27102,7 @@
       </p:sp>
       <p:pic>
         <p:nvPicPr>
-          <p:cNvPr id="4" name="Picture 3"/>
+          <p:cNvPr id="5" name="Picture 4"/>
           <p:cNvPicPr>
             <a:picLocks noChangeAspect="1"/>
           </p:cNvPicPr>
@@ -26976,8 +27116,8 @@
         </p:blipFill>
         <p:spPr>
           <a:xfrm>
-            <a:off x="1712480" y="3420205"/>
-            <a:ext cx="12831041" cy="4504669"/>
+            <a:off x="2364224" y="3971602"/>
+            <a:ext cx="11522937" cy="4045425"/>
           </a:xfrm>
           <a:prstGeom prst="rect">
             <a:avLst/>
@@ -26999,14 +27139,14 @@
   <p:clrMapOvr>
     <a:masterClrMapping/>
   </p:clrMapOvr>
-  <p:transition spd="med">
+  <p:transition xmlns:p14="http://schemas.microsoft.com/office/powerpoint/2010/main" spd="med">
     <p:fade/>
   </p:transition>
 </p:sld>
 </file>
 
 <file path=ppt/slides/slide45.xml><?xml version="1.0" encoding="utf-8"?>
-<p:sld xmlns:a="http://schemas.openxmlformats.org/drawingml/2006/main" xmlns:r="http://schemas.openxmlformats.org/officeDocument/2006/relationships" xmlns:p="http://schemas.openxmlformats.org/presentationml/2006/main">
+<p:sld xmlns:a="http://schemas.openxmlformats.org/drawingml/2006/main" xmlns:r="http://schemas.openxmlformats.org/officeDocument/2006/relationships" xmlns:p="http://schemas.openxmlformats.org/presentationml/2006/main" show="0">
   <p:cSld>
     <p:spTree>
       <p:nvGrpSpPr>
@@ -27255,14 +27395,14 @@
   <p:clrMapOvr>
     <a:masterClrMapping/>
   </p:clrMapOvr>
-  <p:transition spd="med">
+  <p:transition xmlns:p14="http://schemas.microsoft.com/office/powerpoint/2010/main" spd="med">
     <p:fade/>
   </p:transition>
 </p:sld>
 </file>
 
 <file path=ppt/slides/slide46.xml><?xml version="1.0" encoding="utf-8"?>
-<p:sld xmlns:a="http://schemas.openxmlformats.org/drawingml/2006/main" xmlns:r="http://schemas.openxmlformats.org/officeDocument/2006/relationships" xmlns:p="http://schemas.openxmlformats.org/presentationml/2006/main">
+<p:sld xmlns:a="http://schemas.openxmlformats.org/drawingml/2006/main" xmlns:r="http://schemas.openxmlformats.org/officeDocument/2006/relationships" xmlns:p="http://schemas.openxmlformats.org/presentationml/2006/main" show="0">
   <p:cSld>
     <p:spTree>
       <p:nvGrpSpPr>
@@ -27459,7 +27599,7 @@
   <p:clrMapOvr>
     <a:masterClrMapping/>
   </p:clrMapOvr>
-  <p:transition spd="med">
+  <p:transition xmlns:p14="http://schemas.microsoft.com/office/powerpoint/2010/main" spd="med">
     <p:fade/>
   </p:transition>
 </p:sld>
@@ -27584,13 +27724,13 @@
   <p:clrMapOvr>
     <a:masterClrMapping/>
   </p:clrMapOvr>
-  <p:transition spd="med">
+  <p:transition xmlns:p14="http://schemas.microsoft.com/office/powerpoint/2010/main" spd="med">
     <p:fade/>
   </p:transition>
   <p:timing>
     <p:tnLst>
       <p:par>
-        <p:cTn id="1" dur="indefinite" restart="never" nodeType="tmRoot"/>
+        <p:cTn xmlns:p14="http://schemas.microsoft.com/office/powerpoint/2010/main" id="1" dur="indefinite" restart="never" nodeType="tmRoot"/>
       </p:par>
     </p:tnLst>
   </p:timing>
@@ -27879,13 +28019,13 @@
   <p:clrMapOvr>
     <a:masterClrMapping/>
   </p:clrMapOvr>
-  <p:transition spd="med">
+  <p:transition xmlns:p14="http://schemas.microsoft.com/office/powerpoint/2010/main" spd="med">
     <p:fade/>
   </p:transition>
   <p:timing>
     <p:tnLst>
       <p:par>
-        <p:cTn id="1" dur="indefinite" restart="never" nodeType="tmRoot"/>
+        <p:cTn xmlns:p14="http://schemas.microsoft.com/office/powerpoint/2010/main" id="1" dur="indefinite" restart="never" nodeType="tmRoot"/>
       </p:par>
     </p:tnLst>
   </p:timing>
@@ -28164,13 +28304,13 @@
   <p:clrMapOvr>
     <a:masterClrMapping/>
   </p:clrMapOvr>
-  <p:transition spd="med">
+  <p:transition xmlns:p14="http://schemas.microsoft.com/office/powerpoint/2010/main" spd="med">
     <p:fade/>
   </p:transition>
   <p:timing>
     <p:tnLst>
       <p:par>
-        <p:cTn id="1" dur="indefinite" restart="never" nodeType="tmRoot"/>
+        <p:cTn xmlns:p14="http://schemas.microsoft.com/office/powerpoint/2010/main" id="1" dur="indefinite" restart="never" nodeType="tmRoot"/>
       </p:par>
     </p:tnLst>
   </p:timing>
@@ -28281,31 +28421,32 @@
       </p:sp>
       <p:pic>
         <p:nvPicPr>
-          <p:cNvPr id="4" name="Picture 3"/>
+          <p:cNvPr id="5" name="Picture 4" descr="Chef_Compliance_Dashboard.png"/>
           <p:cNvPicPr>
             <a:picLocks noChangeAspect="1"/>
           </p:cNvPicPr>
           <p:nvPr/>
         </p:nvPicPr>
         <p:blipFill>
-          <a:blip r:embed="rId2"/>
+          <a:blip r:embed="rId2">
+            <a:extLst>
+              <a:ext uri="{28A0092B-C50C-407E-A947-70E740481C1C}">
+                <a14:useLocalDpi xmlns:a14="http://schemas.microsoft.com/office/drawing/2010/main" val="0"/>
+              </a:ext>
+            </a:extLst>
+          </a:blip>
           <a:stretch>
             <a:fillRect/>
           </a:stretch>
         </p:blipFill>
         <p:spPr>
           <a:xfrm>
-            <a:off x="6759742" y="2924211"/>
-            <a:ext cx="8785058" cy="3209925"/>
+            <a:off x="6912086" y="2951272"/>
+            <a:ext cx="8636000" cy="3632200"/>
           </a:xfrm>
           <a:prstGeom prst="rect">
             <a:avLst/>
           </a:prstGeom>
-          <a:ln>
-            <a:solidFill>
-              <a:schemeClr val="accent1"/>
-            </a:solidFill>
-          </a:ln>
         </p:spPr>
       </p:pic>
     </p:spTree>
@@ -28318,13 +28459,13 @@
   <p:clrMapOvr>
     <a:masterClrMapping/>
   </p:clrMapOvr>
-  <p:transition spd="med">
+  <p:transition xmlns:p14="http://schemas.microsoft.com/office/powerpoint/2010/main" spd="med">
     <p:fade/>
   </p:transition>
   <p:timing>
     <p:tnLst>
       <p:par>
-        <p:cTn id="1" dur="indefinite" restart="never" nodeType="tmRoot"/>
+        <p:cTn xmlns:p14="http://schemas.microsoft.com/office/powerpoint/2010/main" id="1" dur="indefinite" restart="never" nodeType="tmRoot"/>
       </p:par>
     </p:tnLst>
   </p:timing>
@@ -28505,13 +28646,13 @@
   <p:clrMapOvr>
     <a:masterClrMapping/>
   </p:clrMapOvr>
-  <p:transition spd="med">
+  <p:transition xmlns:p14="http://schemas.microsoft.com/office/powerpoint/2010/main" spd="med">
     <p:fade/>
   </p:transition>
   <p:timing>
     <p:tnLst>
       <p:par>
-        <p:cTn id="1" dur="indefinite" restart="never" nodeType="tmRoot"/>
+        <p:cTn xmlns:p14="http://schemas.microsoft.com/office/powerpoint/2010/main" id="1" dur="indefinite" restart="never" nodeType="tmRoot"/>
       </p:par>
     </p:tnLst>
   </p:timing>
@@ -28691,7 +28832,7 @@
   <p:clrMapOvr>
     <a:masterClrMapping/>
   </p:clrMapOvr>
-  <p:transition spd="med">
+  <p:transition xmlns:p14="http://schemas.microsoft.com/office/powerpoint/2010/main" spd="med">
     <p:fade/>
   </p:transition>
 </p:sld>
@@ -28787,7 +28928,7 @@
   <p:clrMapOvr>
     <a:masterClrMapping/>
   </p:clrMapOvr>
-  <p:transition spd="med">
+  <p:transition xmlns:p14="http://schemas.microsoft.com/office/powerpoint/2010/main" spd="med">
     <p:fade/>
   </p:transition>
 </p:sld>
@@ -29143,13 +29284,201 @@
   <p:clrMapOvr>
     <a:masterClrMapping/>
   </p:clrMapOvr>
-  <p:transition spd="med">
+  <p:transition xmlns:p14="http://schemas.microsoft.com/office/powerpoint/2010/main" spd="med">
     <p:fade/>
   </p:transition>
 </p:sld>
 </file>
 
 <file path=ppt/slides/slide54.xml><?xml version="1.0" encoding="utf-8"?>
+<p:sld xmlns:a="http://schemas.openxmlformats.org/drawingml/2006/main" xmlns:r="http://schemas.openxmlformats.org/officeDocument/2006/relationships" xmlns:p="http://schemas.openxmlformats.org/presentationml/2006/main">
+  <p:cSld>
+    <p:spTree>
+      <p:nvGrpSpPr>
+        <p:cNvPr id="1" name=""/>
+        <p:cNvGrpSpPr/>
+        <p:nvPr/>
+      </p:nvGrpSpPr>
+      <p:grpSpPr>
+        <a:xfrm>
+          <a:off x="0" y="0"/>
+          <a:ext cx="0" cy="0"/>
+          <a:chOff x="0" y="0"/>
+          <a:chExt cx="0" cy="0"/>
+        </a:xfrm>
+      </p:grpSpPr>
+      <p:sp>
+        <p:nvSpPr>
+          <p:cNvPr id="2" name="Content Placeholder 1"/>
+          <p:cNvSpPr>
+            <a:spLocks noGrp="1"/>
+          </p:cNvSpPr>
+          <p:nvPr>
+            <p:ph sz="quarter" idx="10"/>
+          </p:nvPr>
+        </p:nvSpPr>
+        <p:spPr>
+          <a:xfrm>
+            <a:off x="1121104" y="3228515"/>
+            <a:ext cx="14423693" cy="4667928"/>
+          </a:xfrm>
+        </p:spPr>
+        <p:txBody>
+          <a:bodyPr/>
+          <a:lstStyle/>
+          <a:p>
+            <a:r>
+              <a:rPr lang="en-US" sz="3600" dirty="0"/>
+              <a:t>.</a:t>
+            </a:r>
+          </a:p>
+          <a:p>
+            <a:endParaRPr lang="en-US" sz="3600" dirty="0"/>
+          </a:p>
+          <a:p>
+            <a:r>
+              <a:rPr lang="en-US" sz="3600" dirty="0"/>
+              <a:t>Finished in 0.21546 seconds (files took 0.3575 seconds to load)</a:t>
+            </a:r>
+          </a:p>
+          <a:p>
+            <a:r>
+              <a:rPr lang="en-US" sz="3600" dirty="0"/>
+              <a:t>1 example, 0 failures</a:t>
+            </a:r>
+          </a:p>
+          <a:p>
+            <a:endParaRPr lang="en-US" sz="3600" dirty="0"/>
+          </a:p>
+        </p:txBody>
+      </p:sp>
+      <p:sp>
+        <p:nvSpPr>
+          <p:cNvPr id="3" name="Text Placeholder 2"/>
+          <p:cNvSpPr>
+            <a:spLocks noGrp="1"/>
+          </p:cNvSpPr>
+          <p:nvPr>
+            <p:ph type="body" sz="quarter" idx="11"/>
+          </p:nvPr>
+        </p:nvSpPr>
+        <p:spPr>
+          <a:xfrm>
+            <a:off x="1121104" y="1337149"/>
+            <a:ext cx="14422528" cy="1512377"/>
+          </a:xfrm>
+        </p:spPr>
+        <p:txBody>
+          <a:bodyPr/>
+          <a:lstStyle/>
+          <a:p>
+            <a:r>
+              <a:rPr lang="en-US" dirty="0" smtClean="0"/>
+              <a:t>$ </a:t>
+            </a:r>
+            <a:r>
+              <a:rPr lang="en-US" dirty="0" err="1"/>
+              <a:t>inspec</a:t>
+            </a:r>
+            <a:r>
+              <a:rPr lang="en-US" dirty="0"/>
+              <a:t> </a:t>
+            </a:r>
+            <a:r>
+              <a:rPr lang="en-US" dirty="0" smtClean="0"/>
+              <a:t>exec ~/</a:t>
+            </a:r>
+            <a:r>
+              <a:rPr lang="en-US" dirty="0"/>
+              <a:t>cookbooks/ssh/test/integration/client/</a:t>
+            </a:r>
+            <a:r>
+              <a:rPr lang="en-US" dirty="0" err="1"/>
+              <a:t>inspec</a:t>
+            </a:r>
+            <a:r>
+              <a:rPr lang="en-US" dirty="0"/>
+              <a:t>/</a:t>
+            </a:r>
+            <a:r>
+              <a:rPr lang="en-US" dirty="0" err="1"/>
+              <a:t>client_spec.rb</a:t>
+            </a:r>
+            <a:r>
+              <a:rPr lang="en-US" dirty="0"/>
+              <a:t> -t docker</a:t>
+            </a:r>
+            <a:r>
+              <a:rPr lang="en-US" dirty="0" smtClean="0"/>
+              <a:t>://CONTAINER_ID </a:t>
+            </a:r>
+            <a:endParaRPr lang="en-US" dirty="0"/>
+          </a:p>
+        </p:txBody>
+      </p:sp>
+      <p:sp>
+        <p:nvSpPr>
+          <p:cNvPr id="5" name="Title 4"/>
+          <p:cNvSpPr>
+            <a:spLocks noGrp="1"/>
+          </p:cNvSpPr>
+          <p:nvPr>
+            <p:ph type="title"/>
+          </p:nvPr>
+        </p:nvSpPr>
+        <p:spPr>
+          <a:xfrm>
+            <a:off x="608432" y="360193"/>
+            <a:ext cx="14935200" cy="828675"/>
+          </a:xfrm>
+        </p:spPr>
+        <p:txBody>
+          <a:bodyPr/>
+          <a:lstStyle/>
+          <a:p>
+            <a:r>
+              <a:rPr lang="en-US" dirty="0" smtClean="0"/>
+              <a:t>GE: </a:t>
+            </a:r>
+            <a:r>
+              <a:rPr lang="en-US" dirty="0"/>
+              <a:t>Running </a:t>
+            </a:r>
+            <a:r>
+              <a:rPr lang="en-US" dirty="0" err="1"/>
+              <a:t>InSpec</a:t>
+            </a:r>
+            <a:r>
+              <a:rPr lang="en-US" dirty="0"/>
+              <a:t> from the CLI</a:t>
+            </a:r>
+          </a:p>
+        </p:txBody>
+      </p:sp>
+    </p:spTree>
+    <p:extLst>
+      <p:ext uri="{BB962C8B-B14F-4D97-AF65-F5344CB8AC3E}">
+        <p14:creationId xmlns:p14="http://schemas.microsoft.com/office/powerpoint/2010/main" val="722678992"/>
+      </p:ext>
+    </p:extLst>
+  </p:cSld>
+  <p:clrMapOvr>
+    <a:masterClrMapping/>
+  </p:clrMapOvr>
+  <p:transition xmlns:p14="http://schemas.microsoft.com/office/powerpoint/2010/main" spd="med">
+    <p:fade/>
+  </p:transition>
+  <p:timing>
+    <p:tnLst>
+      <p:par>
+        <p:cTn xmlns:p14="http://schemas.microsoft.com/office/powerpoint/2010/main" id="1" dur="indefinite" restart="never" nodeType="tmRoot"/>
+      </p:par>
+    </p:tnLst>
+  </p:timing>
+</p:sld>
+</file>
+
+<file path=ppt/slides/slide55.xml><?xml version="1.0" encoding="utf-8"?>
 <p:sld xmlns:a="http://schemas.openxmlformats.org/drawingml/2006/main" xmlns:r="http://schemas.openxmlformats.org/officeDocument/2006/relationships" xmlns:p="http://schemas.openxmlformats.org/presentationml/2006/main">
   <p:cSld>
     <p:spTree>
@@ -29523,13 +29852,13 @@
   <p:clrMapOvr>
     <a:masterClrMapping/>
   </p:clrMapOvr>
-  <p:transition spd="med">
+  <p:transition xmlns:p14="http://schemas.microsoft.com/office/powerpoint/2010/main" spd="med">
     <p:fade/>
   </p:transition>
 </p:sld>
 </file>
 
-<file path=ppt/slides/slide55.xml><?xml version="1.0" encoding="utf-8"?>
+<file path=ppt/slides/slide56.xml><?xml version="1.0" encoding="utf-8"?>
 <p:sld xmlns:a="http://schemas.openxmlformats.org/drawingml/2006/main" xmlns:r="http://schemas.openxmlformats.org/officeDocument/2006/relationships" xmlns:p="http://schemas.openxmlformats.org/presentationml/2006/main">
   <p:cSld>
     <p:spTree>
@@ -29647,13 +29976,13 @@
   <p:clrMapOvr>
     <a:masterClrMapping/>
   </p:clrMapOvr>
-  <p:transition spd="med">
+  <p:transition xmlns:p14="http://schemas.microsoft.com/office/powerpoint/2010/main" spd="med">
     <p:fade/>
   </p:transition>
 </p:sld>
 </file>
 
-<file path=ppt/slides/slide56.xml><?xml version="1.0" encoding="utf-8"?>
+<file path=ppt/slides/slide57.xml><?xml version="1.0" encoding="utf-8"?>
 <p:sld xmlns:a="http://schemas.openxmlformats.org/drawingml/2006/main" xmlns:r="http://schemas.openxmlformats.org/officeDocument/2006/relationships" xmlns:p="http://schemas.openxmlformats.org/presentationml/2006/main">
   <p:cSld>
     <p:spTree>
@@ -29770,20 +30099,20 @@
   <p:clrMapOvr>
     <a:masterClrMapping/>
   </p:clrMapOvr>
-  <p:transition spd="med">
+  <p:transition xmlns:p14="http://schemas.microsoft.com/office/powerpoint/2010/main" spd="med">
     <p:fade/>
   </p:transition>
   <p:timing>
     <p:tnLst>
       <p:par>
-        <p:cTn id="1" dur="indefinite" restart="never" nodeType="tmRoot"/>
+        <p:cTn xmlns:p14="http://schemas.microsoft.com/office/powerpoint/2010/main" id="1" dur="indefinite" restart="never" nodeType="tmRoot"/>
       </p:par>
     </p:tnLst>
   </p:timing>
 </p:sld>
 </file>
 
-<file path=ppt/slides/slide57.xml><?xml version="1.0" encoding="utf-8"?>
+<file path=ppt/slides/slide58.xml><?xml version="1.0" encoding="utf-8"?>
 <p:sld xmlns:a="http://schemas.openxmlformats.org/drawingml/2006/main" xmlns:r="http://schemas.openxmlformats.org/officeDocument/2006/relationships" xmlns:p="http://schemas.openxmlformats.org/presentationml/2006/main">
   <p:cSld>
     <p:spTree>
@@ -29892,191 +30221,13 @@
   <p:clrMapOvr>
     <a:masterClrMapping/>
   </p:clrMapOvr>
-  <p:transition spd="med">
+  <p:transition xmlns:p14="http://schemas.microsoft.com/office/powerpoint/2010/main" spd="med">
     <p:fade/>
   </p:transition>
   <p:timing>
     <p:tnLst>
       <p:par>
-        <p:cTn id="1" dur="indefinite" restart="never" nodeType="tmRoot"/>
-      </p:par>
-    </p:tnLst>
-  </p:timing>
-</p:sld>
-</file>
-
-<file path=ppt/slides/slide58.xml><?xml version="1.0" encoding="utf-8"?>
-<p:sld xmlns:a="http://schemas.openxmlformats.org/drawingml/2006/main" xmlns:r="http://schemas.openxmlformats.org/officeDocument/2006/relationships" xmlns:p="http://schemas.openxmlformats.org/presentationml/2006/main">
-  <p:cSld>
-    <p:spTree>
-      <p:nvGrpSpPr>
-        <p:cNvPr id="1" name=""/>
-        <p:cNvGrpSpPr/>
-        <p:nvPr/>
-      </p:nvGrpSpPr>
-      <p:grpSpPr>
-        <a:xfrm>
-          <a:off x="0" y="0"/>
-          <a:ext cx="0" cy="0"/>
-          <a:chOff x="0" y="0"/>
-          <a:chExt cx="0" cy="0"/>
-        </a:xfrm>
-      </p:grpSpPr>
-      <p:sp>
-        <p:nvSpPr>
-          <p:cNvPr id="2" name="Title 1"/>
-          <p:cNvSpPr>
-            <a:spLocks noGrp="1"/>
-          </p:cNvSpPr>
-          <p:nvPr>
-            <p:ph type="ctrTitle"/>
-          </p:nvPr>
-        </p:nvSpPr>
-        <p:spPr/>
-        <p:txBody>
-          <a:bodyPr>
-            <a:normAutofit fontScale="90000"/>
-          </a:bodyPr>
-          <a:lstStyle/>
-          <a:p>
-            <a:r>
-              <a:rPr lang="en-US" dirty="0" smtClean="0"/>
-              <a:t>Conclusion</a:t>
-            </a:r>
-            <a:endParaRPr lang="en-US" dirty="0"/>
-          </a:p>
-        </p:txBody>
-      </p:sp>
-      <p:sp>
-        <p:nvSpPr>
-          <p:cNvPr id="3" name="Subtitle 2"/>
-          <p:cNvSpPr>
-            <a:spLocks noGrp="1"/>
-          </p:cNvSpPr>
-          <p:nvPr>
-            <p:ph type="subTitle" idx="1"/>
-          </p:nvPr>
-        </p:nvSpPr>
-        <p:spPr>
-          <a:xfrm>
-            <a:off x="1660524" y="3420745"/>
-            <a:ext cx="12330113" cy="4123055"/>
-          </a:xfrm>
-        </p:spPr>
-        <p:txBody>
-          <a:bodyPr/>
-          <a:lstStyle/>
-          <a:p>
-            <a:pPr marL="342900" indent="-342900">
-              <a:buFont typeface="Wingdings" panose="05000000000000000000" pitchFamily="2" charset="2"/>
-              <a:buChar char="ü"/>
-            </a:pPr>
-            <a:r>
-              <a:rPr lang="en-US" dirty="0" smtClean="0"/>
-              <a:t> Log </a:t>
-            </a:r>
-            <a:r>
-              <a:rPr lang="en-US" dirty="0"/>
-              <a:t>into your target node</a:t>
-            </a:r>
-          </a:p>
-          <a:p>
-            <a:pPr marL="342900" indent="-342900">
-              <a:buFont typeface="Wingdings" panose="05000000000000000000" pitchFamily="2" charset="2"/>
-              <a:buChar char="ü"/>
-            </a:pPr>
-            <a:r>
-              <a:rPr lang="en-US" dirty="0" smtClean="0"/>
-              <a:t> Write </a:t>
-            </a:r>
-            <a:r>
-              <a:rPr lang="en-US" dirty="0"/>
-              <a:t>a remediation recipe on that node.</a:t>
-            </a:r>
-          </a:p>
-          <a:p>
-            <a:pPr marL="457200" indent="-457200">
-              <a:buFont typeface="Wingdings" panose="05000000000000000000" pitchFamily="2" charset="2"/>
-              <a:buChar char="ü"/>
-            </a:pPr>
-            <a:r>
-              <a:rPr lang="en-US" dirty="0"/>
-              <a:t>Test the recipe with Test Kitchen</a:t>
-            </a:r>
-            <a:r>
-              <a:rPr lang="en-US" dirty="0" smtClean="0"/>
-              <a:t>.</a:t>
-            </a:r>
-          </a:p>
-          <a:p>
-            <a:pPr marL="457200" indent="-457200">
-              <a:buFont typeface="Wingdings" panose="05000000000000000000" pitchFamily="2" charset="2"/>
-              <a:buChar char="ü"/>
-            </a:pPr>
-            <a:r>
-              <a:rPr lang="en-US" dirty="0" smtClean="0"/>
-              <a:t>Test for compliance with </a:t>
-            </a:r>
-            <a:r>
-              <a:rPr lang="en-US" dirty="0" err="1" smtClean="0"/>
-              <a:t>InSpec</a:t>
-            </a:r>
-            <a:r>
-              <a:rPr lang="en-US" dirty="0" smtClean="0"/>
-              <a:t> from the CLI</a:t>
-            </a:r>
-            <a:endParaRPr lang="en-US" dirty="0"/>
-          </a:p>
-          <a:p>
-            <a:pPr marL="457200" indent="-457200">
-              <a:buFont typeface="Wingdings" panose="05000000000000000000" pitchFamily="2" charset="2"/>
-              <a:buChar char="ü"/>
-            </a:pPr>
-            <a:r>
-              <a:rPr lang="en-US" dirty="0" smtClean="0"/>
-              <a:t>Rescan </a:t>
-            </a:r>
-            <a:r>
-              <a:rPr lang="en-US" dirty="0"/>
-              <a:t>the node and ensure compliance</a:t>
-            </a:r>
-            <a:r>
-              <a:rPr lang="en-US" dirty="0" smtClean="0"/>
-              <a:t>.</a:t>
-            </a:r>
-          </a:p>
-          <a:p>
-            <a:pPr marL="457200" indent="-457200">
-              <a:buFont typeface="Wingdings" panose="05000000000000000000" pitchFamily="2" charset="2"/>
-              <a:buChar char="ü"/>
-            </a:pPr>
-            <a:endParaRPr lang="en-US" dirty="0"/>
-          </a:p>
-          <a:p>
-            <a:endParaRPr lang="en-US" dirty="0"/>
-          </a:p>
-          <a:p>
-            <a:endParaRPr lang="en-US" dirty="0"/>
-          </a:p>
-        </p:txBody>
-      </p:sp>
-    </p:spTree>
-    <p:extLst>
-      <p:ext uri="{BB962C8B-B14F-4D97-AF65-F5344CB8AC3E}">
-        <p14:creationId xmlns:p14="http://schemas.microsoft.com/office/powerpoint/2010/main" val="1996638172"/>
-      </p:ext>
-    </p:extLst>
-  </p:cSld>
-  <p:clrMapOvr>
-    <a:masterClrMapping/>
-  </p:clrMapOvr>
-  <p:transition spd="med">
-    <p:fade/>
-  </p:transition>
-  <p:timing>
-    <p:tnLst>
-      <p:par>
-        <p:cTn id="1" dur="indefinite" restart="never" nodeType="tmRoot"/>
+        <p:cTn xmlns:p14="http://schemas.microsoft.com/office/powerpoint/2010/main" id="1" dur="indefinite" restart="never" nodeType="tmRoot"/>
       </p:par>
     </p:tnLst>
   </p:timing>
@@ -30117,7 +30268,11 @@
           </a:bodyPr>
           <a:lstStyle/>
           <a:p>
-            <a:endParaRPr lang="en-US"/>
+            <a:r>
+              <a:rPr lang="en-US" dirty="0" smtClean="0"/>
+              <a:t>Conclusion</a:t>
+            </a:r>
+            <a:endParaRPr lang="en-US" dirty="0"/>
           </a:p>
         </p:txBody>
       </p:sp>
@@ -30131,120 +30286,126 @@
             <p:ph type="subTitle" idx="1"/>
           </p:nvPr>
         </p:nvSpPr>
-        <p:spPr/>
+        <p:spPr>
+          <a:xfrm>
+            <a:off x="1660524" y="3420745"/>
+            <a:ext cx="12330113" cy="4123055"/>
+          </a:xfrm>
+        </p:spPr>
         <p:txBody>
           <a:bodyPr/>
           <a:lstStyle/>
           <a:p>
-            <a:endParaRPr lang="en-US" dirty="0" smtClean="0"/>
-          </a:p>
-          <a:p>
-            <a:r>
-              <a:rPr lang="en-US" dirty="0" err="1"/>
-              <a:t>i</a:t>
+            <a:pPr marL="342900" indent="-342900">
+              <a:buFont typeface="Wingdings" panose="05000000000000000000" pitchFamily="2" charset="2"/>
+              <a:buChar char="ü"/>
+            </a:pPr>
+            <a:r>
+              <a:rPr lang="en-US" dirty="0" smtClean="0"/>
+              <a:t> Log </a:t>
             </a:r>
             <a:r>
               <a:rPr lang="en-US" dirty="0"/>
-              <a:t> believe so.  that's how </a:t>
-            </a:r>
-            <a:r>
-              <a:rPr lang="en-US" dirty="0" err="1"/>
-              <a:t>i</a:t>
+              <a:t>into your target node</a:t>
+            </a:r>
+          </a:p>
+          <a:p>
+            <a:pPr marL="342900" indent="-342900">
+              <a:buFont typeface="Wingdings" panose="05000000000000000000" pitchFamily="2" charset="2"/>
+              <a:buChar char="ü"/>
+            </a:pPr>
+            <a:r>
+              <a:rPr lang="en-US" dirty="0" smtClean="0"/>
+              <a:t> Write </a:t>
             </a:r>
             <a:r>
               <a:rPr lang="en-US" dirty="0"/>
-              <a:t> have it running,  </a:t>
-            </a:r>
-            <a:r>
-              <a:rPr lang="en-US" dirty="0" err="1"/>
-              <a:t>i've</a:t>
-            </a:r>
+              <a:t>a remediation recipe on that node.</a:t>
+            </a:r>
+          </a:p>
+          <a:p>
+            <a:pPr marL="457200" indent="-457200">
+              <a:buFont typeface="Wingdings" panose="05000000000000000000" pitchFamily="2" charset="2"/>
+              <a:buChar char="ü"/>
+            </a:pPr>
             <a:r>
               <a:rPr lang="en-US" dirty="0"/>
-              <a:t> also been running a reconfigure and restart after </a:t>
-            </a:r>
-            <a:r>
-              <a:rPr lang="en-US" dirty="0" err="1"/>
-              <a:t>i</a:t>
+              <a:t>Test the recipe with Test Kitchen</a:t>
+            </a:r>
+            <a:r>
+              <a:rPr lang="en-US" dirty="0" smtClean="0"/>
+              <a:t>.</a:t>
+            </a:r>
+          </a:p>
+          <a:p>
+            <a:pPr marL="457200" indent="-457200">
+              <a:buFont typeface="Wingdings" panose="05000000000000000000" pitchFamily="2" charset="2"/>
+              <a:buChar char="ü"/>
+            </a:pPr>
+            <a:r>
+              <a:rPr lang="en-US" dirty="0" smtClean="0"/>
+              <a:t>Test for compliance with </a:t>
+            </a:r>
+            <a:r>
+              <a:rPr lang="en-US" dirty="0" err="1" smtClean="0"/>
+              <a:t>InSpec</a:t>
+            </a:r>
+            <a:r>
+              <a:rPr lang="en-US" dirty="0" smtClean="0"/>
+              <a:t> from the CLI</a:t>
+            </a:r>
+            <a:endParaRPr lang="en-US" dirty="0"/>
+          </a:p>
+          <a:p>
+            <a:pPr marL="457200" indent="-457200">
+              <a:buFont typeface="Wingdings" panose="05000000000000000000" pitchFamily="2" charset="2"/>
+              <a:buChar char="ü"/>
+            </a:pPr>
+            <a:r>
+              <a:rPr lang="en-US" dirty="0" smtClean="0"/>
+              <a:t>Rescan </a:t>
             </a:r>
             <a:r>
               <a:rPr lang="en-US" dirty="0"/>
-              <a:t> upgrade the package</a:t>
-            </a:r>
-          </a:p>
-          <a:p>
-            <a:r>
-              <a:rPr lang="en-US" dirty="0"/>
-              <a:t>​[9:04 AM] </a:t>
-            </a:r>
-          </a:p>
-          <a:p>
-            <a:r>
-              <a:rPr lang="en-US" dirty="0" err="1"/>
-              <a:t>steve_delfante</a:t>
-            </a:r>
-            <a:r>
-              <a:rPr lang="en-US" dirty="0"/>
-              <a:t> `sudo chef-compliance-</a:t>
-            </a:r>
-            <a:r>
-              <a:rPr lang="en-US" dirty="0" err="1"/>
-              <a:t>ctl</a:t>
-            </a:r>
-            <a:r>
-              <a:rPr lang="en-US" dirty="0"/>
-              <a:t> reconfigure` will reconfigure it but s=does that also restart it?</a:t>
-            </a:r>
-          </a:p>
-          <a:p>
-            <a:r>
-              <a:rPr lang="en-US" dirty="0"/>
-              <a:t>new messages</a:t>
-            </a:r>
-          </a:p>
-          <a:p>
-            <a:r>
-              <a:rPr lang="en-US" dirty="0"/>
-              <a:t>​[9:04 AM] </a:t>
-            </a:r>
-          </a:p>
-          <a:p>
-            <a:r>
-              <a:rPr lang="en-US" dirty="0" err="1"/>
-              <a:t>kennon</a:t>
-            </a:r>
-            <a:r>
-              <a:rPr lang="en-US" dirty="0"/>
-              <a:t> not always, you should also run `sudo chef-compliance-</a:t>
-            </a:r>
-            <a:r>
-              <a:rPr lang="en-US" dirty="0" err="1"/>
-              <a:t>ctl</a:t>
-            </a:r>
-            <a:r>
-              <a:rPr lang="en-US" dirty="0"/>
-              <a:t> restart</a:t>
-            </a:r>
+              <a:t>the node and ensure compliance</a:t>
+            </a:r>
+            <a:r>
+              <a:rPr lang="en-US" dirty="0" smtClean="0"/>
+              <a:t>.</a:t>
+            </a:r>
+          </a:p>
+          <a:p>
+            <a:pPr marL="457200" indent="-457200">
+              <a:buFont typeface="Wingdings" panose="05000000000000000000" pitchFamily="2" charset="2"/>
+              <a:buChar char="ü"/>
+            </a:pPr>
+            <a:endParaRPr lang="en-US" dirty="0"/>
+          </a:p>
+          <a:p>
+            <a:endParaRPr lang="en-US" dirty="0"/>
+          </a:p>
+          <a:p>
+            <a:endParaRPr lang="en-US" dirty="0"/>
           </a:p>
         </p:txBody>
       </p:sp>
     </p:spTree>
     <p:extLst>
       <p:ext uri="{BB962C8B-B14F-4D97-AF65-F5344CB8AC3E}">
-        <p14:creationId xmlns:p14="http://schemas.microsoft.com/office/powerpoint/2010/main" val="108599519"/>
+        <p14:creationId xmlns:p14="http://schemas.microsoft.com/office/powerpoint/2010/main" val="1996638172"/>
       </p:ext>
     </p:extLst>
   </p:cSld>
   <p:clrMapOvr>
     <a:masterClrMapping/>
   </p:clrMapOvr>
-  <p:transition spd="med">
+  <p:transition xmlns:p14="http://schemas.microsoft.com/office/powerpoint/2010/main" spd="med">
     <p:fade/>
   </p:transition>
   <p:timing>
     <p:tnLst>
       <p:par>
-        <p:cTn id="1" dur="indefinite" restart="never" nodeType="tmRoot"/>
+        <p:cTn xmlns:p14="http://schemas.microsoft.com/office/powerpoint/2010/main" id="1" dur="indefinite" restart="never" nodeType="tmRoot"/>
       </p:par>
     </p:tnLst>
   </p:timing>
@@ -30335,27 +30496,7 @@
             </a:pPr>
             <a:r>
               <a:rPr lang="en-US" dirty="0" smtClean="0"/>
-              <a:t>Select the </a:t>
-            </a:r>
-            <a:r>
-              <a:rPr lang="en-US" b="1" dirty="0" smtClean="0"/>
-              <a:t>default</a:t>
-            </a:r>
-            <a:r>
-              <a:rPr lang="en-US" dirty="0" smtClean="0"/>
-              <a:t> environment. You may need to type the </a:t>
-            </a:r>
-            <a:r>
-              <a:rPr lang="en-US" b="1" dirty="0"/>
-              <a:t>default</a:t>
-            </a:r>
-            <a:r>
-              <a:rPr lang="en-US" dirty="0"/>
-              <a:t> environment </a:t>
-            </a:r>
-            <a:r>
-              <a:rPr lang="en-US" dirty="0" smtClean="0"/>
-              <a:t>initially.</a:t>
+              <a:t>Leave environment blank.  A ‘default’ environment will be used</a:t>
             </a:r>
           </a:p>
           <a:p>
@@ -30503,13 +30644,13 @@
   <p:clrMapOvr>
     <a:masterClrMapping/>
   </p:clrMapOvr>
-  <p:transition spd="med">
+  <p:transition xmlns:p14="http://schemas.microsoft.com/office/powerpoint/2010/main" spd="med">
     <p:fade/>
   </p:transition>
   <p:timing>
     <p:tnLst>
       <p:par>
-        <p:cTn id="1" dur="indefinite" restart="never" nodeType="tmRoot"/>
+        <p:cTn xmlns:p14="http://schemas.microsoft.com/office/powerpoint/2010/main" id="1" dur="indefinite" restart="never" nodeType="tmRoot"/>
       </p:par>
     </p:tnLst>
   </p:timing>
@@ -30517,6 +30658,174 @@
 </file>
 
 <file path=ppt/slides/slide60.xml><?xml version="1.0" encoding="utf-8"?>
+<p:sld xmlns:a="http://schemas.openxmlformats.org/drawingml/2006/main" xmlns:r="http://schemas.openxmlformats.org/officeDocument/2006/relationships" xmlns:p="http://schemas.openxmlformats.org/presentationml/2006/main">
+  <p:cSld>
+    <p:spTree>
+      <p:nvGrpSpPr>
+        <p:cNvPr id="1" name=""/>
+        <p:cNvGrpSpPr/>
+        <p:nvPr/>
+      </p:nvGrpSpPr>
+      <p:grpSpPr>
+        <a:xfrm>
+          <a:off x="0" y="0"/>
+          <a:ext cx="0" cy="0"/>
+          <a:chOff x="0" y="0"/>
+          <a:chExt cx="0" cy="0"/>
+        </a:xfrm>
+      </p:grpSpPr>
+      <p:sp>
+        <p:nvSpPr>
+          <p:cNvPr id="2" name="Title 1"/>
+          <p:cNvSpPr>
+            <a:spLocks noGrp="1"/>
+          </p:cNvSpPr>
+          <p:nvPr>
+            <p:ph type="ctrTitle"/>
+          </p:nvPr>
+        </p:nvSpPr>
+        <p:spPr/>
+        <p:txBody>
+          <a:bodyPr>
+            <a:normAutofit fontScale="90000"/>
+          </a:bodyPr>
+          <a:lstStyle/>
+          <a:p>
+            <a:endParaRPr lang="en-US"/>
+          </a:p>
+        </p:txBody>
+      </p:sp>
+      <p:sp>
+        <p:nvSpPr>
+          <p:cNvPr id="3" name="Subtitle 2"/>
+          <p:cNvSpPr>
+            <a:spLocks noGrp="1"/>
+          </p:cNvSpPr>
+          <p:nvPr>
+            <p:ph type="subTitle" idx="1"/>
+          </p:nvPr>
+        </p:nvSpPr>
+        <p:spPr/>
+        <p:txBody>
+          <a:bodyPr/>
+          <a:lstStyle/>
+          <a:p>
+            <a:endParaRPr lang="en-US" dirty="0" smtClean="0"/>
+          </a:p>
+          <a:p>
+            <a:r>
+              <a:rPr lang="en-US" dirty="0" err="1"/>
+              <a:t>i</a:t>
+            </a:r>
+            <a:r>
+              <a:rPr lang="en-US" dirty="0"/>
+              <a:t> believe so.  that's how </a:t>
+            </a:r>
+            <a:r>
+              <a:rPr lang="en-US" dirty="0" err="1"/>
+              <a:t>i</a:t>
+            </a:r>
+            <a:r>
+              <a:rPr lang="en-US" dirty="0"/>
+              <a:t> have it running,  </a:t>
+            </a:r>
+            <a:r>
+              <a:rPr lang="en-US" dirty="0" err="1"/>
+              <a:t>i've</a:t>
+            </a:r>
+            <a:r>
+              <a:rPr lang="en-US" dirty="0"/>
+              <a:t> also been running a reconfigure and restart after </a:t>
+            </a:r>
+            <a:r>
+              <a:rPr lang="en-US" dirty="0" err="1"/>
+              <a:t>i</a:t>
+            </a:r>
+            <a:r>
+              <a:rPr lang="en-US" dirty="0"/>
+              <a:t> upgrade the package</a:t>
+            </a:r>
+          </a:p>
+          <a:p>
+            <a:r>
+              <a:rPr lang="en-US" dirty="0"/>
+              <a:t>​[9:04 AM] </a:t>
+            </a:r>
+          </a:p>
+          <a:p>
+            <a:r>
+              <a:rPr lang="en-US" dirty="0" err="1"/>
+              <a:t>steve_delfante</a:t>
+            </a:r>
+            <a:r>
+              <a:rPr lang="en-US" dirty="0"/>
+              <a:t> `sudo chef-compliance-</a:t>
+            </a:r>
+            <a:r>
+              <a:rPr lang="en-US" dirty="0" err="1"/>
+              <a:t>ctl</a:t>
+            </a:r>
+            <a:r>
+              <a:rPr lang="en-US" dirty="0"/>
+              <a:t> reconfigure` will reconfigure it but s=does that also restart it?</a:t>
+            </a:r>
+          </a:p>
+          <a:p>
+            <a:r>
+              <a:rPr lang="en-US" dirty="0"/>
+              <a:t>new messages</a:t>
+            </a:r>
+          </a:p>
+          <a:p>
+            <a:r>
+              <a:rPr lang="en-US" dirty="0"/>
+              <a:t>​[9:04 AM] </a:t>
+            </a:r>
+          </a:p>
+          <a:p>
+            <a:r>
+              <a:rPr lang="en-US" dirty="0" err="1"/>
+              <a:t>kennon</a:t>
+            </a:r>
+            <a:r>
+              <a:rPr lang="en-US" dirty="0"/>
+              <a:t> not always, you should also run `sudo chef-compliance-</a:t>
+            </a:r>
+            <a:r>
+              <a:rPr lang="en-US" dirty="0" err="1"/>
+              <a:t>ctl</a:t>
+            </a:r>
+            <a:r>
+              <a:rPr lang="en-US" dirty="0"/>
+              <a:t> restart</a:t>
+            </a:r>
+          </a:p>
+        </p:txBody>
+      </p:sp>
+    </p:spTree>
+    <p:extLst>
+      <p:ext uri="{BB962C8B-B14F-4D97-AF65-F5344CB8AC3E}">
+        <p14:creationId xmlns:p14="http://schemas.microsoft.com/office/powerpoint/2010/main" val="108599519"/>
+      </p:ext>
+    </p:extLst>
+  </p:cSld>
+  <p:clrMapOvr>
+    <a:masterClrMapping/>
+  </p:clrMapOvr>
+  <p:transition xmlns:p14="http://schemas.microsoft.com/office/powerpoint/2010/main" spd="med">
+    <p:fade/>
+  </p:transition>
+  <p:timing>
+    <p:tnLst>
+      <p:par>
+        <p:cTn xmlns:p14="http://schemas.microsoft.com/office/powerpoint/2010/main" id="1" dur="indefinite" restart="never" nodeType="tmRoot"/>
+      </p:par>
+    </p:tnLst>
+  </p:timing>
+</p:sld>
+</file>
+
+<file path=ppt/slides/slide61.xml><?xml version="1.0" encoding="utf-8"?>
 <p:sld xmlns:a="http://schemas.openxmlformats.org/drawingml/2006/main" xmlns:r="http://schemas.openxmlformats.org/officeDocument/2006/relationships" xmlns:p="http://schemas.openxmlformats.org/presentationml/2006/main">
   <p:cSld>
     <p:bg>
@@ -30690,13 +30999,13 @@
   <p:clrMapOvr>
     <a:masterClrMapping/>
   </p:clrMapOvr>
-  <p:transition spd="med">
+  <p:transition xmlns:p14="http://schemas.microsoft.com/office/powerpoint/2010/main" spd="med">
     <p:fade/>
   </p:transition>
 </p:sld>
 </file>
 
-<file path=ppt/slides/slide61.xml><?xml version="1.0" encoding="utf-8"?>
+<file path=ppt/slides/slide62.xml><?xml version="1.0" encoding="utf-8"?>
 <p:sld xmlns:a="http://schemas.openxmlformats.org/drawingml/2006/main" xmlns:r="http://schemas.openxmlformats.org/officeDocument/2006/relationships" xmlns:p="http://schemas.openxmlformats.org/presentationml/2006/main">
   <p:cSld>
     <p:spTree>
@@ -30884,7 +31193,7 @@
   <p:clrMapOvr>
     <a:masterClrMapping/>
   </p:clrMapOvr>
-  <p:transition spd="med">
+  <p:transition xmlns:p14="http://schemas.microsoft.com/office/powerpoint/2010/main" spd="med">
     <p:fade/>
   </p:transition>
 </p:sld>
@@ -31058,20 +31367,20 @@
     </p:spTree>
     <p:extLst>
       <p:ext uri="{BB962C8B-B14F-4D97-AF65-F5344CB8AC3E}">
-        <p14:creationId xmlns:p14="http://schemas.microsoft.com/office/powerpoint/2010/main" val="1041467821"/>
+        <p14:creationId xmlns:p14="http://schemas.microsoft.com/office/powerpoint/2010/main" val="74563133"/>
       </p:ext>
     </p:extLst>
   </p:cSld>
   <p:clrMapOvr>
     <a:masterClrMapping/>
   </p:clrMapOvr>
-  <p:transition spd="med">
+  <p:transition xmlns:p14="http://schemas.microsoft.com/office/powerpoint/2010/main" spd="med">
     <p:fade/>
   </p:transition>
   <p:timing>
     <p:tnLst>
       <p:par>
-        <p:cTn id="1" dur="indefinite" restart="never" nodeType="tmRoot"/>
+        <p:cTn xmlns:p14="http://schemas.microsoft.com/office/powerpoint/2010/main" id="1" dur="indefinite" restart="never" nodeType="tmRoot"/>
       </p:par>
     </p:tnLst>
   </p:timing>
@@ -31293,13 +31602,13 @@
   <p:clrMapOvr>
     <a:masterClrMapping/>
   </p:clrMapOvr>
-  <p:transition spd="med">
+  <p:transition xmlns:p14="http://schemas.microsoft.com/office/powerpoint/2010/main" spd="med">
     <p:fade/>
   </p:transition>
   <p:timing>
     <p:tnLst>
       <p:par>
-        <p:cTn id="1" dur="indefinite" restart="never" nodeType="tmRoot"/>
+        <p:cTn xmlns:p14="http://schemas.microsoft.com/office/powerpoint/2010/main" id="1" dur="indefinite" restart="never" nodeType="tmRoot"/>
       </p:par>
     </p:tnLst>
   </p:timing>
@@ -31460,13 +31769,13 @@
   <p:clrMapOvr>
     <a:masterClrMapping/>
   </p:clrMapOvr>
-  <p:transition spd="med">
+  <p:transition xmlns:p14="http://schemas.microsoft.com/office/powerpoint/2010/main" spd="med">
     <p:fade/>
   </p:transition>
   <p:timing>
     <p:tnLst>
       <p:par>
-        <p:cTn id="1" dur="indefinite" restart="never" nodeType="tmRoot"/>
+        <p:cTn xmlns:p14="http://schemas.microsoft.com/office/powerpoint/2010/main" id="1" dur="indefinite" restart="never" nodeType="tmRoot"/>
       </p:par>
     </p:tnLst>
   </p:timing>
@@ -31849,7 +32158,7 @@
   <a:extraClrSchemeLst/>
   <a:extLst>
     <a:ext uri="{05A4C25C-085E-4340-85A3-A5531E510DB2}">
-      <thm15:themeFamily xmlns:thm15="http://schemas.microsoft.com/office/thememl/2012/main" name="Chef-TemplateComps_v09-16x9-Light.potx" id="{078CEFDB-FA7A-4E36-9964-13EF367585CB}" vid="{8B87B0F3-7308-43D5-8388-E1B49EA02652}"/>
+      <thm15:themeFamily xmlns="" xmlns:thm15="http://schemas.microsoft.com/office/thememl/2012/main" name="Chef-TemplateComps_v09-16x9-Light.potx" id="{078CEFDB-FA7A-4E36-9964-13EF367585CB}" vid="{8B87B0F3-7308-43D5-8388-E1B49EA02652}"/>
     </a:ext>
   </a:extLst>
 </a:theme>
@@ -32231,7 +32540,7 @@
   <a:extraClrSchemeLst/>
   <a:extLst>
     <a:ext uri="{05A4C25C-085E-4340-85A3-A5531E510DB2}">
-      <thm15:themeFamily xmlns:thm15="http://schemas.microsoft.com/office/thememl/2012/main" name="Chef-TemplateComps_v09-16x9-Light.potx" id="{078CEFDB-FA7A-4E36-9964-13EF367585CB}" vid="{8B87B0F3-7308-43D5-8388-E1B49EA02652}"/>
+      <thm15:themeFamily xmlns="" xmlns:thm15="http://schemas.microsoft.com/office/thememl/2012/main" name="Chef-TemplateComps_v09-16x9-Light.potx" id="{078CEFDB-FA7A-4E36-9964-13EF367585CB}" vid="{8B87B0F3-7308-43D5-8388-E1B49EA02652}"/>
     </a:ext>
   </a:extLst>
 </a:theme>

</xml_diff>

<commit_message>
Spell out 'command line interface'
</commit_message>
<xml_diff>
--- a/03-initial-configuration-scans.pptx
+++ b/03-initial-configuration-scans.pptx
@@ -204,7 +204,7 @@
   </p:defaultTextStyle>
   <p:extLst>
     <p:ext uri="{EFAFB233-063F-42B5-8137-9DF3F51BA10A}">
-      <p15:sldGuideLst xmlns="" xmlns:p15="http://schemas.microsoft.com/office/powerpoint/2012/main">
+      <p15:sldGuideLst xmlns:p15="http://schemas.microsoft.com/office/powerpoint/2012/main" xmlns="">
         <p15:guide id="1" orient="horz" pos="894">
           <p15:clr>
             <a:srgbClr val="A4A3A4"/>
@@ -218,7 +218,7 @@
       </p15:sldGuideLst>
     </p:ext>
     <p:ext uri="{2D200454-40CA-4A62-9FC3-DE9A4176ACB9}">
-      <p15:notesGuideLst xmlns="" xmlns:p15="http://schemas.microsoft.com/office/powerpoint/2012/main"/>
+      <p15:notesGuideLst xmlns:p15="http://schemas.microsoft.com/office/powerpoint/2012/main" xmlns=""/>
     </p:ext>
   </p:extLst>
 </p:presentation>
@@ -21479,8 +21479,13 @@
             </a:r>
             <a:r>
               <a:rPr lang="en-US" dirty="0" smtClean="0"/>
-              <a:t> from the CLI.</a:t>
-            </a:r>
+              <a:t> from the </a:t>
+            </a:r>
+            <a:r>
+              <a:rPr lang="en-US" dirty="0" smtClean="0"/>
+              <a:t>command line interface.</a:t>
+            </a:r>
+            <a:endParaRPr lang="en-US" dirty="0" smtClean="0"/>
           </a:p>
           <a:p>
             <a:pPr marL="457200" indent="-457200">
@@ -23327,7 +23332,6 @@
               <a:rPr lang="en-US" sz="4900" dirty="0"/>
               <a:t>Create and change to a ‘cookbooks’ directory</a:t>
             </a:r>
-            <a:endParaRPr lang="en-US" sz="4900" dirty="0"/>
           </a:p>
         </p:txBody>
       </p:sp>
@@ -24536,8 +24540,21 @@
             </a:r>
             <a:r>
               <a:rPr lang="en-US" dirty="0"/>
-              <a:t> from the CLI</a:t>
-            </a:r>
+              <a:t> from the </a:t>
+            </a:r>
+            <a:r>
+              <a:rPr lang="en-US" dirty="0" smtClean="0"/>
+              <a:t>comman</a:t>
+            </a:r>
+            <a:r>
+              <a:rPr lang="en-US" dirty="0" smtClean="0"/>
+              <a:t>d line interface (</a:t>
+            </a:r>
+            <a:r>
+              <a:rPr lang="en-US" dirty="0" smtClean="0"/>
+              <a:t>CLI)</a:t>
+            </a:r>
+            <a:endParaRPr lang="en-US" dirty="0"/>
           </a:p>
           <a:p>
             <a:pPr marL="457200" indent="-457200">
@@ -26642,8 +26659,13 @@
             </a:r>
             <a:r>
               <a:rPr lang="en-US" dirty="0"/>
-              <a:t> from the CLI</a:t>
-            </a:r>
+              <a:t> from the </a:t>
+            </a:r>
+            <a:r>
+              <a:rPr lang="en-US" dirty="0" smtClean="0"/>
+              <a:t>command line interface (CLI)</a:t>
+            </a:r>
+            <a:endParaRPr lang="en-US" dirty="0"/>
           </a:p>
           <a:p>
             <a:pPr marL="457200" indent="-457200">
@@ -27649,7 +27671,15 @@
             </a:r>
             <a:r>
               <a:rPr lang="en-US" dirty="0" smtClean="0"/>
-              <a:t> from the CLI</a:t>
+              <a:t> from the </a:t>
+            </a:r>
+            <a:r>
+              <a:rPr lang="en-US" dirty="0" smtClean="0"/>
+              <a:t>command </a:t>
+            </a:r>
+            <a:r>
+              <a:rPr lang="en-US" smtClean="0"/>
+              <a:t>line interface (CLI)</a:t>
             </a:r>
             <a:endParaRPr lang="en-US" dirty="0"/>
           </a:p>
@@ -27665,7 +27695,12 @@
             <p:ph type="subTitle" idx="1"/>
           </p:nvPr>
         </p:nvSpPr>
-        <p:spPr/>
+        <p:spPr>
+          <a:xfrm>
+            <a:off x="1671638" y="3525842"/>
+            <a:ext cx="12319000" cy="3346421"/>
+          </a:xfrm>
+        </p:spPr>
         <p:txBody>
           <a:bodyPr/>
           <a:lstStyle/>
@@ -32158,7 +32193,7 @@
   <a:extraClrSchemeLst/>
   <a:extLst>
     <a:ext uri="{05A4C25C-085E-4340-85A3-A5531E510DB2}">
-      <thm15:themeFamily xmlns="" xmlns:thm15="http://schemas.microsoft.com/office/thememl/2012/main" name="Chef-TemplateComps_v09-16x9-Light.potx" id="{078CEFDB-FA7A-4E36-9964-13EF367585CB}" vid="{8B87B0F3-7308-43D5-8388-E1B49EA02652}"/>
+      <thm15:themeFamily xmlns:thm15="http://schemas.microsoft.com/office/thememl/2012/main" xmlns="" name="Chef-TemplateComps_v09-16x9-Light.potx" id="{078CEFDB-FA7A-4E36-9964-13EF367585CB}" vid="{8B87B0F3-7308-43D5-8388-E1B49EA02652}"/>
     </a:ext>
   </a:extLst>
 </a:theme>
@@ -32540,7 +32575,7 @@
   <a:extraClrSchemeLst/>
   <a:extLst>
     <a:ext uri="{05A4C25C-085E-4340-85A3-A5531E510DB2}">
-      <thm15:themeFamily xmlns="" xmlns:thm15="http://schemas.microsoft.com/office/thememl/2012/main" name="Chef-TemplateComps_v09-16x9-Light.potx" id="{078CEFDB-FA7A-4E36-9964-13EF367585CB}" vid="{8B87B0F3-7308-43D5-8388-E1B49EA02652}"/>
+      <thm15:themeFamily xmlns:thm15="http://schemas.microsoft.com/office/thememl/2012/main" xmlns="" name="Chef-TemplateComps_v09-16x9-Light.potx" id="{078CEFDB-FA7A-4E36-9964-13EF367585CB}" vid="{8B87B0F3-7308-43D5-8388-E1B49EA02652}"/>
     </a:ext>
   </a:extLst>
 </a:theme>

</xml_diff>

<commit_message>
Add a period after 'Log into your target node.'
</commit_message>
<xml_diff>
--- a/03-initial-configuration-scans.pptx
+++ b/03-initial-configuration-scans.pptx
@@ -204,7 +204,7 @@
   </p:defaultTextStyle>
   <p:extLst>
     <p:ext uri="{EFAFB233-063F-42B5-8137-9DF3F51BA10A}">
-      <p15:sldGuideLst xmlns:p15="http://schemas.microsoft.com/office/powerpoint/2012/main" xmlns="">
+      <p15:sldGuideLst xmlns="" xmlns:p15="http://schemas.microsoft.com/office/powerpoint/2012/main">
         <p15:guide id="1" orient="horz" pos="894">
           <p15:clr>
             <a:srgbClr val="A4A3A4"/>
@@ -218,7 +218,7 @@
       </p15:sldGuideLst>
     </p:ext>
     <p:ext uri="{2D200454-40CA-4A62-9FC3-DE9A4176ACB9}">
-      <p15:notesGuideLst xmlns:p15="http://schemas.microsoft.com/office/powerpoint/2012/main" xmlns=""/>
+      <p15:notesGuideLst xmlns="" xmlns:p15="http://schemas.microsoft.com/office/powerpoint/2012/main"/>
     </p:ext>
   </p:extLst>
 </p:presentation>
@@ -335,7 +335,7 @@
               <a:pPr>
                 <a:defRPr/>
               </a:pPr>
-              <a:t>1/19/16</a:t>
+              <a:t>1/20/16</a:t>
             </a:fld>
             <a:endParaRPr lang="en-US" dirty="0"/>
           </a:p>
@@ -518,7 +518,7 @@
               <a:pPr>
                 <a:defRPr/>
               </a:pPr>
-              <a:t>1/19/16</a:t>
+              <a:t>1/20/16</a:t>
             </a:fld>
             <a:endParaRPr lang="en-US" dirty="0"/>
           </a:p>
@@ -21479,13 +21479,8 @@
             </a:r>
             <a:r>
               <a:rPr lang="en-US" dirty="0" smtClean="0"/>
-              <a:t> from the </a:t>
-            </a:r>
-            <a:r>
-              <a:rPr lang="en-US" dirty="0" smtClean="0"/>
-              <a:t>command line interface.</a:t>
-            </a:r>
-            <a:endParaRPr lang="en-US" dirty="0" smtClean="0"/>
+              <a:t> from the command line interface.</a:t>
+            </a:r>
           </a:p>
           <a:p>
             <a:pPr marL="457200" indent="-457200">
@@ -22849,8 +22844,13 @@
             </a:pPr>
             <a:r>
               <a:rPr lang="en-US" dirty="0"/>
-              <a:t>Log into your target node</a:t>
-            </a:r>
+              <a:t>Log into your target </a:t>
+            </a:r>
+            <a:r>
+              <a:rPr lang="en-US" dirty="0" smtClean="0"/>
+              <a:t>node.</a:t>
+            </a:r>
+            <a:endParaRPr lang="en-US" dirty="0"/>
           </a:p>
           <a:p>
             <a:pPr marL="342900" indent="-342900">
@@ -24502,8 +24502,13 @@
             </a:pPr>
             <a:r>
               <a:rPr lang="en-US" dirty="0"/>
-              <a:t>Log into your target node</a:t>
-            </a:r>
+              <a:t>Log into your target </a:t>
+            </a:r>
+            <a:r>
+              <a:rPr lang="en-US" dirty="0" smtClean="0"/>
+              <a:t>node.</a:t>
+            </a:r>
+            <a:endParaRPr lang="en-US" dirty="0"/>
           </a:p>
           <a:p>
             <a:pPr marL="342900" indent="-342900">
@@ -24544,15 +24549,7 @@
             </a:r>
             <a:r>
               <a:rPr lang="en-US" dirty="0" smtClean="0"/>
-              <a:t>comman</a:t>
-            </a:r>
-            <a:r>
-              <a:rPr lang="en-US" dirty="0" smtClean="0"/>
-              <a:t>d line interface (</a:t>
-            </a:r>
-            <a:r>
-              <a:rPr lang="en-US" dirty="0" smtClean="0"/>
-              <a:t>CLI)</a:t>
+              <a:t>command line interface (CLI)</a:t>
             </a:r>
             <a:endParaRPr lang="en-US" dirty="0"/>
           </a:p>
@@ -26621,8 +26618,13 @@
             </a:pPr>
             <a:r>
               <a:rPr lang="en-US" dirty="0"/>
-              <a:t>Log into your target node</a:t>
-            </a:r>
+              <a:t>Log into your target </a:t>
+            </a:r>
+            <a:r>
+              <a:rPr lang="en-US" dirty="0" smtClean="0"/>
+              <a:t>node.</a:t>
+            </a:r>
+            <a:endParaRPr lang="en-US" dirty="0"/>
           </a:p>
           <a:p>
             <a:pPr marL="342900" indent="-342900">
@@ -27671,11 +27673,7 @@
             </a:r>
             <a:r>
               <a:rPr lang="en-US" dirty="0" smtClean="0"/>
-              <a:t> from the </a:t>
-            </a:r>
-            <a:r>
-              <a:rPr lang="en-US" dirty="0" smtClean="0"/>
-              <a:t>command </a:t>
+              <a:t> from the command </a:t>
             </a:r>
             <a:r>
               <a:rPr lang="en-US" smtClean="0"/>
@@ -30341,8 +30339,13 @@
             </a:r>
             <a:r>
               <a:rPr lang="en-US" dirty="0"/>
-              <a:t>into your target node</a:t>
-            </a:r>
+              <a:t>into your target </a:t>
+            </a:r>
+            <a:r>
+              <a:rPr lang="en-US" dirty="0" smtClean="0"/>
+              <a:t>node.</a:t>
+            </a:r>
+            <a:endParaRPr lang="en-US" dirty="0"/>
           </a:p>
           <a:p>
             <a:pPr marL="342900" indent="-342900">
@@ -32193,7 +32196,7 @@
   <a:extraClrSchemeLst/>
   <a:extLst>
     <a:ext uri="{05A4C25C-085E-4340-85A3-A5531E510DB2}">
-      <thm15:themeFamily xmlns:thm15="http://schemas.microsoft.com/office/thememl/2012/main" xmlns="" name="Chef-TemplateComps_v09-16x9-Light.potx" id="{078CEFDB-FA7A-4E36-9964-13EF367585CB}" vid="{8B87B0F3-7308-43D5-8388-E1B49EA02652}"/>
+      <thm15:themeFamily xmlns="" xmlns:thm15="http://schemas.microsoft.com/office/thememl/2012/main" name="Chef-TemplateComps_v09-16x9-Light.potx" id="{078CEFDB-FA7A-4E36-9964-13EF367585CB}" vid="{8B87B0F3-7308-43D5-8388-E1B49EA02652}"/>
     </a:ext>
   </a:extLst>
 </a:theme>
@@ -32575,7 +32578,7 @@
   <a:extraClrSchemeLst/>
   <a:extLst>
     <a:ext uri="{05A4C25C-085E-4340-85A3-A5531E510DB2}">
-      <thm15:themeFamily xmlns:thm15="http://schemas.microsoft.com/office/thememl/2012/main" xmlns="" name="Chef-TemplateComps_v09-16x9-Light.potx" id="{078CEFDB-FA7A-4E36-9964-13EF367585CB}" vid="{8B87B0F3-7308-43D5-8388-E1B49EA02652}"/>
+      <thm15:themeFamily xmlns="" xmlns:thm15="http://schemas.microsoft.com/office/thememl/2012/main" name="Chef-TemplateComps_v09-16x9-Light.potx" id="{078CEFDB-FA7A-4E36-9964-13EF367585CB}" vid="{8B87B0F3-7308-43D5-8388-E1B49EA02652}"/>
     </a:ext>
   </a:extLst>
 </a:theme>

</xml_diff>

<commit_message>
Minor edits and change GE to GL
</commit_message>
<xml_diff>
--- a/03-initial-configuration-scans.pptx
+++ b/03-initial-configuration-scans.pptx
@@ -2009,15 +2009,7 @@
           <a:p>
             <a:r>
               <a:rPr lang="en-US" dirty="0" smtClean="0"/>
-              <a:t>Instructor Note: Now we continue the group </a:t>
-            </a:r>
-            <a:r>
-              <a:rPr lang="en-US" dirty="0" smtClean="0"/>
-              <a:t>Lab </a:t>
-            </a:r>
-            <a:r>
-              <a:rPr lang="en-US" dirty="0" smtClean="0"/>
-              <a:t>but you</a:t>
+              <a:t>Instructor Note: Now we continue the group Lab but you</a:t>
             </a:r>
             <a:r>
               <a:rPr lang="en-US" baseline="0" dirty="0" smtClean="0"/>
@@ -6348,8 +6340,62 @@
             </a:r>
             <a:r>
               <a:rPr lang="en-US" dirty="0" smtClean="0"/>
-              <a:t>' file to save yourself some typing.</a:t>
-            </a:r>
+              <a:t>' file to save yourself some typing</a:t>
+            </a:r>
+            <a:r>
+              <a:rPr lang="en-US" dirty="0" smtClean="0"/>
+              <a:t>.</a:t>
+            </a:r>
+          </a:p>
+          <a:p>
+            <a:endParaRPr lang="en-US" dirty="0" smtClean="0"/>
+          </a:p>
+          <a:p>
+            <a:r>
+              <a:rPr lang="en-US" dirty="0" smtClean="0"/>
+              <a:t>Instructor Note: TBD </a:t>
+            </a:r>
+            <a:r>
+              <a:rPr lang="en-US" dirty="0" smtClean="0">
+                <a:effectLst/>
+              </a:rPr>
+              <a:t>It would also be good for the instructor to demonstrate using the </a:t>
+            </a:r>
+            <a:r>
+              <a:rPr lang="en-US" dirty="0" err="1" smtClean="0">
+                <a:effectLst/>
+              </a:rPr>
+              <a:t>InSpec</a:t>
+            </a:r>
+            <a:r>
+              <a:rPr lang="en-US" dirty="0" smtClean="0">
+                <a:effectLst/>
+              </a:rPr>
+              <a:t> verifier in test kitchen locally </a:t>
+            </a:r>
+            <a:r>
+              <a:rPr lang="en-US" smtClean="0">
+                <a:effectLst/>
+              </a:rPr>
+              <a:t>with Vagrant to </a:t>
+            </a:r>
+            <a:r>
+              <a:rPr lang="en-US" dirty="0" smtClean="0">
+                <a:effectLst/>
+              </a:rPr>
+              <a:t>show the students that it can </a:t>
+            </a:r>
+            <a:r>
+              <a:rPr lang="en-US" smtClean="0">
+                <a:effectLst/>
+              </a:rPr>
+              <a:t>be done.</a:t>
+            </a:r>
+            <a:endParaRPr lang="en-US" dirty="0" smtClean="0">
+              <a:effectLst/>
+            </a:endParaRPr>
+          </a:p>
+          <a:p>
             <a:endParaRPr lang="en-US" dirty="0"/>
           </a:p>
         </p:txBody>
@@ -11184,14 +11230,14 @@
           </a:ln>
           <a:extLst>
             <a:ext uri="{909E8E84-426E-40dd-AFC4-6F175D3DCCD1}">
-              <a14:hiddenFill xmlns="" xmlns:a14="http://schemas.microsoft.com/office/drawing/2010/main">
+              <a14:hiddenFill xmlns:a14="http://schemas.microsoft.com/office/drawing/2010/main" xmlns="">
                 <a:solidFill>
                   <a:srgbClr val="FFFFFF"/>
                 </a:solidFill>
               </a14:hiddenFill>
             </a:ext>
             <a:ext uri="{91240B29-F687-4f45-9708-019B960494DF}">
-              <a14:hiddenLine xmlns="" xmlns:a14="http://schemas.microsoft.com/office/drawing/2010/main" w="9525">
+              <a14:hiddenLine xmlns:a14="http://schemas.microsoft.com/office/drawing/2010/main" xmlns="" w="9525">
                 <a:solidFill>
                   <a:srgbClr val="000000"/>
                 </a:solidFill>
@@ -11339,14 +11385,14 @@
           </a:ln>
           <a:extLst>
             <a:ext uri="{909E8E84-426E-40dd-AFC4-6F175D3DCCD1}">
-              <a14:hiddenFill xmlns="" xmlns:a14="http://schemas.microsoft.com/office/drawing/2010/main">
+              <a14:hiddenFill xmlns:a14="http://schemas.microsoft.com/office/drawing/2010/main" xmlns="">
                 <a:solidFill>
                   <a:srgbClr val="FFFFFF"/>
                 </a:solidFill>
               </a14:hiddenFill>
             </a:ext>
             <a:ext uri="{91240B29-F687-4f45-9708-019B960494DF}">
-              <a14:hiddenLine xmlns="" xmlns:a14="http://schemas.microsoft.com/office/drawing/2010/main" w="9525">
+              <a14:hiddenLine xmlns:a14="http://schemas.microsoft.com/office/drawing/2010/main" xmlns="" w="9525">
                 <a:solidFill>
                   <a:srgbClr val="000000"/>
                 </a:solidFill>
@@ -11837,14 +11883,14 @@
           </a:ln>
           <a:extLst>
             <a:ext uri="{909E8E84-426E-40dd-AFC4-6F175D3DCCD1}">
-              <a14:hiddenFill xmlns="" xmlns:a14="http://schemas.microsoft.com/office/drawing/2010/main">
+              <a14:hiddenFill xmlns:a14="http://schemas.microsoft.com/office/drawing/2010/main" xmlns="">
                 <a:solidFill>
                   <a:srgbClr val="FFFFFF"/>
                 </a:solidFill>
               </a14:hiddenFill>
             </a:ext>
             <a:ext uri="{91240B29-F687-4f45-9708-019B960494DF}">
-              <a14:hiddenLine xmlns="" xmlns:a14="http://schemas.microsoft.com/office/drawing/2010/main" w="9525">
+              <a14:hiddenLine xmlns:a14="http://schemas.microsoft.com/office/drawing/2010/main" xmlns="" w="9525">
                 <a:solidFill>
                   <a:srgbClr val="000000"/>
                 </a:solidFill>
@@ -12083,14 +12129,14 @@
           </a:ln>
           <a:extLst>
             <a:ext uri="{909E8E84-426E-40dd-AFC4-6F175D3DCCD1}">
-              <a14:hiddenFill xmlns="" xmlns:a14="http://schemas.microsoft.com/office/drawing/2010/main">
+              <a14:hiddenFill xmlns:a14="http://schemas.microsoft.com/office/drawing/2010/main" xmlns="">
                 <a:solidFill>
                   <a:srgbClr val="FFFFFF"/>
                 </a:solidFill>
               </a14:hiddenFill>
             </a:ext>
             <a:ext uri="{91240B29-F687-4f45-9708-019B960494DF}">
-              <a14:hiddenLine xmlns="" xmlns:a14="http://schemas.microsoft.com/office/drawing/2010/main" w="9525">
+              <a14:hiddenLine xmlns:a14="http://schemas.microsoft.com/office/drawing/2010/main" xmlns="" w="9525">
                 <a:solidFill>
                   <a:srgbClr val="000000"/>
                 </a:solidFill>
@@ -14018,14 +14064,14 @@
           </a:ln>
           <a:extLst>
             <a:ext uri="{909E8E84-426E-40dd-AFC4-6F175D3DCCD1}">
-              <a14:hiddenFill xmlns="" xmlns:a14="http://schemas.microsoft.com/office/drawing/2010/main">
+              <a14:hiddenFill xmlns:a14="http://schemas.microsoft.com/office/drawing/2010/main" xmlns="">
                 <a:solidFill>
                   <a:srgbClr val="FFFFFF"/>
                 </a:solidFill>
               </a14:hiddenFill>
             </a:ext>
             <a:ext uri="{91240B29-F687-4f45-9708-019B960494DF}">
-              <a14:hiddenLine xmlns="" xmlns:a14="http://schemas.microsoft.com/office/drawing/2010/main" w="9525">
+              <a14:hiddenLine xmlns:a14="http://schemas.microsoft.com/office/drawing/2010/main" xmlns="" w="9525">
                 <a:solidFill>
                   <a:srgbClr val="000000"/>
                 </a:solidFill>
@@ -15559,14 +15605,14 @@
           </a:ln>
           <a:extLst>
             <a:ext uri="{909E8E84-426E-40dd-AFC4-6F175D3DCCD1}">
-              <a14:hiddenFill xmlns="" xmlns:a14="http://schemas.microsoft.com/office/drawing/2010/main">
+              <a14:hiddenFill xmlns:a14="http://schemas.microsoft.com/office/drawing/2010/main" xmlns="">
                 <a:solidFill>
                   <a:srgbClr val="FFFFFF"/>
                 </a:solidFill>
               </a14:hiddenFill>
             </a:ext>
             <a:ext uri="{91240B29-F687-4f45-9708-019B960494DF}">
-              <a14:hiddenLine xmlns="" xmlns:a14="http://schemas.microsoft.com/office/drawing/2010/main" w="9525">
+              <a14:hiddenLine xmlns:a14="http://schemas.microsoft.com/office/drawing/2010/main" xmlns="" w="9525">
                 <a:solidFill>
                   <a:srgbClr val="000000"/>
                 </a:solidFill>
@@ -16124,14 +16170,14 @@
           </a:ln>
           <a:extLst>
             <a:ext uri="{909E8E84-426E-40dd-AFC4-6F175D3DCCD1}">
-              <a14:hiddenFill xmlns="" xmlns:a14="http://schemas.microsoft.com/office/drawing/2010/main">
+              <a14:hiddenFill xmlns:a14="http://schemas.microsoft.com/office/drawing/2010/main" xmlns="">
                 <a:solidFill>
                   <a:srgbClr val="FFFFFF"/>
                 </a:solidFill>
               </a14:hiddenFill>
             </a:ext>
             <a:ext uri="{91240B29-F687-4f45-9708-019B960494DF}">
-              <a14:hiddenLine xmlns="" xmlns:a14="http://schemas.microsoft.com/office/drawing/2010/main" w="9525">
+              <a14:hiddenLine xmlns:a14="http://schemas.microsoft.com/office/drawing/2010/main" xmlns="" w="9525">
                 <a:solidFill>
                   <a:srgbClr val="000000"/>
                 </a:solidFill>
@@ -16698,14 +16744,14 @@
           </a:ln>
           <a:extLst>
             <a:ext uri="{909E8E84-426E-40dd-AFC4-6F175D3DCCD1}">
-              <a14:hiddenFill xmlns="" xmlns:a14="http://schemas.microsoft.com/office/drawing/2010/main">
+              <a14:hiddenFill xmlns:a14="http://schemas.microsoft.com/office/drawing/2010/main" xmlns="">
                 <a:solidFill>
                   <a:srgbClr val="FFFFFF"/>
                 </a:solidFill>
               </a14:hiddenFill>
             </a:ext>
             <a:ext uri="{91240B29-F687-4f45-9708-019B960494DF}">
-              <a14:hiddenLine xmlns="" xmlns:a14="http://schemas.microsoft.com/office/drawing/2010/main" w="9525">
+              <a14:hiddenLine xmlns:a14="http://schemas.microsoft.com/office/drawing/2010/main" xmlns="" w="9525">
                 <a:solidFill>
                   <a:srgbClr val="000000"/>
                 </a:solidFill>
@@ -17645,14 +17691,14 @@
           </a:ln>
           <a:extLst>
             <a:ext uri="{909E8E84-426E-40dd-AFC4-6F175D3DCCD1}">
-              <a14:hiddenFill xmlns="" xmlns:a14="http://schemas.microsoft.com/office/drawing/2010/main">
+              <a14:hiddenFill xmlns:a14="http://schemas.microsoft.com/office/drawing/2010/main" xmlns="">
                 <a:solidFill>
                   <a:srgbClr val="FFFFFF"/>
                 </a:solidFill>
               </a14:hiddenFill>
             </a:ext>
             <a:ext uri="{91240B29-F687-4f45-9708-019B960494DF}">
-              <a14:hiddenLine xmlns="" xmlns:a14="http://schemas.microsoft.com/office/drawing/2010/main" w="9525">
+              <a14:hiddenLine xmlns:a14="http://schemas.microsoft.com/office/drawing/2010/main" xmlns="" w="9525">
                 <a:solidFill>
                   <a:srgbClr val="000000"/>
                 </a:solidFill>
@@ -18405,14 +18451,14 @@
           </a:ln>
           <a:extLst>
             <a:ext uri="{909E8E84-426E-40dd-AFC4-6F175D3DCCD1}">
-              <a14:hiddenFill xmlns="" xmlns:a14="http://schemas.microsoft.com/office/drawing/2010/main">
+              <a14:hiddenFill xmlns:a14="http://schemas.microsoft.com/office/drawing/2010/main" xmlns="">
                 <a:solidFill>
                   <a:srgbClr val="FFFFFF"/>
                 </a:solidFill>
               </a14:hiddenFill>
             </a:ext>
             <a:ext uri="{91240B29-F687-4f45-9708-019B960494DF}">
-              <a14:hiddenLine xmlns="" xmlns:a14="http://schemas.microsoft.com/office/drawing/2010/main" w="9525">
+              <a14:hiddenLine xmlns:a14="http://schemas.microsoft.com/office/drawing/2010/main" xmlns="" w="9525">
                 <a:solidFill>
                   <a:srgbClr val="000000"/>
                 </a:solidFill>
@@ -19262,11 +19308,7 @@
           <a:p>
             <a:r>
               <a:rPr lang="en-US" dirty="0" smtClean="0"/>
-              <a:t>GL: </a:t>
-            </a:r>
-            <a:r>
-              <a:rPr lang="en-US" dirty="0" smtClean="0"/>
-              <a:t>Testing Connectivity to your Node</a:t>
+              <a:t>GL: Testing Connectivity to your Node</a:t>
             </a:r>
             <a:endParaRPr lang="en-US" dirty="0"/>
           </a:p>
@@ -20243,15 +20285,7 @@
           <a:p>
             <a:r>
               <a:rPr lang="en-US" dirty="0" smtClean="0"/>
-              <a:t>Group </a:t>
-            </a:r>
-            <a:r>
-              <a:rPr lang="en-US" dirty="0" smtClean="0"/>
-              <a:t>Lab: </a:t>
-            </a:r>
-            <a:r>
-              <a:rPr lang="en-US" dirty="0" smtClean="0"/>
-              <a:t>Running a Scan</a:t>
+              <a:t>Group Lab: Running a Scan</a:t>
             </a:r>
             <a:endParaRPr lang="en-US" dirty="0"/>
           </a:p>
@@ -20364,11 +20398,7 @@
           <a:p>
             <a:r>
               <a:rPr lang="en-US" dirty="0" smtClean="0"/>
-              <a:t>GL: </a:t>
-            </a:r>
-            <a:r>
-              <a:rPr lang="en-US" dirty="0" smtClean="0"/>
-              <a:t>Running a Scan</a:t>
+              <a:t>GL: Running a Scan</a:t>
             </a:r>
             <a:endParaRPr lang="en-US" dirty="0"/>
           </a:p>
@@ -20539,11 +20569,7 @@
           <a:p>
             <a:r>
               <a:rPr lang="en-US" dirty="0" smtClean="0"/>
-              <a:t>GL: </a:t>
-            </a:r>
-            <a:r>
-              <a:rPr lang="en-US" dirty="0" smtClean="0"/>
-              <a:t>Running a Scan</a:t>
+              <a:t>GL: Running a Scan</a:t>
             </a:r>
             <a:endParaRPr lang="en-US" dirty="0"/>
           </a:p>
@@ -21382,11 +21408,7 @@
           <a:p>
             <a:r>
               <a:rPr lang="en-US" dirty="0" smtClean="0"/>
-              <a:t>GL: </a:t>
-            </a:r>
-            <a:r>
-              <a:rPr lang="en-US" dirty="0" smtClean="0"/>
-              <a:t>Profile</a:t>
+              <a:t>GL: Profile</a:t>
             </a:r>
             <a:endParaRPr lang="en-US" dirty="0"/>
           </a:p>
@@ -22564,11 +22586,7 @@
           <a:p>
             <a:r>
               <a:rPr lang="en-US" dirty="0" smtClean="0"/>
-              <a:t>GL: </a:t>
-            </a:r>
-            <a:r>
-              <a:rPr lang="en-US" dirty="0" smtClean="0"/>
-              <a:t>Remediating the Issue</a:t>
+              <a:t>GL: Remediating the Issue</a:t>
             </a:r>
             <a:endParaRPr lang="en-US" dirty="0"/>
           </a:p>
@@ -24180,11 +24198,7 @@
           <a:p>
             <a:r>
               <a:rPr lang="en-US" dirty="0" smtClean="0"/>
-              <a:t>GL: </a:t>
-            </a:r>
-            <a:r>
-              <a:rPr lang="en-US" dirty="0" smtClean="0"/>
-              <a:t>Write the Client Recipe</a:t>
+              <a:t>GL: Write the Client Recipe</a:t>
             </a:r>
             <a:endParaRPr lang="en-US" dirty="0"/>
           </a:p>
@@ -24247,11 +24261,7 @@
           <a:p>
             <a:r>
               <a:rPr lang="en-US" dirty="0" smtClean="0"/>
-              <a:t>GL: </a:t>
-            </a:r>
-            <a:r>
-              <a:rPr lang="en-US" dirty="0" smtClean="0"/>
-              <a:t>Testing the Recipe</a:t>
+              <a:t>GL: Testing the Recipe</a:t>
             </a:r>
             <a:endParaRPr lang="en-US" dirty="0"/>
           </a:p>
@@ -24424,11 +24434,7 @@
           <a:p>
             <a:r>
               <a:rPr lang="en-US" dirty="0" smtClean="0"/>
-              <a:t>GL: </a:t>
-            </a:r>
-            <a:r>
-              <a:rPr lang="en-US" dirty="0" smtClean="0"/>
-              <a:t>Navigate to your SSH Cookbook</a:t>
+              <a:t>GL: Navigate to your SSH Cookbook</a:t>
             </a:r>
             <a:endParaRPr lang="en-US" dirty="0"/>
           </a:p>
@@ -24595,11 +24601,7 @@
           <a:p>
             <a:r>
               <a:rPr lang="en-US" dirty="0" smtClean="0"/>
-              <a:t>GL: </a:t>
-            </a:r>
-            <a:r>
-              <a:rPr lang="en-US" dirty="0" smtClean="0"/>
-              <a:t>Edit your .</a:t>
+              <a:t>GL: Edit your .</a:t>
             </a:r>
             <a:r>
               <a:rPr lang="en-US" dirty="0" err="1" smtClean="0"/>
@@ -24855,11 +24857,7 @@
           <a:p>
             <a:r>
               <a:rPr lang="en-US" dirty="0" smtClean="0"/>
-              <a:t>GL: </a:t>
-            </a:r>
-            <a:r>
-              <a:rPr lang="en-US" dirty="0" smtClean="0"/>
-              <a:t>Edit your .</a:t>
+              <a:t>GL: Edit your .</a:t>
             </a:r>
             <a:r>
               <a:rPr lang="en-US" dirty="0" err="1" smtClean="0"/>
@@ -25105,11 +25103,7 @@
           <a:p>
             <a:r>
               <a:rPr lang="en-US" dirty="0" smtClean="0"/>
-              <a:t>GL: </a:t>
-            </a:r>
-            <a:r>
-              <a:rPr lang="en-US" dirty="0" smtClean="0"/>
-              <a:t>Edit your .</a:t>
+              <a:t>GL: Edit your .</a:t>
             </a:r>
             <a:r>
               <a:rPr lang="en-US" dirty="0" err="1" smtClean="0"/>
@@ -25659,11 +25653,7 @@
           <a:p>
             <a:r>
               <a:rPr lang="en-US" dirty="0" smtClean="0"/>
-              <a:t>GL: </a:t>
-            </a:r>
-            <a:r>
-              <a:rPr lang="en-US" dirty="0" smtClean="0"/>
-              <a:t>Run `kitchen list` </a:t>
+              <a:t>GL: Run `kitchen list` </a:t>
             </a:r>
             <a:r>
               <a:rPr lang="en-US" dirty="0"/>
@@ -25888,11 +25878,7 @@
           <a:p>
             <a:r>
               <a:rPr lang="en-US" dirty="0" smtClean="0"/>
-              <a:t>GL: </a:t>
-            </a:r>
-            <a:r>
-              <a:rPr lang="en-US" dirty="0" smtClean="0"/>
-              <a:t>Run `kitchen converge`</a:t>
+              <a:t>GL: Run `kitchen converge`</a:t>
             </a:r>
             <a:r>
               <a:rPr lang="en-US" dirty="0"/>
@@ -26094,15 +26080,7 @@
           <a:p>
             <a:r>
               <a:rPr lang="en-US" dirty="0" smtClean="0"/>
-              <a:t>Group </a:t>
-            </a:r>
-            <a:r>
-              <a:rPr lang="en-US" dirty="0" smtClean="0"/>
-              <a:t>Lab: </a:t>
-            </a:r>
-            <a:r>
-              <a:rPr lang="en-US" dirty="0" smtClean="0"/>
-              <a:t>Adding a Node to Scan</a:t>
+              <a:t>Group Lab: Adding a Node to Scan</a:t>
             </a:r>
             <a:endParaRPr lang="en-US" dirty="0"/>
           </a:p>
@@ -26311,11 +26289,7 @@
             </a:r>
             <a:r>
               <a:rPr lang="en-US" dirty="0" smtClean="0"/>
-              <a:t>instance</a:t>
-            </a:r>
-            <a:r>
-              <a:rPr lang="en-US" dirty="0" smtClean="0"/>
-              <a:t>.</a:t>
+              <a:t>instance.</a:t>
             </a:r>
             <a:endParaRPr lang="en-US" dirty="0"/>
           </a:p>
@@ -26382,7 +26356,7 @@
             </a:r>
             <a:r>
               <a:rPr lang="en-US" dirty="0"/>
-              <a:t>Adding an </a:t>
+              <a:t>Using </a:t>
             </a:r>
             <a:r>
               <a:rPr lang="en-US" dirty="0" err="1"/>
@@ -26390,8 +26364,9 @@
             </a:r>
             <a:r>
               <a:rPr lang="en-US" dirty="0"/>
-              <a:t> Verification</a:t>
-            </a:r>
+              <a:t> for Verification</a:t>
+            </a:r>
+            <a:endParaRPr lang="en-US" dirty="0"/>
           </a:p>
         </p:txBody>
       </p:sp>
@@ -26556,11 +26531,7 @@
           <a:p>
             <a:r>
               <a:rPr lang="en-US" dirty="0" smtClean="0"/>
-              <a:t>GL: </a:t>
-            </a:r>
-            <a:r>
-              <a:rPr lang="en-US" dirty="0" smtClean="0"/>
-              <a:t>Create the `</a:t>
+              <a:t>GL: Create the `</a:t>
             </a:r>
             <a:r>
               <a:rPr lang="en-US" dirty="0" err="1" smtClean="0"/>
@@ -27027,11 +26998,7 @@
             </a:r>
             <a:r>
               <a:rPr lang="en-US" dirty="0" smtClean="0"/>
-              <a:t> from the </a:t>
-            </a:r>
-            <a:r>
-              <a:rPr lang="en-US" dirty="0" smtClean="0"/>
-              <a:t>Command </a:t>
+              <a:t> from the Command </a:t>
             </a:r>
             <a:r>
               <a:rPr lang="en-US" dirty="0"/>
@@ -27047,11 +27014,7 @@
             </a:r>
             <a:r>
               <a:rPr lang="en-US" dirty="0" smtClean="0"/>
-              <a:t>nterface </a:t>
-            </a:r>
-            <a:r>
-              <a:rPr lang="en-US" dirty="0" smtClean="0"/>
-              <a:t>(CLI)</a:t>
+              <a:t>nterface (CLI)</a:t>
             </a:r>
             <a:endParaRPr lang="en-US" dirty="0"/>
           </a:p>
@@ -27287,11 +27250,7 @@
           <a:p>
             <a:r>
               <a:rPr lang="en-US" dirty="0" smtClean="0"/>
-              <a:t>GL: </a:t>
-            </a:r>
-            <a:r>
-              <a:rPr lang="en-US" dirty="0" smtClean="0"/>
-              <a:t>What is your Docker ID?</a:t>
+              <a:t>GL: What is your Docker ID?</a:t>
             </a:r>
             <a:endParaRPr lang="en-US" dirty="0"/>
           </a:p>
@@ -28329,11 +28288,7 @@
           <a:p>
             <a:r>
               <a:rPr lang="en-US" dirty="0" smtClean="0"/>
-              <a:t>GL: </a:t>
-            </a:r>
-            <a:r>
-              <a:rPr lang="en-US" dirty="0" smtClean="0"/>
-              <a:t>Ensure you are in ~/</a:t>
+              <a:t>GL: Ensure you are in ~/</a:t>
             </a:r>
             <a:r>
               <a:rPr lang="en-US" dirty="0"/>
@@ -28623,11 +28578,7 @@
           <a:p>
             <a:r>
               <a:rPr lang="en-US" dirty="0" smtClean="0"/>
-              <a:t>GL: </a:t>
-            </a:r>
-            <a:r>
-              <a:rPr lang="en-US" dirty="0" smtClean="0"/>
-              <a:t>Run `kitchen converge`</a:t>
+              <a:t>GL: Run `kitchen converge`</a:t>
             </a:r>
             <a:endParaRPr lang="en-US" dirty="0"/>
           </a:p>
@@ -29191,11 +29142,7 @@
           <a:p>
             <a:r>
               <a:rPr lang="en-US" dirty="0" smtClean="0"/>
-              <a:t>GL: </a:t>
-            </a:r>
-            <a:r>
-              <a:rPr lang="en-US" dirty="0" smtClean="0"/>
-              <a:t>Apply the New SSH Recipe</a:t>
+              <a:t>GL: Apply the New SSH Recipe</a:t>
             </a:r>
             <a:endParaRPr lang="en-US" dirty="0"/>
           </a:p>
@@ -29318,11 +29265,7 @@
           <a:p>
             <a:r>
               <a:rPr lang="en-US" dirty="0" smtClean="0"/>
-              <a:t>GL: </a:t>
-            </a:r>
-            <a:r>
-              <a:rPr lang="en-US" dirty="0" smtClean="0"/>
-              <a:t>Re-run the Compliance Scan</a:t>
+              <a:t>GL: Re-run the Compliance Scan</a:t>
             </a:r>
             <a:endParaRPr lang="en-US" dirty="0"/>
           </a:p>
@@ -29446,11 +29389,7 @@
           <a:p>
             <a:r>
               <a:rPr lang="en-US" dirty="0" smtClean="0"/>
-              <a:t>GL: </a:t>
-            </a:r>
-            <a:r>
-              <a:rPr lang="en-US" dirty="0" smtClean="0"/>
-              <a:t>Re-run the Compliance Scan</a:t>
+              <a:t>GL: Re-run the Compliance Scan</a:t>
             </a:r>
             <a:endParaRPr lang="en-US" dirty="0"/>
           </a:p>
@@ -29580,11 +29519,7 @@
           <a:p>
             <a:r>
               <a:rPr lang="en-US" dirty="0" smtClean="0"/>
-              <a:t>GL: </a:t>
-            </a:r>
-            <a:r>
-              <a:rPr lang="en-US" dirty="0" smtClean="0"/>
-              <a:t>Results of this Exercise</a:t>
+              <a:t>GL: Results of this Exercise</a:t>
             </a:r>
             <a:endParaRPr lang="en-US" dirty="0"/>
           </a:p>
@@ -30926,11 +30861,7 @@
           <a:p>
             <a:r>
               <a:rPr lang="en-US" dirty="0" smtClean="0"/>
-              <a:t>GL: </a:t>
-            </a:r>
-            <a:r>
-              <a:rPr lang="en-US" dirty="0" smtClean="0"/>
-              <a:t>Testing Connectivity to your Node</a:t>
+              <a:t>GL: Testing Connectivity to your Node</a:t>
             </a:r>
             <a:endParaRPr lang="en-US" dirty="0"/>
           </a:p>
@@ -32395,15 +32326,6 @@
 
 <file path=customXml/item1.xml><?xml version="1.0" encoding="utf-8"?>
 <?mso-contentType ?>
-<FormTemplates xmlns="http://schemas.microsoft.com/sharepoint/v3/contenttype/forms">
-  <Display>DocumentLibraryForm</Display>
-  <Edit>DocumentLibraryForm</Edit>
-  <New>DocumentLibraryForm</New>
-</FormTemplates>
-</file>
-
-<file path=customXml/item2.xml><?xml version="1.0" encoding="utf-8"?>
-<?mso-contentType ?>
 <spe:Receivers xmlns:spe="http://schemas.microsoft.com/sharepoint/events">
   <Receiver>
     <Name>Document ID Generator</Name>
@@ -32448,19 +32370,16 @@
 </spe:Receivers>
 </file>
 
-<file path=customXml/item3.xml><?xml version="1.0" encoding="utf-8"?>
-<p:properties xmlns:p="http://schemas.microsoft.com/office/2006/metadata/properties" xmlns:xsi="http://www.w3.org/2001/XMLSchema-instance" xmlns:pc="http://schemas.microsoft.com/office/infopath/2007/PartnerControls">
-  <documentManagement>
-    <_dlc_DocId xmlns="7bb5d761-a2ea-4873-95f7-7a6658fb3ef0">M4CWTKMW727E-592-73</_dlc_DocId>
-    <_dlc_DocIdUrl xmlns="7bb5d761-a2ea-4873-95f7-7a6658fb3ef0">
-      <Url>https://kms.vci.local/marketing/team/_layouts/DocIdRedir.aspx?ID=M4CWTKMW727E-592-73</Url>
-      <Description>M4CWTKMW727E-592-73</Description>
-    </_dlc_DocIdUrl>
-  </documentManagement>
-</p:properties>
+<file path=customXml/item2.xml><?xml version="1.0" encoding="utf-8"?>
+<?mso-contentType ?>
+<FormTemplates xmlns="http://schemas.microsoft.com/sharepoint/v3/contenttype/forms">
+  <Display>DocumentLibraryForm</Display>
+  <Edit>DocumentLibraryForm</Edit>
+  <New>DocumentLibraryForm</New>
+</FormTemplates>
 </file>
 
-<file path=customXml/item4.xml><?xml version="1.0" encoding="utf-8"?>
+<file path=customXml/item3.xml><?xml version="1.0" encoding="utf-8"?>
 <ct:contentTypeSchema xmlns:ct="http://schemas.microsoft.com/office/2006/metadata/contentType" xmlns:ma="http://schemas.microsoft.com/office/2006/metadata/properties/metaAttributes" ct:_="" ma:_="" ma:contentTypeName="Document" ma:contentTypeID="0x0101000812F700BE7F874999720E88173FE491" ma:contentTypeVersion="0" ma:contentTypeDescription="Create a new document." ma:contentTypeScope="" ma:versionID="3f79f408e2ca720b7aba6e0e32464d0c">
   <xsd:schema xmlns:xsd="http://www.w3.org/2001/XMLSchema" xmlns:xs="http://www.w3.org/2001/XMLSchema" xmlns:p="http://schemas.microsoft.com/office/2006/metadata/properties" xmlns:ns2="7bb5d761-a2ea-4873-95f7-7a6658fb3ef0" targetNamespace="http://schemas.microsoft.com/office/2006/metadata/properties" ma:root="true" ma:fieldsID="1e062cd38ba31e406bfc4340fbc7f87a" ns2:_="">
     <xsd:import namespace="7bb5d761-a2ea-4873-95f7-7a6658fb3ef0"/>
@@ -32605,7 +32524,27 @@
 </ct:contentTypeSchema>
 </file>
 
+<file path=customXml/item4.xml><?xml version="1.0" encoding="utf-8"?>
+<p:properties xmlns:p="http://schemas.microsoft.com/office/2006/metadata/properties" xmlns:xsi="http://www.w3.org/2001/XMLSchema-instance" xmlns:pc="http://schemas.microsoft.com/office/infopath/2007/PartnerControls">
+  <documentManagement>
+    <_dlc_DocId xmlns="7bb5d761-a2ea-4873-95f7-7a6658fb3ef0">M4CWTKMW727E-592-73</_dlc_DocId>
+    <_dlc_DocIdUrl xmlns="7bb5d761-a2ea-4873-95f7-7a6658fb3ef0">
+      <Url>https://kms.vci.local/marketing/team/_layouts/DocIdRedir.aspx?ID=M4CWTKMW727E-592-73</Url>
+      <Description>M4CWTKMW727E-592-73</Description>
+    </_dlc_DocIdUrl>
+  </documentManagement>
+</p:properties>
+</file>
+
 <file path=customXml/itemProps1.xml><?xml version="1.0" encoding="utf-8"?>
+<ds:datastoreItem xmlns:ds="http://schemas.openxmlformats.org/officeDocument/2006/customXml" ds:itemID="{B13EBC30-FE27-4C6A-B723-23FC2188F7DC}">
+  <ds:schemaRefs>
+    <ds:schemaRef ds:uri="http://schemas.microsoft.com/sharepoint/events"/>
+  </ds:schemaRefs>
+</ds:datastoreItem>
+</file>
+
+<file path=customXml/itemProps2.xml><?xml version="1.0" encoding="utf-8"?>
 <ds:datastoreItem xmlns:ds="http://schemas.openxmlformats.org/officeDocument/2006/customXml" ds:itemID="{5CDEB364-43EC-4510-9881-539C2A3FCE9E}">
   <ds:schemaRefs>
     <ds:schemaRef ds:uri="http://schemas.microsoft.com/sharepoint/v3/contenttype/forms"/>
@@ -32613,31 +32552,7 @@
 </ds:datastoreItem>
 </file>
 
-<file path=customXml/itemProps2.xml><?xml version="1.0" encoding="utf-8"?>
-<ds:datastoreItem xmlns:ds="http://schemas.openxmlformats.org/officeDocument/2006/customXml" ds:itemID="{B13EBC30-FE27-4C6A-B723-23FC2188F7DC}">
-  <ds:schemaRefs>
-    <ds:schemaRef ds:uri="http://schemas.microsoft.com/sharepoint/events"/>
-  </ds:schemaRefs>
-</ds:datastoreItem>
-</file>
-
 <file path=customXml/itemProps3.xml><?xml version="1.0" encoding="utf-8"?>
-<ds:datastoreItem xmlns:ds="http://schemas.openxmlformats.org/officeDocument/2006/customXml" ds:itemID="{6921749B-AEB7-461B-845F-603CABD25259}">
-  <ds:schemaRefs>
-    <ds:schemaRef ds:uri="http://purl.org/dc/dcmitype/"/>
-    <ds:schemaRef ds:uri="http://schemas.microsoft.com/office/2006/documentManagement/types"/>
-    <ds:schemaRef ds:uri="http://purl.org/dc/elements/1.1/"/>
-    <ds:schemaRef ds:uri="http://schemas.microsoft.com/office/2006/metadata/properties"/>
-    <ds:schemaRef ds:uri="7bb5d761-a2ea-4873-95f7-7a6658fb3ef0"/>
-    <ds:schemaRef ds:uri="http://purl.org/dc/terms/"/>
-    <ds:schemaRef ds:uri="http://schemas.openxmlformats.org/package/2006/metadata/core-properties"/>
-    <ds:schemaRef ds:uri="http://schemas.microsoft.com/office/infopath/2007/PartnerControls"/>
-    <ds:schemaRef ds:uri="http://www.w3.org/XML/1998/namespace"/>
-  </ds:schemaRefs>
-</ds:datastoreItem>
-</file>
-
-<file path=customXml/itemProps4.xml><?xml version="1.0" encoding="utf-8"?>
 <ds:datastoreItem xmlns:ds="http://schemas.openxmlformats.org/officeDocument/2006/customXml" ds:itemID="{164479E5-0B02-49AC-B79E-EC1D6164DDD3}">
   <ds:schemaRefs>
     <ds:schemaRef ds:uri="http://schemas.microsoft.com/office/2006/metadata/contentType"/>
@@ -32653,4 +32568,20 @@
     <ds:schemaRef ds:uri="http://schemas.microsoft.com/internal/obd"/>
   </ds:schemaRefs>
 </ds:datastoreItem>
+</file>
+
+<file path=customXml/itemProps4.xml><?xml version="1.0" encoding="utf-8"?>
+<ds:datastoreItem xmlns:ds="http://schemas.openxmlformats.org/officeDocument/2006/customXml" ds:itemID="{6921749B-AEB7-461B-845F-603CABD25259}">
+  <ds:schemaRefs>
+    <ds:schemaRef ds:uri="http://purl.org/dc/dcmitype/"/>
+    <ds:schemaRef ds:uri="http://schemas.microsoft.com/office/2006/documentManagement/types"/>
+    <ds:schemaRef ds:uri="http://purl.org/dc/elements/1.1/"/>
+    <ds:schemaRef ds:uri="http://schemas.microsoft.com/office/2006/metadata/properties"/>
+    <ds:schemaRef ds:uri="7bb5d761-a2ea-4873-95f7-7a6658fb3ef0"/>
+    <ds:schemaRef ds:uri="http://purl.org/dc/terms/"/>
+    <ds:schemaRef ds:uri="http://schemas.openxmlformats.org/package/2006/metadata/core-properties"/>
+    <ds:schemaRef ds:uri="http://schemas.microsoft.com/office/infopath/2007/PartnerControls"/>
+    <ds:schemaRef ds:uri="http://www.w3.org/XML/1998/namespace"/>
+  </ds:schemaRefs>
+</ds:datastoreItem>
 </file>
</xml_diff>

<commit_message>
added speaker notes s3-52 Running InSpec via CLI
</commit_message>
<xml_diff>
--- a/03-initial-configuration-scans.pptx
+++ b/03-initial-configuration-scans.pptx
@@ -6340,11 +6340,7 @@
             </a:r>
             <a:r>
               <a:rPr lang="en-US" dirty="0" smtClean="0"/>
-              <a:t>' file to save yourself some typing</a:t>
-            </a:r>
-            <a:r>
-              <a:rPr lang="en-US" dirty="0" smtClean="0"/>
-              <a:t>.</a:t>
+              <a:t>' file to save yourself some typing.</a:t>
             </a:r>
           </a:p>
           <a:p>
@@ -8793,17 +8789,87 @@
           <a:p>
             <a:r>
               <a:rPr lang="en-US" dirty="0" smtClean="0"/>
-              <a:t>We</a:t>
+              <a:t>Run this </a:t>
+            </a:r>
+            <a:r>
+              <a:rPr lang="en-US" dirty="0" err="1" smtClean="0"/>
+              <a:t>inspec</a:t>
             </a:r>
             <a:r>
               <a:rPr lang="en-US" baseline="0" dirty="0" smtClean="0"/>
-              <a:t> have now verified the change in our </a:t>
-            </a:r>
-            <a:r>
-              <a:rPr lang="en-US" baseline="0" smtClean="0"/>
-              <a:t>test kitchen</a:t>
-            </a:r>
-            <a:endParaRPr lang="en-US" dirty="0"/>
+              <a:t> command again using the container ID you copied previously, replacing CONTAINER_ID in the example.</a:t>
+            </a:r>
+          </a:p>
+          <a:p>
+            <a:endParaRPr lang="en-US" baseline="0" dirty="0" smtClean="0"/>
+          </a:p>
+          <a:p>
+            <a:r>
+              <a:rPr lang="en-US" dirty="0" smtClean="0"/>
+              <a:t>`</a:t>
+            </a:r>
+            <a:r>
+              <a:rPr lang="en-US" dirty="0" err="1" smtClean="0"/>
+              <a:t>inspec</a:t>
+            </a:r>
+            <a:r>
+              <a:rPr lang="en-US" dirty="0" smtClean="0"/>
+              <a:t> exec ~/cookbooks/ssh/test/integration/client/</a:t>
+            </a:r>
+            <a:r>
+              <a:rPr lang="en-US" dirty="0" err="1" smtClean="0"/>
+              <a:t>inspec</a:t>
+            </a:r>
+            <a:r>
+              <a:rPr lang="en-US" dirty="0" smtClean="0"/>
+              <a:t>/</a:t>
+            </a:r>
+            <a:r>
+              <a:rPr lang="en-US" dirty="0" err="1" smtClean="0"/>
+              <a:t>client_spec.rb</a:t>
+            </a:r>
+            <a:r>
+              <a:rPr lang="en-US" dirty="0" smtClean="0"/>
+              <a:t> -t docker://CONTAINER_ID`</a:t>
+            </a:r>
+          </a:p>
+          <a:p>
+            <a:endParaRPr lang="en-US" dirty="0" smtClean="0"/>
+          </a:p>
+          <a:p>
+            <a:r>
+              <a:rPr lang="en-US" dirty="0" smtClean="0"/>
+              <a:t>You should now see that the</a:t>
+            </a:r>
+            <a:r>
+              <a:rPr lang="en-US" baseline="0" dirty="0" smtClean="0"/>
+              <a:t> test</a:t>
+            </a:r>
+            <a:r>
+              <a:rPr lang="en-US" dirty="0" smtClean="0"/>
+              <a:t> has passed. In</a:t>
+            </a:r>
+            <a:r>
+              <a:rPr lang="en-US" baseline="0" dirty="0" smtClean="0"/>
+              <a:t> addition to the output text that says there were 0 failures, th</a:t>
+            </a:r>
+            <a:r>
+              <a:rPr lang="en-US" dirty="0" smtClean="0"/>
+              <a:t>e single dot at the top-left of the output means there</a:t>
+            </a:r>
+            <a:r>
+              <a:rPr lang="en-US" baseline="0" dirty="0" smtClean="0"/>
+              <a:t> was </a:t>
+            </a:r>
+            <a:r>
+              <a:rPr lang="en-US" dirty="0" smtClean="0"/>
+              <a:t>one</a:t>
+            </a:r>
+            <a:r>
+              <a:rPr lang="en-US" baseline="0" dirty="0" smtClean="0"/>
+              <a:t> test made and that it passed.</a:t>
+            </a:r>
+            <a:endParaRPr lang="en-US" dirty="0" smtClean="0"/>
           </a:p>
         </p:txBody>
       </p:sp>
@@ -19308,7 +19374,7 @@
           <a:p>
             <a:r>
               <a:rPr lang="en-US" dirty="0" smtClean="0"/>
-              <a:t>GL: Testing Connectivity to your Node</a:t>
+              <a:t>GL: Testing Connectivity to Your Node</a:t>
             </a:r>
             <a:endParaRPr lang="en-US" dirty="0"/>
           </a:p>
@@ -26366,7 +26432,6 @@
               <a:rPr lang="en-US" dirty="0"/>
               <a:t> for Verification</a:t>
             </a:r>
-            <a:endParaRPr lang="en-US" dirty="0"/>
           </a:p>
         </p:txBody>
       </p:sp>
@@ -30861,7 +30926,7 @@
           <a:p>
             <a:r>
               <a:rPr lang="en-US" dirty="0" smtClean="0"/>
-              <a:t>GL: Testing Connectivity to your Node</a:t>
+              <a:t>GL: Testing Connectivity to Your Node</a:t>
             </a:r>
             <a:endParaRPr lang="en-US" dirty="0"/>
           </a:p>

</xml_diff>

<commit_message>
03-initial-configuration-scans added quiz to end of module
</commit_message>
<xml_diff>
--- a/03-initial-configuration-scans.pptx
+++ b/03-initial-configuration-scans.pptx
@@ -334,7 +334,7 @@
               <a:pPr>
                 <a:defRPr/>
               </a:pPr>
-              <a:t>2016-02-08</a:t>
+              <a:t>2016-02-11</a:t>
             </a:fld>
             <a:endParaRPr lang="en-US" dirty="0"/>
           </a:p>
@@ -517,7 +517,7 @@
               <a:pPr>
                 <a:defRPr/>
               </a:pPr>
-              <a:t>2016-02-08</a:t>
+              <a:t>2016-02-11</a:t>
             </a:fld>
             <a:endParaRPr lang="en-US" dirty="0"/>
           </a:p>
@@ -962,6 +962,14 @@
           <a:bodyPr/>
           <a:lstStyle/>
           <a:p>
+            <a:r>
+              <a:rPr lang="en-US" dirty="0" smtClean="0"/>
+              <a:t>Instructor Note: Answers</a:t>
+            </a:r>
+            <a:r>
+              <a:rPr lang="en-US" baseline="0" dirty="0" smtClean="0"/>
+              <a:t> to quizzes are contained in Instructor Notes found below each quiz slide so participants won't see the answers.</a:t>
+            </a:r>
             <a:endParaRPr lang="en-US" dirty="0"/>
           </a:p>
         </p:txBody>
@@ -1996,7 +2004,15 @@
           <a:p>
             <a:r>
               <a:rPr lang="en-US" dirty="0" smtClean="0"/>
-              <a:t>There are also 6 critical issues related to ssh on the target node. Your results may be slightly different that this example.</a:t>
+              <a:t>There are also 6 critical issues related to ssh on the target node. Your results may be slightly different </a:t>
+            </a:r>
+            <a:r>
+              <a:rPr lang="en-US" dirty="0" smtClean="0"/>
+              <a:t>than </a:t>
+            </a:r>
+            <a:r>
+              <a:rPr lang="en-US" dirty="0" smtClean="0"/>
+              <a:t>this example.</a:t>
             </a:r>
           </a:p>
           <a:p>
@@ -6522,13 +6538,8 @@
             </a:r>
             <a:r>
               <a:rPr lang="en-US" baseline="0" dirty="0" smtClean="0"/>
-              <a:t> issue</a:t>
-            </a:r>
-            <a:r>
-              <a:rPr lang="en-US" baseline="0" dirty="0" smtClean="0"/>
-              <a:t>.</a:t>
-            </a:r>
-            <a:endParaRPr lang="en-US" baseline="0" dirty="0" smtClean="0"/>
+              <a:t> issue.</a:t>
+            </a:r>
           </a:p>
         </p:txBody>
       </p:sp>
@@ -10948,8 +10959,79 @@
         </p:nvSpPr>
         <p:spPr/>
         <p:txBody>
-          <a:bodyPr/>
-          <a:lstStyle/>
+          <a:bodyPr>
+            <a:normAutofit lnSpcReduction="10000"/>
+          </a:bodyPr>
+          <a:lstStyle/>
+          <a:p>
+            <a:r>
+              <a:rPr lang="en-US" dirty="0" smtClean="0"/>
+              <a:t>Instructor Note Answers:</a:t>
+            </a:r>
+          </a:p>
+          <a:p>
+            <a:r>
+              <a:rPr lang="en-US" dirty="0" smtClean="0"/>
+              <a:t>1.</a:t>
+            </a:r>
+            <a:r>
+              <a:rPr lang="en-US" baseline="0" dirty="0" smtClean="0"/>
+              <a:t> It doesn't matter...you could use the </a:t>
+            </a:r>
+            <a:r>
+              <a:rPr lang="en-US" dirty="0" smtClean="0"/>
+              <a:t>node's FQDN or just its IP address.</a:t>
+            </a:r>
+          </a:p>
+          <a:p>
+            <a:r>
+              <a:rPr lang="en-US" dirty="0" smtClean="0"/>
+              <a:t>2. </a:t>
+            </a:r>
+            <a:r>
+              <a:rPr lang="en-US" baseline="0" dirty="0" smtClean="0"/>
+              <a:t>`</a:t>
+            </a:r>
+            <a:r>
+              <a:rPr lang="en-US" baseline="0" dirty="0" err="1" smtClean="0"/>
+              <a:t>inspec</a:t>
+            </a:r>
+            <a:r>
+              <a:rPr lang="en-US" baseline="0" dirty="0" smtClean="0"/>
+              <a:t> exec` can be used to test a compliance profile against </a:t>
+            </a:r>
+            <a:r>
+              <a:rPr lang="en-US" dirty="0" smtClean="0"/>
+              <a:t>remote hosts, including </a:t>
+            </a:r>
+            <a:r>
+              <a:rPr lang="en-US" dirty="0" err="1" smtClean="0"/>
+              <a:t>docker</a:t>
+            </a:r>
+            <a:r>
+              <a:rPr lang="en-US" dirty="0" smtClean="0"/>
+              <a:t> containers.</a:t>
+            </a:r>
+          </a:p>
+          <a:p>
+            <a:r>
+              <a:rPr lang="en-US" sz="1200" baseline="0" dirty="0" smtClean="0"/>
+              <a:t>3. </a:t>
+            </a:r>
+            <a:r>
+              <a:rPr lang="en-US" sz="1200" dirty="0" smtClean="0"/>
+              <a:t>The `impact` value in a Compliance Profile defines severity. See slide 3-22 through slide 3-24 for examples.</a:t>
+            </a:r>
+          </a:p>
+          <a:p>
+            <a:r>
+              <a:rPr lang="en-US" sz="1200" dirty="0" smtClean="0"/>
+              <a:t>4. The `describe` section is the actual test.</a:t>
+            </a:r>
+          </a:p>
+          <a:p>
+            <a:endParaRPr lang="en-US" sz="1200" dirty="0" smtClean="0"/>
+          </a:p>
           <a:p>
             <a:endParaRPr lang="en-US" dirty="0"/>
           </a:p>
@@ -11156,6 +11238,52 @@
                 <a:effectLst/>
               </a:rPr>
               <a:t>` is uncommented. </a:t>
+            </a:r>
+            <a:r>
+              <a:rPr lang="en-US" dirty="0" smtClean="0">
+                <a:effectLst/>
+              </a:rPr>
+              <a:t>The Linux</a:t>
+            </a:r>
+            <a:r>
+              <a:rPr lang="en-US" baseline="0" dirty="0" smtClean="0">
+                <a:effectLst/>
+              </a:rPr>
+              <a:t> AMI used in this course </a:t>
+            </a:r>
+            <a:r>
+              <a:rPr lang="en-US" sz="1200" b="0" i="0" kern="1200" dirty="0" smtClean="0">
+                <a:solidFill>
+                  <a:schemeClr val="tx1"/>
+                </a:solidFill>
+                <a:effectLst/>
+                <a:latin typeface="Arial" panose="020B0604020202020204" pitchFamily="34" charset="0"/>
+                <a:ea typeface="ＭＳ Ｐゴシック" charset="0"/>
+                <a:cs typeface="Arial" panose="020B0604020202020204" pitchFamily="34" charset="0"/>
+              </a:rPr>
+              <a:t>has /etc/sudoers  </a:t>
+            </a:r>
+            <a:r>
+              <a:rPr lang="en-US" dirty="0" smtClean="0">
+                <a:effectLst/>
+              </a:rPr>
+              <a:t>`</a:t>
+            </a:r>
+            <a:r>
+              <a:rPr lang="en-US" dirty="0" smtClean="0"/>
+              <a:t>Defaults    requiretty</a:t>
+            </a:r>
+            <a:r>
+              <a:rPr lang="en-US" dirty="0" smtClean="0">
+                <a:effectLst/>
+              </a:rPr>
+              <a:t>` commented</a:t>
+            </a:r>
+            <a:r>
+              <a:rPr lang="en-US" baseline="0" dirty="0" smtClean="0">
+                <a:effectLst/>
+              </a:rPr>
+              <a:t> so no worries."</a:t>
             </a:r>
             <a:r>
               <a:rPr lang="en-US" dirty="0" smtClean="0"/>
@@ -12269,14 +12397,14 @@
           </a:ln>
           <a:extLst>
             <a:ext uri="{909E8E84-426E-40dd-AFC4-6F175D3DCCD1}">
-              <a14:hiddenFill xmlns="" xmlns:a14="http://schemas.microsoft.com/office/drawing/2010/main">
+              <a14:hiddenFill xmlns:a14="http://schemas.microsoft.com/office/drawing/2010/main" xmlns="">
                 <a:solidFill>
                   <a:srgbClr val="FFFFFF"/>
                 </a:solidFill>
               </a14:hiddenFill>
             </a:ext>
             <a:ext uri="{91240B29-F687-4f45-9708-019B960494DF}">
-              <a14:hiddenLine xmlns="" xmlns:a14="http://schemas.microsoft.com/office/drawing/2010/main" w="9525">
+              <a14:hiddenLine xmlns:a14="http://schemas.microsoft.com/office/drawing/2010/main" xmlns="" w="9525">
                 <a:solidFill>
                   <a:srgbClr val="000000"/>
                 </a:solidFill>
@@ -12424,14 +12552,14 @@
           </a:ln>
           <a:extLst>
             <a:ext uri="{909E8E84-426E-40dd-AFC4-6F175D3DCCD1}">
-              <a14:hiddenFill xmlns="" xmlns:a14="http://schemas.microsoft.com/office/drawing/2010/main">
+              <a14:hiddenFill xmlns:a14="http://schemas.microsoft.com/office/drawing/2010/main" xmlns="">
                 <a:solidFill>
                   <a:srgbClr val="FFFFFF"/>
                 </a:solidFill>
               </a14:hiddenFill>
             </a:ext>
             <a:ext uri="{91240B29-F687-4f45-9708-019B960494DF}">
-              <a14:hiddenLine xmlns="" xmlns:a14="http://schemas.microsoft.com/office/drawing/2010/main" w="9525">
+              <a14:hiddenLine xmlns:a14="http://schemas.microsoft.com/office/drawing/2010/main" xmlns="" w="9525">
                 <a:solidFill>
                   <a:srgbClr val="000000"/>
                 </a:solidFill>
@@ -12922,14 +13050,14 @@
           </a:ln>
           <a:extLst>
             <a:ext uri="{909E8E84-426E-40dd-AFC4-6F175D3DCCD1}">
-              <a14:hiddenFill xmlns="" xmlns:a14="http://schemas.microsoft.com/office/drawing/2010/main">
+              <a14:hiddenFill xmlns:a14="http://schemas.microsoft.com/office/drawing/2010/main" xmlns="">
                 <a:solidFill>
                   <a:srgbClr val="FFFFFF"/>
                 </a:solidFill>
               </a14:hiddenFill>
             </a:ext>
             <a:ext uri="{91240B29-F687-4f45-9708-019B960494DF}">
-              <a14:hiddenLine xmlns="" xmlns:a14="http://schemas.microsoft.com/office/drawing/2010/main" w="9525">
+              <a14:hiddenLine xmlns:a14="http://schemas.microsoft.com/office/drawing/2010/main" xmlns="" w="9525">
                 <a:solidFill>
                   <a:srgbClr val="000000"/>
                 </a:solidFill>
@@ -13168,14 +13296,14 @@
           </a:ln>
           <a:extLst>
             <a:ext uri="{909E8E84-426E-40dd-AFC4-6F175D3DCCD1}">
-              <a14:hiddenFill xmlns="" xmlns:a14="http://schemas.microsoft.com/office/drawing/2010/main">
+              <a14:hiddenFill xmlns:a14="http://schemas.microsoft.com/office/drawing/2010/main" xmlns="">
                 <a:solidFill>
                   <a:srgbClr val="FFFFFF"/>
                 </a:solidFill>
               </a14:hiddenFill>
             </a:ext>
             <a:ext uri="{91240B29-F687-4f45-9708-019B960494DF}">
-              <a14:hiddenLine xmlns="" xmlns:a14="http://schemas.microsoft.com/office/drawing/2010/main" w="9525">
+              <a14:hiddenLine xmlns:a14="http://schemas.microsoft.com/office/drawing/2010/main" xmlns="" w="9525">
                 <a:solidFill>
                   <a:srgbClr val="000000"/>
                 </a:solidFill>
@@ -15103,14 +15231,14 @@
           </a:ln>
           <a:extLst>
             <a:ext uri="{909E8E84-426E-40dd-AFC4-6F175D3DCCD1}">
-              <a14:hiddenFill xmlns="" xmlns:a14="http://schemas.microsoft.com/office/drawing/2010/main">
+              <a14:hiddenFill xmlns:a14="http://schemas.microsoft.com/office/drawing/2010/main" xmlns="">
                 <a:solidFill>
                   <a:srgbClr val="FFFFFF"/>
                 </a:solidFill>
               </a14:hiddenFill>
             </a:ext>
             <a:ext uri="{91240B29-F687-4f45-9708-019B960494DF}">
-              <a14:hiddenLine xmlns="" xmlns:a14="http://schemas.microsoft.com/office/drawing/2010/main" w="9525">
+              <a14:hiddenLine xmlns:a14="http://schemas.microsoft.com/office/drawing/2010/main" xmlns="" w="9525">
                 <a:solidFill>
                   <a:srgbClr val="000000"/>
                 </a:solidFill>
@@ -16644,14 +16772,14 @@
           </a:ln>
           <a:extLst>
             <a:ext uri="{909E8E84-426E-40dd-AFC4-6F175D3DCCD1}">
-              <a14:hiddenFill xmlns="" xmlns:a14="http://schemas.microsoft.com/office/drawing/2010/main">
+              <a14:hiddenFill xmlns:a14="http://schemas.microsoft.com/office/drawing/2010/main" xmlns="">
                 <a:solidFill>
                   <a:srgbClr val="FFFFFF"/>
                 </a:solidFill>
               </a14:hiddenFill>
             </a:ext>
             <a:ext uri="{91240B29-F687-4f45-9708-019B960494DF}">
-              <a14:hiddenLine xmlns="" xmlns:a14="http://schemas.microsoft.com/office/drawing/2010/main" w="9525">
+              <a14:hiddenLine xmlns:a14="http://schemas.microsoft.com/office/drawing/2010/main" xmlns="" w="9525">
                 <a:solidFill>
                   <a:srgbClr val="000000"/>
                 </a:solidFill>
@@ -17209,14 +17337,14 @@
           </a:ln>
           <a:extLst>
             <a:ext uri="{909E8E84-426E-40dd-AFC4-6F175D3DCCD1}">
-              <a14:hiddenFill xmlns="" xmlns:a14="http://schemas.microsoft.com/office/drawing/2010/main">
+              <a14:hiddenFill xmlns:a14="http://schemas.microsoft.com/office/drawing/2010/main" xmlns="">
                 <a:solidFill>
                   <a:srgbClr val="FFFFFF"/>
                 </a:solidFill>
               </a14:hiddenFill>
             </a:ext>
             <a:ext uri="{91240B29-F687-4f45-9708-019B960494DF}">
-              <a14:hiddenLine xmlns="" xmlns:a14="http://schemas.microsoft.com/office/drawing/2010/main" w="9525">
+              <a14:hiddenLine xmlns:a14="http://schemas.microsoft.com/office/drawing/2010/main" xmlns="" w="9525">
                 <a:solidFill>
                   <a:srgbClr val="000000"/>
                 </a:solidFill>
@@ -17783,14 +17911,14 @@
           </a:ln>
           <a:extLst>
             <a:ext uri="{909E8E84-426E-40dd-AFC4-6F175D3DCCD1}">
-              <a14:hiddenFill xmlns="" xmlns:a14="http://schemas.microsoft.com/office/drawing/2010/main">
+              <a14:hiddenFill xmlns:a14="http://schemas.microsoft.com/office/drawing/2010/main" xmlns="">
                 <a:solidFill>
                   <a:srgbClr val="FFFFFF"/>
                 </a:solidFill>
               </a14:hiddenFill>
             </a:ext>
             <a:ext uri="{91240B29-F687-4f45-9708-019B960494DF}">
-              <a14:hiddenLine xmlns="" xmlns:a14="http://schemas.microsoft.com/office/drawing/2010/main" w="9525">
+              <a14:hiddenLine xmlns:a14="http://schemas.microsoft.com/office/drawing/2010/main" xmlns="" w="9525">
                 <a:solidFill>
                   <a:srgbClr val="000000"/>
                 </a:solidFill>
@@ -18730,14 +18858,14 @@
           </a:ln>
           <a:extLst>
             <a:ext uri="{909E8E84-426E-40dd-AFC4-6F175D3DCCD1}">
-              <a14:hiddenFill xmlns="" xmlns:a14="http://schemas.microsoft.com/office/drawing/2010/main">
+              <a14:hiddenFill xmlns:a14="http://schemas.microsoft.com/office/drawing/2010/main" xmlns="">
                 <a:solidFill>
                   <a:srgbClr val="FFFFFF"/>
                 </a:solidFill>
               </a14:hiddenFill>
             </a:ext>
             <a:ext uri="{91240B29-F687-4f45-9708-019B960494DF}">
-              <a14:hiddenLine xmlns="" xmlns:a14="http://schemas.microsoft.com/office/drawing/2010/main" w="9525">
+              <a14:hiddenLine xmlns:a14="http://schemas.microsoft.com/office/drawing/2010/main" xmlns="" w="9525">
                 <a:solidFill>
                   <a:srgbClr val="000000"/>
                 </a:solidFill>
@@ -19490,14 +19618,14 @@
           </a:ln>
           <a:extLst>
             <a:ext uri="{909E8E84-426E-40dd-AFC4-6F175D3DCCD1}">
-              <a14:hiddenFill xmlns="" xmlns:a14="http://schemas.microsoft.com/office/drawing/2010/main">
+              <a14:hiddenFill xmlns:a14="http://schemas.microsoft.com/office/drawing/2010/main" xmlns="">
                 <a:solidFill>
                   <a:srgbClr val="FFFFFF"/>
                 </a:solidFill>
               </a14:hiddenFill>
             </a:ext>
             <a:ext uri="{91240B29-F687-4f45-9708-019B960494DF}">
-              <a14:hiddenLine xmlns="" xmlns:a14="http://schemas.microsoft.com/office/drawing/2010/main" w="9525">
+              <a14:hiddenLine xmlns:a14="http://schemas.microsoft.com/office/drawing/2010/main" xmlns="" w="9525">
                 <a:solidFill>
                   <a:srgbClr val="000000"/>
                 </a:solidFill>
@@ -28694,7 +28822,48 @@
           <a:p>
             <a:r>
               <a:rPr lang="en-US" dirty="0" smtClean="0"/>
-              <a:t>containers.</a:t>
+              <a:t>containers</a:t>
+            </a:r>
+            <a:r>
+              <a:rPr lang="en-US" dirty="0" smtClean="0"/>
+              <a:t>.</a:t>
+            </a:r>
+          </a:p>
+          <a:p>
+            <a:endParaRPr lang="en-US" dirty="0"/>
+          </a:p>
+          <a:p>
+            <a:r>
+              <a:rPr lang="en-US" dirty="0" smtClean="0"/>
+              <a:t>You can use '</a:t>
+            </a:r>
+            <a:r>
+              <a:rPr lang="en-US" dirty="0" err="1" smtClean="0"/>
+              <a:t>inspec</a:t>
+            </a:r>
+            <a:r>
+              <a:rPr lang="en-US" dirty="0" smtClean="0"/>
+              <a:t> exec' </a:t>
+            </a:r>
+            <a:r>
+              <a:rPr lang="en-US" dirty="0"/>
+              <a:t>to run </a:t>
+            </a:r>
+            <a:r>
+              <a:rPr lang="en-US" dirty="0" smtClean="0"/>
+              <a:t>tests </a:t>
+            </a:r>
+            <a:r>
+              <a:rPr lang="en-US" dirty="0"/>
+              <a:t>at </a:t>
+            </a:r>
+            <a:r>
+              <a:rPr lang="en-US" dirty="0" smtClean="0"/>
+              <a:t>a specified </a:t>
+            </a:r>
+            <a:r>
+              <a:rPr lang="en-US" dirty="0"/>
+              <a:t>path.</a:t>
             </a:r>
             <a:endParaRPr lang="en-US" dirty="0"/>
           </a:p>
@@ -31840,7 +32009,12 @@
             <p:ph type="body" sz="quarter" idx="12"/>
           </p:nvPr>
         </p:nvSpPr>
-        <p:spPr/>
+        <p:spPr>
+          <a:xfrm>
+            <a:off x="650039" y="1856198"/>
+            <a:ext cx="15089313" cy="5345953"/>
+          </a:xfrm>
+        </p:spPr>
         <p:txBody>
           <a:bodyPr/>
           <a:lstStyle/>
@@ -31851,15 +32025,24 @@
             </a:pPr>
             <a:r>
               <a:rPr lang="en-US" dirty="0" smtClean="0"/>
-              <a:t>What is ...?</a:t>
+              <a:t>When adding a node to the Compliance server's dashboard, should you </a:t>
+            </a:r>
+            <a:r>
+              <a:rPr lang="en-US" dirty="0"/>
+              <a:t>use the node's FQDN or </a:t>
+            </a:r>
+            <a:r>
+              <a:rPr lang="en-US" dirty="0" smtClean="0"/>
+              <a:t>just its IP address?</a:t>
+            </a:r>
+            <a:r>
+              <a:rPr lang="en-US" dirty="0" smtClean="0"/>
+              <a:t/>
             </a:r>
             <a:br>
               <a:rPr lang="en-US" dirty="0" smtClean="0"/>
             </a:br>
-            <a:r>
-              <a:rPr lang="en-US" dirty="0" smtClean="0"/>
-              <a:t>______________________________</a:t>
-            </a:r>
+            <a:endParaRPr lang="en-US" dirty="0" smtClean="0"/>
           </a:p>
           <a:p>
             <a:pPr marL="514350" indent="-514350">
@@ -31868,47 +32051,19 @@
             </a:pPr>
             <a:r>
               <a:rPr lang="en-US" dirty="0" smtClean="0"/>
-              <a:t>Which is the correct answer?  </a:t>
-            </a:r>
-          </a:p>
-          <a:p>
-            <a:pPr marL="822325" lvl="1" indent="-514350">
-              <a:buFont typeface="+mj-lt"/>
-              <a:buAutoNum type="alphaLcPeriod"/>
-            </a:pPr>
-            <a:r>
-              <a:rPr lang="en-US" dirty="0" smtClean="0"/>
-              <a:t>answer</a:t>
-            </a:r>
-          </a:p>
-          <a:p>
-            <a:pPr marL="822325" lvl="1" indent="-514350">
-              <a:buFont typeface="+mj-lt"/>
-              <a:buAutoNum type="alphaLcPeriod"/>
-            </a:pPr>
-            <a:r>
-              <a:rPr lang="en-US" dirty="0" smtClean="0"/>
-              <a:t>answer</a:t>
-            </a:r>
-          </a:p>
-          <a:p>
-            <a:pPr marL="822325" lvl="1" indent="-514350">
-              <a:buFont typeface="+mj-lt"/>
-              <a:buAutoNum type="alphaLcPeriod"/>
-            </a:pPr>
-            <a:r>
-              <a:rPr lang="en-US" dirty="0" smtClean="0"/>
-              <a:t>answer</a:t>
-            </a:r>
-          </a:p>
-          <a:p>
-            <a:pPr marL="822325" lvl="1" indent="-514350">
-              <a:buFont typeface="+mj-lt"/>
-              <a:buAutoNum type="alphaLcPeriod"/>
-            </a:pPr>
-            <a:r>
-              <a:rPr lang="en-US" dirty="0" smtClean="0"/>
-              <a:t>answer</a:t>
+              <a:t>What can `</a:t>
+            </a:r>
+            <a:r>
+              <a:rPr lang="en-US" dirty="0" err="1" smtClean="0"/>
+              <a:t>inspec</a:t>
+            </a:r>
+            <a:r>
+              <a:rPr lang="en-US" dirty="0" smtClean="0"/>
+              <a:t> exec` be used for?</a:t>
+            </a:r>
+            <a:r>
+              <a:rPr lang="en-US" dirty="0" smtClean="0"/>
+              <a:t/>
             </a:r>
             <a:br>
               <a:rPr lang="en-US" dirty="0" smtClean="0"/>
@@ -31922,7 +32077,7 @@
             </a:pPr>
             <a:r>
               <a:rPr lang="en-US" dirty="0" smtClean="0"/>
-              <a:t>Capable of carrying on a conversation</a:t>
+              <a:t>How are compliance severities defined?</a:t>
             </a:r>
           </a:p>
           <a:p>
@@ -31930,14 +32085,57 @@
               <a:buFont typeface="+mj-lt"/>
               <a:buAutoNum type="arabicPeriod"/>
             </a:pPr>
-            <a:r>
-              <a:rPr lang="en-US" dirty="0" smtClean="0"/>
-              <a:t>Explain</a:t>
-            </a:r>
             <a:endParaRPr lang="en-US" dirty="0"/>
           </a:p>
-        </p:txBody>
-      </p:sp>
+          <a:p>
+            <a:pPr marL="514350" indent="-514350">
+              <a:buFont typeface="+mj-lt"/>
+              <a:buAutoNum type="arabicPeriod"/>
+            </a:pPr>
+            <a:r>
+              <a:rPr lang="en-US" dirty="0" smtClean="0"/>
+              <a:t>Using the image on the right, what section</a:t>
+            </a:r>
+            <a:br>
+              <a:rPr lang="en-US" dirty="0" smtClean="0"/>
+            </a:br>
+            <a:r>
+              <a:rPr lang="en-US" dirty="0" smtClean="0"/>
+              <a:t>is the actual test?</a:t>
+            </a:r>
+            <a:endParaRPr lang="en-US" dirty="0"/>
+          </a:p>
+        </p:txBody>
+      </p:sp>
+      <p:pic>
+        <p:nvPicPr>
+          <p:cNvPr id="4" name="Picture 3"/>
+          <p:cNvPicPr>
+            <a:picLocks noChangeAspect="1"/>
+          </p:cNvPicPr>
+          <p:nvPr/>
+        </p:nvPicPr>
+        <p:blipFill>
+          <a:blip r:embed="rId3"/>
+          <a:stretch>
+            <a:fillRect/>
+          </a:stretch>
+        </p:blipFill>
+        <p:spPr>
+          <a:xfrm>
+            <a:off x="9299643" y="5164954"/>
+            <a:ext cx="6439709" cy="2780456"/>
+          </a:xfrm>
+          <a:prstGeom prst="rect">
+            <a:avLst/>
+          </a:prstGeom>
+          <a:ln>
+            <a:solidFill>
+              <a:schemeClr val="accent1"/>
+            </a:solidFill>
+          </a:ln>
+        </p:spPr>
+      </p:pic>
     </p:spTree>
     <p:extLst>
       <p:ext uri="{BB962C8B-B14F-4D97-AF65-F5344CB8AC3E}">
@@ -34076,73 +34274,6 @@
 </file>
 
 <file path=customXml/item1.xml><?xml version="1.0" encoding="utf-8"?>
-<?mso-contentType ?>
-<FormTemplates xmlns="http://schemas.microsoft.com/sharepoint/v3/contenttype/forms">
-  <Display>DocumentLibraryForm</Display>
-  <Edit>DocumentLibraryForm</Edit>
-  <New>DocumentLibraryForm</New>
-</FormTemplates>
-</file>
-
-<file path=customXml/item2.xml><?xml version="1.0" encoding="utf-8"?>
-<p:properties xmlns:p="http://schemas.microsoft.com/office/2006/metadata/properties" xmlns:xsi="http://www.w3.org/2001/XMLSchema-instance" xmlns:pc="http://schemas.microsoft.com/office/infopath/2007/PartnerControls">
-  <documentManagement>
-    <_dlc_DocId xmlns="7bb5d761-a2ea-4873-95f7-7a6658fb3ef0">M4CWTKMW727E-592-73</_dlc_DocId>
-    <_dlc_DocIdUrl xmlns="7bb5d761-a2ea-4873-95f7-7a6658fb3ef0">
-      <Url>https://kms.vci.local/marketing/team/_layouts/DocIdRedir.aspx?ID=M4CWTKMW727E-592-73</Url>
-      <Description>M4CWTKMW727E-592-73</Description>
-    </_dlc_DocIdUrl>
-  </documentManagement>
-</p:properties>
-</file>
-
-<file path=customXml/item3.xml><?xml version="1.0" encoding="utf-8"?>
-<?mso-contentType ?>
-<spe:Receivers xmlns:spe="http://schemas.microsoft.com/sharepoint/events">
-  <Receiver>
-    <Name>Document ID Generator</Name>
-    <Synchronization>Synchronous</Synchronization>
-    <Type>10001</Type>
-    <SequenceNumber>1000</SequenceNumber>
-    <Assembly>Microsoft.Office.DocumentManagement, Version=14.0.0.0, Culture=neutral, PublicKeyToken=71e9bce111e9429c</Assembly>
-    <Class>Microsoft.Office.DocumentManagement.Internal.DocIdHandler</Class>
-    <Data/>
-    <Filter/>
-  </Receiver>
-  <Receiver>
-    <Name>Document ID Generator</Name>
-    <Synchronization>Synchronous</Synchronization>
-    <Type>10002</Type>
-    <SequenceNumber>1001</SequenceNumber>
-    <Assembly>Microsoft.Office.DocumentManagement, Version=14.0.0.0, Culture=neutral, PublicKeyToken=71e9bce111e9429c</Assembly>
-    <Class>Microsoft.Office.DocumentManagement.Internal.DocIdHandler</Class>
-    <Data/>
-    <Filter/>
-  </Receiver>
-  <Receiver>
-    <Name>Document ID Generator</Name>
-    <Synchronization>Synchronous</Synchronization>
-    <Type>10004</Type>
-    <SequenceNumber>1002</SequenceNumber>
-    <Assembly>Microsoft.Office.DocumentManagement, Version=14.0.0.0, Culture=neutral, PublicKeyToken=71e9bce111e9429c</Assembly>
-    <Class>Microsoft.Office.DocumentManagement.Internal.DocIdHandler</Class>
-    <Data/>
-    <Filter/>
-  </Receiver>
-  <Receiver>
-    <Name>Document ID Generator</Name>
-    <Synchronization>Synchronous</Synchronization>
-    <Type>10006</Type>
-    <SequenceNumber>1003</SequenceNumber>
-    <Assembly>Microsoft.Office.DocumentManagement, Version=14.0.0.0, Culture=neutral, PublicKeyToken=71e9bce111e9429c</Assembly>
-    <Class>Microsoft.Office.DocumentManagement.Internal.DocIdHandler</Class>
-    <Data/>
-    <Filter/>
-  </Receiver>
-</spe:Receivers>
-</file>
-
-<file path=customXml/item4.xml><?xml version="1.0" encoding="utf-8"?>
 <ct:contentTypeSchema xmlns:ct="http://schemas.microsoft.com/office/2006/metadata/contentType" xmlns:ma="http://schemas.microsoft.com/office/2006/metadata/properties/metaAttributes" ct:_="" ma:_="" ma:contentTypeName="Document" ma:contentTypeID="0x0101000812F700BE7F874999720E88173FE491" ma:contentTypeVersion="0" ma:contentTypeDescription="Create a new document." ma:contentTypeScope="" ma:versionID="3f79f408e2ca720b7aba6e0e32464d0c">
   <xsd:schema xmlns:xsd="http://www.w3.org/2001/XMLSchema" xmlns:xs="http://www.w3.org/2001/XMLSchema" xmlns:p="http://schemas.microsoft.com/office/2006/metadata/properties" xmlns:ns2="7bb5d761-a2ea-4873-95f7-7a6658fb3ef0" targetNamespace="http://schemas.microsoft.com/office/2006/metadata/properties" ma:root="true" ma:fieldsID="1e062cd38ba31e406bfc4340fbc7f87a" ns2:_="">
     <xsd:import namespace="7bb5d761-a2ea-4873-95f7-7a6658fb3ef0"/>
@@ -34287,39 +34418,74 @@
 </ct:contentTypeSchema>
 </file>
 
-<file path=customXml/itemProps1.xml><?xml version="1.0" encoding="utf-8"?>
-<ds:datastoreItem xmlns:ds="http://schemas.openxmlformats.org/officeDocument/2006/customXml" ds:itemID="{5CDEB364-43EC-4510-9881-539C2A3FCE9E}">
-  <ds:schemaRefs>
-    <ds:schemaRef ds:uri="http://schemas.microsoft.com/sharepoint/v3/contenttype/forms"/>
-  </ds:schemaRefs>
-</ds:datastoreItem>
+<file path=customXml/item2.xml><?xml version="1.0" encoding="utf-8"?>
+<?mso-contentType ?>
+<spe:Receivers xmlns:spe="http://schemas.microsoft.com/sharepoint/events">
+  <Receiver>
+    <Name>Document ID Generator</Name>
+    <Synchronization>Synchronous</Synchronization>
+    <Type>10001</Type>
+    <SequenceNumber>1000</SequenceNumber>
+    <Assembly>Microsoft.Office.DocumentManagement, Version=14.0.0.0, Culture=neutral, PublicKeyToken=71e9bce111e9429c</Assembly>
+    <Class>Microsoft.Office.DocumentManagement.Internal.DocIdHandler</Class>
+    <Data/>
+    <Filter/>
+  </Receiver>
+  <Receiver>
+    <Name>Document ID Generator</Name>
+    <Synchronization>Synchronous</Synchronization>
+    <Type>10002</Type>
+    <SequenceNumber>1001</SequenceNumber>
+    <Assembly>Microsoft.Office.DocumentManagement, Version=14.0.0.0, Culture=neutral, PublicKeyToken=71e9bce111e9429c</Assembly>
+    <Class>Microsoft.Office.DocumentManagement.Internal.DocIdHandler</Class>
+    <Data/>
+    <Filter/>
+  </Receiver>
+  <Receiver>
+    <Name>Document ID Generator</Name>
+    <Synchronization>Synchronous</Synchronization>
+    <Type>10004</Type>
+    <SequenceNumber>1002</SequenceNumber>
+    <Assembly>Microsoft.Office.DocumentManagement, Version=14.0.0.0, Culture=neutral, PublicKeyToken=71e9bce111e9429c</Assembly>
+    <Class>Microsoft.Office.DocumentManagement.Internal.DocIdHandler</Class>
+    <Data/>
+    <Filter/>
+  </Receiver>
+  <Receiver>
+    <Name>Document ID Generator</Name>
+    <Synchronization>Synchronous</Synchronization>
+    <Type>10006</Type>
+    <SequenceNumber>1003</SequenceNumber>
+    <Assembly>Microsoft.Office.DocumentManagement, Version=14.0.0.0, Culture=neutral, PublicKeyToken=71e9bce111e9429c</Assembly>
+    <Class>Microsoft.Office.DocumentManagement.Internal.DocIdHandler</Class>
+    <Data/>
+    <Filter/>
+  </Receiver>
+</spe:Receivers>
 </file>
 
-<file path=customXml/itemProps2.xml><?xml version="1.0" encoding="utf-8"?>
-<ds:datastoreItem xmlns:ds="http://schemas.openxmlformats.org/officeDocument/2006/customXml" ds:itemID="{6921749B-AEB7-461B-845F-603CABD25259}">
-  <ds:schemaRefs>
-    <ds:schemaRef ds:uri="http://purl.org/dc/terms/"/>
-    <ds:schemaRef ds:uri="http://schemas.openxmlformats.org/package/2006/metadata/core-properties"/>
-    <ds:schemaRef ds:uri="http://purl.org/dc/dcmitype/"/>
-    <ds:schemaRef ds:uri="http://schemas.microsoft.com/office/infopath/2007/PartnerControls"/>
-    <ds:schemaRef ds:uri="http://purl.org/dc/elements/1.1/"/>
-    <ds:schemaRef ds:uri="http://schemas.microsoft.com/office/2006/metadata/properties"/>
-    <ds:schemaRef ds:uri="http://schemas.microsoft.com/office/2006/documentManagement/types"/>
-    <ds:schemaRef ds:uri="7bb5d761-a2ea-4873-95f7-7a6658fb3ef0"/>
-    <ds:schemaRef ds:uri="http://www.w3.org/XML/1998/namespace"/>
-  </ds:schemaRefs>
-</ds:datastoreItem>
+<file path=customXml/item3.xml><?xml version="1.0" encoding="utf-8"?>
+<?mso-contentType ?>
+<FormTemplates xmlns="http://schemas.microsoft.com/sharepoint/v3/contenttype/forms">
+  <Display>DocumentLibraryForm</Display>
+  <Edit>DocumentLibraryForm</Edit>
+  <New>DocumentLibraryForm</New>
+</FormTemplates>
 </file>
 
-<file path=customXml/itemProps3.xml><?xml version="1.0" encoding="utf-8"?>
-<ds:datastoreItem xmlns:ds="http://schemas.openxmlformats.org/officeDocument/2006/customXml" ds:itemID="{B13EBC30-FE27-4C6A-B723-23FC2188F7DC}">
-  <ds:schemaRefs>
-    <ds:schemaRef ds:uri="http://schemas.microsoft.com/sharepoint/events"/>
-  </ds:schemaRefs>
-</ds:datastoreItem>
+<file path=customXml/item4.xml><?xml version="1.0" encoding="utf-8"?>
+<p:properties xmlns:p="http://schemas.microsoft.com/office/2006/metadata/properties" xmlns:xsi="http://www.w3.org/2001/XMLSchema-instance" xmlns:pc="http://schemas.microsoft.com/office/infopath/2007/PartnerControls">
+  <documentManagement>
+    <_dlc_DocId xmlns="7bb5d761-a2ea-4873-95f7-7a6658fb3ef0">M4CWTKMW727E-592-73</_dlc_DocId>
+    <_dlc_DocIdUrl xmlns="7bb5d761-a2ea-4873-95f7-7a6658fb3ef0">
+      <Url>https://kms.vci.local/marketing/team/_layouts/DocIdRedir.aspx?ID=M4CWTKMW727E-592-73</Url>
+      <Description>M4CWTKMW727E-592-73</Description>
+    </_dlc_DocIdUrl>
+  </documentManagement>
+</p:properties>
 </file>
 
-<file path=customXml/itemProps4.xml><?xml version="1.0" encoding="utf-8"?>
+<file path=customXml/itemProps1.xml><?xml version="1.0" encoding="utf-8"?>
 <ds:datastoreItem xmlns:ds="http://schemas.openxmlformats.org/officeDocument/2006/customXml" ds:itemID="{164479E5-0B02-49AC-B79E-EC1D6164DDD3}">
   <ds:schemaRefs>
     <ds:schemaRef ds:uri="http://schemas.microsoft.com/office/2006/metadata/contentType"/>
@@ -34335,4 +34501,36 @@
     <ds:schemaRef ds:uri="http://schemas.microsoft.com/internal/obd"/>
   </ds:schemaRefs>
 </ds:datastoreItem>
+</file>
+
+<file path=customXml/itemProps2.xml><?xml version="1.0" encoding="utf-8"?>
+<ds:datastoreItem xmlns:ds="http://schemas.openxmlformats.org/officeDocument/2006/customXml" ds:itemID="{B13EBC30-FE27-4C6A-B723-23FC2188F7DC}">
+  <ds:schemaRefs>
+    <ds:schemaRef ds:uri="http://schemas.microsoft.com/sharepoint/events"/>
+  </ds:schemaRefs>
+</ds:datastoreItem>
+</file>
+
+<file path=customXml/itemProps3.xml><?xml version="1.0" encoding="utf-8"?>
+<ds:datastoreItem xmlns:ds="http://schemas.openxmlformats.org/officeDocument/2006/customXml" ds:itemID="{5CDEB364-43EC-4510-9881-539C2A3FCE9E}">
+  <ds:schemaRefs>
+    <ds:schemaRef ds:uri="http://schemas.microsoft.com/sharepoint/v3/contenttype/forms"/>
+  </ds:schemaRefs>
+</ds:datastoreItem>
+</file>
+
+<file path=customXml/itemProps4.xml><?xml version="1.0" encoding="utf-8"?>
+<ds:datastoreItem xmlns:ds="http://schemas.openxmlformats.org/officeDocument/2006/customXml" ds:itemID="{6921749B-AEB7-461B-845F-603CABD25259}">
+  <ds:schemaRefs>
+    <ds:schemaRef ds:uri="http://purl.org/dc/terms/"/>
+    <ds:schemaRef ds:uri="http://schemas.openxmlformats.org/package/2006/metadata/core-properties"/>
+    <ds:schemaRef ds:uri="http://purl.org/dc/dcmitype/"/>
+    <ds:schemaRef ds:uri="http://schemas.microsoft.com/office/infopath/2007/PartnerControls"/>
+    <ds:schemaRef ds:uri="http://purl.org/dc/elements/1.1/"/>
+    <ds:schemaRef ds:uri="http://schemas.microsoft.com/office/2006/metadata/properties"/>
+    <ds:schemaRef ds:uri="http://schemas.microsoft.com/office/2006/documentManagement/types"/>
+    <ds:schemaRef ds:uri="7bb5d761-a2ea-4873-95f7-7a6658fb3ef0"/>
+    <ds:schemaRef ds:uri="http://www.w3.org/XML/1998/namespace"/>
+  </ds:schemaRefs>
+</ds:datastoreItem>
 </file>
</xml_diff>

<commit_message>
03-initial-configuration-scans nudged image on 3-60 quiz
</commit_message>
<xml_diff>
--- a/03-initial-configuration-scans.pptx
+++ b/03-initial-configuration-scans.pptx
@@ -335,7 +335,7 @@
               <a:pPr>
                 <a:defRPr/>
               </a:pPr>
-              <a:t>2016-02-11</a:t>
+              <a:t>2016-02-12</a:t>
             </a:fld>
             <a:endParaRPr lang="en-US" dirty="0"/>
           </a:p>
@@ -518,7 +518,7 @@
               <a:pPr>
                 <a:defRPr/>
               </a:pPr>
-              <a:t>2016-02-11</a:t>
+              <a:t>2016-02-12</a:t>
             </a:fld>
             <a:endParaRPr lang="en-US" dirty="0"/>
           </a:p>
@@ -11013,15 +11013,7 @@
             </a:r>
             <a:r>
               <a:rPr lang="en-US" sz="1200" dirty="0" smtClean="0"/>
-              <a:t>The `impact` value in a Compliance </a:t>
-            </a:r>
-            <a:r>
-              <a:rPr lang="en-US" sz="1200" dirty="0" smtClean="0"/>
-              <a:t>Profile/control </a:t>
-            </a:r>
-            <a:r>
-              <a:rPr lang="en-US" sz="1200" dirty="0" smtClean="0"/>
-              <a:t>defines severity. See slide 3-22 through slide 3-24 for examples.</a:t>
+              <a:t>The `impact` value in a Compliance Profile/control defines severity. See slide 3-22 through slide 3-24 for examples.</a:t>
             </a:r>
           </a:p>
           <a:p>
@@ -12583,14 +12575,14 @@
           </a:ln>
           <a:extLst>
             <a:ext uri="{909E8E84-426E-40dd-AFC4-6F175D3DCCD1}">
-              <a14:hiddenFill xmlns="" xmlns:a14="http://schemas.microsoft.com/office/drawing/2010/main">
+              <a14:hiddenFill xmlns:a14="http://schemas.microsoft.com/office/drawing/2010/main" xmlns="">
                 <a:solidFill>
                   <a:srgbClr val="FFFFFF"/>
                 </a:solidFill>
               </a14:hiddenFill>
             </a:ext>
             <a:ext uri="{91240B29-F687-4f45-9708-019B960494DF}">
-              <a14:hiddenLine xmlns="" xmlns:a14="http://schemas.microsoft.com/office/drawing/2010/main" w="9525">
+              <a14:hiddenLine xmlns:a14="http://schemas.microsoft.com/office/drawing/2010/main" xmlns="" w="9525">
                 <a:solidFill>
                   <a:srgbClr val="000000"/>
                 </a:solidFill>
@@ -12738,14 +12730,14 @@
           </a:ln>
           <a:extLst>
             <a:ext uri="{909E8E84-426E-40dd-AFC4-6F175D3DCCD1}">
-              <a14:hiddenFill xmlns="" xmlns:a14="http://schemas.microsoft.com/office/drawing/2010/main">
+              <a14:hiddenFill xmlns:a14="http://schemas.microsoft.com/office/drawing/2010/main" xmlns="">
                 <a:solidFill>
                   <a:srgbClr val="FFFFFF"/>
                 </a:solidFill>
               </a14:hiddenFill>
             </a:ext>
             <a:ext uri="{91240B29-F687-4f45-9708-019B960494DF}">
-              <a14:hiddenLine xmlns="" xmlns:a14="http://schemas.microsoft.com/office/drawing/2010/main" w="9525">
+              <a14:hiddenLine xmlns:a14="http://schemas.microsoft.com/office/drawing/2010/main" xmlns="" w="9525">
                 <a:solidFill>
                   <a:srgbClr val="000000"/>
                 </a:solidFill>
@@ -13236,14 +13228,14 @@
           </a:ln>
           <a:extLst>
             <a:ext uri="{909E8E84-426E-40dd-AFC4-6F175D3DCCD1}">
-              <a14:hiddenFill xmlns="" xmlns:a14="http://schemas.microsoft.com/office/drawing/2010/main">
+              <a14:hiddenFill xmlns:a14="http://schemas.microsoft.com/office/drawing/2010/main" xmlns="">
                 <a:solidFill>
                   <a:srgbClr val="FFFFFF"/>
                 </a:solidFill>
               </a14:hiddenFill>
             </a:ext>
             <a:ext uri="{91240B29-F687-4f45-9708-019B960494DF}">
-              <a14:hiddenLine xmlns="" xmlns:a14="http://schemas.microsoft.com/office/drawing/2010/main" w="9525">
+              <a14:hiddenLine xmlns:a14="http://schemas.microsoft.com/office/drawing/2010/main" xmlns="" w="9525">
                 <a:solidFill>
                   <a:srgbClr val="000000"/>
                 </a:solidFill>
@@ -13482,14 +13474,14 @@
           </a:ln>
           <a:extLst>
             <a:ext uri="{909E8E84-426E-40dd-AFC4-6F175D3DCCD1}">
-              <a14:hiddenFill xmlns="" xmlns:a14="http://schemas.microsoft.com/office/drawing/2010/main">
+              <a14:hiddenFill xmlns:a14="http://schemas.microsoft.com/office/drawing/2010/main" xmlns="">
                 <a:solidFill>
                   <a:srgbClr val="FFFFFF"/>
                 </a:solidFill>
               </a14:hiddenFill>
             </a:ext>
             <a:ext uri="{91240B29-F687-4f45-9708-019B960494DF}">
-              <a14:hiddenLine xmlns="" xmlns:a14="http://schemas.microsoft.com/office/drawing/2010/main" w="9525">
+              <a14:hiddenLine xmlns:a14="http://schemas.microsoft.com/office/drawing/2010/main" xmlns="" w="9525">
                 <a:solidFill>
                   <a:srgbClr val="000000"/>
                 </a:solidFill>
@@ -15417,14 +15409,14 @@
           </a:ln>
           <a:extLst>
             <a:ext uri="{909E8E84-426E-40dd-AFC4-6F175D3DCCD1}">
-              <a14:hiddenFill xmlns="" xmlns:a14="http://schemas.microsoft.com/office/drawing/2010/main">
+              <a14:hiddenFill xmlns:a14="http://schemas.microsoft.com/office/drawing/2010/main" xmlns="">
                 <a:solidFill>
                   <a:srgbClr val="FFFFFF"/>
                 </a:solidFill>
               </a14:hiddenFill>
             </a:ext>
             <a:ext uri="{91240B29-F687-4f45-9708-019B960494DF}">
-              <a14:hiddenLine xmlns="" xmlns:a14="http://schemas.microsoft.com/office/drawing/2010/main" w="9525">
+              <a14:hiddenLine xmlns:a14="http://schemas.microsoft.com/office/drawing/2010/main" xmlns="" w="9525">
                 <a:solidFill>
                   <a:srgbClr val="000000"/>
                 </a:solidFill>
@@ -16958,14 +16950,14 @@
           </a:ln>
           <a:extLst>
             <a:ext uri="{909E8E84-426E-40dd-AFC4-6F175D3DCCD1}">
-              <a14:hiddenFill xmlns="" xmlns:a14="http://schemas.microsoft.com/office/drawing/2010/main">
+              <a14:hiddenFill xmlns:a14="http://schemas.microsoft.com/office/drawing/2010/main" xmlns="">
                 <a:solidFill>
                   <a:srgbClr val="FFFFFF"/>
                 </a:solidFill>
               </a14:hiddenFill>
             </a:ext>
             <a:ext uri="{91240B29-F687-4f45-9708-019B960494DF}">
-              <a14:hiddenLine xmlns="" xmlns:a14="http://schemas.microsoft.com/office/drawing/2010/main" w="9525">
+              <a14:hiddenLine xmlns:a14="http://schemas.microsoft.com/office/drawing/2010/main" xmlns="" w="9525">
                 <a:solidFill>
                   <a:srgbClr val="000000"/>
                 </a:solidFill>
@@ -17523,14 +17515,14 @@
           </a:ln>
           <a:extLst>
             <a:ext uri="{909E8E84-426E-40dd-AFC4-6F175D3DCCD1}">
-              <a14:hiddenFill xmlns="" xmlns:a14="http://schemas.microsoft.com/office/drawing/2010/main">
+              <a14:hiddenFill xmlns:a14="http://schemas.microsoft.com/office/drawing/2010/main" xmlns="">
                 <a:solidFill>
                   <a:srgbClr val="FFFFFF"/>
                 </a:solidFill>
               </a14:hiddenFill>
             </a:ext>
             <a:ext uri="{91240B29-F687-4f45-9708-019B960494DF}">
-              <a14:hiddenLine xmlns="" xmlns:a14="http://schemas.microsoft.com/office/drawing/2010/main" w="9525">
+              <a14:hiddenLine xmlns:a14="http://schemas.microsoft.com/office/drawing/2010/main" xmlns="" w="9525">
                 <a:solidFill>
                   <a:srgbClr val="000000"/>
                 </a:solidFill>
@@ -18097,14 +18089,14 @@
           </a:ln>
           <a:extLst>
             <a:ext uri="{909E8E84-426E-40dd-AFC4-6F175D3DCCD1}">
-              <a14:hiddenFill xmlns="" xmlns:a14="http://schemas.microsoft.com/office/drawing/2010/main">
+              <a14:hiddenFill xmlns:a14="http://schemas.microsoft.com/office/drawing/2010/main" xmlns="">
                 <a:solidFill>
                   <a:srgbClr val="FFFFFF"/>
                 </a:solidFill>
               </a14:hiddenFill>
             </a:ext>
             <a:ext uri="{91240B29-F687-4f45-9708-019B960494DF}">
-              <a14:hiddenLine xmlns="" xmlns:a14="http://schemas.microsoft.com/office/drawing/2010/main" w="9525">
+              <a14:hiddenLine xmlns:a14="http://schemas.microsoft.com/office/drawing/2010/main" xmlns="" w="9525">
                 <a:solidFill>
                   <a:srgbClr val="000000"/>
                 </a:solidFill>
@@ -19044,14 +19036,14 @@
           </a:ln>
           <a:extLst>
             <a:ext uri="{909E8E84-426E-40dd-AFC4-6F175D3DCCD1}">
-              <a14:hiddenFill xmlns="" xmlns:a14="http://schemas.microsoft.com/office/drawing/2010/main">
+              <a14:hiddenFill xmlns:a14="http://schemas.microsoft.com/office/drawing/2010/main" xmlns="">
                 <a:solidFill>
                   <a:srgbClr val="FFFFFF"/>
                 </a:solidFill>
               </a14:hiddenFill>
             </a:ext>
             <a:ext uri="{91240B29-F687-4f45-9708-019B960494DF}">
-              <a14:hiddenLine xmlns="" xmlns:a14="http://schemas.microsoft.com/office/drawing/2010/main" w="9525">
+              <a14:hiddenLine xmlns:a14="http://schemas.microsoft.com/office/drawing/2010/main" xmlns="" w="9525">
                 <a:solidFill>
                   <a:srgbClr val="000000"/>
                 </a:solidFill>
@@ -19804,14 +19796,14 @@
           </a:ln>
           <a:extLst>
             <a:ext uri="{909E8E84-426E-40dd-AFC4-6F175D3DCCD1}">
-              <a14:hiddenFill xmlns="" xmlns:a14="http://schemas.microsoft.com/office/drawing/2010/main">
+              <a14:hiddenFill xmlns:a14="http://schemas.microsoft.com/office/drawing/2010/main" xmlns="">
                 <a:solidFill>
                   <a:srgbClr val="FFFFFF"/>
                 </a:solidFill>
               </a14:hiddenFill>
             </a:ext>
             <a:ext uri="{91240B29-F687-4f45-9708-019B960494DF}">
-              <a14:hiddenLine xmlns="" xmlns:a14="http://schemas.microsoft.com/office/drawing/2010/main" w="9525">
+              <a14:hiddenLine xmlns:a14="http://schemas.microsoft.com/office/drawing/2010/main" xmlns="" w="9525">
                 <a:solidFill>
                   <a:srgbClr val="000000"/>
                 </a:solidFill>
@@ -32296,7 +32288,7 @@
         </p:blipFill>
         <p:spPr>
           <a:xfrm>
-            <a:off x="8879339" y="4983480"/>
+            <a:off x="9133339" y="4983480"/>
             <a:ext cx="6860014" cy="2961930"/>
           </a:xfrm>
           <a:prstGeom prst="rect">
@@ -32419,10 +32411,6 @@
             <a:r>
               <a:rPr lang="en-US" dirty="0" smtClean="0"/>
               <a:t>?</a:t>
-            </a:r>
-            <a:r>
-              <a:rPr lang="en-US" dirty="0" smtClean="0"/>
-              <a:t/>
             </a:r>
             <a:br>
               <a:rPr lang="en-US" dirty="0" smtClean="0"/>
@@ -34603,52 +34591,6 @@
 </file>
 
 <file path=customXml/item1.xml><?xml version="1.0" encoding="utf-8"?>
-<?mso-contentType ?>
-<spe:Receivers xmlns:spe="http://schemas.microsoft.com/sharepoint/events">
-  <Receiver>
-    <Name>Document ID Generator</Name>
-    <Synchronization>Synchronous</Synchronization>
-    <Type>10001</Type>
-    <SequenceNumber>1000</SequenceNumber>
-    <Assembly>Microsoft.Office.DocumentManagement, Version=14.0.0.0, Culture=neutral, PublicKeyToken=71e9bce111e9429c</Assembly>
-    <Class>Microsoft.Office.DocumentManagement.Internal.DocIdHandler</Class>
-    <Data/>
-    <Filter/>
-  </Receiver>
-  <Receiver>
-    <Name>Document ID Generator</Name>
-    <Synchronization>Synchronous</Synchronization>
-    <Type>10002</Type>
-    <SequenceNumber>1001</SequenceNumber>
-    <Assembly>Microsoft.Office.DocumentManagement, Version=14.0.0.0, Culture=neutral, PublicKeyToken=71e9bce111e9429c</Assembly>
-    <Class>Microsoft.Office.DocumentManagement.Internal.DocIdHandler</Class>
-    <Data/>
-    <Filter/>
-  </Receiver>
-  <Receiver>
-    <Name>Document ID Generator</Name>
-    <Synchronization>Synchronous</Synchronization>
-    <Type>10004</Type>
-    <SequenceNumber>1002</SequenceNumber>
-    <Assembly>Microsoft.Office.DocumentManagement, Version=14.0.0.0, Culture=neutral, PublicKeyToken=71e9bce111e9429c</Assembly>
-    <Class>Microsoft.Office.DocumentManagement.Internal.DocIdHandler</Class>
-    <Data/>
-    <Filter/>
-  </Receiver>
-  <Receiver>
-    <Name>Document ID Generator</Name>
-    <Synchronization>Synchronous</Synchronization>
-    <Type>10006</Type>
-    <SequenceNumber>1003</SequenceNumber>
-    <Assembly>Microsoft.Office.DocumentManagement, Version=14.0.0.0, Culture=neutral, PublicKeyToken=71e9bce111e9429c</Assembly>
-    <Class>Microsoft.Office.DocumentManagement.Internal.DocIdHandler</Class>
-    <Data/>
-    <Filter/>
-  </Receiver>
-</spe:Receivers>
-</file>
-
-<file path=customXml/item2.xml><?xml version="1.0" encoding="utf-8"?>
 <p:properties xmlns:p="http://schemas.microsoft.com/office/2006/metadata/properties" xmlns:xsi="http://www.w3.org/2001/XMLSchema-instance" xmlns:pc="http://schemas.microsoft.com/office/infopath/2007/PartnerControls">
   <documentManagement>
     <_dlc_DocId xmlns="7bb5d761-a2ea-4873-95f7-7a6658fb3ef0">M4CWTKMW727E-592-73</_dlc_DocId>
@@ -34660,16 +34602,7 @@
 </p:properties>
 </file>
 
-<file path=customXml/item3.xml><?xml version="1.0" encoding="utf-8"?>
-<?mso-contentType ?>
-<FormTemplates xmlns="http://schemas.microsoft.com/sharepoint/v3/contenttype/forms">
-  <Display>DocumentLibraryForm</Display>
-  <Edit>DocumentLibraryForm</Edit>
-  <New>DocumentLibraryForm</New>
-</FormTemplates>
-</file>
-
-<file path=customXml/item4.xml><?xml version="1.0" encoding="utf-8"?>
+<file path=customXml/item2.xml><?xml version="1.0" encoding="utf-8"?>
 <ct:contentTypeSchema xmlns:ct="http://schemas.microsoft.com/office/2006/metadata/contentType" xmlns:ma="http://schemas.microsoft.com/office/2006/metadata/properties/metaAttributes" ct:_="" ma:_="" ma:contentTypeName="Document" ma:contentTypeID="0x0101000812F700BE7F874999720E88173FE491" ma:contentTypeVersion="0" ma:contentTypeDescription="Create a new document." ma:contentTypeScope="" ma:versionID="3f79f408e2ca720b7aba6e0e32464d0c">
   <xsd:schema xmlns:xsd="http://www.w3.org/2001/XMLSchema" xmlns:xs="http://www.w3.org/2001/XMLSchema" xmlns:p="http://schemas.microsoft.com/office/2006/metadata/properties" xmlns:ns2="7bb5d761-a2ea-4873-95f7-7a6658fb3ef0" targetNamespace="http://schemas.microsoft.com/office/2006/metadata/properties" ma:root="true" ma:fieldsID="1e062cd38ba31e406bfc4340fbc7f87a" ns2:_="">
     <xsd:import namespace="7bb5d761-a2ea-4873-95f7-7a6658fb3ef0"/>
@@ -34814,15 +34747,62 @@
 </ct:contentTypeSchema>
 </file>
 
-<file path=customXml/itemProps1.xml><?xml version="1.0" encoding="utf-8"?>
-<ds:datastoreItem xmlns:ds="http://schemas.openxmlformats.org/officeDocument/2006/customXml" ds:itemID="{B13EBC30-FE27-4C6A-B723-23FC2188F7DC}">
-  <ds:schemaRefs>
-    <ds:schemaRef ds:uri="http://schemas.microsoft.com/sharepoint/events"/>
-  </ds:schemaRefs>
-</ds:datastoreItem>
+<file path=customXml/item3.xml><?xml version="1.0" encoding="utf-8"?>
+<?mso-contentType ?>
+<FormTemplates xmlns="http://schemas.microsoft.com/sharepoint/v3/contenttype/forms">
+  <Display>DocumentLibraryForm</Display>
+  <Edit>DocumentLibraryForm</Edit>
+  <New>DocumentLibraryForm</New>
+</FormTemplates>
 </file>
 
-<file path=customXml/itemProps2.xml><?xml version="1.0" encoding="utf-8"?>
+<file path=customXml/item4.xml><?xml version="1.0" encoding="utf-8"?>
+<?mso-contentType ?>
+<spe:Receivers xmlns:spe="http://schemas.microsoft.com/sharepoint/events">
+  <Receiver>
+    <Name>Document ID Generator</Name>
+    <Synchronization>Synchronous</Synchronization>
+    <Type>10001</Type>
+    <SequenceNumber>1000</SequenceNumber>
+    <Assembly>Microsoft.Office.DocumentManagement, Version=14.0.0.0, Culture=neutral, PublicKeyToken=71e9bce111e9429c</Assembly>
+    <Class>Microsoft.Office.DocumentManagement.Internal.DocIdHandler</Class>
+    <Data/>
+    <Filter/>
+  </Receiver>
+  <Receiver>
+    <Name>Document ID Generator</Name>
+    <Synchronization>Synchronous</Synchronization>
+    <Type>10002</Type>
+    <SequenceNumber>1001</SequenceNumber>
+    <Assembly>Microsoft.Office.DocumentManagement, Version=14.0.0.0, Culture=neutral, PublicKeyToken=71e9bce111e9429c</Assembly>
+    <Class>Microsoft.Office.DocumentManagement.Internal.DocIdHandler</Class>
+    <Data/>
+    <Filter/>
+  </Receiver>
+  <Receiver>
+    <Name>Document ID Generator</Name>
+    <Synchronization>Synchronous</Synchronization>
+    <Type>10004</Type>
+    <SequenceNumber>1002</SequenceNumber>
+    <Assembly>Microsoft.Office.DocumentManagement, Version=14.0.0.0, Culture=neutral, PublicKeyToken=71e9bce111e9429c</Assembly>
+    <Class>Microsoft.Office.DocumentManagement.Internal.DocIdHandler</Class>
+    <Data/>
+    <Filter/>
+  </Receiver>
+  <Receiver>
+    <Name>Document ID Generator</Name>
+    <Synchronization>Synchronous</Synchronization>
+    <Type>10006</Type>
+    <SequenceNumber>1003</SequenceNumber>
+    <Assembly>Microsoft.Office.DocumentManagement, Version=14.0.0.0, Culture=neutral, PublicKeyToken=71e9bce111e9429c</Assembly>
+    <Class>Microsoft.Office.DocumentManagement.Internal.DocIdHandler</Class>
+    <Data/>
+    <Filter/>
+  </Receiver>
+</spe:Receivers>
+</file>
+
+<file path=customXml/itemProps1.xml><?xml version="1.0" encoding="utf-8"?>
 <ds:datastoreItem xmlns:ds="http://schemas.openxmlformats.org/officeDocument/2006/customXml" ds:itemID="{6921749B-AEB7-461B-845F-603CABD25259}">
   <ds:schemaRefs>
     <ds:schemaRef ds:uri="http://purl.org/dc/terms/"/>
@@ -34838,15 +34818,7 @@
 </ds:datastoreItem>
 </file>
 
-<file path=customXml/itemProps3.xml><?xml version="1.0" encoding="utf-8"?>
-<ds:datastoreItem xmlns:ds="http://schemas.openxmlformats.org/officeDocument/2006/customXml" ds:itemID="{5CDEB364-43EC-4510-9881-539C2A3FCE9E}">
-  <ds:schemaRefs>
-    <ds:schemaRef ds:uri="http://schemas.microsoft.com/sharepoint/v3/contenttype/forms"/>
-  </ds:schemaRefs>
-</ds:datastoreItem>
-</file>
-
-<file path=customXml/itemProps4.xml><?xml version="1.0" encoding="utf-8"?>
+<file path=customXml/itemProps2.xml><?xml version="1.0" encoding="utf-8"?>
 <ds:datastoreItem xmlns:ds="http://schemas.openxmlformats.org/officeDocument/2006/customXml" ds:itemID="{164479E5-0B02-49AC-B79E-EC1D6164DDD3}">
   <ds:schemaRefs>
     <ds:schemaRef ds:uri="http://schemas.microsoft.com/office/2006/metadata/contentType"/>
@@ -34862,4 +34834,20 @@
     <ds:schemaRef ds:uri="http://schemas.microsoft.com/internal/obd"/>
   </ds:schemaRefs>
 </ds:datastoreItem>
+</file>
+
+<file path=customXml/itemProps3.xml><?xml version="1.0" encoding="utf-8"?>
+<ds:datastoreItem xmlns:ds="http://schemas.openxmlformats.org/officeDocument/2006/customXml" ds:itemID="{5CDEB364-43EC-4510-9881-539C2A3FCE9E}">
+  <ds:schemaRefs>
+    <ds:schemaRef ds:uri="http://schemas.microsoft.com/sharepoint/v3/contenttype/forms"/>
+  </ds:schemaRefs>
+</ds:datastoreItem>
+</file>
+
+<file path=customXml/itemProps4.xml><?xml version="1.0" encoding="utf-8"?>
+<ds:datastoreItem xmlns:ds="http://schemas.openxmlformats.org/officeDocument/2006/customXml" ds:itemID="{B13EBC30-FE27-4C6A-B723-23FC2188F7DC}">
+  <ds:schemaRefs>
+    <ds:schemaRef ds:uri="http://schemas.microsoft.com/sharepoint/events"/>
+  </ds:schemaRefs>
+</ds:datastoreItem>
 </file>
</xml_diff>

<commit_message>
fixed highlight on slide 3-53 to show only protocol change
</commit_message>
<xml_diff>
--- a/03-initial-configuration-scans.pptx
+++ b/03-initial-configuration-scans.pptx
@@ -335,7 +335,7 @@
               <a:pPr>
                 <a:defRPr/>
               </a:pPr>
-              <a:t>2016-02-12</a:t>
+              <a:t>2016-02-23</a:t>
             </a:fld>
             <a:endParaRPr lang="en-US" dirty="0"/>
           </a:p>
@@ -518,7 +518,7 @@
               <a:pPr>
                 <a:defRPr/>
               </a:pPr>
-              <a:t>2016-02-12</a:t>
+              <a:t>2016-02-23</a:t>
             </a:fld>
             <a:endParaRPr lang="en-US" dirty="0"/>
           </a:p>
@@ -12575,14 +12575,14 @@
           </a:ln>
           <a:extLst>
             <a:ext uri="{909E8E84-426E-40dd-AFC4-6F175D3DCCD1}">
-              <a14:hiddenFill xmlns:a14="http://schemas.microsoft.com/office/drawing/2010/main" xmlns="">
+              <a14:hiddenFill xmlns="" xmlns:a14="http://schemas.microsoft.com/office/drawing/2010/main">
                 <a:solidFill>
                   <a:srgbClr val="FFFFFF"/>
                 </a:solidFill>
               </a14:hiddenFill>
             </a:ext>
             <a:ext uri="{91240B29-F687-4f45-9708-019B960494DF}">
-              <a14:hiddenLine xmlns:a14="http://schemas.microsoft.com/office/drawing/2010/main" xmlns="" w="9525">
+              <a14:hiddenLine xmlns="" xmlns:a14="http://schemas.microsoft.com/office/drawing/2010/main" w="9525">
                 <a:solidFill>
                   <a:srgbClr val="000000"/>
                 </a:solidFill>
@@ -12730,14 +12730,14 @@
           </a:ln>
           <a:extLst>
             <a:ext uri="{909E8E84-426E-40dd-AFC4-6F175D3DCCD1}">
-              <a14:hiddenFill xmlns:a14="http://schemas.microsoft.com/office/drawing/2010/main" xmlns="">
+              <a14:hiddenFill xmlns="" xmlns:a14="http://schemas.microsoft.com/office/drawing/2010/main">
                 <a:solidFill>
                   <a:srgbClr val="FFFFFF"/>
                 </a:solidFill>
               </a14:hiddenFill>
             </a:ext>
             <a:ext uri="{91240B29-F687-4f45-9708-019B960494DF}">
-              <a14:hiddenLine xmlns:a14="http://schemas.microsoft.com/office/drawing/2010/main" xmlns="" w="9525">
+              <a14:hiddenLine xmlns="" xmlns:a14="http://schemas.microsoft.com/office/drawing/2010/main" w="9525">
                 <a:solidFill>
                   <a:srgbClr val="000000"/>
                 </a:solidFill>
@@ -13228,14 +13228,14 @@
           </a:ln>
           <a:extLst>
             <a:ext uri="{909E8E84-426E-40dd-AFC4-6F175D3DCCD1}">
-              <a14:hiddenFill xmlns:a14="http://schemas.microsoft.com/office/drawing/2010/main" xmlns="">
+              <a14:hiddenFill xmlns="" xmlns:a14="http://schemas.microsoft.com/office/drawing/2010/main">
                 <a:solidFill>
                   <a:srgbClr val="FFFFFF"/>
                 </a:solidFill>
               </a14:hiddenFill>
             </a:ext>
             <a:ext uri="{91240B29-F687-4f45-9708-019B960494DF}">
-              <a14:hiddenLine xmlns:a14="http://schemas.microsoft.com/office/drawing/2010/main" xmlns="" w="9525">
+              <a14:hiddenLine xmlns="" xmlns:a14="http://schemas.microsoft.com/office/drawing/2010/main" w="9525">
                 <a:solidFill>
                   <a:srgbClr val="000000"/>
                 </a:solidFill>
@@ -13474,14 +13474,14 @@
           </a:ln>
           <a:extLst>
             <a:ext uri="{909E8E84-426E-40dd-AFC4-6F175D3DCCD1}">
-              <a14:hiddenFill xmlns:a14="http://schemas.microsoft.com/office/drawing/2010/main" xmlns="">
+              <a14:hiddenFill xmlns="" xmlns:a14="http://schemas.microsoft.com/office/drawing/2010/main">
                 <a:solidFill>
                   <a:srgbClr val="FFFFFF"/>
                 </a:solidFill>
               </a14:hiddenFill>
             </a:ext>
             <a:ext uri="{91240B29-F687-4f45-9708-019B960494DF}">
-              <a14:hiddenLine xmlns:a14="http://schemas.microsoft.com/office/drawing/2010/main" xmlns="" w="9525">
+              <a14:hiddenLine xmlns="" xmlns:a14="http://schemas.microsoft.com/office/drawing/2010/main" w="9525">
                 <a:solidFill>
                   <a:srgbClr val="000000"/>
                 </a:solidFill>
@@ -15409,14 +15409,14 @@
           </a:ln>
           <a:extLst>
             <a:ext uri="{909E8E84-426E-40dd-AFC4-6F175D3DCCD1}">
-              <a14:hiddenFill xmlns:a14="http://schemas.microsoft.com/office/drawing/2010/main" xmlns="">
+              <a14:hiddenFill xmlns="" xmlns:a14="http://schemas.microsoft.com/office/drawing/2010/main">
                 <a:solidFill>
                   <a:srgbClr val="FFFFFF"/>
                 </a:solidFill>
               </a14:hiddenFill>
             </a:ext>
             <a:ext uri="{91240B29-F687-4f45-9708-019B960494DF}">
-              <a14:hiddenLine xmlns:a14="http://schemas.microsoft.com/office/drawing/2010/main" xmlns="" w="9525">
+              <a14:hiddenLine xmlns="" xmlns:a14="http://schemas.microsoft.com/office/drawing/2010/main" w="9525">
                 <a:solidFill>
                   <a:srgbClr val="000000"/>
                 </a:solidFill>
@@ -16950,14 +16950,14 @@
           </a:ln>
           <a:extLst>
             <a:ext uri="{909E8E84-426E-40dd-AFC4-6F175D3DCCD1}">
-              <a14:hiddenFill xmlns:a14="http://schemas.microsoft.com/office/drawing/2010/main" xmlns="">
+              <a14:hiddenFill xmlns="" xmlns:a14="http://schemas.microsoft.com/office/drawing/2010/main">
                 <a:solidFill>
                   <a:srgbClr val="FFFFFF"/>
                 </a:solidFill>
               </a14:hiddenFill>
             </a:ext>
             <a:ext uri="{91240B29-F687-4f45-9708-019B960494DF}">
-              <a14:hiddenLine xmlns:a14="http://schemas.microsoft.com/office/drawing/2010/main" xmlns="" w="9525">
+              <a14:hiddenLine xmlns="" xmlns:a14="http://schemas.microsoft.com/office/drawing/2010/main" w="9525">
                 <a:solidFill>
                   <a:srgbClr val="000000"/>
                 </a:solidFill>
@@ -17515,14 +17515,14 @@
           </a:ln>
           <a:extLst>
             <a:ext uri="{909E8E84-426E-40dd-AFC4-6F175D3DCCD1}">
-              <a14:hiddenFill xmlns:a14="http://schemas.microsoft.com/office/drawing/2010/main" xmlns="">
+              <a14:hiddenFill xmlns="" xmlns:a14="http://schemas.microsoft.com/office/drawing/2010/main">
                 <a:solidFill>
                   <a:srgbClr val="FFFFFF"/>
                 </a:solidFill>
               </a14:hiddenFill>
             </a:ext>
             <a:ext uri="{91240B29-F687-4f45-9708-019B960494DF}">
-              <a14:hiddenLine xmlns:a14="http://schemas.microsoft.com/office/drawing/2010/main" xmlns="" w="9525">
+              <a14:hiddenLine xmlns="" xmlns:a14="http://schemas.microsoft.com/office/drawing/2010/main" w="9525">
                 <a:solidFill>
                   <a:srgbClr val="000000"/>
                 </a:solidFill>
@@ -18089,14 +18089,14 @@
           </a:ln>
           <a:extLst>
             <a:ext uri="{909E8E84-426E-40dd-AFC4-6F175D3DCCD1}">
-              <a14:hiddenFill xmlns:a14="http://schemas.microsoft.com/office/drawing/2010/main" xmlns="">
+              <a14:hiddenFill xmlns="" xmlns:a14="http://schemas.microsoft.com/office/drawing/2010/main">
                 <a:solidFill>
                   <a:srgbClr val="FFFFFF"/>
                 </a:solidFill>
               </a14:hiddenFill>
             </a:ext>
             <a:ext uri="{91240B29-F687-4f45-9708-019B960494DF}">
-              <a14:hiddenLine xmlns:a14="http://schemas.microsoft.com/office/drawing/2010/main" xmlns="" w="9525">
+              <a14:hiddenLine xmlns="" xmlns:a14="http://schemas.microsoft.com/office/drawing/2010/main" w="9525">
                 <a:solidFill>
                   <a:srgbClr val="000000"/>
                 </a:solidFill>
@@ -19036,14 +19036,14 @@
           </a:ln>
           <a:extLst>
             <a:ext uri="{909E8E84-426E-40dd-AFC4-6F175D3DCCD1}">
-              <a14:hiddenFill xmlns:a14="http://schemas.microsoft.com/office/drawing/2010/main" xmlns="">
+              <a14:hiddenFill xmlns="" xmlns:a14="http://schemas.microsoft.com/office/drawing/2010/main">
                 <a:solidFill>
                   <a:srgbClr val="FFFFFF"/>
                 </a:solidFill>
               </a14:hiddenFill>
             </a:ext>
             <a:ext uri="{91240B29-F687-4f45-9708-019B960494DF}">
-              <a14:hiddenLine xmlns:a14="http://schemas.microsoft.com/office/drawing/2010/main" xmlns="" w="9525">
+              <a14:hiddenLine xmlns="" xmlns:a14="http://schemas.microsoft.com/office/drawing/2010/main" w="9525">
                 <a:solidFill>
                   <a:srgbClr val="000000"/>
                 </a:solidFill>
@@ -19796,14 +19796,14 @@
           </a:ln>
           <a:extLst>
             <a:ext uri="{909E8E84-426E-40dd-AFC4-6F175D3DCCD1}">
-              <a14:hiddenFill xmlns:a14="http://schemas.microsoft.com/office/drawing/2010/main" xmlns="">
+              <a14:hiddenFill xmlns="" xmlns:a14="http://schemas.microsoft.com/office/drawing/2010/main">
                 <a:solidFill>
                   <a:srgbClr val="FFFFFF"/>
                 </a:solidFill>
               </a14:hiddenFill>
             </a:ext>
             <a:ext uri="{91240B29-F687-4f45-9708-019B960494DF}">
-              <a14:hiddenLine xmlns:a14="http://schemas.microsoft.com/office/drawing/2010/main" xmlns="" w="9525">
+              <a14:hiddenLine xmlns="" xmlns:a14="http://schemas.microsoft.com/office/drawing/2010/main" w="9525">
                 <a:solidFill>
                   <a:srgbClr val="000000"/>
                 </a:solidFill>
@@ -30638,8 +30638,8 @@
         </p:nvSpPr>
         <p:spPr bwMode="auto">
           <a:xfrm>
-            <a:off x="1122159" y="5534527"/>
-            <a:ext cx="14431939" cy="1128344"/>
+            <a:off x="1122159" y="6012179"/>
+            <a:ext cx="14431939" cy="650691"/>
           </a:xfrm>
           <a:prstGeom prst="rect">
             <a:avLst/>
@@ -34591,18 +34591,6 @@
 </file>
 
 <file path=customXml/item1.xml><?xml version="1.0" encoding="utf-8"?>
-<p:properties xmlns:p="http://schemas.microsoft.com/office/2006/metadata/properties" xmlns:xsi="http://www.w3.org/2001/XMLSchema-instance" xmlns:pc="http://schemas.microsoft.com/office/infopath/2007/PartnerControls">
-  <documentManagement>
-    <_dlc_DocId xmlns="7bb5d761-a2ea-4873-95f7-7a6658fb3ef0">M4CWTKMW727E-592-73</_dlc_DocId>
-    <_dlc_DocIdUrl xmlns="7bb5d761-a2ea-4873-95f7-7a6658fb3ef0">
-      <Url>https://kms.vci.local/marketing/team/_layouts/DocIdRedir.aspx?ID=M4CWTKMW727E-592-73</Url>
-      <Description>M4CWTKMW727E-592-73</Description>
-    </_dlc_DocIdUrl>
-  </documentManagement>
-</p:properties>
-</file>
-
-<file path=customXml/item2.xml><?xml version="1.0" encoding="utf-8"?>
 <ct:contentTypeSchema xmlns:ct="http://schemas.microsoft.com/office/2006/metadata/contentType" xmlns:ma="http://schemas.microsoft.com/office/2006/metadata/properties/metaAttributes" ct:_="" ma:_="" ma:contentTypeName="Document" ma:contentTypeID="0x0101000812F700BE7F874999720E88173FE491" ma:contentTypeVersion="0" ma:contentTypeDescription="Create a new document." ma:contentTypeScope="" ma:versionID="3f79f408e2ca720b7aba6e0e32464d0c">
   <xsd:schema xmlns:xsd="http://www.w3.org/2001/XMLSchema" xmlns:xs="http://www.w3.org/2001/XMLSchema" xmlns:p="http://schemas.microsoft.com/office/2006/metadata/properties" xmlns:ns2="7bb5d761-a2ea-4873-95f7-7a6658fb3ef0" targetNamespace="http://schemas.microsoft.com/office/2006/metadata/properties" ma:root="true" ma:fieldsID="1e062cd38ba31e406bfc4340fbc7f87a" ns2:_="">
     <xsd:import namespace="7bb5d761-a2ea-4873-95f7-7a6658fb3ef0"/>
@@ -34747,16 +34735,7 @@
 </ct:contentTypeSchema>
 </file>
 
-<file path=customXml/item3.xml><?xml version="1.0" encoding="utf-8"?>
-<?mso-contentType ?>
-<FormTemplates xmlns="http://schemas.microsoft.com/sharepoint/v3/contenttype/forms">
-  <Display>DocumentLibraryForm</Display>
-  <Edit>DocumentLibraryForm</Edit>
-  <New>DocumentLibraryForm</New>
-</FormTemplates>
-</file>
-
-<file path=customXml/item4.xml><?xml version="1.0" encoding="utf-8"?>
+<file path=customXml/item2.xml><?xml version="1.0" encoding="utf-8"?>
 <?mso-contentType ?>
 <spe:Receivers xmlns:spe="http://schemas.microsoft.com/sharepoint/events">
   <Receiver>
@@ -34802,23 +34781,28 @@
 </spe:Receivers>
 </file>
 
-<file path=customXml/itemProps1.xml><?xml version="1.0" encoding="utf-8"?>
-<ds:datastoreItem xmlns:ds="http://schemas.openxmlformats.org/officeDocument/2006/customXml" ds:itemID="{6921749B-AEB7-461B-845F-603CABD25259}">
-  <ds:schemaRefs>
-    <ds:schemaRef ds:uri="http://purl.org/dc/terms/"/>
-    <ds:schemaRef ds:uri="http://schemas.openxmlformats.org/package/2006/metadata/core-properties"/>
-    <ds:schemaRef ds:uri="http://purl.org/dc/dcmitype/"/>
-    <ds:schemaRef ds:uri="http://schemas.microsoft.com/office/infopath/2007/PartnerControls"/>
-    <ds:schemaRef ds:uri="http://purl.org/dc/elements/1.1/"/>
-    <ds:schemaRef ds:uri="http://schemas.microsoft.com/office/2006/metadata/properties"/>
-    <ds:schemaRef ds:uri="http://schemas.microsoft.com/office/2006/documentManagement/types"/>
-    <ds:schemaRef ds:uri="7bb5d761-a2ea-4873-95f7-7a6658fb3ef0"/>
-    <ds:schemaRef ds:uri="http://www.w3.org/XML/1998/namespace"/>
-  </ds:schemaRefs>
-</ds:datastoreItem>
+<file path=customXml/item3.xml><?xml version="1.0" encoding="utf-8"?>
+<?mso-contentType ?>
+<FormTemplates xmlns="http://schemas.microsoft.com/sharepoint/v3/contenttype/forms">
+  <Display>DocumentLibraryForm</Display>
+  <Edit>DocumentLibraryForm</Edit>
+  <New>DocumentLibraryForm</New>
+</FormTemplates>
 </file>
 
-<file path=customXml/itemProps2.xml><?xml version="1.0" encoding="utf-8"?>
+<file path=customXml/item4.xml><?xml version="1.0" encoding="utf-8"?>
+<p:properties xmlns:p="http://schemas.microsoft.com/office/2006/metadata/properties" xmlns:xsi="http://www.w3.org/2001/XMLSchema-instance" xmlns:pc="http://schemas.microsoft.com/office/infopath/2007/PartnerControls">
+  <documentManagement>
+    <_dlc_DocId xmlns="7bb5d761-a2ea-4873-95f7-7a6658fb3ef0">M4CWTKMW727E-592-73</_dlc_DocId>
+    <_dlc_DocIdUrl xmlns="7bb5d761-a2ea-4873-95f7-7a6658fb3ef0">
+      <Url>https://kms.vci.local/marketing/team/_layouts/DocIdRedir.aspx?ID=M4CWTKMW727E-592-73</Url>
+      <Description>M4CWTKMW727E-592-73</Description>
+    </_dlc_DocIdUrl>
+  </documentManagement>
+</p:properties>
+</file>
+
+<file path=customXml/itemProps1.xml><?xml version="1.0" encoding="utf-8"?>
 <ds:datastoreItem xmlns:ds="http://schemas.openxmlformats.org/officeDocument/2006/customXml" ds:itemID="{164479E5-0B02-49AC-B79E-EC1D6164DDD3}">
   <ds:schemaRefs>
     <ds:schemaRef ds:uri="http://schemas.microsoft.com/office/2006/metadata/contentType"/>
@@ -34836,6 +34820,14 @@
 </ds:datastoreItem>
 </file>
 
+<file path=customXml/itemProps2.xml><?xml version="1.0" encoding="utf-8"?>
+<ds:datastoreItem xmlns:ds="http://schemas.openxmlformats.org/officeDocument/2006/customXml" ds:itemID="{B13EBC30-FE27-4C6A-B723-23FC2188F7DC}">
+  <ds:schemaRefs>
+    <ds:schemaRef ds:uri="http://schemas.microsoft.com/sharepoint/events"/>
+  </ds:schemaRefs>
+</ds:datastoreItem>
+</file>
+
 <file path=customXml/itemProps3.xml><?xml version="1.0" encoding="utf-8"?>
 <ds:datastoreItem xmlns:ds="http://schemas.openxmlformats.org/officeDocument/2006/customXml" ds:itemID="{5CDEB364-43EC-4510-9881-539C2A3FCE9E}">
   <ds:schemaRefs>
@@ -34845,9 +34837,17 @@
 </file>
 
 <file path=customXml/itemProps4.xml><?xml version="1.0" encoding="utf-8"?>
-<ds:datastoreItem xmlns:ds="http://schemas.openxmlformats.org/officeDocument/2006/customXml" ds:itemID="{B13EBC30-FE27-4C6A-B723-23FC2188F7DC}">
+<ds:datastoreItem xmlns:ds="http://schemas.openxmlformats.org/officeDocument/2006/customXml" ds:itemID="{6921749B-AEB7-461B-845F-603CABD25259}">
   <ds:schemaRefs>
-    <ds:schemaRef ds:uri="http://schemas.microsoft.com/sharepoint/events"/>
+    <ds:schemaRef ds:uri="http://purl.org/dc/terms/"/>
+    <ds:schemaRef ds:uri="http://schemas.openxmlformats.org/package/2006/metadata/core-properties"/>
+    <ds:schemaRef ds:uri="http://purl.org/dc/dcmitype/"/>
+    <ds:schemaRef ds:uri="http://schemas.microsoft.com/office/infopath/2007/PartnerControls"/>
+    <ds:schemaRef ds:uri="http://purl.org/dc/elements/1.1/"/>
+    <ds:schemaRef ds:uri="http://schemas.microsoft.com/office/2006/metadata/properties"/>
+    <ds:schemaRef ds:uri="http://schemas.microsoft.com/office/2006/documentManagement/types"/>
+    <ds:schemaRef ds:uri="7bb5d761-a2ea-4873-95f7-7a6658fb3ef0"/>
+    <ds:schemaRef ds:uri="http://www.w3.org/XML/1998/namespace"/>
   </ds:schemaRefs>
 </ds:datastoreItem>
 </file>
</xml_diff>